<commit_message>
Ajout d'images sur le powerpoint
</commit_message>
<xml_diff>
--- a/app/src/main/assets/powerpointvierge.pptx
+++ b/app/src/main/assets/powerpointvierge.pptx
@@ -210,7 +210,7 @@
           <a:p>
             <a:fld id="{8EF2C5CC-36BA-4C84-AC43-9F8430F4AE76}" type="datetimeFigureOut">
               <a:rPr lang="fr-FR" smtClean="0"/>
-              <a:t>22/06/2023</a:t>
+              <a:t>23/06/2023</a:t>
             </a:fld>
             <a:endParaRPr lang="fr-FR"/>
           </a:p>
@@ -1168,104 +1168,6 @@
           <a:chExt cx="0" cy="0"/>
         </a:xfrm>
       </p:grpSpPr>
-      <p:graphicFrame>
-        <p:nvGraphicFramePr>
-          <p:cNvPr id="5" name="Tableau 4">
-            <a:extLst>
-              <a:ext uri="{FF2B5EF4-FFF2-40B4-BE49-F238E27FC236}">
-                <a16:creationId xmlns:a16="http://schemas.microsoft.com/office/drawing/2014/main" id="{5C788EFF-A6F2-C9B1-60C6-018B39CDF800}"/>
-              </a:ext>
-            </a:extLst>
-          </p:cNvPr>
-          <p:cNvGraphicFramePr>
-            <a:graphicFrameLocks noGrp="1"/>
-          </p:cNvGraphicFramePr>
-          <p:nvPr>
-            <p:extLst>
-              <p:ext uri="{D42A27DB-BD31-4B8C-83A1-F6EECF244321}">
-                <p14:modId xmlns:p14="http://schemas.microsoft.com/office/powerpoint/2010/main" val="2969227142"/>
-              </p:ext>
-            </p:extLst>
-          </p:nvPr>
-        </p:nvGraphicFramePr>
-        <p:xfrm>
-          <a:off x="174562" y="1423858"/>
-          <a:ext cx="6570270" cy="3745671"/>
-        </p:xfrm>
-        <a:graphic>
-          <a:graphicData uri="http://schemas.openxmlformats.org/drawingml/2006/table">
-            <a:tbl>
-              <a:tblPr firstRow="1" bandRow="1">
-                <a:tableStyleId>{5C22544A-7EE6-4342-B048-85BDC9FD1C3A}</a:tableStyleId>
-              </a:tblPr>
-              <a:tblGrid>
-                <a:gridCol w="6570270">
-                  <a:extLst>
-                    <a:ext uri="{9D8B030D-6E8A-4147-A177-3AD203B41FA5}">
-                      <a16:colId xmlns:a16="http://schemas.microsoft.com/office/drawing/2014/main" val="4188322631"/>
-                    </a:ext>
-                  </a:extLst>
-                </a:gridCol>
-              </a:tblGrid>
-              <a:tr h="3745671">
-                <a:tc>
-                  <a:txBody>
-                    <a:bodyPr/>
-                    <a:lstStyle/>
-                    <a:p>
-                      <a:endParaRPr lang="fr-FR" dirty="0"/>
-                    </a:p>
-                  </a:txBody>
-                  <a:tcPr>
-                    <a:lnL w="6350" cap="flat" cmpd="sng" algn="ctr">
-                      <a:solidFill>
-                        <a:schemeClr val="tx1"/>
-                      </a:solidFill>
-                      <a:prstDash val="sysDot"/>
-                      <a:round/>
-                      <a:headEnd type="none" w="med" len="med"/>
-                      <a:tailEnd type="none" w="med" len="med"/>
-                    </a:lnL>
-                    <a:lnR w="6350" cap="flat" cmpd="sng" algn="ctr">
-                      <a:solidFill>
-                        <a:schemeClr val="tx1"/>
-                      </a:solidFill>
-                      <a:prstDash val="sysDot"/>
-                      <a:round/>
-                      <a:headEnd type="none" w="med" len="med"/>
-                      <a:tailEnd type="none" w="med" len="med"/>
-                    </a:lnR>
-                    <a:lnT w="6350" cap="flat" cmpd="sng" algn="ctr">
-                      <a:solidFill>
-                        <a:schemeClr val="tx1"/>
-                      </a:solidFill>
-                      <a:prstDash val="sysDot"/>
-                      <a:round/>
-                      <a:headEnd type="none" w="med" len="med"/>
-                      <a:tailEnd type="none" w="med" len="med"/>
-                    </a:lnT>
-                    <a:lnB w="6350" cap="flat" cmpd="sng" algn="ctr">
-                      <a:solidFill>
-                        <a:schemeClr val="tx1"/>
-                      </a:solidFill>
-                      <a:prstDash val="sysDot"/>
-                      <a:round/>
-                      <a:headEnd type="none" w="med" len="med"/>
-                      <a:tailEnd type="none" w="med" len="med"/>
-                    </a:lnB>
-                    <a:noFill/>
-                  </a:tcPr>
-                </a:tc>
-                <a:extLst>
-                  <a:ext uri="{0D108BD9-81ED-4DB2-BD59-A6C34878D82A}">
-                    <a16:rowId xmlns:a16="http://schemas.microsoft.com/office/drawing/2014/main" val="2545247298"/>
-                  </a:ext>
-                </a:extLst>
-              </a:tr>
-            </a:tbl>
-          </a:graphicData>
-        </a:graphic>
-      </p:graphicFrame>
       <p:sp>
         <p:nvSpPr>
           <p:cNvPr id="7" name="ZoneTexte 6">
@@ -1314,7 +1216,7 @@
               <a:defRPr/>
             </a:pPr>
             <a:r>
-              <a:rPr kumimoji="0" lang="fr-FR" sz="1400" b="0" i="0" u="none" strike="noStrike" kern="1200" cap="none" spc="0" normalizeH="0" baseline="0" noProof="0">
+              <a:rPr kumimoji="0" lang="fr-FR" sz="1400" b="0" i="0" u="none" strike="noStrike" kern="1200" cap="none" spc="0" normalizeH="0" baseline="0" noProof="0" dirty="0">
                 <a:ln>
                   <a:noFill/>
                 </a:ln>
@@ -1752,6 +1654,51 @@
               <a:rPr lang="fr-FR" dirty="0"/>
               <a:t> </a:t>
             </a:r>
+          </a:p>
+        </p:txBody>
+      </p:sp>
+      <p:sp>
+        <p:nvSpPr>
+          <p:cNvPr id="3" name="photoBatiment">
+            <a:extLst>
+              <a:ext uri="{FF2B5EF4-FFF2-40B4-BE49-F238E27FC236}">
+                <a16:creationId xmlns:a16="http://schemas.microsoft.com/office/drawing/2014/main" id="{6C9A715B-5E48-46B3-BE70-10F546F00A48}"/>
+              </a:ext>
+            </a:extLst>
+          </p:cNvPr>
+          <p:cNvSpPr/>
+          <p:nvPr/>
+        </p:nvSpPr>
+        <p:spPr>
+          <a:xfrm>
+            <a:off x="187060" y="1006729"/>
+            <a:ext cx="6575247" cy="4224490"/>
+          </a:xfrm>
+          <a:prstGeom prst="rect">
+            <a:avLst/>
+          </a:prstGeom>
+          <a:noFill/>
+        </p:spPr>
+        <p:style>
+          <a:lnRef idx="2">
+            <a:schemeClr val="accent6"/>
+          </a:lnRef>
+          <a:fillRef idx="1">
+            <a:schemeClr val="lt1"/>
+          </a:fillRef>
+          <a:effectRef idx="0">
+            <a:schemeClr val="accent6"/>
+          </a:effectRef>
+          <a:fontRef idx="minor">
+            <a:schemeClr val="dk1"/>
+          </a:fontRef>
+        </p:style>
+        <p:txBody>
+          <a:bodyPr rtlCol="0" anchor="ctr"/>
+          <a:lstStyle/>
+          <a:p>
+            <a:pPr algn="ctr"/>
+            <a:endParaRPr lang="fr-FR"/>
           </a:p>
         </p:txBody>
       </p:sp>
@@ -5705,7 +5652,7 @@
                     <a:bodyPr/>
                     <a:lstStyle/>
                     <a:p>
-                      <a:endParaRPr lang="fr-FR"/>
+                      <a:endParaRPr lang="fr-FR" dirty="0"/>
                     </a:p>
                   </a:txBody>
                   <a:tcPr>
@@ -5760,7 +5707,7 @@
       </p:graphicFrame>
       <p:sp>
         <p:nvSpPr>
-          <p:cNvPr id="28" name="ZoneTexte 27">
+          <p:cNvPr id="28" name="remarqueRemarques enveloppe thermique">
             <a:extLst>
               <a:ext uri="{FF2B5EF4-FFF2-40B4-BE49-F238E27FC236}">
                 <a16:creationId xmlns:a16="http://schemas.microsoft.com/office/drawing/2014/main" id="{EA69ACDB-ABB6-FAD3-1660-FBC3F1C9E8EF}"/>
@@ -8067,7 +8014,7 @@
       </p:sp>
       <p:sp>
         <p:nvSpPr>
-          <p:cNvPr id="6" name="ZoneTexte 5">
+          <p:cNvPr id="6" name="remarqueRemarque systèmes">
             <a:extLst>
               <a:ext uri="{FF2B5EF4-FFF2-40B4-BE49-F238E27FC236}">
                 <a16:creationId xmlns:a16="http://schemas.microsoft.com/office/drawing/2014/main" id="{8EB9C361-8ED1-9CA4-950A-FE3D3A95E26A}"/>
@@ -8131,6 +8078,1126 @@
           </a:p>
         </p:txBody>
       </p:sp>
+      <p:graphicFrame>
+        <p:nvGraphicFramePr>
+          <p:cNvPr id="4" name="tableauEclairage">
+            <a:extLst>
+              <a:ext uri="{FF2B5EF4-FFF2-40B4-BE49-F238E27FC236}">
+                <a16:creationId xmlns:a16="http://schemas.microsoft.com/office/drawing/2014/main" id="{155E2EF7-8CF0-4AEC-3AAC-8569F445D991}"/>
+              </a:ext>
+            </a:extLst>
+          </p:cNvPr>
+          <p:cNvGraphicFramePr>
+            <a:graphicFrameLocks noGrp="1"/>
+          </p:cNvGraphicFramePr>
+          <p:nvPr>
+            <p:extLst>
+              <p:ext uri="{D42A27DB-BD31-4B8C-83A1-F6EECF244321}">
+                <p14:modId xmlns:p14="http://schemas.microsoft.com/office/powerpoint/2010/main" val="2670342612"/>
+              </p:ext>
+            </p:extLst>
+          </p:nvPr>
+        </p:nvGraphicFramePr>
+        <p:xfrm>
+          <a:off x="127001" y="1016000"/>
+          <a:ext cx="6113543" cy="533400"/>
+        </p:xfrm>
+        <a:graphic>
+          <a:graphicData uri="http://schemas.openxmlformats.org/drawingml/2006/table">
+            <a:tbl>
+              <a:tblPr/>
+              <a:tblGrid>
+                <a:gridCol w="2255921">
+                  <a:extLst>
+                    <a:ext uri="{9D8B030D-6E8A-4147-A177-3AD203B41FA5}">
+                      <a16:colId xmlns:a16="http://schemas.microsoft.com/office/drawing/2014/main" val="1793937056"/>
+                    </a:ext>
+                  </a:extLst>
+                </a:gridCol>
+                <a:gridCol w="1434766">
+                  <a:extLst>
+                    <a:ext uri="{9D8B030D-6E8A-4147-A177-3AD203B41FA5}">
+                      <a16:colId xmlns:a16="http://schemas.microsoft.com/office/drawing/2014/main" val="2524973161"/>
+                    </a:ext>
+                  </a:extLst>
+                </a:gridCol>
+                <a:gridCol w="906879">
+                  <a:extLst>
+                    <a:ext uri="{9D8B030D-6E8A-4147-A177-3AD203B41FA5}">
+                      <a16:colId xmlns:a16="http://schemas.microsoft.com/office/drawing/2014/main" val="1103319014"/>
+                    </a:ext>
+                  </a:extLst>
+                </a:gridCol>
+                <a:gridCol w="1515977">
+                  <a:extLst>
+                    <a:ext uri="{9D8B030D-6E8A-4147-A177-3AD203B41FA5}">
+                      <a16:colId xmlns:a16="http://schemas.microsoft.com/office/drawing/2014/main" val="136666475"/>
+                    </a:ext>
+                  </a:extLst>
+                </a:gridCol>
+              </a:tblGrid>
+              <a:tr h="182880">
+                <a:tc gridSpan="4">
+                  <a:txBody>
+                    <a:bodyPr/>
+                    <a:lstStyle/>
+                    <a:p>
+                      <a:pPr algn="ctr" fontAlgn="ctr"/>
+                      <a:r>
+                        <a:rPr lang="fr-FR" sz="1100" b="1" i="0" u="none" strike="noStrike">
+                          <a:solidFill>
+                            <a:srgbClr val="FFFFFF"/>
+                          </a:solidFill>
+                          <a:effectLst/>
+                          <a:latin typeface="Calibri Light" panose="020F0302020204030204" pitchFamily="34" charset="0"/>
+                        </a:rPr>
+                        <a:t>ECLAIRAGE</a:t>
+                      </a:r>
+                    </a:p>
+                  </a:txBody>
+                  <a:tcPr marL="0" marR="0" marT="0" marB="0" anchor="ctr">
+                    <a:lnL>
+                      <a:noFill/>
+                    </a:lnL>
+                    <a:lnR>
+                      <a:noFill/>
+                    </a:lnR>
+                    <a:lnT>
+                      <a:noFill/>
+                    </a:lnT>
+                    <a:lnB>
+                      <a:noFill/>
+                    </a:lnB>
+                    <a:solidFill>
+                      <a:srgbClr val="1F4E78"/>
+                    </a:solidFill>
+                  </a:tcPr>
+                </a:tc>
+                <a:tc hMerge="1">
+                  <a:txBody>
+                    <a:bodyPr/>
+                    <a:lstStyle/>
+                    <a:p>
+                      <a:endParaRPr lang="fr-FR"/>
+                    </a:p>
+                  </a:txBody>
+                  <a:tcPr/>
+                </a:tc>
+                <a:tc hMerge="1">
+                  <a:txBody>
+                    <a:bodyPr/>
+                    <a:lstStyle/>
+                    <a:p>
+                      <a:endParaRPr lang="fr-FR"/>
+                    </a:p>
+                  </a:txBody>
+                  <a:tcPr/>
+                </a:tc>
+                <a:tc hMerge="1">
+                  <a:txBody>
+                    <a:bodyPr/>
+                    <a:lstStyle/>
+                    <a:p>
+                      <a:endParaRPr lang="fr-FR"/>
+                    </a:p>
+                  </a:txBody>
+                  <a:tcPr/>
+                </a:tc>
+                <a:extLst>
+                  <a:ext uri="{0D108BD9-81ED-4DB2-BD59-A6C34878D82A}">
+                    <a16:rowId xmlns:a16="http://schemas.microsoft.com/office/drawing/2014/main" val="2812696214"/>
+                  </a:ext>
+                </a:extLst>
+              </a:tr>
+              <a:tr h="121920">
+                <a:tc>
+                  <a:txBody>
+                    <a:bodyPr/>
+                    <a:lstStyle/>
+                    <a:p>
+                      <a:pPr algn="l" fontAlgn="b"/>
+                      <a:endParaRPr lang="fr-FR" sz="1100" b="0" i="0" u="none" strike="noStrike">
+                        <a:solidFill>
+                          <a:srgbClr val="000000"/>
+                        </a:solidFill>
+                        <a:effectLst/>
+                        <a:latin typeface="Calibri Light" panose="020F0302020204030204" pitchFamily="34" charset="0"/>
+                      </a:endParaRPr>
+                    </a:p>
+                  </a:txBody>
+                  <a:tcPr marL="0" marR="0" marT="0" marB="0" anchor="b">
+                    <a:lnL>
+                      <a:noFill/>
+                    </a:lnL>
+                    <a:lnR>
+                      <a:noFill/>
+                    </a:lnR>
+                    <a:lnT>
+                      <a:noFill/>
+                    </a:lnT>
+                    <a:lnB>
+                      <a:noFill/>
+                    </a:lnB>
+                  </a:tcPr>
+                </a:tc>
+                <a:tc>
+                  <a:txBody>
+                    <a:bodyPr/>
+                    <a:lstStyle/>
+                    <a:p>
+                      <a:pPr algn="l" fontAlgn="b"/>
+                      <a:endParaRPr lang="fr-FR" sz="1100" b="0" i="0" u="none" strike="noStrike" dirty="0">
+                        <a:solidFill>
+                          <a:srgbClr val="000000"/>
+                        </a:solidFill>
+                        <a:effectLst/>
+                        <a:latin typeface="Calibri Light" panose="020F0302020204030204" pitchFamily="34" charset="0"/>
+                      </a:endParaRPr>
+                    </a:p>
+                  </a:txBody>
+                  <a:tcPr marL="0" marR="0" marT="0" marB="0" anchor="b">
+                    <a:lnL>
+                      <a:noFill/>
+                    </a:lnL>
+                    <a:lnR>
+                      <a:noFill/>
+                    </a:lnR>
+                    <a:lnT>
+                      <a:noFill/>
+                    </a:lnT>
+                    <a:lnB>
+                      <a:noFill/>
+                    </a:lnB>
+                  </a:tcPr>
+                </a:tc>
+                <a:tc>
+                  <a:txBody>
+                    <a:bodyPr/>
+                    <a:lstStyle/>
+                    <a:p>
+                      <a:pPr algn="l" fontAlgn="b"/>
+                      <a:endParaRPr lang="fr-FR" sz="1100" b="0" i="0" u="none" strike="noStrike">
+                        <a:solidFill>
+                          <a:srgbClr val="000000"/>
+                        </a:solidFill>
+                        <a:effectLst/>
+                        <a:latin typeface="Calibri Light" panose="020F0302020204030204" pitchFamily="34" charset="0"/>
+                      </a:endParaRPr>
+                    </a:p>
+                  </a:txBody>
+                  <a:tcPr marL="0" marR="0" marT="0" marB="0" anchor="b">
+                    <a:lnL>
+                      <a:noFill/>
+                    </a:lnL>
+                    <a:lnR>
+                      <a:noFill/>
+                    </a:lnR>
+                    <a:lnT>
+                      <a:noFill/>
+                    </a:lnT>
+                    <a:lnB>
+                      <a:noFill/>
+                    </a:lnB>
+                  </a:tcPr>
+                </a:tc>
+                <a:tc>
+                  <a:txBody>
+                    <a:bodyPr/>
+                    <a:lstStyle/>
+                    <a:p>
+                      <a:pPr algn="l" fontAlgn="b"/>
+                      <a:endParaRPr lang="fr-FR" sz="1100" b="0" i="0" u="none" strike="noStrike">
+                        <a:solidFill>
+                          <a:srgbClr val="000000"/>
+                        </a:solidFill>
+                        <a:effectLst/>
+                        <a:latin typeface="Calibri Light" panose="020F0302020204030204" pitchFamily="34" charset="0"/>
+                      </a:endParaRPr>
+                    </a:p>
+                  </a:txBody>
+                  <a:tcPr marL="0" marR="0" marT="0" marB="0" anchor="b">
+                    <a:lnL>
+                      <a:noFill/>
+                    </a:lnL>
+                    <a:lnR>
+                      <a:noFill/>
+                    </a:lnR>
+                    <a:lnT>
+                      <a:noFill/>
+                    </a:lnT>
+                    <a:lnB>
+                      <a:noFill/>
+                    </a:lnB>
+                  </a:tcPr>
+                </a:tc>
+                <a:extLst>
+                  <a:ext uri="{0D108BD9-81ED-4DB2-BD59-A6C34878D82A}">
+                    <a16:rowId xmlns:a16="http://schemas.microsoft.com/office/drawing/2014/main" val="173156548"/>
+                  </a:ext>
+                </a:extLst>
+              </a:tr>
+              <a:tr h="182880">
+                <a:tc>
+                  <a:txBody>
+                    <a:bodyPr/>
+                    <a:lstStyle/>
+                    <a:p>
+                      <a:pPr algn="ctr" fontAlgn="ctr"/>
+                      <a:r>
+                        <a:rPr lang="fr-FR" sz="1100" b="1" i="0" u="none" strike="noStrike" dirty="0">
+                          <a:solidFill>
+                            <a:srgbClr val="1F4E78"/>
+                          </a:solidFill>
+                          <a:effectLst/>
+                          <a:latin typeface="Calibri Light" panose="020F0302020204030204" pitchFamily="34" charset="0"/>
+                        </a:rPr>
+                        <a:t>COULOIR</a:t>
+                      </a:r>
+                    </a:p>
+                  </a:txBody>
+                  <a:tcPr marL="0" marR="0" marT="0" marB="0" anchor="ctr">
+                    <a:lnL>
+                      <a:noFill/>
+                    </a:lnL>
+                    <a:lnR>
+                      <a:noFill/>
+                    </a:lnR>
+                    <a:lnT>
+                      <a:noFill/>
+                    </a:lnT>
+                    <a:lnB>
+                      <a:noFill/>
+                    </a:lnB>
+                  </a:tcPr>
+                </a:tc>
+                <a:tc>
+                  <a:txBody>
+                    <a:bodyPr/>
+                    <a:lstStyle/>
+                    <a:p>
+                      <a:pPr algn="ctr" fontAlgn="ctr"/>
+                      <a:r>
+                        <a:rPr lang="fr-FR" sz="1100" b="0" i="0" u="none" strike="noStrike">
+                          <a:solidFill>
+                            <a:srgbClr val="000000"/>
+                          </a:solidFill>
+                          <a:effectLst/>
+                          <a:latin typeface="Calibri Light" panose="020F0302020204030204" pitchFamily="34" charset="0"/>
+                        </a:rPr>
+                        <a:t>Tube fluorescent</a:t>
+                      </a:r>
+                    </a:p>
+                  </a:txBody>
+                  <a:tcPr marL="0" marR="0" marT="0" marB="0" anchor="ctr">
+                    <a:lnL>
+                      <a:noFill/>
+                    </a:lnL>
+                    <a:lnR>
+                      <a:noFill/>
+                    </a:lnR>
+                    <a:lnT>
+                      <a:noFill/>
+                    </a:lnT>
+                    <a:lnB>
+                      <a:noFill/>
+                    </a:lnB>
+                  </a:tcPr>
+                </a:tc>
+                <a:tc>
+                  <a:txBody>
+                    <a:bodyPr/>
+                    <a:lstStyle/>
+                    <a:p>
+                      <a:pPr algn="ctr" fontAlgn="ctr"/>
+                      <a:r>
+                        <a:rPr lang="fr-FR" sz="1100" b="0" i="0" u="none" strike="noStrike">
+                          <a:solidFill>
+                            <a:srgbClr val="000000"/>
+                          </a:solidFill>
+                          <a:effectLst/>
+                          <a:latin typeface="Calibri Light" panose="020F0302020204030204" pitchFamily="34" charset="0"/>
+                        </a:rPr>
+                        <a:t>régulé par</a:t>
+                      </a:r>
+                    </a:p>
+                  </a:txBody>
+                  <a:tcPr marL="0" marR="0" marT="0" marB="0" anchor="ctr">
+                    <a:lnL>
+                      <a:noFill/>
+                    </a:lnL>
+                    <a:lnR>
+                      <a:noFill/>
+                    </a:lnR>
+                    <a:lnT>
+                      <a:noFill/>
+                    </a:lnT>
+                    <a:lnB>
+                      <a:noFill/>
+                    </a:lnB>
+                  </a:tcPr>
+                </a:tc>
+                <a:tc>
+                  <a:txBody>
+                    <a:bodyPr/>
+                    <a:lstStyle/>
+                    <a:p>
+                      <a:pPr algn="ctr" fontAlgn="ctr"/>
+                      <a:r>
+                        <a:rPr lang="fr-FR" sz="1100" b="0" i="0" u="none" strike="noStrike" dirty="0">
+                          <a:solidFill>
+                            <a:srgbClr val="000000"/>
+                          </a:solidFill>
+                          <a:effectLst/>
+                          <a:latin typeface="Calibri Light" panose="020F0302020204030204" pitchFamily="34" charset="0"/>
+                        </a:rPr>
+                        <a:t>interrupteur</a:t>
+                      </a:r>
+                    </a:p>
+                  </a:txBody>
+                  <a:tcPr marL="0" marR="0" marT="0" marB="0" anchor="ctr">
+                    <a:lnL>
+                      <a:noFill/>
+                    </a:lnL>
+                    <a:lnR>
+                      <a:noFill/>
+                    </a:lnR>
+                    <a:lnT>
+                      <a:noFill/>
+                    </a:lnT>
+                    <a:lnB>
+                      <a:noFill/>
+                    </a:lnB>
+                  </a:tcPr>
+                </a:tc>
+                <a:extLst>
+                  <a:ext uri="{0D108BD9-81ED-4DB2-BD59-A6C34878D82A}">
+                    <a16:rowId xmlns:a16="http://schemas.microsoft.com/office/drawing/2014/main" val="126196301"/>
+                  </a:ext>
+                </a:extLst>
+              </a:tr>
+            </a:tbl>
+          </a:graphicData>
+        </a:graphic>
+      </p:graphicFrame>
+      <p:graphicFrame>
+        <p:nvGraphicFramePr>
+          <p:cNvPr id="7" name="tableauVentilation">
+            <a:extLst>
+              <a:ext uri="{FF2B5EF4-FFF2-40B4-BE49-F238E27FC236}">
+                <a16:creationId xmlns:a16="http://schemas.microsoft.com/office/drawing/2014/main" id="{772FCC8E-F57E-003C-A682-3681075EE97D}"/>
+              </a:ext>
+            </a:extLst>
+          </p:cNvPr>
+          <p:cNvGraphicFramePr>
+            <a:graphicFrameLocks noGrp="1"/>
+          </p:cNvGraphicFramePr>
+          <p:nvPr>
+            <p:extLst>
+              <p:ext uri="{D42A27DB-BD31-4B8C-83A1-F6EECF244321}">
+                <p14:modId xmlns:p14="http://schemas.microsoft.com/office/powerpoint/2010/main" val="3173557359"/>
+              </p:ext>
+            </p:extLst>
+          </p:nvPr>
+        </p:nvGraphicFramePr>
+        <p:xfrm>
+          <a:off x="127000" y="2249859"/>
+          <a:ext cx="6113545" cy="533400"/>
+        </p:xfrm>
+        <a:graphic>
+          <a:graphicData uri="http://schemas.openxmlformats.org/drawingml/2006/table">
+            <a:tbl>
+              <a:tblPr/>
+              <a:tblGrid>
+                <a:gridCol w="1589932">
+                  <a:extLst>
+                    <a:ext uri="{9D8B030D-6E8A-4147-A177-3AD203B41FA5}">
+                      <a16:colId xmlns:a16="http://schemas.microsoft.com/office/drawing/2014/main" val="486084234"/>
+                    </a:ext>
+                  </a:extLst>
+                </a:gridCol>
+                <a:gridCol w="1969465">
+                  <a:extLst>
+                    <a:ext uri="{9D8B030D-6E8A-4147-A177-3AD203B41FA5}">
+                      <a16:colId xmlns:a16="http://schemas.microsoft.com/office/drawing/2014/main" val="3582835150"/>
+                    </a:ext>
+                  </a:extLst>
+                </a:gridCol>
+                <a:gridCol w="1277074">
+                  <a:extLst>
+                    <a:ext uri="{9D8B030D-6E8A-4147-A177-3AD203B41FA5}">
+                      <a16:colId xmlns:a16="http://schemas.microsoft.com/office/drawing/2014/main" val="3359446599"/>
+                    </a:ext>
+                  </a:extLst>
+                </a:gridCol>
+                <a:gridCol w="1277074">
+                  <a:extLst>
+                    <a:ext uri="{9D8B030D-6E8A-4147-A177-3AD203B41FA5}">
+                      <a16:colId xmlns:a16="http://schemas.microsoft.com/office/drawing/2014/main" val="1107751077"/>
+                    </a:ext>
+                  </a:extLst>
+                </a:gridCol>
+              </a:tblGrid>
+              <a:tr h="182880">
+                <a:tc gridSpan="4">
+                  <a:txBody>
+                    <a:bodyPr/>
+                    <a:lstStyle/>
+                    <a:p>
+                      <a:pPr algn="ctr" fontAlgn="ctr"/>
+                      <a:r>
+                        <a:rPr lang="fr-FR" sz="1100" b="1" i="0" u="none" strike="noStrike">
+                          <a:solidFill>
+                            <a:srgbClr val="FFFFFF"/>
+                          </a:solidFill>
+                          <a:effectLst/>
+                          <a:latin typeface="Calibri Light" panose="020F0302020204030204" pitchFamily="34" charset="0"/>
+                        </a:rPr>
+                        <a:t>VENTILATION</a:t>
+                      </a:r>
+                    </a:p>
+                  </a:txBody>
+                  <a:tcPr marL="0" marR="0" marT="0" marB="0" anchor="ctr">
+                    <a:lnL>
+                      <a:noFill/>
+                    </a:lnL>
+                    <a:lnR>
+                      <a:noFill/>
+                    </a:lnR>
+                    <a:lnT>
+                      <a:noFill/>
+                    </a:lnT>
+                    <a:lnB>
+                      <a:noFill/>
+                    </a:lnB>
+                    <a:solidFill>
+                      <a:srgbClr val="BF8F00"/>
+                    </a:solidFill>
+                  </a:tcPr>
+                </a:tc>
+                <a:tc hMerge="1">
+                  <a:txBody>
+                    <a:bodyPr/>
+                    <a:lstStyle/>
+                    <a:p>
+                      <a:endParaRPr lang="fr-FR"/>
+                    </a:p>
+                  </a:txBody>
+                  <a:tcPr/>
+                </a:tc>
+                <a:tc hMerge="1">
+                  <a:txBody>
+                    <a:bodyPr/>
+                    <a:lstStyle/>
+                    <a:p>
+                      <a:endParaRPr lang="fr-FR"/>
+                    </a:p>
+                  </a:txBody>
+                  <a:tcPr/>
+                </a:tc>
+                <a:tc hMerge="1">
+                  <a:txBody>
+                    <a:bodyPr/>
+                    <a:lstStyle/>
+                    <a:p>
+                      <a:endParaRPr lang="fr-FR"/>
+                    </a:p>
+                  </a:txBody>
+                  <a:tcPr/>
+                </a:tc>
+                <a:extLst>
+                  <a:ext uri="{0D108BD9-81ED-4DB2-BD59-A6C34878D82A}">
+                    <a16:rowId xmlns:a16="http://schemas.microsoft.com/office/drawing/2014/main" val="1682971720"/>
+                  </a:ext>
+                </a:extLst>
+              </a:tr>
+              <a:tr h="121920">
+                <a:tc>
+                  <a:txBody>
+                    <a:bodyPr/>
+                    <a:lstStyle/>
+                    <a:p>
+                      <a:pPr algn="l" fontAlgn="b"/>
+                      <a:endParaRPr lang="fr-FR" sz="1100" b="0" i="0" u="none" strike="noStrike" dirty="0">
+                        <a:solidFill>
+                          <a:srgbClr val="000000"/>
+                        </a:solidFill>
+                        <a:effectLst/>
+                        <a:latin typeface="Calibri Light" panose="020F0302020204030204" pitchFamily="34" charset="0"/>
+                      </a:endParaRPr>
+                    </a:p>
+                  </a:txBody>
+                  <a:tcPr marL="0" marR="0" marT="0" marB="0" anchor="b">
+                    <a:lnL>
+                      <a:noFill/>
+                    </a:lnL>
+                    <a:lnR>
+                      <a:noFill/>
+                    </a:lnR>
+                    <a:lnT>
+                      <a:noFill/>
+                    </a:lnT>
+                    <a:lnB>
+                      <a:noFill/>
+                    </a:lnB>
+                  </a:tcPr>
+                </a:tc>
+                <a:tc>
+                  <a:txBody>
+                    <a:bodyPr/>
+                    <a:lstStyle/>
+                    <a:p>
+                      <a:pPr algn="l" fontAlgn="b"/>
+                      <a:endParaRPr lang="fr-FR" sz="1100" b="0" i="0" u="none" strike="noStrike" dirty="0">
+                        <a:solidFill>
+                          <a:srgbClr val="000000"/>
+                        </a:solidFill>
+                        <a:effectLst/>
+                        <a:latin typeface="Calibri Light" panose="020F0302020204030204" pitchFamily="34" charset="0"/>
+                      </a:endParaRPr>
+                    </a:p>
+                  </a:txBody>
+                  <a:tcPr marL="0" marR="0" marT="0" marB="0" anchor="b">
+                    <a:lnL>
+                      <a:noFill/>
+                    </a:lnL>
+                    <a:lnR>
+                      <a:noFill/>
+                    </a:lnR>
+                    <a:lnT>
+                      <a:noFill/>
+                    </a:lnT>
+                    <a:lnB>
+                      <a:noFill/>
+                    </a:lnB>
+                  </a:tcPr>
+                </a:tc>
+                <a:tc>
+                  <a:txBody>
+                    <a:bodyPr/>
+                    <a:lstStyle/>
+                    <a:p>
+                      <a:pPr algn="l" fontAlgn="b"/>
+                      <a:endParaRPr lang="fr-FR" sz="1100" b="0" i="0" u="none" strike="noStrike">
+                        <a:solidFill>
+                          <a:srgbClr val="000000"/>
+                        </a:solidFill>
+                        <a:effectLst/>
+                        <a:latin typeface="Calibri Light" panose="020F0302020204030204" pitchFamily="34" charset="0"/>
+                      </a:endParaRPr>
+                    </a:p>
+                  </a:txBody>
+                  <a:tcPr marL="0" marR="0" marT="0" marB="0" anchor="b">
+                    <a:lnL>
+                      <a:noFill/>
+                    </a:lnL>
+                    <a:lnR>
+                      <a:noFill/>
+                    </a:lnR>
+                    <a:lnT>
+                      <a:noFill/>
+                    </a:lnT>
+                    <a:lnB>
+                      <a:noFill/>
+                    </a:lnB>
+                  </a:tcPr>
+                </a:tc>
+                <a:tc>
+                  <a:txBody>
+                    <a:bodyPr/>
+                    <a:lstStyle/>
+                    <a:p>
+                      <a:pPr algn="l" fontAlgn="b"/>
+                      <a:endParaRPr lang="fr-FR" sz="1100" b="0" i="0" u="none" strike="noStrike">
+                        <a:solidFill>
+                          <a:srgbClr val="000000"/>
+                        </a:solidFill>
+                        <a:effectLst/>
+                        <a:latin typeface="Calibri Light" panose="020F0302020204030204" pitchFamily="34" charset="0"/>
+                      </a:endParaRPr>
+                    </a:p>
+                  </a:txBody>
+                  <a:tcPr marL="0" marR="0" marT="0" marB="0" anchor="b">
+                    <a:lnL>
+                      <a:noFill/>
+                    </a:lnL>
+                    <a:lnR>
+                      <a:noFill/>
+                    </a:lnR>
+                    <a:lnB>
+                      <a:noFill/>
+                    </a:lnB>
+                  </a:tcPr>
+                </a:tc>
+                <a:extLst>
+                  <a:ext uri="{0D108BD9-81ED-4DB2-BD59-A6C34878D82A}">
+                    <a16:rowId xmlns:a16="http://schemas.microsoft.com/office/drawing/2014/main" val="1433406762"/>
+                  </a:ext>
+                </a:extLst>
+              </a:tr>
+              <a:tr h="182880">
+                <a:tc>
+                  <a:txBody>
+                    <a:bodyPr/>
+                    <a:lstStyle/>
+                    <a:p>
+                      <a:pPr algn="ctr" fontAlgn="ctr"/>
+                      <a:r>
+                        <a:rPr lang="fr-FR" sz="1100" b="1" i="0" u="none" strike="noStrike" dirty="0">
+                          <a:solidFill>
+                            <a:srgbClr val="1F4E78"/>
+                          </a:solidFill>
+                          <a:effectLst/>
+                          <a:latin typeface="Calibri Light" panose="020F0302020204030204" pitchFamily="34" charset="0"/>
+                        </a:rPr>
+                        <a:t>COULOIR</a:t>
+                      </a:r>
+                    </a:p>
+                  </a:txBody>
+                  <a:tcPr marL="0" marR="0" marT="0" marB="0" anchor="ctr">
+                    <a:lnL>
+                      <a:noFill/>
+                    </a:lnL>
+                    <a:lnR>
+                      <a:noFill/>
+                    </a:lnR>
+                    <a:lnT>
+                      <a:noFill/>
+                    </a:lnT>
+                    <a:lnB>
+                      <a:noFill/>
+                    </a:lnB>
+                  </a:tcPr>
+                </a:tc>
+                <a:tc>
+                  <a:txBody>
+                    <a:bodyPr/>
+                    <a:lstStyle/>
+                    <a:p>
+                      <a:pPr algn="ctr" fontAlgn="ctr"/>
+                      <a:r>
+                        <a:rPr lang="fr-FR" sz="1100" b="0" i="0" u="none" strike="noStrike" dirty="0">
+                          <a:solidFill>
+                            <a:srgbClr val="000000"/>
+                          </a:solidFill>
+                          <a:effectLst/>
+                          <a:latin typeface="Calibri Light" panose="020F0302020204030204" pitchFamily="34" charset="0"/>
+                        </a:rPr>
+                        <a:t>Ventilation naturelle</a:t>
+                      </a:r>
+                    </a:p>
+                  </a:txBody>
+                  <a:tcPr marL="0" marR="0" marT="0" marB="0" anchor="ctr">
+                    <a:lnL>
+                      <a:noFill/>
+                    </a:lnL>
+                    <a:lnR>
+                      <a:noFill/>
+                    </a:lnR>
+                    <a:lnT>
+                      <a:noFill/>
+                    </a:lnT>
+                    <a:lnB>
+                      <a:noFill/>
+                    </a:lnB>
+                  </a:tcPr>
+                </a:tc>
+                <a:tc>
+                  <a:txBody>
+                    <a:bodyPr/>
+                    <a:lstStyle/>
+                    <a:p>
+                      <a:pPr algn="ctr" fontAlgn="ctr"/>
+                      <a:r>
+                        <a:rPr lang="fr-FR" sz="1100" b="0" i="0" u="none" strike="noStrike" dirty="0">
+                          <a:solidFill>
+                            <a:srgbClr val="000000"/>
+                          </a:solidFill>
+                          <a:effectLst/>
+                          <a:latin typeface="Calibri Light" panose="020F0302020204030204" pitchFamily="34" charset="0"/>
+                        </a:rPr>
+                        <a:t>E</a:t>
+                      </a:r>
+                    </a:p>
+                  </a:txBody>
+                  <a:tcPr marL="0" marR="0" marT="0" marB="0" anchor="ctr">
+                    <a:lnL>
+                      <a:noFill/>
+                    </a:lnL>
+                    <a:lnR>
+                      <a:noFill/>
+                    </a:lnR>
+                    <a:lnT>
+                      <a:noFill/>
+                    </a:lnT>
+                    <a:lnB>
+                      <a:noFill/>
+                    </a:lnB>
+                  </a:tcPr>
+                </a:tc>
+                <a:tc>
+                  <a:txBody>
+                    <a:bodyPr/>
+                    <a:lstStyle/>
+                    <a:p>
+                      <a:pPr algn="ctr" fontAlgn="ctr"/>
+                      <a:r>
+                        <a:rPr lang="fr-FR" sz="1100" b="0" i="0" u="none" strike="noStrike" dirty="0">
+                          <a:solidFill>
+                            <a:srgbClr val="000000"/>
+                          </a:solidFill>
+                          <a:effectLst/>
+                          <a:latin typeface="Calibri Light" panose="020F0302020204030204" pitchFamily="34" charset="0"/>
+                        </a:rPr>
+                        <a:t>a</a:t>
+                      </a:r>
+                    </a:p>
+                  </a:txBody>
+                  <a:tcPr marL="0" marR="0" marT="0" marB="0" anchor="ctr">
+                    <a:lnL>
+                      <a:noFill/>
+                    </a:lnL>
+                    <a:lnR>
+                      <a:noFill/>
+                    </a:lnR>
+                    <a:lnT>
+                      <a:noFill/>
+                    </a:lnT>
+                    <a:lnB>
+                      <a:noFill/>
+                    </a:lnB>
+                  </a:tcPr>
+                </a:tc>
+                <a:extLst>
+                  <a:ext uri="{0D108BD9-81ED-4DB2-BD59-A6C34878D82A}">
+                    <a16:rowId xmlns:a16="http://schemas.microsoft.com/office/drawing/2014/main" val="233354312"/>
+                  </a:ext>
+                </a:extLst>
+              </a:tr>
+            </a:tbl>
+          </a:graphicData>
+        </a:graphic>
+      </p:graphicFrame>
+      <p:graphicFrame>
+        <p:nvGraphicFramePr>
+          <p:cNvPr id="8" name="tableauECS">
+            <a:extLst>
+              <a:ext uri="{FF2B5EF4-FFF2-40B4-BE49-F238E27FC236}">
+                <a16:creationId xmlns:a16="http://schemas.microsoft.com/office/drawing/2014/main" id="{A4F95A4A-8154-13FB-6A88-01C6CE49F950}"/>
+              </a:ext>
+            </a:extLst>
+          </p:cNvPr>
+          <p:cNvGraphicFramePr>
+            <a:graphicFrameLocks noGrp="1"/>
+          </p:cNvGraphicFramePr>
+          <p:nvPr>
+            <p:extLst>
+              <p:ext uri="{D42A27DB-BD31-4B8C-83A1-F6EECF244321}">
+                <p14:modId xmlns:p14="http://schemas.microsoft.com/office/powerpoint/2010/main" val="2480246530"/>
+              </p:ext>
+            </p:extLst>
+          </p:nvPr>
+        </p:nvGraphicFramePr>
+        <p:xfrm>
+          <a:off x="127000" y="3429000"/>
+          <a:ext cx="6113544" cy="533400"/>
+        </p:xfrm>
+        <a:graphic>
+          <a:graphicData uri="http://schemas.openxmlformats.org/drawingml/2006/table">
+            <a:tbl>
+              <a:tblPr/>
+              <a:tblGrid>
+                <a:gridCol w="1592263">
+                  <a:extLst>
+                    <a:ext uri="{9D8B030D-6E8A-4147-A177-3AD203B41FA5}">
+                      <a16:colId xmlns:a16="http://schemas.microsoft.com/office/drawing/2014/main" val="516980052"/>
+                    </a:ext>
+                  </a:extLst>
+                </a:gridCol>
+                <a:gridCol w="2032605">
+                  <a:extLst>
+                    <a:ext uri="{9D8B030D-6E8A-4147-A177-3AD203B41FA5}">
+                      <a16:colId xmlns:a16="http://schemas.microsoft.com/office/drawing/2014/main" val="867641606"/>
+                    </a:ext>
+                  </a:extLst>
+                </a:gridCol>
+                <a:gridCol w="2488676">
+                  <a:extLst>
+                    <a:ext uri="{9D8B030D-6E8A-4147-A177-3AD203B41FA5}">
+                      <a16:colId xmlns:a16="http://schemas.microsoft.com/office/drawing/2014/main" val="174171261"/>
+                    </a:ext>
+                  </a:extLst>
+                </a:gridCol>
+              </a:tblGrid>
+              <a:tr h="182880">
+                <a:tc gridSpan="3">
+                  <a:txBody>
+                    <a:bodyPr/>
+                    <a:lstStyle/>
+                    <a:p>
+                      <a:pPr algn="ctr" fontAlgn="ctr"/>
+                      <a:r>
+                        <a:rPr lang="fr-FR" sz="1100" b="1" i="0" u="none" strike="noStrike" dirty="0">
+                          <a:solidFill>
+                            <a:srgbClr val="FFFFFF"/>
+                          </a:solidFill>
+                          <a:effectLst/>
+                          <a:latin typeface="Calibri Light" panose="020F0302020204030204" pitchFamily="34" charset="0"/>
+                        </a:rPr>
+                        <a:t>ECS</a:t>
+                      </a:r>
+                    </a:p>
+                  </a:txBody>
+                  <a:tcPr marL="0" marR="0" marT="0" marB="0" anchor="ctr">
+                    <a:lnL>
+                      <a:noFill/>
+                    </a:lnL>
+                    <a:lnR>
+                      <a:noFill/>
+                    </a:lnR>
+                    <a:lnT>
+                      <a:noFill/>
+                    </a:lnT>
+                    <a:lnB>
+                      <a:noFill/>
+                    </a:lnB>
+                    <a:solidFill>
+                      <a:srgbClr val="BF3FFF"/>
+                    </a:solidFill>
+                  </a:tcPr>
+                </a:tc>
+                <a:tc hMerge="1">
+                  <a:txBody>
+                    <a:bodyPr/>
+                    <a:lstStyle/>
+                    <a:p>
+                      <a:endParaRPr lang="fr-FR"/>
+                    </a:p>
+                  </a:txBody>
+                  <a:tcPr/>
+                </a:tc>
+                <a:tc hMerge="1">
+                  <a:txBody>
+                    <a:bodyPr/>
+                    <a:lstStyle/>
+                    <a:p>
+                      <a:endParaRPr lang="fr-FR"/>
+                    </a:p>
+                  </a:txBody>
+                  <a:tcPr/>
+                </a:tc>
+                <a:extLst>
+                  <a:ext uri="{0D108BD9-81ED-4DB2-BD59-A6C34878D82A}">
+                    <a16:rowId xmlns:a16="http://schemas.microsoft.com/office/drawing/2014/main" val="875875333"/>
+                  </a:ext>
+                </a:extLst>
+              </a:tr>
+              <a:tr h="121920">
+                <a:tc>
+                  <a:txBody>
+                    <a:bodyPr/>
+                    <a:lstStyle/>
+                    <a:p>
+                      <a:pPr algn="l" fontAlgn="b"/>
+                      <a:endParaRPr lang="fr-FR" sz="1100" b="0" i="0" u="none" strike="noStrike" dirty="0">
+                        <a:solidFill>
+                          <a:srgbClr val="000000"/>
+                        </a:solidFill>
+                        <a:effectLst/>
+                        <a:latin typeface="Calibri Light" panose="020F0302020204030204" pitchFamily="34" charset="0"/>
+                      </a:endParaRPr>
+                    </a:p>
+                  </a:txBody>
+                  <a:tcPr marL="0" marR="0" marT="0" marB="0" anchor="b">
+                    <a:lnL>
+                      <a:noFill/>
+                    </a:lnL>
+                    <a:lnR>
+                      <a:noFill/>
+                    </a:lnR>
+                    <a:lnT>
+                      <a:noFill/>
+                    </a:lnT>
+                    <a:lnB>
+                      <a:noFill/>
+                    </a:lnB>
+                  </a:tcPr>
+                </a:tc>
+                <a:tc>
+                  <a:txBody>
+                    <a:bodyPr/>
+                    <a:lstStyle/>
+                    <a:p>
+                      <a:pPr algn="l" fontAlgn="b"/>
+                      <a:endParaRPr lang="fr-FR" sz="1100" b="0" i="0" u="none" strike="noStrike" dirty="0">
+                        <a:solidFill>
+                          <a:srgbClr val="000000"/>
+                        </a:solidFill>
+                        <a:effectLst/>
+                        <a:latin typeface="Calibri Light" panose="020F0302020204030204" pitchFamily="34" charset="0"/>
+                      </a:endParaRPr>
+                    </a:p>
+                  </a:txBody>
+                  <a:tcPr marL="0" marR="0" marT="0" marB="0" anchor="b">
+                    <a:lnL>
+                      <a:noFill/>
+                    </a:lnL>
+                    <a:lnR>
+                      <a:noFill/>
+                    </a:lnR>
+                    <a:lnT>
+                      <a:noFill/>
+                    </a:lnT>
+                    <a:lnB>
+                      <a:noFill/>
+                    </a:lnB>
+                  </a:tcPr>
+                </a:tc>
+                <a:tc>
+                  <a:txBody>
+                    <a:bodyPr/>
+                    <a:lstStyle/>
+                    <a:p>
+                      <a:pPr algn="l" fontAlgn="b"/>
+                      <a:endParaRPr lang="fr-FR" sz="1100" b="0" i="0" u="none" strike="noStrike">
+                        <a:solidFill>
+                          <a:srgbClr val="000000"/>
+                        </a:solidFill>
+                        <a:effectLst/>
+                        <a:latin typeface="Calibri Light" panose="020F0302020204030204" pitchFamily="34" charset="0"/>
+                      </a:endParaRPr>
+                    </a:p>
+                  </a:txBody>
+                  <a:tcPr marL="0" marR="0" marT="0" marB="0" anchor="b">
+                    <a:lnL>
+                      <a:noFill/>
+                    </a:lnL>
+                    <a:lnR>
+                      <a:noFill/>
+                    </a:lnR>
+                    <a:lnT>
+                      <a:noFill/>
+                    </a:lnT>
+                    <a:lnB>
+                      <a:noFill/>
+                    </a:lnB>
+                  </a:tcPr>
+                </a:tc>
+                <a:extLst>
+                  <a:ext uri="{0D108BD9-81ED-4DB2-BD59-A6C34878D82A}">
+                    <a16:rowId xmlns:a16="http://schemas.microsoft.com/office/drawing/2014/main" val="1490918215"/>
+                  </a:ext>
+                </a:extLst>
+              </a:tr>
+              <a:tr h="182880">
+                <a:tc>
+                  <a:txBody>
+                    <a:bodyPr/>
+                    <a:lstStyle/>
+                    <a:p>
+                      <a:pPr algn="ctr" fontAlgn="ctr"/>
+                      <a:r>
+                        <a:rPr lang="fr-FR" sz="1100" b="1" i="0" u="none" strike="noStrike" dirty="0">
+                          <a:solidFill>
+                            <a:srgbClr val="1F4E78"/>
+                          </a:solidFill>
+                          <a:effectLst/>
+                          <a:latin typeface="Calibri Light" panose="020F0302020204030204" pitchFamily="34" charset="0"/>
+                        </a:rPr>
+                        <a:t>COULOIR</a:t>
+                      </a:r>
+                    </a:p>
+                  </a:txBody>
+                  <a:tcPr marL="0" marR="0" marT="0" marB="0" anchor="ctr">
+                    <a:lnL>
+                      <a:noFill/>
+                    </a:lnL>
+                    <a:lnR>
+                      <a:noFill/>
+                    </a:lnR>
+                    <a:lnT>
+                      <a:noFill/>
+                    </a:lnT>
+                    <a:lnB>
+                      <a:noFill/>
+                    </a:lnB>
+                  </a:tcPr>
+                </a:tc>
+                <a:tc>
+                  <a:txBody>
+                    <a:bodyPr/>
+                    <a:lstStyle/>
+                    <a:p>
+                      <a:pPr algn="ctr" fontAlgn="ctr"/>
+                      <a:r>
+                        <a:rPr lang="fr-FR" sz="1100" b="0" i="0" u="none" strike="noStrike" dirty="0">
+                          <a:solidFill>
+                            <a:srgbClr val="000000"/>
+                          </a:solidFill>
+                          <a:effectLst/>
+                          <a:latin typeface="Calibri Light" panose="020F0302020204030204" pitchFamily="34" charset="0"/>
+                        </a:rPr>
+                        <a:t>Ventilation naturelle</a:t>
+                      </a:r>
+                    </a:p>
+                  </a:txBody>
+                  <a:tcPr marL="0" marR="0" marT="0" marB="0" anchor="ctr">
+                    <a:lnL>
+                      <a:noFill/>
+                    </a:lnL>
+                    <a:lnR>
+                      <a:noFill/>
+                    </a:lnR>
+                    <a:lnT>
+                      <a:noFill/>
+                    </a:lnT>
+                    <a:lnB>
+                      <a:noFill/>
+                    </a:lnB>
+                  </a:tcPr>
+                </a:tc>
+                <a:tc>
+                  <a:txBody>
+                    <a:bodyPr/>
+                    <a:lstStyle/>
+                    <a:p>
+                      <a:pPr algn="ctr" fontAlgn="ctr"/>
+                      <a:r>
+                        <a:rPr lang="fr-FR" sz="1100" b="0" i="0" u="none" strike="noStrike" dirty="0">
+                          <a:solidFill>
+                            <a:srgbClr val="000000"/>
+                          </a:solidFill>
+                          <a:effectLst/>
+                          <a:latin typeface="Calibri Light" panose="020F0302020204030204" pitchFamily="34" charset="0"/>
+                        </a:rPr>
+                        <a:t>(Atlantic  ;200 l)</a:t>
+                      </a:r>
+                    </a:p>
+                  </a:txBody>
+                  <a:tcPr marL="0" marR="0" marT="0" marB="0" anchor="ctr">
+                    <a:lnL>
+                      <a:noFill/>
+                    </a:lnL>
+                    <a:lnR>
+                      <a:noFill/>
+                    </a:lnR>
+                    <a:lnT>
+                      <a:noFill/>
+                    </a:lnT>
+                    <a:lnB>
+                      <a:noFill/>
+                    </a:lnB>
+                  </a:tcPr>
+                </a:tc>
+                <a:extLst>
+                  <a:ext uri="{0D108BD9-81ED-4DB2-BD59-A6C34878D82A}">
+                    <a16:rowId xmlns:a16="http://schemas.microsoft.com/office/drawing/2014/main" val="1168696370"/>
+                  </a:ext>
+                </a:extLst>
+              </a:tr>
+            </a:tbl>
+          </a:graphicData>
+        </a:graphic>
+      </p:graphicFrame>
     </p:spTree>
     <p:extLst>
       <p:ext uri="{BB962C8B-B14F-4D97-AF65-F5344CB8AC3E}">
@@ -8388,6 +9455,835 @@
           </a:p>
         </p:txBody>
       </p:sp>
+      <p:graphicFrame>
+        <p:nvGraphicFramePr>
+          <p:cNvPr id="4" name="tableauEmetteurs">
+            <a:extLst>
+              <a:ext uri="{FF2B5EF4-FFF2-40B4-BE49-F238E27FC236}">
+                <a16:creationId xmlns:a16="http://schemas.microsoft.com/office/drawing/2014/main" id="{66EBB3F5-FD86-80C1-EFD3-9C7014689C0B}"/>
+              </a:ext>
+            </a:extLst>
+          </p:cNvPr>
+          <p:cNvGraphicFramePr>
+            <a:graphicFrameLocks noGrp="1"/>
+          </p:cNvGraphicFramePr>
+          <p:nvPr>
+            <p:extLst>
+              <p:ext uri="{D42A27DB-BD31-4B8C-83A1-F6EECF244321}">
+                <p14:modId xmlns:p14="http://schemas.microsoft.com/office/powerpoint/2010/main" val="3383950311"/>
+              </p:ext>
+            </p:extLst>
+          </p:nvPr>
+        </p:nvGraphicFramePr>
+        <p:xfrm>
+          <a:off x="149940" y="1115465"/>
+          <a:ext cx="5946059" cy="533400"/>
+        </p:xfrm>
+        <a:graphic>
+          <a:graphicData uri="http://schemas.openxmlformats.org/drawingml/2006/table">
+            <a:tbl>
+              <a:tblPr/>
+              <a:tblGrid>
+                <a:gridCol w="1399605">
+                  <a:extLst>
+                    <a:ext uri="{9D8B030D-6E8A-4147-A177-3AD203B41FA5}">
+                      <a16:colId xmlns:a16="http://schemas.microsoft.com/office/drawing/2014/main" val="775377458"/>
+                    </a:ext>
+                  </a:extLst>
+                </a:gridCol>
+                <a:gridCol w="361188">
+                  <a:extLst>
+                    <a:ext uri="{9D8B030D-6E8A-4147-A177-3AD203B41FA5}">
+                      <a16:colId xmlns:a16="http://schemas.microsoft.com/office/drawing/2014/main" val="1025018918"/>
+                    </a:ext>
+                  </a:extLst>
+                </a:gridCol>
+                <a:gridCol w="2654732">
+                  <a:extLst>
+                    <a:ext uri="{9D8B030D-6E8A-4147-A177-3AD203B41FA5}">
+                      <a16:colId xmlns:a16="http://schemas.microsoft.com/office/drawing/2014/main" val="3532419179"/>
+                    </a:ext>
+                  </a:extLst>
+                </a:gridCol>
+                <a:gridCol w="1530534">
+                  <a:extLst>
+                    <a:ext uri="{9D8B030D-6E8A-4147-A177-3AD203B41FA5}">
+                      <a16:colId xmlns:a16="http://schemas.microsoft.com/office/drawing/2014/main" val="1275283422"/>
+                    </a:ext>
+                  </a:extLst>
+                </a:gridCol>
+              </a:tblGrid>
+              <a:tr h="182880">
+                <a:tc gridSpan="4">
+                  <a:txBody>
+                    <a:bodyPr/>
+                    <a:lstStyle/>
+                    <a:p>
+                      <a:pPr algn="ctr" fontAlgn="ctr"/>
+                      <a:r>
+                        <a:rPr lang="fr-FR" sz="1100" b="1" i="0" u="none" strike="noStrike" dirty="0">
+                          <a:solidFill>
+                            <a:srgbClr val="FFFFFF"/>
+                          </a:solidFill>
+                          <a:effectLst/>
+                          <a:latin typeface="Calibri Light" panose="020F0302020204030204" pitchFamily="34" charset="0"/>
+                        </a:rPr>
+                        <a:t>EMETTEURS CHAUFFAGE / CLIMATISATION</a:t>
+                      </a:r>
+                    </a:p>
+                  </a:txBody>
+                  <a:tcPr marL="0" marR="0" marT="0" marB="0" anchor="ctr">
+                    <a:lnL>
+                      <a:noFill/>
+                    </a:lnL>
+                    <a:lnR>
+                      <a:noFill/>
+                    </a:lnR>
+                    <a:lnT>
+                      <a:noFill/>
+                    </a:lnT>
+                    <a:lnB>
+                      <a:noFill/>
+                    </a:lnB>
+                    <a:solidFill>
+                      <a:srgbClr val="70AD47"/>
+                    </a:solidFill>
+                  </a:tcPr>
+                </a:tc>
+                <a:tc hMerge="1">
+                  <a:txBody>
+                    <a:bodyPr/>
+                    <a:lstStyle/>
+                    <a:p>
+                      <a:endParaRPr lang="fr-FR"/>
+                    </a:p>
+                  </a:txBody>
+                  <a:tcPr/>
+                </a:tc>
+                <a:tc hMerge="1">
+                  <a:txBody>
+                    <a:bodyPr/>
+                    <a:lstStyle/>
+                    <a:p>
+                      <a:endParaRPr lang="fr-FR"/>
+                    </a:p>
+                  </a:txBody>
+                  <a:tcPr/>
+                </a:tc>
+                <a:tc hMerge="1">
+                  <a:txBody>
+                    <a:bodyPr/>
+                    <a:lstStyle/>
+                    <a:p>
+                      <a:endParaRPr lang="fr-FR"/>
+                    </a:p>
+                  </a:txBody>
+                  <a:tcPr/>
+                </a:tc>
+                <a:extLst>
+                  <a:ext uri="{0D108BD9-81ED-4DB2-BD59-A6C34878D82A}">
+                    <a16:rowId xmlns:a16="http://schemas.microsoft.com/office/drawing/2014/main" val="1205834722"/>
+                  </a:ext>
+                </a:extLst>
+              </a:tr>
+              <a:tr h="121920">
+                <a:tc>
+                  <a:txBody>
+                    <a:bodyPr/>
+                    <a:lstStyle/>
+                    <a:p>
+                      <a:pPr algn="l" fontAlgn="b"/>
+                      <a:endParaRPr lang="fr-FR" sz="1100" b="0" i="0" u="none" strike="noStrike">
+                        <a:solidFill>
+                          <a:srgbClr val="000000"/>
+                        </a:solidFill>
+                        <a:effectLst/>
+                        <a:latin typeface="Calibri Light" panose="020F0302020204030204" pitchFamily="34" charset="0"/>
+                      </a:endParaRPr>
+                    </a:p>
+                  </a:txBody>
+                  <a:tcPr marL="0" marR="0" marT="0" marB="0" anchor="b">
+                    <a:lnL>
+                      <a:noFill/>
+                    </a:lnL>
+                    <a:lnR>
+                      <a:noFill/>
+                    </a:lnR>
+                    <a:lnT>
+                      <a:noFill/>
+                    </a:lnT>
+                    <a:lnB>
+                      <a:noFill/>
+                    </a:lnB>
+                  </a:tcPr>
+                </a:tc>
+                <a:tc>
+                  <a:txBody>
+                    <a:bodyPr/>
+                    <a:lstStyle/>
+                    <a:p>
+                      <a:pPr algn="l" fontAlgn="b"/>
+                      <a:endParaRPr lang="fr-FR" sz="1100" b="0" i="0" u="none" strike="noStrike">
+                        <a:solidFill>
+                          <a:srgbClr val="000000"/>
+                        </a:solidFill>
+                        <a:effectLst/>
+                        <a:latin typeface="Calibri Light" panose="020F0302020204030204" pitchFamily="34" charset="0"/>
+                      </a:endParaRPr>
+                    </a:p>
+                  </a:txBody>
+                  <a:tcPr marL="0" marR="0" marT="0" marB="0" anchor="b">
+                    <a:lnL>
+                      <a:noFill/>
+                    </a:lnL>
+                    <a:lnR>
+                      <a:noFill/>
+                    </a:lnR>
+                    <a:lnT>
+                      <a:noFill/>
+                    </a:lnT>
+                    <a:lnB>
+                      <a:noFill/>
+                    </a:lnB>
+                  </a:tcPr>
+                </a:tc>
+                <a:tc>
+                  <a:txBody>
+                    <a:bodyPr/>
+                    <a:lstStyle/>
+                    <a:p>
+                      <a:pPr algn="l" fontAlgn="b"/>
+                      <a:endParaRPr lang="fr-FR" sz="1100" b="0" i="0" u="none" strike="noStrike" dirty="0">
+                        <a:solidFill>
+                          <a:srgbClr val="000000"/>
+                        </a:solidFill>
+                        <a:effectLst/>
+                        <a:latin typeface="Calibri Light" panose="020F0302020204030204" pitchFamily="34" charset="0"/>
+                      </a:endParaRPr>
+                    </a:p>
+                  </a:txBody>
+                  <a:tcPr marL="0" marR="0" marT="0" marB="0" anchor="b">
+                    <a:lnL>
+                      <a:noFill/>
+                    </a:lnL>
+                    <a:lnR>
+                      <a:noFill/>
+                    </a:lnR>
+                    <a:lnT>
+                      <a:noFill/>
+                    </a:lnT>
+                    <a:lnB>
+                      <a:noFill/>
+                    </a:lnB>
+                  </a:tcPr>
+                </a:tc>
+                <a:tc>
+                  <a:txBody>
+                    <a:bodyPr/>
+                    <a:lstStyle/>
+                    <a:p>
+                      <a:pPr algn="l" fontAlgn="b"/>
+                      <a:endParaRPr lang="fr-FR" sz="1100" b="0" i="0" u="none" strike="noStrike">
+                        <a:solidFill>
+                          <a:srgbClr val="000000"/>
+                        </a:solidFill>
+                        <a:effectLst/>
+                        <a:latin typeface="Calibri Light" panose="020F0302020204030204" pitchFamily="34" charset="0"/>
+                      </a:endParaRPr>
+                    </a:p>
+                  </a:txBody>
+                  <a:tcPr marL="0" marR="0" marT="0" marB="0" anchor="b">
+                    <a:lnL>
+                      <a:noFill/>
+                    </a:lnL>
+                    <a:lnR>
+                      <a:noFill/>
+                    </a:lnR>
+                    <a:lnT>
+                      <a:noFill/>
+                    </a:lnT>
+                    <a:lnB>
+                      <a:noFill/>
+                    </a:lnB>
+                  </a:tcPr>
+                </a:tc>
+                <a:extLst>
+                  <a:ext uri="{0D108BD9-81ED-4DB2-BD59-A6C34878D82A}">
+                    <a16:rowId xmlns:a16="http://schemas.microsoft.com/office/drawing/2014/main" val="104608334"/>
+                  </a:ext>
+                </a:extLst>
+              </a:tr>
+              <a:tr h="182880">
+                <a:tc>
+                  <a:txBody>
+                    <a:bodyPr/>
+                    <a:lstStyle/>
+                    <a:p>
+                      <a:pPr algn="ctr" fontAlgn="ctr"/>
+                      <a:r>
+                        <a:rPr lang="fr-FR" sz="1100" b="1" i="0" u="none" strike="noStrike" dirty="0">
+                          <a:solidFill>
+                            <a:srgbClr val="1F4E78"/>
+                          </a:solidFill>
+                          <a:effectLst/>
+                          <a:latin typeface="Calibri Light" panose="020F0302020204030204" pitchFamily="34" charset="0"/>
+                        </a:rPr>
+                        <a:t>COULOIR</a:t>
+                      </a:r>
+                    </a:p>
+                  </a:txBody>
+                  <a:tcPr marL="0" marR="0" marT="0" marB="0" anchor="ctr">
+                    <a:lnL>
+                      <a:noFill/>
+                    </a:lnL>
+                    <a:lnR>
+                      <a:noFill/>
+                    </a:lnR>
+                    <a:lnT>
+                      <a:noFill/>
+                    </a:lnT>
+                    <a:lnB>
+                      <a:noFill/>
+                    </a:lnB>
+                  </a:tcPr>
+                </a:tc>
+                <a:tc>
+                  <a:txBody>
+                    <a:bodyPr/>
+                    <a:lstStyle/>
+                    <a:p>
+                      <a:pPr algn="ctr" fontAlgn="ctr"/>
+                      <a:r>
+                        <a:rPr lang="fr-FR" sz="1100" b="0" i="0" u="none" strike="noStrike" dirty="0">
+                          <a:solidFill>
+                            <a:srgbClr val="000000"/>
+                          </a:solidFill>
+                          <a:effectLst/>
+                          <a:latin typeface="Calibri Light" panose="020F0302020204030204" pitchFamily="34" charset="0"/>
+                        </a:rPr>
+                        <a:t>0</a:t>
+                      </a:r>
+                    </a:p>
+                  </a:txBody>
+                  <a:tcPr marL="0" marR="0" marT="0" marB="0" anchor="ctr">
+                    <a:lnL>
+                      <a:noFill/>
+                    </a:lnL>
+                    <a:lnR>
+                      <a:noFill/>
+                    </a:lnR>
+                    <a:lnT>
+                      <a:noFill/>
+                    </a:lnT>
+                    <a:lnB>
+                      <a:noFill/>
+                    </a:lnB>
+                  </a:tcPr>
+                </a:tc>
+                <a:tc>
+                  <a:txBody>
+                    <a:bodyPr/>
+                    <a:lstStyle/>
+                    <a:p>
+                      <a:pPr algn="ctr" fontAlgn="ctr"/>
+                      <a:r>
+                        <a:rPr lang="fr-FR" sz="1100" b="0" i="0" u="none" strike="noStrike">
+                          <a:solidFill>
+                            <a:srgbClr val="000000"/>
+                          </a:solidFill>
+                          <a:effectLst/>
+                          <a:latin typeface="Calibri Light" panose="020F0302020204030204" pitchFamily="34" charset="0"/>
+                        </a:rPr>
+                        <a:t>PLAFOND RAYONNANT</a:t>
+                      </a:r>
+                    </a:p>
+                  </a:txBody>
+                  <a:tcPr marL="0" marR="0" marT="0" marB="0" anchor="ctr">
+                    <a:lnL>
+                      <a:noFill/>
+                    </a:lnL>
+                    <a:lnR>
+                      <a:noFill/>
+                    </a:lnR>
+                    <a:lnT>
+                      <a:noFill/>
+                    </a:lnT>
+                    <a:lnB>
+                      <a:noFill/>
+                    </a:lnB>
+                  </a:tcPr>
+                </a:tc>
+                <a:tc>
+                  <a:txBody>
+                    <a:bodyPr/>
+                    <a:lstStyle/>
+                    <a:p>
+                      <a:pPr algn="l" fontAlgn="ctr"/>
+                      <a:r>
+                        <a:rPr lang="fr-FR" sz="1100" b="0" i="0" u="none" strike="noStrike">
+                          <a:solidFill>
+                            <a:srgbClr val="000000"/>
+                          </a:solidFill>
+                          <a:effectLst/>
+                          <a:latin typeface="Calibri Light" panose="020F0302020204030204" pitchFamily="34" charset="0"/>
+                        </a:rPr>
+                        <a:t> sdf </a:t>
+                      </a:r>
+                      <a:endParaRPr lang="fr-FR" sz="1100" b="0" i="0" u="none" strike="noStrike" dirty="0">
+                        <a:solidFill>
+                          <a:srgbClr val="000000"/>
+                        </a:solidFill>
+                        <a:effectLst/>
+                        <a:latin typeface="Calibri Light" panose="020F0302020204030204" pitchFamily="34" charset="0"/>
+                      </a:endParaRPr>
+                    </a:p>
+                  </a:txBody>
+                  <a:tcPr marL="0" marR="0" marT="0" marB="0" anchor="ctr">
+                    <a:lnL>
+                      <a:noFill/>
+                    </a:lnL>
+                    <a:lnR>
+                      <a:noFill/>
+                    </a:lnR>
+                    <a:lnT>
+                      <a:noFill/>
+                    </a:lnT>
+                    <a:lnB>
+                      <a:noFill/>
+                    </a:lnB>
+                  </a:tcPr>
+                </a:tc>
+                <a:extLst>
+                  <a:ext uri="{0D108BD9-81ED-4DB2-BD59-A6C34878D82A}">
+                    <a16:rowId xmlns:a16="http://schemas.microsoft.com/office/drawing/2014/main" val="2158564058"/>
+                  </a:ext>
+                </a:extLst>
+              </a:tr>
+            </a:tbl>
+          </a:graphicData>
+        </a:graphic>
+      </p:graphicFrame>
+      <p:graphicFrame>
+        <p:nvGraphicFramePr>
+          <p:cNvPr id="8" name="tableauProduction">
+            <a:extLst>
+              <a:ext uri="{FF2B5EF4-FFF2-40B4-BE49-F238E27FC236}">
+                <a16:creationId xmlns:a16="http://schemas.microsoft.com/office/drawing/2014/main" id="{31CFF4BE-45F7-391A-204F-EACFE65BCB05}"/>
+              </a:ext>
+            </a:extLst>
+          </p:cNvPr>
+          <p:cNvGraphicFramePr>
+            <a:graphicFrameLocks noGrp="1"/>
+          </p:cNvGraphicFramePr>
+          <p:nvPr>
+            <p:extLst>
+              <p:ext uri="{D42A27DB-BD31-4B8C-83A1-F6EECF244321}">
+                <p14:modId xmlns:p14="http://schemas.microsoft.com/office/powerpoint/2010/main" val="3959535927"/>
+              </p:ext>
+            </p:extLst>
+          </p:nvPr>
+        </p:nvGraphicFramePr>
+        <p:xfrm>
+          <a:off x="149940" y="2392772"/>
+          <a:ext cx="5946058" cy="890875"/>
+        </p:xfrm>
+        <a:graphic>
+          <a:graphicData uri="http://schemas.openxmlformats.org/drawingml/2006/table">
+            <a:tbl>
+              <a:tblPr/>
+              <a:tblGrid>
+                <a:gridCol w="1342659">
+                  <a:extLst>
+                    <a:ext uri="{9D8B030D-6E8A-4147-A177-3AD203B41FA5}">
+                      <a16:colId xmlns:a16="http://schemas.microsoft.com/office/drawing/2014/main" val="2557114044"/>
+                    </a:ext>
+                  </a:extLst>
+                </a:gridCol>
+                <a:gridCol w="273327">
+                  <a:extLst>
+                    <a:ext uri="{9D8B030D-6E8A-4147-A177-3AD203B41FA5}">
+                      <a16:colId xmlns:a16="http://schemas.microsoft.com/office/drawing/2014/main" val="3886438790"/>
+                    </a:ext>
+                  </a:extLst>
+                </a:gridCol>
+                <a:gridCol w="2505377">
+                  <a:extLst>
+                    <a:ext uri="{9D8B030D-6E8A-4147-A177-3AD203B41FA5}">
+                      <a16:colId xmlns:a16="http://schemas.microsoft.com/office/drawing/2014/main" val="3652922138"/>
+                    </a:ext>
+                  </a:extLst>
+                </a:gridCol>
+                <a:gridCol w="1824695">
+                  <a:extLst>
+                    <a:ext uri="{9D8B030D-6E8A-4147-A177-3AD203B41FA5}">
+                      <a16:colId xmlns:a16="http://schemas.microsoft.com/office/drawing/2014/main" val="778122155"/>
+                    </a:ext>
+                  </a:extLst>
+                </a:gridCol>
+              </a:tblGrid>
+              <a:tr h="134952">
+                <a:tc gridSpan="4">
+                  <a:txBody>
+                    <a:bodyPr/>
+                    <a:lstStyle/>
+                    <a:p>
+                      <a:pPr algn="ctr" fontAlgn="ctr"/>
+                      <a:r>
+                        <a:rPr lang="fr-FR" sz="1100" b="1" i="0" u="none" strike="noStrike" dirty="0">
+                          <a:solidFill>
+                            <a:srgbClr val="FFFFFF"/>
+                          </a:solidFill>
+                          <a:effectLst/>
+                          <a:latin typeface="Calibri Light" panose="020F0302020204030204" pitchFamily="34" charset="0"/>
+                        </a:rPr>
+                        <a:t>PRODUCTION DE CHAUFFAGE / CLIMATISATION</a:t>
+                      </a:r>
+                    </a:p>
+                  </a:txBody>
+                  <a:tcPr marL="0" marR="0" marT="0" marB="0" anchor="ctr">
+                    <a:lnL>
+                      <a:noFill/>
+                    </a:lnL>
+                    <a:lnR>
+                      <a:noFill/>
+                    </a:lnR>
+                    <a:lnT>
+                      <a:noFill/>
+                    </a:lnT>
+                    <a:lnB>
+                      <a:noFill/>
+                    </a:lnB>
+                    <a:solidFill>
+                      <a:srgbClr val="1F4E78"/>
+                    </a:solidFill>
+                  </a:tcPr>
+                </a:tc>
+                <a:tc hMerge="1">
+                  <a:txBody>
+                    <a:bodyPr/>
+                    <a:lstStyle/>
+                    <a:p>
+                      <a:endParaRPr lang="fr-FR"/>
+                    </a:p>
+                  </a:txBody>
+                  <a:tcPr/>
+                </a:tc>
+                <a:tc hMerge="1">
+                  <a:txBody>
+                    <a:bodyPr/>
+                    <a:lstStyle/>
+                    <a:p>
+                      <a:endParaRPr lang="fr-FR"/>
+                    </a:p>
+                  </a:txBody>
+                  <a:tcPr/>
+                </a:tc>
+                <a:tc hMerge="1">
+                  <a:txBody>
+                    <a:bodyPr/>
+                    <a:lstStyle/>
+                    <a:p>
+                      <a:endParaRPr lang="fr-FR"/>
+                    </a:p>
+                  </a:txBody>
+                  <a:tcPr/>
+                </a:tc>
+                <a:extLst>
+                  <a:ext uri="{0D108BD9-81ED-4DB2-BD59-A6C34878D82A}">
+                    <a16:rowId xmlns:a16="http://schemas.microsoft.com/office/drawing/2014/main" val="1750045856"/>
+                  </a:ext>
+                </a:extLst>
+              </a:tr>
+              <a:tr h="134952">
+                <a:tc>
+                  <a:txBody>
+                    <a:bodyPr/>
+                    <a:lstStyle/>
+                    <a:p>
+                      <a:pPr algn="l" fontAlgn="b"/>
+                      <a:endParaRPr lang="fr-FR" sz="1100" b="0" i="0" u="none" strike="noStrike">
+                        <a:solidFill>
+                          <a:srgbClr val="000000"/>
+                        </a:solidFill>
+                        <a:effectLst/>
+                        <a:latin typeface="Calibri" panose="020F0502020204030204" pitchFamily="34" charset="0"/>
+                      </a:endParaRPr>
+                    </a:p>
+                  </a:txBody>
+                  <a:tcPr marL="0" marR="0" marT="0" marB="0" anchor="b">
+                    <a:lnL>
+                      <a:noFill/>
+                    </a:lnL>
+                    <a:lnR>
+                      <a:noFill/>
+                    </a:lnR>
+                    <a:lnT>
+                      <a:noFill/>
+                    </a:lnT>
+                    <a:lnB>
+                      <a:noFill/>
+                    </a:lnB>
+                  </a:tcPr>
+                </a:tc>
+                <a:tc>
+                  <a:txBody>
+                    <a:bodyPr/>
+                    <a:lstStyle/>
+                    <a:p>
+                      <a:pPr algn="l" fontAlgn="b"/>
+                      <a:endParaRPr lang="fr-FR" sz="1100" b="0" i="0" u="none" strike="noStrike">
+                        <a:solidFill>
+                          <a:srgbClr val="000000"/>
+                        </a:solidFill>
+                        <a:effectLst/>
+                        <a:latin typeface="Calibri" panose="020F0502020204030204" pitchFamily="34" charset="0"/>
+                      </a:endParaRPr>
+                    </a:p>
+                  </a:txBody>
+                  <a:tcPr marL="0" marR="0" marT="0" marB="0" anchor="b">
+                    <a:lnL>
+                      <a:noFill/>
+                    </a:lnL>
+                    <a:lnR>
+                      <a:noFill/>
+                    </a:lnR>
+                    <a:lnT>
+                      <a:noFill/>
+                    </a:lnT>
+                    <a:lnB>
+                      <a:noFill/>
+                    </a:lnB>
+                  </a:tcPr>
+                </a:tc>
+                <a:tc>
+                  <a:txBody>
+                    <a:bodyPr/>
+                    <a:lstStyle/>
+                    <a:p>
+                      <a:pPr algn="l" fontAlgn="b"/>
+                      <a:endParaRPr lang="fr-FR" sz="1100" b="0" i="0" u="none" strike="noStrike">
+                        <a:solidFill>
+                          <a:srgbClr val="000000"/>
+                        </a:solidFill>
+                        <a:effectLst/>
+                        <a:latin typeface="Calibri" panose="020F0502020204030204" pitchFamily="34" charset="0"/>
+                      </a:endParaRPr>
+                    </a:p>
+                  </a:txBody>
+                  <a:tcPr marL="0" marR="0" marT="0" marB="0" anchor="b">
+                    <a:lnL>
+                      <a:noFill/>
+                    </a:lnL>
+                    <a:lnR>
+                      <a:noFill/>
+                    </a:lnR>
+                    <a:lnT>
+                      <a:noFill/>
+                    </a:lnT>
+                    <a:lnB>
+                      <a:noFill/>
+                    </a:lnB>
+                  </a:tcPr>
+                </a:tc>
+                <a:tc>
+                  <a:txBody>
+                    <a:bodyPr/>
+                    <a:lstStyle/>
+                    <a:p>
+                      <a:pPr algn="l" fontAlgn="b"/>
+                      <a:endParaRPr lang="fr-FR" sz="1100" b="0" i="0" u="none" strike="noStrike">
+                        <a:solidFill>
+                          <a:srgbClr val="000000"/>
+                        </a:solidFill>
+                        <a:effectLst/>
+                        <a:latin typeface="Calibri" panose="020F0502020204030204" pitchFamily="34" charset="0"/>
+                      </a:endParaRPr>
+                    </a:p>
+                  </a:txBody>
+                  <a:tcPr marL="0" marR="0" marT="0" marB="0" anchor="b">
+                    <a:lnL>
+                      <a:noFill/>
+                    </a:lnL>
+                    <a:lnR>
+                      <a:noFill/>
+                    </a:lnR>
+                    <a:lnT>
+                      <a:noFill/>
+                    </a:lnT>
+                    <a:lnB>
+                      <a:noFill/>
+                    </a:lnB>
+                  </a:tcPr>
+                </a:tc>
+                <a:extLst>
+                  <a:ext uri="{0D108BD9-81ED-4DB2-BD59-A6C34878D82A}">
+                    <a16:rowId xmlns:a16="http://schemas.microsoft.com/office/drawing/2014/main" val="664283103"/>
+                  </a:ext>
+                </a:extLst>
+              </a:tr>
+              <a:tr h="555595">
+                <a:tc>
+                  <a:txBody>
+                    <a:bodyPr/>
+                    <a:lstStyle/>
+                    <a:p>
+                      <a:pPr algn="ctr" fontAlgn="ctr"/>
+                      <a:r>
+                        <a:rPr lang="fr-FR" sz="1100" b="1" i="0" u="none" strike="noStrike" dirty="0">
+                          <a:solidFill>
+                            <a:srgbClr val="0070C0"/>
+                          </a:solidFill>
+                          <a:effectLst/>
+                          <a:latin typeface="Calibri Light" panose="020F0302020204030204" pitchFamily="34" charset="0"/>
+                        </a:rPr>
+                        <a:t>Grande salle et bar</a:t>
+                      </a:r>
+                    </a:p>
+                  </a:txBody>
+                  <a:tcPr marL="0" marR="0" marT="0" marB="0" anchor="ctr">
+                    <a:lnL>
+                      <a:noFill/>
+                    </a:lnL>
+                    <a:lnR>
+                      <a:noFill/>
+                    </a:lnR>
+                    <a:lnT>
+                      <a:noFill/>
+                    </a:lnT>
+                    <a:lnB>
+                      <a:noFill/>
+                    </a:lnB>
+                  </a:tcPr>
+                </a:tc>
+                <a:tc>
+                  <a:txBody>
+                    <a:bodyPr/>
+                    <a:lstStyle/>
+                    <a:p>
+                      <a:pPr algn="ctr" fontAlgn="ctr"/>
+                      <a:r>
+                        <a:rPr lang="fr-FR" sz="1100" b="0" i="0" u="none" strike="noStrike">
+                          <a:solidFill>
+                            <a:srgbClr val="000000"/>
+                          </a:solidFill>
+                          <a:effectLst/>
+                          <a:latin typeface="Calibri Light" panose="020F0302020204030204" pitchFamily="34" charset="0"/>
+                        </a:rPr>
+                        <a:t>1</a:t>
+                      </a:r>
+                    </a:p>
+                  </a:txBody>
+                  <a:tcPr marL="0" marR="0" marT="0" marB="0" anchor="ctr">
+                    <a:lnL>
+                      <a:noFill/>
+                    </a:lnL>
+                    <a:lnR>
+                      <a:noFill/>
+                    </a:lnR>
+                    <a:lnT>
+                      <a:noFill/>
+                    </a:lnT>
+                    <a:lnB>
+                      <a:noFill/>
+                    </a:lnB>
+                  </a:tcPr>
+                </a:tc>
+                <a:tc>
+                  <a:txBody>
+                    <a:bodyPr/>
+                    <a:lstStyle/>
+                    <a:p>
+                      <a:pPr algn="ctr" fontAlgn="ctr"/>
+                      <a:r>
+                        <a:rPr lang="fr-FR" sz="1100" b="0" i="0" u="none" strike="noStrike" dirty="0">
+                          <a:solidFill>
+                            <a:srgbClr val="000000"/>
+                          </a:solidFill>
+                          <a:effectLst/>
+                          <a:latin typeface="Calibri Light" panose="020F0302020204030204" pitchFamily="34" charset="0"/>
+                        </a:rPr>
+                        <a:t>Chaudière gaz à condensation</a:t>
+                      </a:r>
+                    </a:p>
+                  </a:txBody>
+                  <a:tcPr marL="0" marR="0" marT="0" marB="0" anchor="ctr">
+                    <a:lnL>
+                      <a:noFill/>
+                    </a:lnL>
+                    <a:lnR>
+                      <a:noFill/>
+                    </a:lnR>
+                    <a:lnT>
+                      <a:noFill/>
+                    </a:lnT>
+                    <a:lnB>
+                      <a:noFill/>
+                    </a:lnB>
+                  </a:tcPr>
+                </a:tc>
+                <a:tc>
+                  <a:txBody>
+                    <a:bodyPr/>
+                    <a:lstStyle/>
+                    <a:p>
+                      <a:pPr algn="ctr" fontAlgn="ctr"/>
+                      <a:r>
+                        <a:rPr lang="fr-FR" sz="1100" b="0" i="0" u="none" strike="noStrike" dirty="0">
+                          <a:solidFill>
+                            <a:srgbClr val="000000"/>
+                          </a:solidFill>
+                          <a:effectLst/>
+                          <a:latin typeface="Calibri Light" panose="020F0302020204030204" pitchFamily="34" charset="0"/>
+                        </a:rPr>
+                        <a:t>(Atlantic ,70 </a:t>
+                      </a:r>
+                      <a:r>
+                        <a:rPr lang="fr-FR" sz="1100" b="0" i="0" u="none" strike="noStrike" dirty="0" err="1">
+                          <a:solidFill>
+                            <a:srgbClr val="000000"/>
+                          </a:solidFill>
+                          <a:effectLst/>
+                          <a:latin typeface="Calibri Light" panose="020F0302020204030204" pitchFamily="34" charset="0"/>
+                        </a:rPr>
+                        <a:t>kw</a:t>
+                      </a:r>
+                      <a:r>
+                        <a:rPr lang="fr-FR" sz="1100" b="0" i="0" u="none" strike="noStrike" dirty="0">
+                          <a:solidFill>
+                            <a:srgbClr val="000000"/>
+                          </a:solidFill>
+                          <a:effectLst/>
+                          <a:latin typeface="Calibri Light" panose="020F0302020204030204" pitchFamily="34" charset="0"/>
+                        </a:rPr>
+                        <a:t>)</a:t>
+                      </a:r>
+                    </a:p>
+                  </a:txBody>
+                  <a:tcPr marL="0" marR="0" marT="0" marB="0" anchor="ctr">
+                    <a:lnL>
+                      <a:noFill/>
+                    </a:lnL>
+                    <a:lnR>
+                      <a:noFill/>
+                    </a:lnR>
+                    <a:lnT>
+                      <a:noFill/>
+                    </a:lnT>
+                    <a:lnB>
+                      <a:noFill/>
+                    </a:lnB>
+                  </a:tcPr>
+                </a:tc>
+                <a:extLst>
+                  <a:ext uri="{0D108BD9-81ED-4DB2-BD59-A6C34878D82A}">
+                    <a16:rowId xmlns:a16="http://schemas.microsoft.com/office/drawing/2014/main" val="3440922109"/>
+                  </a:ext>
+                </a:extLst>
+              </a:tr>
+            </a:tbl>
+          </a:graphicData>
+        </a:graphic>
+      </p:graphicFrame>
     </p:spTree>
     <p:extLst>
       <p:ext uri="{BB962C8B-B14F-4D97-AF65-F5344CB8AC3E}">
@@ -8496,7 +10392,7 @@
       </p:sp>
       <p:graphicFrame>
         <p:nvGraphicFramePr>
-          <p:cNvPr id="3" name="Tableau 3">
+          <p:cNvPr id="3" name="tableauPreconisations">
             <a:extLst>
               <a:ext uri="{FF2B5EF4-FFF2-40B4-BE49-F238E27FC236}">
                 <a16:creationId xmlns:a16="http://schemas.microsoft.com/office/drawing/2014/main" id="{E00B247E-2D7E-5ABE-E8CE-19DC8B6D3726}"/>
@@ -8509,14 +10405,14 @@
           <p:nvPr>
             <p:extLst>
               <p:ext uri="{D42A27DB-BD31-4B8C-83A1-F6EECF244321}">
-                <p14:modId xmlns:p14="http://schemas.microsoft.com/office/powerpoint/2010/main" val="4027590659"/>
+                <p14:modId xmlns:p14="http://schemas.microsoft.com/office/powerpoint/2010/main" val="3606062103"/>
               </p:ext>
             </p:extLst>
           </p:nvPr>
         </p:nvGraphicFramePr>
         <p:xfrm>
           <a:off x="241075" y="1179000"/>
-          <a:ext cx="5040000" cy="3352800"/>
+          <a:ext cx="5040000" cy="335280"/>
         </p:xfrm>
         <a:graphic>
           <a:graphicData uri="http://schemas.openxmlformats.org/drawingml/2006/table">
@@ -8540,13 +10436,16 @@
                     <a:lstStyle/>
                     <a:p>
                       <a:pPr algn="l"/>
-                      <a:endParaRPr lang="fr-FR" sz="1600" b="1" dirty="0">
-                        <a:solidFill>
-                          <a:schemeClr val="tx1"/>
-                        </a:solidFill>
-                        <a:latin typeface="Calibri" panose="020F0502020204030204" pitchFamily="34" charset="0"/>
-                        <a:cs typeface="Calibri" panose="020F0502020204030204" pitchFamily="34" charset="0"/>
-                      </a:endParaRPr>
+                      <a:r>
+                        <a:rPr lang="fr-FR" sz="1600" b="1" dirty="0">
+                          <a:solidFill>
+                            <a:schemeClr val="tx1"/>
+                          </a:solidFill>
+                          <a:latin typeface="Calibri" panose="020F0502020204030204" pitchFamily="34" charset="0"/>
+                          <a:cs typeface="Calibri" panose="020F0502020204030204" pitchFamily="34" charset="0"/>
+                        </a:rPr>
+                        <a:t>Remplacer les tubes fluo par des LEDS</a:t>
+                      </a:r>
                     </a:p>
                   </a:txBody>
                   <a:tcPr anchor="ctr">
@@ -8577,692 +10476,6 @@
                       <a:headEnd type="none" w="med" len="med"/>
                       <a:tailEnd type="none" w="med" len="med"/>
                     </a:lnT>
-                    <a:lnB w="38100" cmpd="sng">
-                      <a:noFill/>
-                    </a:lnB>
-                    <a:lnTlToBr w="12700" cmpd="sng">
-                      <a:noFill/>
-                      <a:prstDash val="solid"/>
-                    </a:lnTlToBr>
-                    <a:lnBlToTr w="12700" cmpd="sng">
-                      <a:noFill/>
-                      <a:prstDash val="solid"/>
-                    </a:lnBlToTr>
-                    <a:noFill/>
-                  </a:tcPr>
-                </a:tc>
-                <a:extLst>
-                  <a:ext uri="{0D108BD9-81ED-4DB2-BD59-A6C34878D82A}">
-                    <a16:rowId xmlns:a16="http://schemas.microsoft.com/office/drawing/2014/main" val="3075188765"/>
-                  </a:ext>
-                </a:extLst>
-              </a:tr>
-              <a:tr h="247860">
-                <a:tc>
-                  <a:txBody>
-                    <a:bodyPr/>
-                    <a:lstStyle/>
-                    <a:p>
-                      <a:pPr marL="0" marR="0" lvl="0" indent="0" algn="l" defTabSz="914400" rtl="0" eaLnBrk="1" fontAlgn="auto" latinLnBrk="0" hangingPunct="1">
-                        <a:lnSpc>
-                          <a:spcPct val="100000"/>
-                        </a:lnSpc>
-                        <a:spcBef>
-                          <a:spcPts val="0"/>
-                        </a:spcBef>
-                        <a:spcAft>
-                          <a:spcPts val="0"/>
-                        </a:spcAft>
-                        <a:buClrTx/>
-                        <a:buSzTx/>
-                        <a:buFontTx/>
-                        <a:buNone/>
-                        <a:tabLst/>
-                        <a:defRPr/>
-                      </a:pPr>
-                      <a:endParaRPr lang="fr-FR" sz="1600" b="1" dirty="0">
-                        <a:solidFill>
-                          <a:schemeClr val="tx1"/>
-                        </a:solidFill>
-                        <a:latin typeface="Calibri" panose="020F0502020204030204" pitchFamily="34" charset="0"/>
-                        <a:cs typeface="Calibri" panose="020F0502020204030204" pitchFamily="34" charset="0"/>
-                      </a:endParaRPr>
-                    </a:p>
-                  </a:txBody>
-                  <a:tcPr anchor="ctr">
-                    <a:lnL w="12700" cap="flat" cmpd="sng" algn="ctr">
-                      <a:solidFill>
-                        <a:schemeClr val="tx1"/>
-                      </a:solidFill>
-                      <a:prstDash val="solid"/>
-                      <a:round/>
-                      <a:headEnd type="none" w="med" len="med"/>
-                      <a:tailEnd type="none" w="med" len="med"/>
-                    </a:lnL>
-                    <a:lnR w="12700" cap="flat" cmpd="sng" algn="ctr">
-                      <a:solidFill>
-                        <a:schemeClr val="tx1"/>
-                      </a:solidFill>
-                      <a:prstDash val="solid"/>
-                      <a:round/>
-                      <a:headEnd type="none" w="med" len="med"/>
-                      <a:tailEnd type="none" w="med" len="med"/>
-                    </a:lnR>
-                    <a:lnT w="38100" cmpd="sng">
-                      <a:noFill/>
-                    </a:lnT>
-                    <a:lnB w="12700" cmpd="sng">
-                      <a:noFill/>
-                    </a:lnB>
-                    <a:lnTlToBr w="12700" cmpd="sng">
-                      <a:noFill/>
-                      <a:prstDash val="solid"/>
-                    </a:lnTlToBr>
-                    <a:lnBlToTr w="12700" cmpd="sng">
-                      <a:noFill/>
-                      <a:prstDash val="solid"/>
-                    </a:lnBlToTr>
-                    <a:noFill/>
-                  </a:tcPr>
-                </a:tc>
-                <a:extLst>
-                  <a:ext uri="{0D108BD9-81ED-4DB2-BD59-A6C34878D82A}">
-                    <a16:rowId xmlns:a16="http://schemas.microsoft.com/office/drawing/2014/main" val="883756731"/>
-                  </a:ext>
-                </a:extLst>
-              </a:tr>
-              <a:tr h="247860">
-                <a:tc>
-                  <a:txBody>
-                    <a:bodyPr/>
-                    <a:lstStyle/>
-                    <a:p>
-                      <a:pPr marL="0" marR="0" lvl="0" indent="0" algn="l" defTabSz="914400" rtl="0" eaLnBrk="1" fontAlgn="auto" latinLnBrk="0" hangingPunct="1">
-                        <a:lnSpc>
-                          <a:spcPct val="100000"/>
-                        </a:lnSpc>
-                        <a:spcBef>
-                          <a:spcPts val="0"/>
-                        </a:spcBef>
-                        <a:spcAft>
-                          <a:spcPts val="0"/>
-                        </a:spcAft>
-                        <a:buClrTx/>
-                        <a:buSzTx/>
-                        <a:buFontTx/>
-                        <a:buNone/>
-                        <a:tabLst/>
-                        <a:defRPr/>
-                      </a:pPr>
-                      <a:endParaRPr lang="fr-FR" sz="1600" b="1">
-                        <a:solidFill>
-                          <a:schemeClr val="tx1"/>
-                        </a:solidFill>
-                        <a:latin typeface="Calibri" panose="020F0502020204030204" pitchFamily="34" charset="0"/>
-                        <a:cs typeface="Calibri" panose="020F0502020204030204" pitchFamily="34" charset="0"/>
-                      </a:endParaRPr>
-                    </a:p>
-                  </a:txBody>
-                  <a:tcPr anchor="ctr">
-                    <a:lnL w="12700" cap="flat" cmpd="sng" algn="ctr">
-                      <a:solidFill>
-                        <a:schemeClr val="tx1"/>
-                      </a:solidFill>
-                      <a:prstDash val="solid"/>
-                      <a:round/>
-                      <a:headEnd type="none" w="med" len="med"/>
-                      <a:tailEnd type="none" w="med" len="med"/>
-                    </a:lnL>
-                    <a:lnR w="12700" cap="flat" cmpd="sng" algn="ctr">
-                      <a:solidFill>
-                        <a:schemeClr val="tx1"/>
-                      </a:solidFill>
-                      <a:prstDash val="solid"/>
-                      <a:round/>
-                      <a:headEnd type="none" w="med" len="med"/>
-                      <a:tailEnd type="none" w="med" len="med"/>
-                    </a:lnR>
-                    <a:lnT w="12700" cmpd="sng">
-                      <a:noFill/>
-                    </a:lnT>
-                    <a:lnB w="12700" cmpd="sng">
-                      <a:noFill/>
-                    </a:lnB>
-                    <a:lnTlToBr w="12700" cmpd="sng">
-                      <a:noFill/>
-                      <a:prstDash val="solid"/>
-                    </a:lnTlToBr>
-                    <a:lnBlToTr w="12700" cmpd="sng">
-                      <a:noFill/>
-                      <a:prstDash val="solid"/>
-                    </a:lnBlToTr>
-                    <a:noFill/>
-                  </a:tcPr>
-                </a:tc>
-                <a:extLst>
-                  <a:ext uri="{0D108BD9-81ED-4DB2-BD59-A6C34878D82A}">
-                    <a16:rowId xmlns:a16="http://schemas.microsoft.com/office/drawing/2014/main" val="143874211"/>
-                  </a:ext>
-                </a:extLst>
-              </a:tr>
-              <a:tr h="247860">
-                <a:tc>
-                  <a:txBody>
-                    <a:bodyPr/>
-                    <a:lstStyle/>
-                    <a:p>
-                      <a:pPr marL="0" marR="0" lvl="0" indent="0" algn="l" defTabSz="914400" rtl="0" eaLnBrk="1" fontAlgn="auto" latinLnBrk="0" hangingPunct="1">
-                        <a:lnSpc>
-                          <a:spcPct val="100000"/>
-                        </a:lnSpc>
-                        <a:spcBef>
-                          <a:spcPts val="0"/>
-                        </a:spcBef>
-                        <a:spcAft>
-                          <a:spcPts val="0"/>
-                        </a:spcAft>
-                        <a:buClrTx/>
-                        <a:buSzTx/>
-                        <a:buFontTx/>
-                        <a:buNone/>
-                        <a:tabLst/>
-                        <a:defRPr/>
-                      </a:pPr>
-                      <a:endParaRPr lang="fr-FR" sz="1600" b="1" dirty="0">
-                        <a:solidFill>
-                          <a:schemeClr val="tx1"/>
-                        </a:solidFill>
-                        <a:latin typeface="Calibri" panose="020F0502020204030204" pitchFamily="34" charset="0"/>
-                        <a:cs typeface="Calibri" panose="020F0502020204030204" pitchFamily="34" charset="0"/>
-                      </a:endParaRPr>
-                    </a:p>
-                  </a:txBody>
-                  <a:tcPr anchor="ctr">
-                    <a:lnL w="12700" cap="flat" cmpd="sng" algn="ctr">
-                      <a:solidFill>
-                        <a:schemeClr val="tx1"/>
-                      </a:solidFill>
-                      <a:prstDash val="solid"/>
-                      <a:round/>
-                      <a:headEnd type="none" w="med" len="med"/>
-                      <a:tailEnd type="none" w="med" len="med"/>
-                    </a:lnL>
-                    <a:lnR w="12700" cap="flat" cmpd="sng" algn="ctr">
-                      <a:solidFill>
-                        <a:schemeClr val="tx1"/>
-                      </a:solidFill>
-                      <a:prstDash val="solid"/>
-                      <a:round/>
-                      <a:headEnd type="none" w="med" len="med"/>
-                      <a:tailEnd type="none" w="med" len="med"/>
-                    </a:lnR>
-                    <a:lnT w="12700" cmpd="sng">
-                      <a:noFill/>
-                    </a:lnT>
-                    <a:lnB w="12700" cmpd="sng">
-                      <a:noFill/>
-                    </a:lnB>
-                    <a:lnTlToBr w="12700" cmpd="sng">
-                      <a:noFill/>
-                      <a:prstDash val="solid"/>
-                    </a:lnTlToBr>
-                    <a:lnBlToTr w="12700" cmpd="sng">
-                      <a:noFill/>
-                      <a:prstDash val="solid"/>
-                    </a:lnBlToTr>
-                    <a:noFill/>
-                  </a:tcPr>
-                </a:tc>
-                <a:extLst>
-                  <a:ext uri="{0D108BD9-81ED-4DB2-BD59-A6C34878D82A}">
-                    <a16:rowId xmlns:a16="http://schemas.microsoft.com/office/drawing/2014/main" val="1626374685"/>
-                  </a:ext>
-                </a:extLst>
-              </a:tr>
-              <a:tr h="247860">
-                <a:tc>
-                  <a:txBody>
-                    <a:bodyPr/>
-                    <a:lstStyle/>
-                    <a:p>
-                      <a:pPr marL="0" marR="0" lvl="0" indent="0" algn="l" defTabSz="914400" rtl="0" eaLnBrk="1" fontAlgn="auto" latinLnBrk="0" hangingPunct="1">
-                        <a:lnSpc>
-                          <a:spcPct val="100000"/>
-                        </a:lnSpc>
-                        <a:spcBef>
-                          <a:spcPts val="0"/>
-                        </a:spcBef>
-                        <a:spcAft>
-                          <a:spcPts val="0"/>
-                        </a:spcAft>
-                        <a:buClrTx/>
-                        <a:buSzTx/>
-                        <a:buFontTx/>
-                        <a:buNone/>
-                        <a:tabLst/>
-                        <a:defRPr/>
-                      </a:pPr>
-                      <a:endParaRPr lang="fr-FR" sz="1600" b="1">
-                        <a:solidFill>
-                          <a:schemeClr val="tx1"/>
-                        </a:solidFill>
-                        <a:latin typeface="Calibri" panose="020F0502020204030204" pitchFamily="34" charset="0"/>
-                        <a:cs typeface="Calibri" panose="020F0502020204030204" pitchFamily="34" charset="0"/>
-                      </a:endParaRPr>
-                    </a:p>
-                  </a:txBody>
-                  <a:tcPr anchor="ctr">
-                    <a:lnL w="12700" cap="flat" cmpd="sng" algn="ctr">
-                      <a:solidFill>
-                        <a:schemeClr val="tx1"/>
-                      </a:solidFill>
-                      <a:prstDash val="solid"/>
-                      <a:round/>
-                      <a:headEnd type="none" w="med" len="med"/>
-                      <a:tailEnd type="none" w="med" len="med"/>
-                    </a:lnL>
-                    <a:lnR w="12700" cap="flat" cmpd="sng" algn="ctr">
-                      <a:solidFill>
-                        <a:schemeClr val="tx1"/>
-                      </a:solidFill>
-                      <a:prstDash val="solid"/>
-                      <a:round/>
-                      <a:headEnd type="none" w="med" len="med"/>
-                      <a:tailEnd type="none" w="med" len="med"/>
-                    </a:lnR>
-                    <a:lnT w="12700" cmpd="sng">
-                      <a:noFill/>
-                    </a:lnT>
-                    <a:lnB w="12700" cap="flat" cmpd="sng" algn="ctr">
-                      <a:noFill/>
-                      <a:prstDash val="solid"/>
-                      <a:round/>
-                      <a:headEnd type="none" w="med" len="med"/>
-                      <a:tailEnd type="none" w="med" len="med"/>
-                    </a:lnB>
-                    <a:lnTlToBr w="12700" cmpd="sng">
-                      <a:noFill/>
-                      <a:prstDash val="solid"/>
-                    </a:lnTlToBr>
-                    <a:lnBlToTr w="12700" cmpd="sng">
-                      <a:noFill/>
-                      <a:prstDash val="solid"/>
-                    </a:lnBlToTr>
-                    <a:noFill/>
-                  </a:tcPr>
-                </a:tc>
-                <a:extLst>
-                  <a:ext uri="{0D108BD9-81ED-4DB2-BD59-A6C34878D82A}">
-                    <a16:rowId xmlns:a16="http://schemas.microsoft.com/office/drawing/2014/main" val="908503018"/>
-                  </a:ext>
-                </a:extLst>
-              </a:tr>
-              <a:tr h="247860">
-                <a:tc>
-                  <a:txBody>
-                    <a:bodyPr/>
-                    <a:lstStyle/>
-                    <a:p>
-                      <a:pPr marL="0" marR="0" lvl="0" indent="0" algn="l" defTabSz="914400" rtl="0" eaLnBrk="1" fontAlgn="auto" latinLnBrk="0" hangingPunct="1">
-                        <a:lnSpc>
-                          <a:spcPct val="100000"/>
-                        </a:lnSpc>
-                        <a:spcBef>
-                          <a:spcPts val="0"/>
-                        </a:spcBef>
-                        <a:spcAft>
-                          <a:spcPts val="0"/>
-                        </a:spcAft>
-                        <a:buClrTx/>
-                        <a:buSzTx/>
-                        <a:buFontTx/>
-                        <a:buNone/>
-                        <a:tabLst/>
-                        <a:defRPr/>
-                      </a:pPr>
-                      <a:endParaRPr lang="fr-FR" sz="1600" b="1" dirty="0">
-                        <a:solidFill>
-                          <a:schemeClr val="tx1"/>
-                        </a:solidFill>
-                        <a:latin typeface="Calibri" panose="020F0502020204030204" pitchFamily="34" charset="0"/>
-                        <a:cs typeface="Calibri" panose="020F0502020204030204" pitchFamily="34" charset="0"/>
-                      </a:endParaRPr>
-                    </a:p>
-                  </a:txBody>
-                  <a:tcPr anchor="ctr">
-                    <a:lnL w="12700" cap="flat" cmpd="sng" algn="ctr">
-                      <a:solidFill>
-                        <a:schemeClr val="tx1"/>
-                      </a:solidFill>
-                      <a:prstDash val="solid"/>
-                      <a:round/>
-                      <a:headEnd type="none" w="med" len="med"/>
-                      <a:tailEnd type="none" w="med" len="med"/>
-                    </a:lnL>
-                    <a:lnR w="12700" cap="flat" cmpd="sng" algn="ctr">
-                      <a:solidFill>
-                        <a:schemeClr val="tx1"/>
-                      </a:solidFill>
-                      <a:prstDash val="solid"/>
-                      <a:round/>
-                      <a:headEnd type="none" w="med" len="med"/>
-                      <a:tailEnd type="none" w="med" len="med"/>
-                    </a:lnR>
-                    <a:lnT w="12700" cmpd="sng">
-                      <a:noFill/>
-                    </a:lnT>
-                    <a:lnB w="12700" cap="flat" cmpd="sng" algn="ctr">
-                      <a:noFill/>
-                      <a:prstDash val="solid"/>
-                      <a:round/>
-                      <a:headEnd type="none" w="med" len="med"/>
-                      <a:tailEnd type="none" w="med" len="med"/>
-                    </a:lnB>
-                    <a:lnTlToBr w="12700" cmpd="sng">
-                      <a:noFill/>
-                      <a:prstDash val="solid"/>
-                    </a:lnTlToBr>
-                    <a:lnBlToTr w="12700" cmpd="sng">
-                      <a:noFill/>
-                      <a:prstDash val="solid"/>
-                    </a:lnBlToTr>
-                    <a:noFill/>
-                  </a:tcPr>
-                </a:tc>
-                <a:extLst>
-                  <a:ext uri="{0D108BD9-81ED-4DB2-BD59-A6C34878D82A}">
-                    <a16:rowId xmlns:a16="http://schemas.microsoft.com/office/drawing/2014/main" val="955004388"/>
-                  </a:ext>
-                </a:extLst>
-              </a:tr>
-              <a:tr h="247860">
-                <a:tc>
-                  <a:txBody>
-                    <a:bodyPr/>
-                    <a:lstStyle/>
-                    <a:p>
-                      <a:pPr marL="0" marR="0" lvl="0" indent="0" algn="l" defTabSz="914400" rtl="0" eaLnBrk="1" fontAlgn="auto" latinLnBrk="0" hangingPunct="1">
-                        <a:lnSpc>
-                          <a:spcPct val="100000"/>
-                        </a:lnSpc>
-                        <a:spcBef>
-                          <a:spcPts val="0"/>
-                        </a:spcBef>
-                        <a:spcAft>
-                          <a:spcPts val="0"/>
-                        </a:spcAft>
-                        <a:buClrTx/>
-                        <a:buSzTx/>
-                        <a:buFontTx/>
-                        <a:buNone/>
-                        <a:tabLst/>
-                        <a:defRPr/>
-                      </a:pPr>
-                      <a:endParaRPr lang="fr-FR" sz="1600" b="1">
-                        <a:solidFill>
-                          <a:schemeClr val="tx1"/>
-                        </a:solidFill>
-                        <a:latin typeface="Calibri" panose="020F0502020204030204" pitchFamily="34" charset="0"/>
-                        <a:cs typeface="Calibri" panose="020F0502020204030204" pitchFamily="34" charset="0"/>
-                      </a:endParaRPr>
-                    </a:p>
-                  </a:txBody>
-                  <a:tcPr anchor="ctr">
-                    <a:lnL w="12700" cap="flat" cmpd="sng" algn="ctr">
-                      <a:solidFill>
-                        <a:schemeClr val="tx1"/>
-                      </a:solidFill>
-                      <a:prstDash val="solid"/>
-                      <a:round/>
-                      <a:headEnd type="none" w="med" len="med"/>
-                      <a:tailEnd type="none" w="med" len="med"/>
-                    </a:lnL>
-                    <a:lnR w="12700" cap="flat" cmpd="sng" algn="ctr">
-                      <a:solidFill>
-                        <a:schemeClr val="tx1"/>
-                      </a:solidFill>
-                      <a:prstDash val="solid"/>
-                      <a:round/>
-                      <a:headEnd type="none" w="med" len="med"/>
-                      <a:tailEnd type="none" w="med" len="med"/>
-                    </a:lnR>
-                    <a:lnT w="12700" cmpd="sng">
-                      <a:noFill/>
-                    </a:lnT>
-                    <a:lnB w="12700" cap="flat" cmpd="sng" algn="ctr">
-                      <a:noFill/>
-                      <a:prstDash val="solid"/>
-                      <a:round/>
-                      <a:headEnd type="none" w="med" len="med"/>
-                      <a:tailEnd type="none" w="med" len="med"/>
-                    </a:lnB>
-                    <a:lnTlToBr w="12700" cmpd="sng">
-                      <a:noFill/>
-                      <a:prstDash val="solid"/>
-                    </a:lnTlToBr>
-                    <a:lnBlToTr w="12700" cmpd="sng">
-                      <a:noFill/>
-                      <a:prstDash val="solid"/>
-                    </a:lnBlToTr>
-                    <a:noFill/>
-                  </a:tcPr>
-                </a:tc>
-                <a:extLst>
-                  <a:ext uri="{0D108BD9-81ED-4DB2-BD59-A6C34878D82A}">
-                    <a16:rowId xmlns:a16="http://schemas.microsoft.com/office/drawing/2014/main" val="2567130616"/>
-                  </a:ext>
-                </a:extLst>
-              </a:tr>
-              <a:tr h="247860">
-                <a:tc>
-                  <a:txBody>
-                    <a:bodyPr/>
-                    <a:lstStyle/>
-                    <a:p>
-                      <a:pPr marL="0" marR="0" lvl="0" indent="0" algn="l" defTabSz="914400" rtl="0" eaLnBrk="1" fontAlgn="auto" latinLnBrk="0" hangingPunct="1">
-                        <a:lnSpc>
-                          <a:spcPct val="100000"/>
-                        </a:lnSpc>
-                        <a:spcBef>
-                          <a:spcPts val="0"/>
-                        </a:spcBef>
-                        <a:spcAft>
-                          <a:spcPts val="0"/>
-                        </a:spcAft>
-                        <a:buClrTx/>
-                        <a:buSzTx/>
-                        <a:buFontTx/>
-                        <a:buNone/>
-                        <a:tabLst/>
-                        <a:defRPr/>
-                      </a:pPr>
-                      <a:endParaRPr lang="fr-FR" sz="1600" b="1">
-                        <a:solidFill>
-                          <a:schemeClr val="tx1"/>
-                        </a:solidFill>
-                        <a:latin typeface="Calibri" panose="020F0502020204030204" pitchFamily="34" charset="0"/>
-                        <a:cs typeface="Calibri" panose="020F0502020204030204" pitchFamily="34" charset="0"/>
-                      </a:endParaRPr>
-                    </a:p>
-                  </a:txBody>
-                  <a:tcPr anchor="ctr">
-                    <a:lnL w="12700" cap="flat" cmpd="sng" algn="ctr">
-                      <a:solidFill>
-                        <a:schemeClr val="tx1"/>
-                      </a:solidFill>
-                      <a:prstDash val="solid"/>
-                      <a:round/>
-                      <a:headEnd type="none" w="med" len="med"/>
-                      <a:tailEnd type="none" w="med" len="med"/>
-                    </a:lnL>
-                    <a:lnR w="12700" cap="flat" cmpd="sng" algn="ctr">
-                      <a:solidFill>
-                        <a:schemeClr val="tx1"/>
-                      </a:solidFill>
-                      <a:prstDash val="solid"/>
-                      <a:round/>
-                      <a:headEnd type="none" w="med" len="med"/>
-                      <a:tailEnd type="none" w="med" len="med"/>
-                    </a:lnR>
-                    <a:lnT w="12700" cmpd="sng">
-                      <a:noFill/>
-                    </a:lnT>
-                    <a:lnB w="12700" cap="flat" cmpd="sng" algn="ctr">
-                      <a:noFill/>
-                      <a:prstDash val="solid"/>
-                      <a:round/>
-                      <a:headEnd type="none" w="med" len="med"/>
-                      <a:tailEnd type="none" w="med" len="med"/>
-                    </a:lnB>
-                    <a:lnTlToBr w="12700" cmpd="sng">
-                      <a:noFill/>
-                      <a:prstDash val="solid"/>
-                    </a:lnTlToBr>
-                    <a:lnBlToTr w="12700" cmpd="sng">
-                      <a:noFill/>
-                      <a:prstDash val="solid"/>
-                    </a:lnBlToTr>
-                    <a:noFill/>
-                  </a:tcPr>
-                </a:tc>
-                <a:extLst>
-                  <a:ext uri="{0D108BD9-81ED-4DB2-BD59-A6C34878D82A}">
-                    <a16:rowId xmlns:a16="http://schemas.microsoft.com/office/drawing/2014/main" val="3261276914"/>
-                  </a:ext>
-                </a:extLst>
-              </a:tr>
-              <a:tr h="247860">
-                <a:tc>
-                  <a:txBody>
-                    <a:bodyPr/>
-                    <a:lstStyle/>
-                    <a:p>
-                      <a:pPr marL="0" marR="0" lvl="0" indent="0" algn="l" defTabSz="914400" rtl="0" eaLnBrk="1" fontAlgn="auto" latinLnBrk="0" hangingPunct="1">
-                        <a:lnSpc>
-                          <a:spcPct val="100000"/>
-                        </a:lnSpc>
-                        <a:spcBef>
-                          <a:spcPts val="0"/>
-                        </a:spcBef>
-                        <a:spcAft>
-                          <a:spcPts val="0"/>
-                        </a:spcAft>
-                        <a:buClrTx/>
-                        <a:buSzTx/>
-                        <a:buFontTx/>
-                        <a:buNone/>
-                        <a:tabLst/>
-                        <a:defRPr/>
-                      </a:pPr>
-                      <a:endParaRPr lang="fr-FR" sz="1600" b="1" dirty="0">
-                        <a:solidFill>
-                          <a:schemeClr val="tx1"/>
-                        </a:solidFill>
-                        <a:latin typeface="Calibri" panose="020F0502020204030204" pitchFamily="34" charset="0"/>
-                        <a:cs typeface="Calibri" panose="020F0502020204030204" pitchFamily="34" charset="0"/>
-                      </a:endParaRPr>
-                    </a:p>
-                  </a:txBody>
-                  <a:tcPr anchor="ctr">
-                    <a:lnL w="12700" cap="flat" cmpd="sng" algn="ctr">
-                      <a:solidFill>
-                        <a:schemeClr val="tx1"/>
-                      </a:solidFill>
-                      <a:prstDash val="solid"/>
-                      <a:round/>
-                      <a:headEnd type="none" w="med" len="med"/>
-                      <a:tailEnd type="none" w="med" len="med"/>
-                    </a:lnL>
-                    <a:lnR w="12700" cap="flat" cmpd="sng" algn="ctr">
-                      <a:solidFill>
-                        <a:schemeClr val="tx1"/>
-                      </a:solidFill>
-                      <a:prstDash val="solid"/>
-                      <a:round/>
-                      <a:headEnd type="none" w="med" len="med"/>
-                      <a:tailEnd type="none" w="med" len="med"/>
-                    </a:lnR>
-                    <a:lnT w="12700" cmpd="sng">
-                      <a:noFill/>
-                    </a:lnT>
-                    <a:lnB w="12700" cap="flat" cmpd="sng" algn="ctr">
-                      <a:noFill/>
-                      <a:prstDash val="solid"/>
-                      <a:round/>
-                      <a:headEnd type="none" w="med" len="med"/>
-                      <a:tailEnd type="none" w="med" len="med"/>
-                    </a:lnB>
-                    <a:lnTlToBr w="12700" cmpd="sng">
-                      <a:noFill/>
-                      <a:prstDash val="solid"/>
-                    </a:lnTlToBr>
-                    <a:lnBlToTr w="12700" cmpd="sng">
-                      <a:noFill/>
-                      <a:prstDash val="solid"/>
-                    </a:lnBlToTr>
-                    <a:noFill/>
-                  </a:tcPr>
-                </a:tc>
-                <a:extLst>
-                  <a:ext uri="{0D108BD9-81ED-4DB2-BD59-A6C34878D82A}">
-                    <a16:rowId xmlns:a16="http://schemas.microsoft.com/office/drawing/2014/main" val="2182611590"/>
-                  </a:ext>
-                </a:extLst>
-              </a:tr>
-              <a:tr h="247860">
-                <a:tc>
-                  <a:txBody>
-                    <a:bodyPr/>
-                    <a:lstStyle/>
-                    <a:p>
-                      <a:pPr marL="0" marR="0" lvl="0" indent="0" algn="l" defTabSz="914400" rtl="0" eaLnBrk="1" fontAlgn="auto" latinLnBrk="0" hangingPunct="1">
-                        <a:lnSpc>
-                          <a:spcPct val="100000"/>
-                        </a:lnSpc>
-                        <a:spcBef>
-                          <a:spcPts val="0"/>
-                        </a:spcBef>
-                        <a:spcAft>
-                          <a:spcPts val="0"/>
-                        </a:spcAft>
-                        <a:buClrTx/>
-                        <a:buSzTx/>
-                        <a:buFontTx/>
-                        <a:buNone/>
-                        <a:tabLst/>
-                        <a:defRPr/>
-                      </a:pPr>
-                      <a:endParaRPr lang="fr-FR" sz="1600" b="1" dirty="0">
-                        <a:solidFill>
-                          <a:schemeClr val="tx1"/>
-                        </a:solidFill>
-                        <a:latin typeface="Calibri" panose="020F0502020204030204" pitchFamily="34" charset="0"/>
-                        <a:cs typeface="Calibri" panose="020F0502020204030204" pitchFamily="34" charset="0"/>
-                      </a:endParaRPr>
-                    </a:p>
-                  </a:txBody>
-                  <a:tcPr anchor="ctr">
-                    <a:lnL w="12700" cap="flat" cmpd="sng" algn="ctr">
-                      <a:solidFill>
-                        <a:schemeClr val="tx1"/>
-                      </a:solidFill>
-                      <a:prstDash val="solid"/>
-                      <a:round/>
-                      <a:headEnd type="none" w="med" len="med"/>
-                      <a:tailEnd type="none" w="med" len="med"/>
-                    </a:lnL>
-                    <a:lnR w="12700" cap="flat" cmpd="sng" algn="ctr">
-                      <a:solidFill>
-                        <a:schemeClr val="tx1"/>
-                      </a:solidFill>
-                      <a:prstDash val="solid"/>
-                      <a:round/>
-                      <a:headEnd type="none" w="med" len="med"/>
-                      <a:tailEnd type="none" w="med" len="med"/>
-                    </a:lnR>
-                    <a:lnT w="12700" cmpd="sng">
-                      <a:noFill/>
-                    </a:lnT>
                     <a:lnB w="12700" cap="flat" cmpd="sng" algn="ctr">
                       <a:solidFill>
                         <a:schemeClr val="tx1"/>
@@ -9285,7 +10498,7 @@
                 </a:tc>
                 <a:extLst>
                   <a:ext uri="{0D108BD9-81ED-4DB2-BD59-A6C34878D82A}">
-                    <a16:rowId xmlns:a16="http://schemas.microsoft.com/office/drawing/2014/main" val="3578014490"/>
+                    <a16:rowId xmlns:a16="http://schemas.microsoft.com/office/drawing/2014/main" val="3075188765"/>
                   </a:ext>
                 </a:extLst>
               </a:tr>

</xml_diff>

<commit_message>
soulignement des élément si ils sont à vérifier
</commit_message>
<xml_diff>
--- a/app/src/main/assets/powerpointvierge.pptx
+++ b/app/src/main/assets/powerpointvierge.pptx
@@ -210,7 +210,7 @@
           <a:p>
             <a:fld id="{8EF2C5CC-36BA-4C84-AC43-9F8430F4AE76}" type="datetimeFigureOut">
               <a:rPr lang="fr-FR" smtClean="0"/>
-              <a:t>23/06/2023</a:t>
+              <a:t>26/06/2023</a:t>
             </a:fld>
             <a:endParaRPr lang="fr-FR"/>
           </a:p>
@@ -4957,6 +4957,42 @@
           </a:graphicData>
         </a:graphic>
       </p:graphicFrame>
+      <p:sp>
+        <p:nvSpPr>
+          <p:cNvPr id="3" name="ZoneTexte 2">
+            <a:extLst>
+              <a:ext uri="{FF2B5EF4-FFF2-40B4-BE49-F238E27FC236}">
+                <a16:creationId xmlns:a16="http://schemas.microsoft.com/office/drawing/2014/main" id="{64F13A8C-57E2-AFB6-B140-5892D2A0FD02}"/>
+              </a:ext>
+            </a:extLst>
+          </p:cNvPr>
+          <p:cNvSpPr txBox="1"/>
+          <p:nvPr/>
+        </p:nvSpPr>
+        <p:spPr>
+          <a:xfrm>
+            <a:off x="11577729" y="6642556"/>
+            <a:ext cx="614271" cy="215444"/>
+          </a:xfrm>
+          <a:prstGeom prst="rect">
+            <a:avLst/>
+          </a:prstGeom>
+          <a:noFill/>
+        </p:spPr>
+        <p:txBody>
+          <a:bodyPr wrap="none" rtlCol="0">
+            <a:spAutoFit/>
+          </a:bodyPr>
+          <a:lstStyle/>
+          <a:p>
+            <a:pPr algn="l"/>
+            <a:r>
+              <a:rPr lang="fr-FR" sz="800" u="sng" dirty="0"/>
+              <a:t>A vérifier</a:t>
+            </a:r>
+          </a:p>
+        </p:txBody>
+      </p:sp>
     </p:spTree>
     <p:extLst>
       <p:ext uri="{BB962C8B-B14F-4D97-AF65-F5344CB8AC3E}">
@@ -7364,6 +7400,42 @@
           </a:p>
         </p:txBody>
       </p:sp>
+      <p:sp>
+        <p:nvSpPr>
+          <p:cNvPr id="3" name="ZoneTexte 2">
+            <a:extLst>
+              <a:ext uri="{FF2B5EF4-FFF2-40B4-BE49-F238E27FC236}">
+                <a16:creationId xmlns:a16="http://schemas.microsoft.com/office/drawing/2014/main" id="{8CB98E1C-1AB8-05C7-1428-31A65920EB6D}"/>
+              </a:ext>
+            </a:extLst>
+          </p:cNvPr>
+          <p:cNvSpPr txBox="1"/>
+          <p:nvPr/>
+        </p:nvSpPr>
+        <p:spPr>
+          <a:xfrm>
+            <a:off x="11577729" y="6642556"/>
+            <a:ext cx="614271" cy="215444"/>
+          </a:xfrm>
+          <a:prstGeom prst="rect">
+            <a:avLst/>
+          </a:prstGeom>
+          <a:noFill/>
+        </p:spPr>
+        <p:txBody>
+          <a:bodyPr wrap="none" rtlCol="0">
+            <a:spAutoFit/>
+          </a:bodyPr>
+          <a:lstStyle/>
+          <a:p>
+            <a:pPr algn="l"/>
+            <a:r>
+              <a:rPr lang="fr-FR" sz="800" u="sng" dirty="0"/>
+              <a:t>A vérifier</a:t>
+            </a:r>
+          </a:p>
+        </p:txBody>
+      </p:sp>
     </p:spTree>
     <p:extLst>
       <p:ext uri="{BB962C8B-B14F-4D97-AF65-F5344CB8AC3E}">
@@ -8701,6 +8773,42 @@
           </a:p>
         </p:txBody>
       </p:sp>
+      <p:sp>
+        <p:nvSpPr>
+          <p:cNvPr id="2" name="ZoneTexte 1">
+            <a:extLst>
+              <a:ext uri="{FF2B5EF4-FFF2-40B4-BE49-F238E27FC236}">
+                <a16:creationId xmlns:a16="http://schemas.microsoft.com/office/drawing/2014/main" id="{53B7F790-9889-C6A5-973A-14942F28C3B1}"/>
+              </a:ext>
+            </a:extLst>
+          </p:cNvPr>
+          <p:cNvSpPr txBox="1"/>
+          <p:nvPr/>
+        </p:nvSpPr>
+        <p:spPr>
+          <a:xfrm>
+            <a:off x="11577729" y="6642556"/>
+            <a:ext cx="614271" cy="215444"/>
+          </a:xfrm>
+          <a:prstGeom prst="rect">
+            <a:avLst/>
+          </a:prstGeom>
+          <a:noFill/>
+        </p:spPr>
+        <p:txBody>
+          <a:bodyPr wrap="none" rtlCol="0">
+            <a:spAutoFit/>
+          </a:bodyPr>
+          <a:lstStyle/>
+          <a:p>
+            <a:pPr algn="l"/>
+            <a:r>
+              <a:rPr lang="fr-FR" sz="800" u="sng" dirty="0"/>
+              <a:t>A vérifier</a:t>
+            </a:r>
+          </a:p>
+        </p:txBody>
+      </p:sp>
     </p:spTree>
     <p:extLst>
       <p:ext uri="{BB962C8B-B14F-4D97-AF65-F5344CB8AC3E}">
@@ -9733,6 +9841,42 @@
           <a:p>
             <a:pPr algn="ctr"/>
             <a:endParaRPr lang="fr-FR"/>
+          </a:p>
+        </p:txBody>
+      </p:sp>
+      <p:sp>
+        <p:nvSpPr>
+          <p:cNvPr id="2" name="ZoneTexte 1">
+            <a:extLst>
+              <a:ext uri="{FF2B5EF4-FFF2-40B4-BE49-F238E27FC236}">
+                <a16:creationId xmlns:a16="http://schemas.microsoft.com/office/drawing/2014/main" id="{BB72642B-B0CD-C3D9-E920-B64AFD009CE0}"/>
+              </a:ext>
+            </a:extLst>
+          </p:cNvPr>
+          <p:cNvSpPr txBox="1"/>
+          <p:nvPr/>
+        </p:nvSpPr>
+        <p:spPr>
+          <a:xfrm>
+            <a:off x="11577729" y="6642556"/>
+            <a:ext cx="614271" cy="215444"/>
+          </a:xfrm>
+          <a:prstGeom prst="rect">
+            <a:avLst/>
+          </a:prstGeom>
+          <a:noFill/>
+        </p:spPr>
+        <p:txBody>
+          <a:bodyPr wrap="none" rtlCol="0">
+            <a:spAutoFit/>
+          </a:bodyPr>
+          <a:lstStyle/>
+          <a:p>
+            <a:pPr algn="l"/>
+            <a:r>
+              <a:rPr lang="fr-FR" sz="800" u="sng" dirty="0"/>
+              <a:t>A vérifier</a:t>
+            </a:r>
           </a:p>
         </p:txBody>
       </p:sp>

</xml_diff>

<commit_message>
Calendrier modification et export #1 #10 #22
</commit_message>
<xml_diff>
--- a/app/src/main/assets/powerpointvierge.pptx
+++ b/app/src/main/assets/powerpointvierge.pptx
@@ -210,7 +210,7 @@
           <a:p>
             <a:fld id="{8EF2C5CC-36BA-4C84-AC43-9F8430F4AE76}" type="datetimeFigureOut">
               <a:rPr lang="fr-FR" smtClean="0"/>
-              <a:t>28/06/2023</a:t>
+              <a:t>29/06/2023</a:t>
             </a:fld>
             <a:endParaRPr lang="fr-FR"/>
           </a:p>
@@ -5464,6 +5464,2162 @@
           </a:p>
         </p:txBody>
       </p:sp>
+      <p:graphicFrame>
+        <p:nvGraphicFramePr>
+          <p:cNvPr id="8" name="tableauUsageEtOccupation">
+            <a:extLst>
+              <a:ext uri="{FF2B5EF4-FFF2-40B4-BE49-F238E27FC236}">
+                <a16:creationId xmlns:a16="http://schemas.microsoft.com/office/drawing/2014/main" id="{F62846BA-2936-6D8B-C071-95EB1401F13C}"/>
+              </a:ext>
+            </a:extLst>
+          </p:cNvPr>
+          <p:cNvGraphicFramePr>
+            <a:graphicFrameLocks noGrp="1"/>
+          </p:cNvGraphicFramePr>
+          <p:nvPr>
+            <p:extLst>
+              <p:ext uri="{D42A27DB-BD31-4B8C-83A1-F6EECF244321}">
+                <p14:modId xmlns:p14="http://schemas.microsoft.com/office/powerpoint/2010/main" val="207158695"/>
+              </p:ext>
+            </p:extLst>
+          </p:nvPr>
+        </p:nvGraphicFramePr>
+        <p:xfrm>
+          <a:off x="50200" y="1061595"/>
+          <a:ext cx="5998173" cy="743737"/>
+        </p:xfrm>
+        <a:graphic>
+          <a:graphicData uri="http://schemas.openxmlformats.org/drawingml/2006/table">
+            <a:tbl>
+              <a:tblPr/>
+              <a:tblGrid>
+                <a:gridCol w="382694">
+                  <a:extLst>
+                    <a:ext uri="{9D8B030D-6E8A-4147-A177-3AD203B41FA5}">
+                      <a16:colId xmlns:a16="http://schemas.microsoft.com/office/drawing/2014/main" val="1570197389"/>
+                    </a:ext>
+                  </a:extLst>
+                </a:gridCol>
+                <a:gridCol w="382694">
+                  <a:extLst>
+                    <a:ext uri="{9D8B030D-6E8A-4147-A177-3AD203B41FA5}">
+                      <a16:colId xmlns:a16="http://schemas.microsoft.com/office/drawing/2014/main" val="2062104135"/>
+                    </a:ext>
+                  </a:extLst>
+                </a:gridCol>
+                <a:gridCol w="394090">
+                  <a:extLst>
+                    <a:ext uri="{9D8B030D-6E8A-4147-A177-3AD203B41FA5}">
+                      <a16:colId xmlns:a16="http://schemas.microsoft.com/office/drawing/2014/main" val="2079264698"/>
+                    </a:ext>
+                  </a:extLst>
+                </a:gridCol>
+                <a:gridCol w="456648">
+                  <a:extLst>
+                    <a:ext uri="{9D8B030D-6E8A-4147-A177-3AD203B41FA5}">
+                      <a16:colId xmlns:a16="http://schemas.microsoft.com/office/drawing/2014/main" val="1236367479"/>
+                    </a:ext>
+                  </a:extLst>
+                </a:gridCol>
+                <a:gridCol w="381551">
+                  <a:extLst>
+                    <a:ext uri="{9D8B030D-6E8A-4147-A177-3AD203B41FA5}">
+                      <a16:colId xmlns:a16="http://schemas.microsoft.com/office/drawing/2014/main" val="2694132656"/>
+                    </a:ext>
+                  </a:extLst>
+                </a:gridCol>
+                <a:gridCol w="450775">
+                  <a:extLst>
+                    <a:ext uri="{9D8B030D-6E8A-4147-A177-3AD203B41FA5}">
+                      <a16:colId xmlns:a16="http://schemas.microsoft.com/office/drawing/2014/main" val="276330688"/>
+                    </a:ext>
+                  </a:extLst>
+                </a:gridCol>
+                <a:gridCol w="368374">
+                  <a:extLst>
+                    <a:ext uri="{9D8B030D-6E8A-4147-A177-3AD203B41FA5}">
+                      <a16:colId xmlns:a16="http://schemas.microsoft.com/office/drawing/2014/main" val="878808144"/>
+                    </a:ext>
+                  </a:extLst>
+                </a:gridCol>
+                <a:gridCol w="431800">
+                  <a:extLst>
+                    <a:ext uri="{9D8B030D-6E8A-4147-A177-3AD203B41FA5}">
+                      <a16:colId xmlns:a16="http://schemas.microsoft.com/office/drawing/2014/main" val="2282394120"/>
+                    </a:ext>
+                  </a:extLst>
+                </a:gridCol>
+                <a:gridCol w="393700">
+                  <a:extLst>
+                    <a:ext uri="{9D8B030D-6E8A-4147-A177-3AD203B41FA5}">
+                      <a16:colId xmlns:a16="http://schemas.microsoft.com/office/drawing/2014/main" val="1758652614"/>
+                    </a:ext>
+                  </a:extLst>
+                </a:gridCol>
+                <a:gridCol w="431461">
+                  <a:extLst>
+                    <a:ext uri="{9D8B030D-6E8A-4147-A177-3AD203B41FA5}">
+                      <a16:colId xmlns:a16="http://schemas.microsoft.com/office/drawing/2014/main" val="4152945676"/>
+                    </a:ext>
+                  </a:extLst>
+                </a:gridCol>
+                <a:gridCol w="355939">
+                  <a:extLst>
+                    <a:ext uri="{9D8B030D-6E8A-4147-A177-3AD203B41FA5}">
+                      <a16:colId xmlns:a16="http://schemas.microsoft.com/office/drawing/2014/main" val="3050978946"/>
+                    </a:ext>
+                  </a:extLst>
+                </a:gridCol>
+                <a:gridCol w="410852">
+                  <a:extLst>
+                    <a:ext uri="{9D8B030D-6E8A-4147-A177-3AD203B41FA5}">
+                      <a16:colId xmlns:a16="http://schemas.microsoft.com/office/drawing/2014/main" val="2339646369"/>
+                    </a:ext>
+                  </a:extLst>
+                </a:gridCol>
+                <a:gridCol w="389248">
+                  <a:extLst>
+                    <a:ext uri="{9D8B030D-6E8A-4147-A177-3AD203B41FA5}">
+                      <a16:colId xmlns:a16="http://schemas.microsoft.com/office/drawing/2014/main" val="1687241469"/>
+                    </a:ext>
+                  </a:extLst>
+                </a:gridCol>
+                <a:gridCol w="400051">
+                  <a:extLst>
+                    <a:ext uri="{9D8B030D-6E8A-4147-A177-3AD203B41FA5}">
+                      <a16:colId xmlns:a16="http://schemas.microsoft.com/office/drawing/2014/main" val="1890204817"/>
+                    </a:ext>
+                  </a:extLst>
+                </a:gridCol>
+                <a:gridCol w="368296">
+                  <a:extLst>
+                    <a:ext uri="{9D8B030D-6E8A-4147-A177-3AD203B41FA5}">
+                      <a16:colId xmlns:a16="http://schemas.microsoft.com/office/drawing/2014/main" val="1918776766"/>
+                    </a:ext>
+                  </a:extLst>
+                </a:gridCol>
+              </a:tblGrid>
+              <a:tr h="457200">
+                <a:tc>
+                  <a:txBody>
+                    <a:bodyPr/>
+                    <a:lstStyle/>
+                    <a:p>
+                      <a:pPr algn="ctr" fontAlgn="ctr"/>
+                      <a:endParaRPr lang="fr-FR" sz="1400" b="1" i="0" u="none" strike="noStrike" dirty="0">
+                        <a:solidFill>
+                          <a:srgbClr val="FFFFFF"/>
+                        </a:solidFill>
+                        <a:effectLst/>
+                        <a:latin typeface="Calibri Light" panose="020F0302020204030204" pitchFamily="34" charset="0"/>
+                      </a:endParaRPr>
+                    </a:p>
+                  </a:txBody>
+                  <a:tcPr marL="0" marR="0" marT="0" marB="0" anchor="ctr">
+                    <a:lnL w="12700" cap="flat" cmpd="sng" algn="ctr">
+                      <a:solidFill>
+                        <a:schemeClr val="tx1"/>
+                      </a:solidFill>
+                      <a:prstDash val="solid"/>
+                      <a:round/>
+                      <a:headEnd type="none" w="med" len="med"/>
+                      <a:tailEnd type="none" w="med" len="med"/>
+                    </a:lnL>
+                    <a:lnR>
+                      <a:noFill/>
+                    </a:lnR>
+                    <a:lnT w="12700" cap="flat" cmpd="sng" algn="ctr">
+                      <a:solidFill>
+                        <a:schemeClr val="tx1"/>
+                      </a:solidFill>
+                      <a:prstDash val="solid"/>
+                      <a:round/>
+                      <a:headEnd type="none" w="med" len="med"/>
+                      <a:tailEnd type="none" w="med" len="med"/>
+                    </a:lnT>
+                    <a:lnB>
+                      <a:noFill/>
+                    </a:lnB>
+                    <a:solidFill>
+                      <a:schemeClr val="tx2"/>
+                    </a:solidFill>
+                  </a:tcPr>
+                </a:tc>
+                <a:tc gridSpan="2">
+                  <a:txBody>
+                    <a:bodyPr/>
+                    <a:lstStyle/>
+                    <a:p>
+                      <a:pPr algn="ctr" fontAlgn="ctr"/>
+                      <a:r>
+                        <a:rPr lang="fr-FR" sz="1400" b="1" i="0" u="none" strike="noStrike" dirty="0">
+                          <a:solidFill>
+                            <a:srgbClr val="FFFFFF"/>
+                          </a:solidFill>
+                          <a:effectLst/>
+                          <a:latin typeface="Calibri Light" panose="020F0302020204030204" pitchFamily="34" charset="0"/>
+                        </a:rPr>
+                        <a:t>Lundi</a:t>
+                      </a:r>
+                    </a:p>
+                  </a:txBody>
+                  <a:tcPr marL="0" marR="0" marT="0" marB="0" anchor="ctr">
+                    <a:lnL>
+                      <a:noFill/>
+                    </a:lnL>
+                    <a:lnR>
+                      <a:noFill/>
+                    </a:lnR>
+                    <a:lnT w="12700" cap="flat" cmpd="sng" algn="ctr">
+                      <a:solidFill>
+                        <a:schemeClr val="tx1"/>
+                      </a:solidFill>
+                      <a:prstDash val="solid"/>
+                      <a:round/>
+                      <a:headEnd type="none" w="med" len="med"/>
+                      <a:tailEnd type="none" w="med" len="med"/>
+                    </a:lnT>
+                    <a:lnB>
+                      <a:noFill/>
+                    </a:lnB>
+                    <a:solidFill>
+                      <a:schemeClr val="tx2"/>
+                    </a:solidFill>
+                  </a:tcPr>
+                </a:tc>
+                <a:tc hMerge="1">
+                  <a:txBody>
+                    <a:bodyPr/>
+                    <a:lstStyle/>
+                    <a:p>
+                      <a:pPr algn="ctr" fontAlgn="ctr"/>
+                      <a:endParaRPr lang="fr-FR" sz="1400" b="1" i="0" u="none" strike="noStrike" dirty="0">
+                        <a:solidFill>
+                          <a:srgbClr val="FFFFFF"/>
+                        </a:solidFill>
+                        <a:effectLst/>
+                        <a:latin typeface="Calibri Light" panose="020F0302020204030204" pitchFamily="34" charset="0"/>
+                      </a:endParaRPr>
+                    </a:p>
+                  </a:txBody>
+                  <a:tcPr marL="0" marR="0" marT="0" marB="0" anchor="ctr">
+                    <a:lnL>
+                      <a:noFill/>
+                    </a:lnL>
+                    <a:lnR>
+                      <a:noFill/>
+                    </a:lnR>
+                    <a:lnT>
+                      <a:noFill/>
+                    </a:lnT>
+                    <a:lnB>
+                      <a:noFill/>
+                    </a:lnB>
+                    <a:solidFill>
+                      <a:srgbClr val="A9D08E"/>
+                    </a:solidFill>
+                  </a:tcPr>
+                </a:tc>
+                <a:tc gridSpan="2">
+                  <a:txBody>
+                    <a:bodyPr/>
+                    <a:lstStyle/>
+                    <a:p>
+                      <a:pPr algn="ctr" fontAlgn="ctr"/>
+                      <a:r>
+                        <a:rPr lang="fr-FR" sz="1400" b="1" i="0" u="none" strike="noStrike" dirty="0">
+                          <a:solidFill>
+                            <a:srgbClr val="FFFFFF"/>
+                          </a:solidFill>
+                          <a:effectLst/>
+                          <a:latin typeface="Calibri Light" panose="020F0302020204030204" pitchFamily="34" charset="0"/>
+                        </a:rPr>
+                        <a:t>Mardi</a:t>
+                      </a:r>
+                    </a:p>
+                  </a:txBody>
+                  <a:tcPr marL="0" marR="0" marT="0" marB="0" anchor="ctr">
+                    <a:lnL>
+                      <a:noFill/>
+                    </a:lnL>
+                    <a:lnR>
+                      <a:noFill/>
+                    </a:lnR>
+                    <a:lnT w="12700" cap="flat" cmpd="sng" algn="ctr">
+                      <a:solidFill>
+                        <a:schemeClr val="tx1"/>
+                      </a:solidFill>
+                      <a:prstDash val="solid"/>
+                      <a:round/>
+                      <a:headEnd type="none" w="med" len="med"/>
+                      <a:tailEnd type="none" w="med" len="med"/>
+                    </a:lnT>
+                    <a:lnB>
+                      <a:noFill/>
+                    </a:lnB>
+                    <a:solidFill>
+                      <a:schemeClr val="tx2"/>
+                    </a:solidFill>
+                  </a:tcPr>
+                </a:tc>
+                <a:tc hMerge="1">
+                  <a:txBody>
+                    <a:bodyPr/>
+                    <a:lstStyle/>
+                    <a:p>
+                      <a:pPr algn="ctr" fontAlgn="ctr"/>
+                      <a:endParaRPr lang="fr-FR" sz="1400" b="1" i="0" u="none" strike="noStrike" dirty="0">
+                        <a:solidFill>
+                          <a:srgbClr val="FFFFFF"/>
+                        </a:solidFill>
+                        <a:effectLst/>
+                        <a:latin typeface="Calibri Light" panose="020F0302020204030204" pitchFamily="34" charset="0"/>
+                      </a:endParaRPr>
+                    </a:p>
+                  </a:txBody>
+                  <a:tcPr marL="0" marR="0" marT="0" marB="0" anchor="ctr">
+                    <a:lnL>
+                      <a:noFill/>
+                    </a:lnL>
+                    <a:lnR>
+                      <a:noFill/>
+                    </a:lnR>
+                    <a:lnT>
+                      <a:noFill/>
+                    </a:lnT>
+                    <a:lnB>
+                      <a:noFill/>
+                    </a:lnB>
+                    <a:solidFill>
+                      <a:srgbClr val="A9D08E"/>
+                    </a:solidFill>
+                  </a:tcPr>
+                </a:tc>
+                <a:tc gridSpan="2">
+                  <a:txBody>
+                    <a:bodyPr/>
+                    <a:lstStyle/>
+                    <a:p>
+                      <a:pPr algn="ctr" fontAlgn="ctr"/>
+                      <a:r>
+                        <a:rPr lang="fr-FR" sz="1400" b="1" i="0" u="none" strike="noStrike" dirty="0">
+                          <a:solidFill>
+                            <a:srgbClr val="FFFFFF"/>
+                          </a:solidFill>
+                          <a:effectLst/>
+                          <a:latin typeface="Calibri Light" panose="020F0302020204030204" pitchFamily="34" charset="0"/>
+                        </a:rPr>
+                        <a:t>Mercredi</a:t>
+                      </a:r>
+                    </a:p>
+                  </a:txBody>
+                  <a:tcPr marL="0" marR="0" marT="0" marB="0" anchor="ctr">
+                    <a:lnL>
+                      <a:noFill/>
+                    </a:lnL>
+                    <a:lnR>
+                      <a:noFill/>
+                    </a:lnR>
+                    <a:lnT w="12700" cap="flat" cmpd="sng" algn="ctr">
+                      <a:solidFill>
+                        <a:schemeClr val="tx1"/>
+                      </a:solidFill>
+                      <a:prstDash val="solid"/>
+                      <a:round/>
+                      <a:headEnd type="none" w="med" len="med"/>
+                      <a:tailEnd type="none" w="med" len="med"/>
+                    </a:lnT>
+                    <a:lnB>
+                      <a:noFill/>
+                    </a:lnB>
+                    <a:solidFill>
+                      <a:schemeClr val="tx2"/>
+                    </a:solidFill>
+                  </a:tcPr>
+                </a:tc>
+                <a:tc hMerge="1">
+                  <a:txBody>
+                    <a:bodyPr/>
+                    <a:lstStyle/>
+                    <a:p>
+                      <a:pPr algn="ctr" fontAlgn="ctr"/>
+                      <a:endParaRPr lang="fr-FR" sz="1400" b="1" i="0" u="none" strike="noStrike" dirty="0">
+                        <a:solidFill>
+                          <a:srgbClr val="FFFFFF"/>
+                        </a:solidFill>
+                        <a:effectLst/>
+                        <a:latin typeface="Calibri Light" panose="020F0302020204030204" pitchFamily="34" charset="0"/>
+                      </a:endParaRPr>
+                    </a:p>
+                  </a:txBody>
+                  <a:tcPr marL="0" marR="0" marT="0" marB="0" anchor="ctr">
+                    <a:lnL>
+                      <a:noFill/>
+                    </a:lnL>
+                    <a:lnR>
+                      <a:noFill/>
+                    </a:lnR>
+                    <a:lnT>
+                      <a:noFill/>
+                    </a:lnT>
+                    <a:lnB>
+                      <a:noFill/>
+                    </a:lnB>
+                    <a:solidFill>
+                      <a:srgbClr val="A9D08E"/>
+                    </a:solidFill>
+                  </a:tcPr>
+                </a:tc>
+                <a:tc gridSpan="2">
+                  <a:txBody>
+                    <a:bodyPr/>
+                    <a:lstStyle/>
+                    <a:p>
+                      <a:pPr algn="ctr" fontAlgn="ctr"/>
+                      <a:r>
+                        <a:rPr lang="fr-FR" sz="1400" b="1" i="0" u="none" strike="noStrike" dirty="0">
+                          <a:solidFill>
+                            <a:srgbClr val="FFFFFF"/>
+                          </a:solidFill>
+                          <a:effectLst/>
+                          <a:latin typeface="Calibri Light" panose="020F0302020204030204" pitchFamily="34" charset="0"/>
+                        </a:rPr>
+                        <a:t>Jeudi</a:t>
+                      </a:r>
+                    </a:p>
+                  </a:txBody>
+                  <a:tcPr marL="0" marR="0" marT="0" marB="0" anchor="ctr">
+                    <a:lnL>
+                      <a:noFill/>
+                    </a:lnL>
+                    <a:lnR>
+                      <a:noFill/>
+                    </a:lnR>
+                    <a:lnT w="12700" cap="flat" cmpd="sng" algn="ctr">
+                      <a:solidFill>
+                        <a:schemeClr val="tx1"/>
+                      </a:solidFill>
+                      <a:prstDash val="solid"/>
+                      <a:round/>
+                      <a:headEnd type="none" w="med" len="med"/>
+                      <a:tailEnd type="none" w="med" len="med"/>
+                    </a:lnT>
+                    <a:lnB>
+                      <a:noFill/>
+                    </a:lnB>
+                    <a:solidFill>
+                      <a:schemeClr val="tx2"/>
+                    </a:solidFill>
+                  </a:tcPr>
+                </a:tc>
+                <a:tc hMerge="1">
+                  <a:txBody>
+                    <a:bodyPr/>
+                    <a:lstStyle/>
+                    <a:p>
+                      <a:pPr algn="ctr" fontAlgn="ctr"/>
+                      <a:endParaRPr lang="fr-FR" sz="1400" b="1" i="0" u="none" strike="noStrike" dirty="0">
+                        <a:solidFill>
+                          <a:srgbClr val="FFFFFF"/>
+                        </a:solidFill>
+                        <a:effectLst/>
+                        <a:latin typeface="Calibri Light" panose="020F0302020204030204" pitchFamily="34" charset="0"/>
+                      </a:endParaRPr>
+                    </a:p>
+                  </a:txBody>
+                  <a:tcPr marL="0" marR="0" marT="0" marB="0" anchor="ctr">
+                    <a:lnL>
+                      <a:noFill/>
+                    </a:lnL>
+                    <a:lnR>
+                      <a:noFill/>
+                    </a:lnR>
+                    <a:lnT>
+                      <a:noFill/>
+                    </a:lnT>
+                    <a:lnB>
+                      <a:noFill/>
+                    </a:lnB>
+                    <a:solidFill>
+                      <a:srgbClr val="A9D08E"/>
+                    </a:solidFill>
+                  </a:tcPr>
+                </a:tc>
+                <a:tc gridSpan="2">
+                  <a:txBody>
+                    <a:bodyPr/>
+                    <a:lstStyle/>
+                    <a:p>
+                      <a:pPr algn="ctr" fontAlgn="ctr"/>
+                      <a:r>
+                        <a:rPr lang="fr-FR" sz="1400" b="1" i="0" u="none" strike="noStrike" dirty="0">
+                          <a:solidFill>
+                            <a:srgbClr val="FFFFFF"/>
+                          </a:solidFill>
+                          <a:effectLst/>
+                          <a:latin typeface="Calibri Light" panose="020F0302020204030204" pitchFamily="34" charset="0"/>
+                        </a:rPr>
+                        <a:t>Vendredi</a:t>
+                      </a:r>
+                    </a:p>
+                  </a:txBody>
+                  <a:tcPr marL="0" marR="0" marT="0" marB="0" anchor="ctr">
+                    <a:lnL>
+                      <a:noFill/>
+                    </a:lnL>
+                    <a:lnR>
+                      <a:noFill/>
+                    </a:lnR>
+                    <a:lnT w="12700" cap="flat" cmpd="sng" algn="ctr">
+                      <a:solidFill>
+                        <a:schemeClr val="tx1"/>
+                      </a:solidFill>
+                      <a:prstDash val="solid"/>
+                      <a:round/>
+                      <a:headEnd type="none" w="med" len="med"/>
+                      <a:tailEnd type="none" w="med" len="med"/>
+                    </a:lnT>
+                    <a:lnB>
+                      <a:noFill/>
+                    </a:lnB>
+                    <a:solidFill>
+                      <a:schemeClr val="tx2"/>
+                    </a:solidFill>
+                  </a:tcPr>
+                </a:tc>
+                <a:tc hMerge="1">
+                  <a:txBody>
+                    <a:bodyPr/>
+                    <a:lstStyle/>
+                    <a:p>
+                      <a:pPr algn="ctr" fontAlgn="ctr"/>
+                      <a:endParaRPr lang="fr-FR" sz="1400" b="1" i="0" u="none" strike="noStrike" dirty="0">
+                        <a:solidFill>
+                          <a:srgbClr val="FFFFFF"/>
+                        </a:solidFill>
+                        <a:effectLst/>
+                        <a:latin typeface="Calibri Light" panose="020F0302020204030204" pitchFamily="34" charset="0"/>
+                      </a:endParaRPr>
+                    </a:p>
+                  </a:txBody>
+                  <a:tcPr marL="0" marR="0" marT="0" marB="0" anchor="ctr">
+                    <a:lnL>
+                      <a:noFill/>
+                    </a:lnL>
+                    <a:lnR>
+                      <a:noFill/>
+                    </a:lnR>
+                    <a:lnT>
+                      <a:noFill/>
+                    </a:lnT>
+                    <a:lnB>
+                      <a:noFill/>
+                    </a:lnB>
+                    <a:solidFill>
+                      <a:srgbClr val="A9D08E"/>
+                    </a:solidFill>
+                  </a:tcPr>
+                </a:tc>
+                <a:tc gridSpan="2">
+                  <a:txBody>
+                    <a:bodyPr/>
+                    <a:lstStyle/>
+                    <a:p>
+                      <a:pPr algn="ctr" fontAlgn="ctr"/>
+                      <a:r>
+                        <a:rPr lang="fr-FR" sz="1400" b="1" i="0" u="none" strike="noStrike" dirty="0">
+                          <a:solidFill>
+                            <a:srgbClr val="FFFFFF"/>
+                          </a:solidFill>
+                          <a:effectLst/>
+                          <a:latin typeface="Calibri Light" panose="020F0302020204030204" pitchFamily="34" charset="0"/>
+                        </a:rPr>
+                        <a:t>Samedi</a:t>
+                      </a:r>
+                    </a:p>
+                  </a:txBody>
+                  <a:tcPr marL="0" marR="0" marT="0" marB="0" anchor="ctr">
+                    <a:lnL>
+                      <a:noFill/>
+                    </a:lnL>
+                    <a:lnR>
+                      <a:noFill/>
+                    </a:lnR>
+                    <a:lnT w="12700" cap="flat" cmpd="sng" algn="ctr">
+                      <a:solidFill>
+                        <a:schemeClr val="tx1"/>
+                      </a:solidFill>
+                      <a:prstDash val="solid"/>
+                      <a:round/>
+                      <a:headEnd type="none" w="med" len="med"/>
+                      <a:tailEnd type="none" w="med" len="med"/>
+                    </a:lnT>
+                    <a:lnB>
+                      <a:noFill/>
+                    </a:lnB>
+                    <a:solidFill>
+                      <a:schemeClr val="tx2"/>
+                    </a:solidFill>
+                  </a:tcPr>
+                </a:tc>
+                <a:tc hMerge="1">
+                  <a:txBody>
+                    <a:bodyPr/>
+                    <a:lstStyle/>
+                    <a:p>
+                      <a:pPr algn="ctr" fontAlgn="ctr"/>
+                      <a:endParaRPr lang="fr-FR" sz="1400" b="1" i="0" u="none" strike="noStrike" dirty="0">
+                        <a:solidFill>
+                          <a:srgbClr val="FFFFFF"/>
+                        </a:solidFill>
+                        <a:effectLst/>
+                        <a:latin typeface="Calibri Light" panose="020F0302020204030204" pitchFamily="34" charset="0"/>
+                      </a:endParaRPr>
+                    </a:p>
+                  </a:txBody>
+                  <a:tcPr marL="0" marR="0" marT="0" marB="0" anchor="ctr">
+                    <a:lnL>
+                      <a:noFill/>
+                    </a:lnL>
+                    <a:lnR>
+                      <a:noFill/>
+                    </a:lnR>
+                    <a:lnT>
+                      <a:noFill/>
+                    </a:lnT>
+                    <a:lnB>
+                      <a:noFill/>
+                    </a:lnB>
+                    <a:solidFill>
+                      <a:srgbClr val="A9D08E"/>
+                    </a:solidFill>
+                  </a:tcPr>
+                </a:tc>
+                <a:tc gridSpan="2">
+                  <a:txBody>
+                    <a:bodyPr/>
+                    <a:lstStyle/>
+                    <a:p>
+                      <a:pPr algn="ctr" fontAlgn="ctr"/>
+                      <a:r>
+                        <a:rPr lang="fr-FR" sz="1400" b="1" i="0" u="none" strike="noStrike" dirty="0">
+                          <a:solidFill>
+                            <a:srgbClr val="FFFFFF"/>
+                          </a:solidFill>
+                          <a:effectLst/>
+                          <a:latin typeface="Calibri Light" panose="020F0302020204030204" pitchFamily="34" charset="0"/>
+                        </a:rPr>
+                        <a:t>Dimanche</a:t>
+                      </a:r>
+                    </a:p>
+                  </a:txBody>
+                  <a:tcPr marL="0" marR="0" marT="0" marB="0" anchor="ctr">
+                    <a:lnL>
+                      <a:noFill/>
+                    </a:lnL>
+                    <a:lnR w="12700" cap="flat" cmpd="sng" algn="ctr">
+                      <a:solidFill>
+                        <a:schemeClr val="tx1"/>
+                      </a:solidFill>
+                      <a:prstDash val="solid"/>
+                      <a:round/>
+                      <a:headEnd type="none" w="med" len="med"/>
+                      <a:tailEnd type="none" w="med" len="med"/>
+                    </a:lnR>
+                    <a:lnT w="12700" cap="flat" cmpd="sng" algn="ctr">
+                      <a:solidFill>
+                        <a:schemeClr val="tx1"/>
+                      </a:solidFill>
+                      <a:prstDash val="solid"/>
+                      <a:round/>
+                      <a:headEnd type="none" w="med" len="med"/>
+                      <a:tailEnd type="none" w="med" len="med"/>
+                    </a:lnT>
+                    <a:lnB>
+                      <a:noFill/>
+                    </a:lnB>
+                    <a:solidFill>
+                      <a:schemeClr val="tx2"/>
+                    </a:solidFill>
+                  </a:tcPr>
+                </a:tc>
+                <a:tc hMerge="1">
+                  <a:txBody>
+                    <a:bodyPr/>
+                    <a:lstStyle/>
+                    <a:p>
+                      <a:pPr algn="ctr" fontAlgn="ctr"/>
+                      <a:endParaRPr lang="fr-FR" sz="1400" b="1" i="0" u="none" strike="noStrike" dirty="0">
+                        <a:solidFill>
+                          <a:srgbClr val="FFFFFF"/>
+                        </a:solidFill>
+                        <a:effectLst/>
+                        <a:latin typeface="Calibri Light" panose="020F0302020204030204" pitchFamily="34" charset="0"/>
+                      </a:endParaRPr>
+                    </a:p>
+                  </a:txBody>
+                  <a:tcPr marL="0" marR="0" marT="0" marB="0" anchor="ctr">
+                    <a:lnL>
+                      <a:noFill/>
+                    </a:lnL>
+                    <a:lnR>
+                      <a:noFill/>
+                    </a:lnR>
+                    <a:lnT>
+                      <a:noFill/>
+                    </a:lnT>
+                    <a:lnB>
+                      <a:noFill/>
+                    </a:lnB>
+                    <a:solidFill>
+                      <a:srgbClr val="A9D08E"/>
+                    </a:solidFill>
+                  </a:tcPr>
+                </a:tc>
+                <a:extLst>
+                  <a:ext uri="{0D108BD9-81ED-4DB2-BD59-A6C34878D82A}">
+                    <a16:rowId xmlns:a16="http://schemas.microsoft.com/office/drawing/2014/main" val="1773314167"/>
+                  </a:ext>
+                </a:extLst>
+              </a:tr>
+              <a:tr h="195097">
+                <a:tc>
+                  <a:txBody>
+                    <a:bodyPr/>
+                    <a:lstStyle/>
+                    <a:p>
+                      <a:pPr algn="ctr" fontAlgn="ctr"/>
+                      <a:endParaRPr lang="fr-FR" sz="800" b="1" i="0" u="none" strike="noStrike" dirty="0">
+                        <a:solidFill>
+                          <a:srgbClr val="FFFFFF"/>
+                        </a:solidFill>
+                        <a:effectLst/>
+                        <a:latin typeface="Calibri Light" panose="020F0302020204030204" pitchFamily="34" charset="0"/>
+                      </a:endParaRPr>
+                    </a:p>
+                  </a:txBody>
+                  <a:tcPr marL="0" marR="0" marT="0" marB="0" anchor="ctr">
+                    <a:lnL w="12700" cap="flat" cmpd="sng" algn="ctr">
+                      <a:solidFill>
+                        <a:schemeClr val="tx1"/>
+                      </a:solidFill>
+                      <a:prstDash val="solid"/>
+                      <a:round/>
+                      <a:headEnd type="none" w="med" len="med"/>
+                      <a:tailEnd type="none" w="med" len="med"/>
+                    </a:lnL>
+                    <a:lnR>
+                      <a:noFill/>
+                    </a:lnR>
+                    <a:lnT>
+                      <a:noFill/>
+                    </a:lnT>
+                    <a:lnB w="12700" cap="flat" cmpd="sng" algn="ctr">
+                      <a:solidFill>
+                        <a:schemeClr val="tx1"/>
+                      </a:solidFill>
+                      <a:prstDash val="solid"/>
+                      <a:round/>
+                      <a:headEnd type="none" w="med" len="med"/>
+                      <a:tailEnd type="none" w="med" len="med"/>
+                    </a:lnB>
+                    <a:solidFill>
+                      <a:schemeClr val="tx2"/>
+                    </a:solidFill>
+                  </a:tcPr>
+                </a:tc>
+                <a:tc>
+                  <a:txBody>
+                    <a:bodyPr/>
+                    <a:lstStyle/>
+                    <a:p>
+                      <a:pPr algn="ctr" fontAlgn="ctr"/>
+                      <a:r>
+                        <a:rPr lang="fr-FR" sz="600" b="1" i="0" u="none" strike="noStrike" dirty="0">
+                          <a:solidFill>
+                            <a:srgbClr val="FFFFFF"/>
+                          </a:solidFill>
+                          <a:effectLst/>
+                          <a:latin typeface="Calibri Light" panose="020F0302020204030204" pitchFamily="34" charset="0"/>
+                        </a:rPr>
+                        <a:t>Occuper</a:t>
+                      </a:r>
+                    </a:p>
+                  </a:txBody>
+                  <a:tcPr marL="0" marR="0" marT="0" marB="0" anchor="ctr">
+                    <a:lnL>
+                      <a:noFill/>
+                    </a:lnL>
+                    <a:lnR>
+                      <a:noFill/>
+                    </a:lnR>
+                    <a:lnT>
+                      <a:noFill/>
+                    </a:lnT>
+                    <a:lnB w="12700" cap="flat" cmpd="sng" algn="ctr">
+                      <a:solidFill>
+                        <a:schemeClr val="tx1"/>
+                      </a:solidFill>
+                      <a:prstDash val="solid"/>
+                      <a:round/>
+                      <a:headEnd type="none" w="med" len="med"/>
+                      <a:tailEnd type="none" w="med" len="med"/>
+                    </a:lnB>
+                    <a:solidFill>
+                      <a:schemeClr val="tx2"/>
+                    </a:solidFill>
+                  </a:tcPr>
+                </a:tc>
+                <a:tc>
+                  <a:txBody>
+                    <a:bodyPr/>
+                    <a:lstStyle/>
+                    <a:p>
+                      <a:pPr algn="ctr" fontAlgn="ctr"/>
+                      <a:r>
+                        <a:rPr lang="fr-FR" sz="600" b="1" i="0" u="none" strike="noStrike" dirty="0">
+                          <a:solidFill>
+                            <a:srgbClr val="FFFFFF"/>
+                          </a:solidFill>
+                          <a:effectLst/>
+                          <a:latin typeface="Calibri Light" panose="020F0302020204030204" pitchFamily="34" charset="0"/>
+                        </a:rPr>
+                        <a:t>Chauffer</a:t>
+                      </a:r>
+                    </a:p>
+                  </a:txBody>
+                  <a:tcPr marL="0" marR="0" marT="0" marB="0" anchor="ctr">
+                    <a:lnL>
+                      <a:noFill/>
+                    </a:lnL>
+                    <a:lnR>
+                      <a:noFill/>
+                    </a:lnR>
+                    <a:lnT>
+                      <a:noFill/>
+                    </a:lnT>
+                    <a:lnB w="12700" cap="flat" cmpd="sng" algn="ctr">
+                      <a:solidFill>
+                        <a:schemeClr val="tx1"/>
+                      </a:solidFill>
+                      <a:prstDash val="solid"/>
+                      <a:round/>
+                      <a:headEnd type="none" w="med" len="med"/>
+                      <a:tailEnd type="none" w="med" len="med"/>
+                    </a:lnB>
+                    <a:solidFill>
+                      <a:schemeClr val="tx2"/>
+                    </a:solidFill>
+                  </a:tcPr>
+                </a:tc>
+                <a:tc>
+                  <a:txBody>
+                    <a:bodyPr/>
+                    <a:lstStyle/>
+                    <a:p>
+                      <a:pPr algn="ctr" fontAlgn="ctr"/>
+                      <a:r>
+                        <a:rPr lang="fr-FR" sz="600" b="1" i="0" u="none" strike="noStrike" dirty="0">
+                          <a:solidFill>
+                            <a:srgbClr val="FFFFFF"/>
+                          </a:solidFill>
+                          <a:effectLst/>
+                          <a:latin typeface="Calibri Light" panose="020F0302020204030204" pitchFamily="34" charset="0"/>
+                        </a:rPr>
+                        <a:t>Occuper</a:t>
+                      </a:r>
+                    </a:p>
+                  </a:txBody>
+                  <a:tcPr marL="0" marR="0" marT="0" marB="0" anchor="ctr">
+                    <a:lnL>
+                      <a:noFill/>
+                    </a:lnL>
+                    <a:lnR>
+                      <a:noFill/>
+                    </a:lnR>
+                    <a:lnT>
+                      <a:noFill/>
+                    </a:lnT>
+                    <a:lnB w="12700" cap="flat" cmpd="sng" algn="ctr">
+                      <a:solidFill>
+                        <a:schemeClr val="tx1"/>
+                      </a:solidFill>
+                      <a:prstDash val="solid"/>
+                      <a:round/>
+                      <a:headEnd type="none" w="med" len="med"/>
+                      <a:tailEnd type="none" w="med" len="med"/>
+                    </a:lnB>
+                    <a:solidFill>
+                      <a:schemeClr val="tx2"/>
+                    </a:solidFill>
+                  </a:tcPr>
+                </a:tc>
+                <a:tc>
+                  <a:txBody>
+                    <a:bodyPr/>
+                    <a:lstStyle/>
+                    <a:p>
+                      <a:pPr algn="ctr" fontAlgn="ctr"/>
+                      <a:r>
+                        <a:rPr lang="fr-FR" sz="600" b="1" i="0" u="none" strike="noStrike" dirty="0">
+                          <a:solidFill>
+                            <a:srgbClr val="FFFFFF"/>
+                          </a:solidFill>
+                          <a:effectLst/>
+                          <a:latin typeface="Calibri Light" panose="020F0302020204030204" pitchFamily="34" charset="0"/>
+                        </a:rPr>
+                        <a:t>Chauffer</a:t>
+                      </a:r>
+                    </a:p>
+                  </a:txBody>
+                  <a:tcPr marL="0" marR="0" marT="0" marB="0" anchor="ctr">
+                    <a:lnL>
+                      <a:noFill/>
+                    </a:lnL>
+                    <a:lnR>
+                      <a:noFill/>
+                    </a:lnR>
+                    <a:lnT>
+                      <a:noFill/>
+                    </a:lnT>
+                    <a:lnB w="12700" cap="flat" cmpd="sng" algn="ctr">
+                      <a:solidFill>
+                        <a:schemeClr val="tx1"/>
+                      </a:solidFill>
+                      <a:prstDash val="solid"/>
+                      <a:round/>
+                      <a:headEnd type="none" w="med" len="med"/>
+                      <a:tailEnd type="none" w="med" len="med"/>
+                    </a:lnB>
+                    <a:solidFill>
+                      <a:schemeClr val="tx2"/>
+                    </a:solidFill>
+                  </a:tcPr>
+                </a:tc>
+                <a:tc>
+                  <a:txBody>
+                    <a:bodyPr/>
+                    <a:lstStyle/>
+                    <a:p>
+                      <a:pPr algn="ctr" fontAlgn="ctr"/>
+                      <a:r>
+                        <a:rPr lang="fr-FR" sz="600" b="1" i="0" u="none" strike="noStrike" dirty="0">
+                          <a:solidFill>
+                            <a:srgbClr val="FFFFFF"/>
+                          </a:solidFill>
+                          <a:effectLst/>
+                          <a:latin typeface="Calibri Light" panose="020F0302020204030204" pitchFamily="34" charset="0"/>
+                        </a:rPr>
+                        <a:t>Occuper</a:t>
+                      </a:r>
+                    </a:p>
+                  </a:txBody>
+                  <a:tcPr marL="0" marR="0" marT="0" marB="0" anchor="ctr">
+                    <a:lnL>
+                      <a:noFill/>
+                    </a:lnL>
+                    <a:lnR>
+                      <a:noFill/>
+                    </a:lnR>
+                    <a:lnT>
+                      <a:noFill/>
+                    </a:lnT>
+                    <a:lnB w="12700" cap="flat" cmpd="sng" algn="ctr">
+                      <a:solidFill>
+                        <a:schemeClr val="tx1"/>
+                      </a:solidFill>
+                      <a:prstDash val="solid"/>
+                      <a:round/>
+                      <a:headEnd type="none" w="med" len="med"/>
+                      <a:tailEnd type="none" w="med" len="med"/>
+                    </a:lnB>
+                    <a:solidFill>
+                      <a:schemeClr val="tx2"/>
+                    </a:solidFill>
+                  </a:tcPr>
+                </a:tc>
+                <a:tc>
+                  <a:txBody>
+                    <a:bodyPr/>
+                    <a:lstStyle/>
+                    <a:p>
+                      <a:pPr algn="ctr" fontAlgn="ctr"/>
+                      <a:r>
+                        <a:rPr lang="fr-FR" sz="600" b="1" i="0" u="none" strike="noStrike" dirty="0">
+                          <a:solidFill>
+                            <a:srgbClr val="FFFFFF"/>
+                          </a:solidFill>
+                          <a:effectLst/>
+                          <a:latin typeface="Calibri Light" panose="020F0302020204030204" pitchFamily="34" charset="0"/>
+                        </a:rPr>
+                        <a:t>Chauffer</a:t>
+                      </a:r>
+                    </a:p>
+                  </a:txBody>
+                  <a:tcPr marL="0" marR="0" marT="0" marB="0" anchor="ctr">
+                    <a:lnL>
+                      <a:noFill/>
+                    </a:lnL>
+                    <a:lnR>
+                      <a:noFill/>
+                    </a:lnR>
+                    <a:lnT>
+                      <a:noFill/>
+                    </a:lnT>
+                    <a:lnB w="12700" cap="flat" cmpd="sng" algn="ctr">
+                      <a:solidFill>
+                        <a:schemeClr val="tx1"/>
+                      </a:solidFill>
+                      <a:prstDash val="solid"/>
+                      <a:round/>
+                      <a:headEnd type="none" w="med" len="med"/>
+                      <a:tailEnd type="none" w="med" len="med"/>
+                    </a:lnB>
+                    <a:solidFill>
+                      <a:schemeClr val="tx2"/>
+                    </a:solidFill>
+                  </a:tcPr>
+                </a:tc>
+                <a:tc>
+                  <a:txBody>
+                    <a:bodyPr/>
+                    <a:lstStyle/>
+                    <a:p>
+                      <a:pPr algn="ctr" fontAlgn="ctr"/>
+                      <a:r>
+                        <a:rPr lang="fr-FR" sz="600" b="1" i="0" u="none" strike="noStrike" dirty="0">
+                          <a:solidFill>
+                            <a:srgbClr val="FFFFFF"/>
+                          </a:solidFill>
+                          <a:effectLst/>
+                          <a:latin typeface="Calibri Light" panose="020F0302020204030204" pitchFamily="34" charset="0"/>
+                        </a:rPr>
+                        <a:t>Occuper</a:t>
+                      </a:r>
+                    </a:p>
+                  </a:txBody>
+                  <a:tcPr marL="0" marR="0" marT="0" marB="0" anchor="ctr">
+                    <a:lnL>
+                      <a:noFill/>
+                    </a:lnL>
+                    <a:lnR>
+                      <a:noFill/>
+                    </a:lnR>
+                    <a:lnT>
+                      <a:noFill/>
+                    </a:lnT>
+                    <a:lnB w="12700" cap="flat" cmpd="sng" algn="ctr">
+                      <a:solidFill>
+                        <a:schemeClr val="tx1"/>
+                      </a:solidFill>
+                      <a:prstDash val="solid"/>
+                      <a:round/>
+                      <a:headEnd type="none" w="med" len="med"/>
+                      <a:tailEnd type="none" w="med" len="med"/>
+                    </a:lnB>
+                    <a:solidFill>
+                      <a:schemeClr val="tx2"/>
+                    </a:solidFill>
+                  </a:tcPr>
+                </a:tc>
+                <a:tc>
+                  <a:txBody>
+                    <a:bodyPr/>
+                    <a:lstStyle/>
+                    <a:p>
+                      <a:pPr algn="ctr" fontAlgn="ctr"/>
+                      <a:r>
+                        <a:rPr lang="fr-FR" sz="600" b="1" i="0" u="none" strike="noStrike" dirty="0">
+                          <a:solidFill>
+                            <a:srgbClr val="FFFFFF"/>
+                          </a:solidFill>
+                          <a:effectLst/>
+                          <a:latin typeface="Calibri Light" panose="020F0302020204030204" pitchFamily="34" charset="0"/>
+                        </a:rPr>
+                        <a:t>Chauffer</a:t>
+                      </a:r>
+                    </a:p>
+                  </a:txBody>
+                  <a:tcPr marL="0" marR="0" marT="0" marB="0" anchor="ctr">
+                    <a:lnL>
+                      <a:noFill/>
+                    </a:lnL>
+                    <a:lnR>
+                      <a:noFill/>
+                    </a:lnR>
+                    <a:lnT>
+                      <a:noFill/>
+                    </a:lnT>
+                    <a:lnB w="12700" cap="flat" cmpd="sng" algn="ctr">
+                      <a:solidFill>
+                        <a:schemeClr val="tx1"/>
+                      </a:solidFill>
+                      <a:prstDash val="solid"/>
+                      <a:round/>
+                      <a:headEnd type="none" w="med" len="med"/>
+                      <a:tailEnd type="none" w="med" len="med"/>
+                    </a:lnB>
+                    <a:solidFill>
+                      <a:schemeClr val="tx2"/>
+                    </a:solidFill>
+                  </a:tcPr>
+                </a:tc>
+                <a:tc>
+                  <a:txBody>
+                    <a:bodyPr/>
+                    <a:lstStyle/>
+                    <a:p>
+                      <a:pPr algn="ctr" fontAlgn="ctr"/>
+                      <a:r>
+                        <a:rPr lang="fr-FR" sz="600" b="1" i="0" u="none" strike="noStrike" dirty="0">
+                          <a:solidFill>
+                            <a:srgbClr val="FFFFFF"/>
+                          </a:solidFill>
+                          <a:effectLst/>
+                          <a:latin typeface="Calibri Light" panose="020F0302020204030204" pitchFamily="34" charset="0"/>
+                        </a:rPr>
+                        <a:t>Occuper</a:t>
+                      </a:r>
+                    </a:p>
+                  </a:txBody>
+                  <a:tcPr marL="0" marR="0" marT="0" marB="0" anchor="ctr">
+                    <a:lnL>
+                      <a:noFill/>
+                    </a:lnL>
+                    <a:lnR>
+                      <a:noFill/>
+                    </a:lnR>
+                    <a:lnT>
+                      <a:noFill/>
+                    </a:lnT>
+                    <a:lnB w="12700" cap="flat" cmpd="sng" algn="ctr">
+                      <a:solidFill>
+                        <a:schemeClr val="tx1"/>
+                      </a:solidFill>
+                      <a:prstDash val="solid"/>
+                      <a:round/>
+                      <a:headEnd type="none" w="med" len="med"/>
+                      <a:tailEnd type="none" w="med" len="med"/>
+                    </a:lnB>
+                    <a:solidFill>
+                      <a:schemeClr val="tx2"/>
+                    </a:solidFill>
+                  </a:tcPr>
+                </a:tc>
+                <a:tc>
+                  <a:txBody>
+                    <a:bodyPr/>
+                    <a:lstStyle/>
+                    <a:p>
+                      <a:pPr algn="ctr" fontAlgn="ctr"/>
+                      <a:r>
+                        <a:rPr lang="fr-FR" sz="600" b="1" i="0" u="none" strike="noStrike" dirty="0">
+                          <a:solidFill>
+                            <a:srgbClr val="FFFFFF"/>
+                          </a:solidFill>
+                          <a:effectLst/>
+                          <a:latin typeface="Calibri Light" panose="020F0302020204030204" pitchFamily="34" charset="0"/>
+                        </a:rPr>
+                        <a:t>Chauffer</a:t>
+                      </a:r>
+                    </a:p>
+                  </a:txBody>
+                  <a:tcPr marL="0" marR="0" marT="0" marB="0" anchor="ctr">
+                    <a:lnL>
+                      <a:noFill/>
+                    </a:lnL>
+                    <a:lnR>
+                      <a:noFill/>
+                    </a:lnR>
+                    <a:lnT>
+                      <a:noFill/>
+                    </a:lnT>
+                    <a:lnB w="12700" cap="flat" cmpd="sng" algn="ctr">
+                      <a:solidFill>
+                        <a:schemeClr val="tx1"/>
+                      </a:solidFill>
+                      <a:prstDash val="solid"/>
+                      <a:round/>
+                      <a:headEnd type="none" w="med" len="med"/>
+                      <a:tailEnd type="none" w="med" len="med"/>
+                    </a:lnB>
+                    <a:solidFill>
+                      <a:schemeClr val="tx2"/>
+                    </a:solidFill>
+                  </a:tcPr>
+                </a:tc>
+                <a:tc>
+                  <a:txBody>
+                    <a:bodyPr/>
+                    <a:lstStyle/>
+                    <a:p>
+                      <a:pPr algn="ctr" fontAlgn="ctr"/>
+                      <a:r>
+                        <a:rPr lang="fr-FR" sz="600" b="1" i="0" u="none" strike="noStrike" dirty="0">
+                          <a:solidFill>
+                            <a:srgbClr val="FFFFFF"/>
+                          </a:solidFill>
+                          <a:effectLst/>
+                          <a:latin typeface="Calibri Light" panose="020F0302020204030204" pitchFamily="34" charset="0"/>
+                        </a:rPr>
+                        <a:t>Occuper</a:t>
+                      </a:r>
+                    </a:p>
+                  </a:txBody>
+                  <a:tcPr marL="0" marR="0" marT="0" marB="0" anchor="ctr">
+                    <a:lnL>
+                      <a:noFill/>
+                    </a:lnL>
+                    <a:lnR>
+                      <a:noFill/>
+                    </a:lnR>
+                    <a:lnT>
+                      <a:noFill/>
+                    </a:lnT>
+                    <a:lnB w="12700" cap="flat" cmpd="sng" algn="ctr">
+                      <a:solidFill>
+                        <a:schemeClr val="tx1"/>
+                      </a:solidFill>
+                      <a:prstDash val="solid"/>
+                      <a:round/>
+                      <a:headEnd type="none" w="med" len="med"/>
+                      <a:tailEnd type="none" w="med" len="med"/>
+                    </a:lnB>
+                    <a:solidFill>
+                      <a:schemeClr val="tx2"/>
+                    </a:solidFill>
+                  </a:tcPr>
+                </a:tc>
+                <a:tc>
+                  <a:txBody>
+                    <a:bodyPr/>
+                    <a:lstStyle/>
+                    <a:p>
+                      <a:pPr algn="ctr" fontAlgn="ctr"/>
+                      <a:r>
+                        <a:rPr lang="fr-FR" sz="600" b="1" i="0" u="none" strike="noStrike" dirty="0">
+                          <a:solidFill>
+                            <a:srgbClr val="FFFFFF"/>
+                          </a:solidFill>
+                          <a:effectLst/>
+                          <a:latin typeface="Calibri Light" panose="020F0302020204030204" pitchFamily="34" charset="0"/>
+                        </a:rPr>
+                        <a:t>Chauffer</a:t>
+                      </a:r>
+                    </a:p>
+                  </a:txBody>
+                  <a:tcPr marL="0" marR="0" marT="0" marB="0" anchor="ctr">
+                    <a:lnL>
+                      <a:noFill/>
+                    </a:lnL>
+                    <a:lnR>
+                      <a:noFill/>
+                    </a:lnR>
+                    <a:lnT>
+                      <a:noFill/>
+                    </a:lnT>
+                    <a:lnB w="12700" cap="flat" cmpd="sng" algn="ctr">
+                      <a:solidFill>
+                        <a:schemeClr val="tx1"/>
+                      </a:solidFill>
+                      <a:prstDash val="solid"/>
+                      <a:round/>
+                      <a:headEnd type="none" w="med" len="med"/>
+                      <a:tailEnd type="none" w="med" len="med"/>
+                    </a:lnB>
+                    <a:solidFill>
+                      <a:schemeClr val="tx2"/>
+                    </a:solidFill>
+                  </a:tcPr>
+                </a:tc>
+                <a:tc>
+                  <a:txBody>
+                    <a:bodyPr/>
+                    <a:lstStyle/>
+                    <a:p>
+                      <a:pPr algn="ctr" fontAlgn="ctr"/>
+                      <a:r>
+                        <a:rPr lang="fr-FR" sz="600" b="1" i="0" u="none" strike="noStrike" dirty="0">
+                          <a:solidFill>
+                            <a:srgbClr val="FFFFFF"/>
+                          </a:solidFill>
+                          <a:effectLst/>
+                          <a:latin typeface="Calibri Light" panose="020F0302020204030204" pitchFamily="34" charset="0"/>
+                        </a:rPr>
+                        <a:t>Occuper</a:t>
+                      </a:r>
+                    </a:p>
+                  </a:txBody>
+                  <a:tcPr marL="0" marR="0" marT="0" marB="0" anchor="ctr">
+                    <a:lnL>
+                      <a:noFill/>
+                    </a:lnL>
+                    <a:lnR>
+                      <a:noFill/>
+                    </a:lnR>
+                    <a:lnT>
+                      <a:noFill/>
+                    </a:lnT>
+                    <a:lnB w="12700" cap="flat" cmpd="sng" algn="ctr">
+                      <a:solidFill>
+                        <a:schemeClr val="tx1"/>
+                      </a:solidFill>
+                      <a:prstDash val="solid"/>
+                      <a:round/>
+                      <a:headEnd type="none" w="med" len="med"/>
+                      <a:tailEnd type="none" w="med" len="med"/>
+                    </a:lnB>
+                    <a:solidFill>
+                      <a:schemeClr val="tx2"/>
+                    </a:solidFill>
+                  </a:tcPr>
+                </a:tc>
+                <a:tc>
+                  <a:txBody>
+                    <a:bodyPr/>
+                    <a:lstStyle/>
+                    <a:p>
+                      <a:pPr algn="ctr" fontAlgn="ctr"/>
+                      <a:r>
+                        <a:rPr lang="fr-FR" sz="600" b="1" i="0" u="none" strike="noStrike" dirty="0">
+                          <a:solidFill>
+                            <a:srgbClr val="FFFFFF"/>
+                          </a:solidFill>
+                          <a:effectLst/>
+                          <a:latin typeface="Calibri Light" panose="020F0302020204030204" pitchFamily="34" charset="0"/>
+                        </a:rPr>
+                        <a:t>Chauffer</a:t>
+                      </a:r>
+                    </a:p>
+                  </a:txBody>
+                  <a:tcPr marL="0" marR="0" marT="0" marB="0" anchor="ctr">
+                    <a:lnL>
+                      <a:noFill/>
+                    </a:lnL>
+                    <a:lnR w="12700" cap="flat" cmpd="sng" algn="ctr">
+                      <a:solidFill>
+                        <a:schemeClr val="tx1"/>
+                      </a:solidFill>
+                      <a:prstDash val="solid"/>
+                      <a:round/>
+                      <a:headEnd type="none" w="med" len="med"/>
+                      <a:tailEnd type="none" w="med" len="med"/>
+                    </a:lnR>
+                    <a:lnT>
+                      <a:noFill/>
+                    </a:lnT>
+                    <a:lnB w="12700" cap="flat" cmpd="sng" algn="ctr">
+                      <a:solidFill>
+                        <a:schemeClr val="tx1"/>
+                      </a:solidFill>
+                      <a:prstDash val="solid"/>
+                      <a:round/>
+                      <a:headEnd type="none" w="med" len="med"/>
+                      <a:tailEnd type="none" w="med" len="med"/>
+                    </a:lnB>
+                    <a:solidFill>
+                      <a:schemeClr val="tx2"/>
+                    </a:solidFill>
+                  </a:tcPr>
+                </a:tc>
+                <a:extLst>
+                  <a:ext uri="{0D108BD9-81ED-4DB2-BD59-A6C34878D82A}">
+                    <a16:rowId xmlns:a16="http://schemas.microsoft.com/office/drawing/2014/main" val="1164603379"/>
+                  </a:ext>
+                </a:extLst>
+              </a:tr>
+              <a:tr h="91096">
+                <a:tc>
+                  <a:txBody>
+                    <a:bodyPr/>
+                    <a:lstStyle/>
+                    <a:p>
+                      <a:pPr algn="ctr" fontAlgn="ctr"/>
+                      <a:r>
+                        <a:rPr lang="fr-FR" sz="600" b="1" i="0" u="none" strike="noStrike" dirty="0">
+                          <a:solidFill>
+                            <a:srgbClr val="222B35"/>
+                          </a:solidFill>
+                          <a:effectLst/>
+                          <a:latin typeface="Calibri Light" panose="020F0302020204030204" pitchFamily="34" charset="0"/>
+                        </a:rPr>
+                        <a:t>24h30</a:t>
+                      </a:r>
+                    </a:p>
+                  </a:txBody>
+                  <a:tcPr marL="0" marR="0" marT="0" marB="0" anchor="ctr">
+                    <a:lnL>
+                      <a:noFill/>
+                    </a:lnL>
+                    <a:lnR>
+                      <a:noFill/>
+                    </a:lnR>
+                    <a:lnT w="12700" cap="flat" cmpd="sng" algn="ctr">
+                      <a:solidFill>
+                        <a:schemeClr val="tx1"/>
+                      </a:solidFill>
+                      <a:prstDash val="solid"/>
+                      <a:round/>
+                      <a:headEnd type="none" w="med" len="med"/>
+                      <a:tailEnd type="none" w="med" len="med"/>
+                    </a:lnT>
+                    <a:lnB>
+                      <a:noFill/>
+                    </a:lnB>
+                  </a:tcPr>
+                </a:tc>
+                <a:tc>
+                  <a:txBody>
+                    <a:bodyPr/>
+                    <a:lstStyle/>
+                    <a:p>
+                      <a:pPr algn="ctr" fontAlgn="ctr"/>
+                      <a:r>
+                        <a:rPr kumimoji="0" lang="fr-FR" sz="300" b="0" i="0" u="none" strike="noStrike" kern="1200" cap="none" spc="0" normalizeH="0" baseline="0" noProof="0" dirty="0">
+                          <a:ln>
+                            <a:noFill/>
+                          </a:ln>
+                          <a:solidFill>
+                            <a:srgbClr val="222B35"/>
+                          </a:solidFill>
+                          <a:effectLst/>
+                          <a:uLnTx/>
+                          <a:uFillTx/>
+                          <a:latin typeface="Calibri Light" panose="020F0302020204030204" pitchFamily="34" charset="0"/>
+                          <a:ea typeface="+mn-ea"/>
+                          <a:cs typeface="+mn-cs"/>
+                        </a:rPr>
+                        <a:t>50031210892940</a:t>
+                      </a:r>
+                      <a:endParaRPr lang="fr-FR" sz="300" b="1" i="0" u="none" strike="noStrike" dirty="0">
+                        <a:solidFill>
+                          <a:srgbClr val="222B35"/>
+                        </a:solidFill>
+                        <a:effectLst/>
+                        <a:latin typeface="Calibri Light" panose="020F0302020204030204" pitchFamily="34" charset="0"/>
+                      </a:endParaRPr>
+                    </a:p>
+                  </a:txBody>
+                  <a:tcPr marL="0" marR="0" marT="0" marB="0" anchor="ctr">
+                    <a:lnL>
+                      <a:noFill/>
+                    </a:lnL>
+                    <a:lnR>
+                      <a:noFill/>
+                    </a:lnR>
+                    <a:lnT w="12700" cap="flat" cmpd="sng" algn="ctr">
+                      <a:solidFill>
+                        <a:schemeClr val="tx1"/>
+                      </a:solidFill>
+                      <a:prstDash val="solid"/>
+                      <a:round/>
+                      <a:headEnd type="none" w="med" len="med"/>
+                      <a:tailEnd type="none" w="med" len="med"/>
+                    </a:lnT>
+                    <a:lnB>
+                      <a:noFill/>
+                    </a:lnB>
+                  </a:tcPr>
+                </a:tc>
+                <a:tc>
+                  <a:txBody>
+                    <a:bodyPr/>
+                    <a:lstStyle/>
+                    <a:p>
+                      <a:pPr algn="ctr" fontAlgn="ctr"/>
+                      <a:r>
+                        <a:rPr kumimoji="0" lang="fr-FR" sz="300" b="0" i="0" u="none" strike="noStrike" kern="1200" cap="none" spc="0" normalizeH="0" baseline="0" noProof="0" dirty="0">
+                          <a:ln>
+                            <a:noFill/>
+                          </a:ln>
+                          <a:solidFill>
+                            <a:srgbClr val="222B35"/>
+                          </a:solidFill>
+                          <a:effectLst/>
+                          <a:uLnTx/>
+                          <a:uFillTx/>
+                          <a:latin typeface="Calibri Light" panose="020F0302020204030204" pitchFamily="34" charset="0"/>
+                          <a:ea typeface="+mn-ea"/>
+                          <a:cs typeface="+mn-cs"/>
+                        </a:rPr>
+                        <a:t>50031210892940</a:t>
+                      </a:r>
+                      <a:endParaRPr lang="fr-FR" sz="300" b="1" i="0" u="none" strike="noStrike" dirty="0">
+                        <a:solidFill>
+                          <a:srgbClr val="222B35"/>
+                        </a:solidFill>
+                        <a:effectLst/>
+                        <a:latin typeface="Calibri Light" panose="020F0302020204030204" pitchFamily="34" charset="0"/>
+                      </a:endParaRPr>
+                    </a:p>
+                  </a:txBody>
+                  <a:tcPr marL="0" marR="0" marT="0" marB="0" anchor="ctr">
+                    <a:lnL>
+                      <a:noFill/>
+                    </a:lnL>
+                    <a:lnR>
+                      <a:noFill/>
+                    </a:lnR>
+                    <a:lnT w="12700" cap="flat" cmpd="sng" algn="ctr">
+                      <a:solidFill>
+                        <a:schemeClr val="tx1"/>
+                      </a:solidFill>
+                      <a:prstDash val="solid"/>
+                      <a:round/>
+                      <a:headEnd type="none" w="med" len="med"/>
+                      <a:tailEnd type="none" w="med" len="med"/>
+                    </a:lnT>
+                    <a:lnB>
+                      <a:noFill/>
+                    </a:lnB>
+                  </a:tcPr>
+                </a:tc>
+                <a:tc>
+                  <a:txBody>
+                    <a:bodyPr/>
+                    <a:lstStyle/>
+                    <a:p>
+                      <a:pPr algn="ctr" fontAlgn="ctr"/>
+                      <a:r>
+                        <a:rPr kumimoji="0" lang="fr-FR" sz="300" b="0" i="0" u="none" strike="noStrike" kern="1200" cap="none" spc="0" normalizeH="0" baseline="0" noProof="0" dirty="0">
+                          <a:ln>
+                            <a:noFill/>
+                          </a:ln>
+                          <a:solidFill>
+                            <a:srgbClr val="222B35"/>
+                          </a:solidFill>
+                          <a:effectLst/>
+                          <a:uLnTx/>
+                          <a:uFillTx/>
+                          <a:latin typeface="Calibri Light" panose="020F0302020204030204" pitchFamily="34" charset="0"/>
+                          <a:ea typeface="+mn-ea"/>
+                          <a:cs typeface="+mn-cs"/>
+                        </a:rPr>
+                        <a:t>50031210892940</a:t>
+                      </a:r>
+                      <a:endParaRPr lang="fr-FR" sz="300" b="0" i="0" u="none" strike="noStrike" dirty="0">
+                        <a:solidFill>
+                          <a:srgbClr val="222B35"/>
+                        </a:solidFill>
+                        <a:effectLst/>
+                        <a:latin typeface="Calibri Light" panose="020F0302020204030204" pitchFamily="34" charset="0"/>
+                      </a:endParaRPr>
+                    </a:p>
+                  </a:txBody>
+                  <a:tcPr marL="0" marR="0" marT="0" marB="0" anchor="ctr">
+                    <a:lnL>
+                      <a:noFill/>
+                    </a:lnL>
+                    <a:lnR>
+                      <a:noFill/>
+                    </a:lnR>
+                    <a:lnT w="12700" cap="flat" cmpd="sng" algn="ctr">
+                      <a:solidFill>
+                        <a:schemeClr val="tx1"/>
+                      </a:solidFill>
+                      <a:prstDash val="solid"/>
+                      <a:round/>
+                      <a:headEnd type="none" w="med" len="med"/>
+                      <a:tailEnd type="none" w="med" len="med"/>
+                    </a:lnT>
+                    <a:lnB>
+                      <a:noFill/>
+                    </a:lnB>
+                  </a:tcPr>
+                </a:tc>
+                <a:tc>
+                  <a:txBody>
+                    <a:bodyPr/>
+                    <a:lstStyle/>
+                    <a:p>
+                      <a:pPr algn="ctr" fontAlgn="ctr"/>
+                      <a:r>
+                        <a:rPr kumimoji="0" lang="fr-FR" sz="300" b="0" i="0" u="none" strike="noStrike" kern="1200" cap="none" spc="0" normalizeH="0" baseline="0" noProof="0" dirty="0">
+                          <a:ln>
+                            <a:noFill/>
+                          </a:ln>
+                          <a:solidFill>
+                            <a:srgbClr val="222B35"/>
+                          </a:solidFill>
+                          <a:effectLst/>
+                          <a:uLnTx/>
+                          <a:uFillTx/>
+                          <a:latin typeface="Calibri Light" panose="020F0302020204030204" pitchFamily="34" charset="0"/>
+                          <a:ea typeface="+mn-ea"/>
+                          <a:cs typeface="+mn-cs"/>
+                        </a:rPr>
+                        <a:t>50031210892940</a:t>
+                      </a:r>
+                      <a:endParaRPr lang="fr-FR" sz="300" b="0" i="0" u="none" strike="noStrike" dirty="0">
+                        <a:solidFill>
+                          <a:srgbClr val="222B35"/>
+                        </a:solidFill>
+                        <a:effectLst/>
+                        <a:latin typeface="Calibri Light" panose="020F0302020204030204" pitchFamily="34" charset="0"/>
+                      </a:endParaRPr>
+                    </a:p>
+                  </a:txBody>
+                  <a:tcPr marL="0" marR="0" marT="0" marB="0" anchor="ctr">
+                    <a:lnL>
+                      <a:noFill/>
+                    </a:lnL>
+                    <a:lnR>
+                      <a:noFill/>
+                    </a:lnR>
+                    <a:lnT w="12700" cap="flat" cmpd="sng" algn="ctr">
+                      <a:solidFill>
+                        <a:schemeClr val="tx1"/>
+                      </a:solidFill>
+                      <a:prstDash val="solid"/>
+                      <a:round/>
+                      <a:headEnd type="none" w="med" len="med"/>
+                      <a:tailEnd type="none" w="med" len="med"/>
+                    </a:lnT>
+                    <a:lnB>
+                      <a:noFill/>
+                    </a:lnB>
+                  </a:tcPr>
+                </a:tc>
+                <a:tc>
+                  <a:txBody>
+                    <a:bodyPr/>
+                    <a:lstStyle/>
+                    <a:p>
+                      <a:pPr algn="ctr" fontAlgn="ctr"/>
+                      <a:r>
+                        <a:rPr kumimoji="0" lang="fr-FR" sz="300" b="0" i="0" u="none" strike="noStrike" kern="1200" cap="none" spc="0" normalizeH="0" baseline="0" noProof="0">
+                          <a:ln>
+                            <a:noFill/>
+                          </a:ln>
+                          <a:solidFill>
+                            <a:srgbClr val="222B35"/>
+                          </a:solidFill>
+                          <a:effectLst/>
+                          <a:uLnTx/>
+                          <a:uFillTx/>
+                          <a:latin typeface="Calibri Light" panose="020F0302020204030204" pitchFamily="34" charset="0"/>
+                          <a:ea typeface="+mn-ea"/>
+                          <a:cs typeface="+mn-cs"/>
+                        </a:rPr>
+                        <a:t>50031210892940</a:t>
+                      </a:r>
+                      <a:endParaRPr lang="fr-FR" sz="300" b="0" i="0" u="none" strike="noStrike">
+                        <a:solidFill>
+                          <a:srgbClr val="222B35"/>
+                        </a:solidFill>
+                        <a:effectLst/>
+                        <a:latin typeface="Calibri Light" panose="020F0302020204030204" pitchFamily="34" charset="0"/>
+                      </a:endParaRPr>
+                    </a:p>
+                  </a:txBody>
+                  <a:tcPr marL="0" marR="0" marT="0" marB="0" anchor="ctr">
+                    <a:lnL>
+                      <a:noFill/>
+                    </a:lnL>
+                    <a:lnR>
+                      <a:noFill/>
+                    </a:lnR>
+                    <a:lnT w="12700" cap="flat" cmpd="sng" algn="ctr">
+                      <a:solidFill>
+                        <a:schemeClr val="tx1"/>
+                      </a:solidFill>
+                      <a:prstDash val="solid"/>
+                      <a:round/>
+                      <a:headEnd type="none" w="med" len="med"/>
+                      <a:tailEnd type="none" w="med" len="med"/>
+                    </a:lnT>
+                    <a:lnB>
+                      <a:noFill/>
+                    </a:lnB>
+                  </a:tcPr>
+                </a:tc>
+                <a:tc>
+                  <a:txBody>
+                    <a:bodyPr/>
+                    <a:lstStyle/>
+                    <a:p>
+                      <a:pPr algn="ctr" fontAlgn="ctr"/>
+                      <a:r>
+                        <a:rPr kumimoji="0" lang="fr-FR" sz="300" b="0" i="0" u="none" strike="noStrike" kern="1200" cap="none" spc="0" normalizeH="0" baseline="0" noProof="0" dirty="0">
+                          <a:ln>
+                            <a:noFill/>
+                          </a:ln>
+                          <a:solidFill>
+                            <a:srgbClr val="222B35"/>
+                          </a:solidFill>
+                          <a:effectLst/>
+                          <a:uLnTx/>
+                          <a:uFillTx/>
+                          <a:latin typeface="Calibri Light" panose="020F0302020204030204" pitchFamily="34" charset="0"/>
+                          <a:ea typeface="+mn-ea"/>
+                          <a:cs typeface="+mn-cs"/>
+                        </a:rPr>
+                        <a:t>50031210892940</a:t>
+                      </a:r>
+                      <a:endParaRPr lang="fr-FR" sz="300" b="0" i="0" u="none" strike="noStrike" dirty="0">
+                        <a:solidFill>
+                          <a:srgbClr val="222B35"/>
+                        </a:solidFill>
+                        <a:effectLst/>
+                        <a:latin typeface="Calibri Light" panose="020F0302020204030204" pitchFamily="34" charset="0"/>
+                      </a:endParaRPr>
+                    </a:p>
+                  </a:txBody>
+                  <a:tcPr marL="0" marR="0" marT="0" marB="0" anchor="ctr">
+                    <a:lnL>
+                      <a:noFill/>
+                    </a:lnL>
+                    <a:lnR>
+                      <a:noFill/>
+                    </a:lnR>
+                    <a:lnT w="12700" cap="flat" cmpd="sng" algn="ctr">
+                      <a:solidFill>
+                        <a:schemeClr val="tx1"/>
+                      </a:solidFill>
+                      <a:prstDash val="solid"/>
+                      <a:round/>
+                      <a:headEnd type="none" w="med" len="med"/>
+                      <a:tailEnd type="none" w="med" len="med"/>
+                    </a:lnT>
+                    <a:lnB>
+                      <a:noFill/>
+                    </a:lnB>
+                  </a:tcPr>
+                </a:tc>
+                <a:tc>
+                  <a:txBody>
+                    <a:bodyPr/>
+                    <a:lstStyle/>
+                    <a:p>
+                      <a:pPr algn="ctr" fontAlgn="ctr"/>
+                      <a:r>
+                        <a:rPr kumimoji="0" lang="fr-FR" sz="300" b="0" i="0" u="none" strike="noStrike" kern="1200" cap="none" spc="0" normalizeH="0" baseline="0" noProof="0">
+                          <a:ln>
+                            <a:noFill/>
+                          </a:ln>
+                          <a:solidFill>
+                            <a:srgbClr val="222B35"/>
+                          </a:solidFill>
+                          <a:effectLst/>
+                          <a:uLnTx/>
+                          <a:uFillTx/>
+                          <a:latin typeface="Calibri Light" panose="020F0302020204030204" pitchFamily="34" charset="0"/>
+                          <a:ea typeface="+mn-ea"/>
+                          <a:cs typeface="+mn-cs"/>
+                        </a:rPr>
+                        <a:t>50031210892940</a:t>
+                      </a:r>
+                      <a:endParaRPr lang="fr-FR" sz="300" b="0" i="0" u="none" strike="noStrike" dirty="0">
+                        <a:solidFill>
+                          <a:srgbClr val="222B35"/>
+                        </a:solidFill>
+                        <a:effectLst/>
+                        <a:latin typeface="Calibri Light" panose="020F0302020204030204" pitchFamily="34" charset="0"/>
+                      </a:endParaRPr>
+                    </a:p>
+                  </a:txBody>
+                  <a:tcPr marL="0" marR="0" marT="0" marB="0" anchor="ctr">
+                    <a:lnL>
+                      <a:noFill/>
+                    </a:lnL>
+                    <a:lnR>
+                      <a:noFill/>
+                    </a:lnR>
+                    <a:lnT w="12700" cap="flat" cmpd="sng" algn="ctr">
+                      <a:solidFill>
+                        <a:schemeClr val="tx1"/>
+                      </a:solidFill>
+                      <a:prstDash val="solid"/>
+                      <a:round/>
+                      <a:headEnd type="none" w="med" len="med"/>
+                      <a:tailEnd type="none" w="med" len="med"/>
+                    </a:lnT>
+                    <a:lnB>
+                      <a:noFill/>
+                    </a:lnB>
+                  </a:tcPr>
+                </a:tc>
+                <a:tc>
+                  <a:txBody>
+                    <a:bodyPr/>
+                    <a:lstStyle/>
+                    <a:p>
+                      <a:pPr algn="ctr" fontAlgn="ctr"/>
+                      <a:r>
+                        <a:rPr kumimoji="0" lang="fr-FR" sz="300" b="0" i="0" u="none" strike="noStrike" kern="1200" cap="none" spc="0" normalizeH="0" baseline="0" noProof="0" dirty="0">
+                          <a:ln>
+                            <a:noFill/>
+                          </a:ln>
+                          <a:solidFill>
+                            <a:srgbClr val="222B35"/>
+                          </a:solidFill>
+                          <a:effectLst/>
+                          <a:uLnTx/>
+                          <a:uFillTx/>
+                          <a:latin typeface="Calibri Light" panose="020F0302020204030204" pitchFamily="34" charset="0"/>
+                          <a:ea typeface="+mn-ea"/>
+                          <a:cs typeface="+mn-cs"/>
+                        </a:rPr>
+                        <a:t>50031210892940</a:t>
+                      </a:r>
+                      <a:endParaRPr lang="fr-FR" sz="300" b="0" i="0" u="none" strike="noStrike" dirty="0">
+                        <a:solidFill>
+                          <a:srgbClr val="222B35"/>
+                        </a:solidFill>
+                        <a:effectLst/>
+                        <a:latin typeface="Calibri Light" panose="020F0302020204030204" pitchFamily="34" charset="0"/>
+                      </a:endParaRPr>
+                    </a:p>
+                  </a:txBody>
+                  <a:tcPr marL="0" marR="0" marT="0" marB="0" anchor="ctr">
+                    <a:lnL>
+                      <a:noFill/>
+                    </a:lnL>
+                    <a:lnR>
+                      <a:noFill/>
+                    </a:lnR>
+                    <a:lnT w="12700" cap="flat" cmpd="sng" algn="ctr">
+                      <a:solidFill>
+                        <a:schemeClr val="tx1"/>
+                      </a:solidFill>
+                      <a:prstDash val="solid"/>
+                      <a:round/>
+                      <a:headEnd type="none" w="med" len="med"/>
+                      <a:tailEnd type="none" w="med" len="med"/>
+                    </a:lnT>
+                    <a:lnB>
+                      <a:noFill/>
+                    </a:lnB>
+                  </a:tcPr>
+                </a:tc>
+                <a:tc>
+                  <a:txBody>
+                    <a:bodyPr/>
+                    <a:lstStyle/>
+                    <a:p>
+                      <a:pPr algn="ctr" fontAlgn="ctr"/>
+                      <a:r>
+                        <a:rPr kumimoji="0" lang="fr-FR" sz="300" b="0" i="0" u="none" strike="noStrike" kern="1200" cap="none" spc="0" normalizeH="0" baseline="0" noProof="0">
+                          <a:ln>
+                            <a:noFill/>
+                          </a:ln>
+                          <a:solidFill>
+                            <a:srgbClr val="222B35"/>
+                          </a:solidFill>
+                          <a:effectLst/>
+                          <a:uLnTx/>
+                          <a:uFillTx/>
+                          <a:latin typeface="Calibri Light" panose="020F0302020204030204" pitchFamily="34" charset="0"/>
+                          <a:ea typeface="+mn-ea"/>
+                          <a:cs typeface="+mn-cs"/>
+                        </a:rPr>
+                        <a:t>50031210892940</a:t>
+                      </a:r>
+                      <a:endParaRPr lang="fr-FR" sz="300" b="0" i="0" u="none" strike="noStrike" dirty="0">
+                        <a:solidFill>
+                          <a:srgbClr val="222B35"/>
+                        </a:solidFill>
+                        <a:effectLst/>
+                        <a:latin typeface="Calibri Light" panose="020F0302020204030204" pitchFamily="34" charset="0"/>
+                      </a:endParaRPr>
+                    </a:p>
+                  </a:txBody>
+                  <a:tcPr marL="0" marR="0" marT="0" marB="0" anchor="ctr">
+                    <a:lnL>
+                      <a:noFill/>
+                    </a:lnL>
+                    <a:lnR>
+                      <a:noFill/>
+                    </a:lnR>
+                    <a:lnT w="12700" cap="flat" cmpd="sng" algn="ctr">
+                      <a:solidFill>
+                        <a:schemeClr val="tx1"/>
+                      </a:solidFill>
+                      <a:prstDash val="solid"/>
+                      <a:round/>
+                      <a:headEnd type="none" w="med" len="med"/>
+                      <a:tailEnd type="none" w="med" len="med"/>
+                    </a:lnT>
+                    <a:lnB>
+                      <a:noFill/>
+                    </a:lnB>
+                  </a:tcPr>
+                </a:tc>
+                <a:tc>
+                  <a:txBody>
+                    <a:bodyPr/>
+                    <a:lstStyle/>
+                    <a:p>
+                      <a:pPr algn="ctr" fontAlgn="ctr"/>
+                      <a:r>
+                        <a:rPr kumimoji="0" lang="fr-FR" sz="300" b="0" i="0" u="none" strike="noStrike" kern="1200" cap="none" spc="0" normalizeH="0" baseline="0" noProof="0">
+                          <a:ln>
+                            <a:noFill/>
+                          </a:ln>
+                          <a:solidFill>
+                            <a:srgbClr val="222B35"/>
+                          </a:solidFill>
+                          <a:effectLst/>
+                          <a:uLnTx/>
+                          <a:uFillTx/>
+                          <a:latin typeface="Calibri Light" panose="020F0302020204030204" pitchFamily="34" charset="0"/>
+                          <a:ea typeface="+mn-ea"/>
+                          <a:cs typeface="+mn-cs"/>
+                        </a:rPr>
+                        <a:t>50031210892940</a:t>
+                      </a:r>
+                      <a:endParaRPr lang="fr-FR" sz="300" b="0" i="0" u="none" strike="noStrike" dirty="0">
+                        <a:solidFill>
+                          <a:srgbClr val="222B35"/>
+                        </a:solidFill>
+                        <a:effectLst/>
+                        <a:latin typeface="Calibri Light" panose="020F0302020204030204" pitchFamily="34" charset="0"/>
+                      </a:endParaRPr>
+                    </a:p>
+                  </a:txBody>
+                  <a:tcPr marL="0" marR="0" marT="0" marB="0" anchor="ctr">
+                    <a:lnL>
+                      <a:noFill/>
+                    </a:lnL>
+                    <a:lnR>
+                      <a:noFill/>
+                    </a:lnR>
+                    <a:lnT w="12700" cap="flat" cmpd="sng" algn="ctr">
+                      <a:solidFill>
+                        <a:schemeClr val="tx1"/>
+                      </a:solidFill>
+                      <a:prstDash val="solid"/>
+                      <a:round/>
+                      <a:headEnd type="none" w="med" len="med"/>
+                      <a:tailEnd type="none" w="med" len="med"/>
+                    </a:lnT>
+                    <a:lnB>
+                      <a:noFill/>
+                    </a:lnB>
+                  </a:tcPr>
+                </a:tc>
+                <a:tc>
+                  <a:txBody>
+                    <a:bodyPr/>
+                    <a:lstStyle/>
+                    <a:p>
+                      <a:pPr algn="ctr" fontAlgn="ctr"/>
+                      <a:r>
+                        <a:rPr kumimoji="0" lang="fr-FR" sz="300" b="0" i="0" u="none" strike="noStrike" kern="1200" cap="none" spc="0" normalizeH="0" baseline="0" noProof="0">
+                          <a:ln>
+                            <a:noFill/>
+                          </a:ln>
+                          <a:solidFill>
+                            <a:srgbClr val="222B35"/>
+                          </a:solidFill>
+                          <a:effectLst/>
+                          <a:uLnTx/>
+                          <a:uFillTx/>
+                          <a:latin typeface="Calibri Light" panose="020F0302020204030204" pitchFamily="34" charset="0"/>
+                          <a:ea typeface="+mn-ea"/>
+                          <a:cs typeface="+mn-cs"/>
+                        </a:rPr>
+                        <a:t>50031210892940</a:t>
+                      </a:r>
+                      <a:endParaRPr lang="fr-FR" sz="300" b="0" i="0" u="none" strike="noStrike" dirty="0">
+                        <a:solidFill>
+                          <a:srgbClr val="222B35"/>
+                        </a:solidFill>
+                        <a:effectLst/>
+                        <a:latin typeface="Calibri Light" panose="020F0302020204030204" pitchFamily="34" charset="0"/>
+                      </a:endParaRPr>
+                    </a:p>
+                  </a:txBody>
+                  <a:tcPr marL="0" marR="0" marT="0" marB="0" anchor="ctr">
+                    <a:lnL>
+                      <a:noFill/>
+                    </a:lnL>
+                    <a:lnR>
+                      <a:noFill/>
+                    </a:lnR>
+                    <a:lnT w="12700" cap="flat" cmpd="sng" algn="ctr">
+                      <a:solidFill>
+                        <a:schemeClr val="tx1"/>
+                      </a:solidFill>
+                      <a:prstDash val="solid"/>
+                      <a:round/>
+                      <a:headEnd type="none" w="med" len="med"/>
+                      <a:tailEnd type="none" w="med" len="med"/>
+                    </a:lnT>
+                    <a:lnB>
+                      <a:noFill/>
+                    </a:lnB>
+                  </a:tcPr>
+                </a:tc>
+                <a:tc>
+                  <a:txBody>
+                    <a:bodyPr/>
+                    <a:lstStyle/>
+                    <a:p>
+                      <a:pPr algn="ctr" fontAlgn="ctr"/>
+                      <a:r>
+                        <a:rPr kumimoji="0" lang="fr-FR" sz="300" b="0" i="0" u="none" strike="noStrike" kern="1200" cap="none" spc="0" normalizeH="0" baseline="0" noProof="0">
+                          <a:ln>
+                            <a:noFill/>
+                          </a:ln>
+                          <a:solidFill>
+                            <a:srgbClr val="222B35"/>
+                          </a:solidFill>
+                          <a:effectLst/>
+                          <a:uLnTx/>
+                          <a:uFillTx/>
+                          <a:latin typeface="Calibri Light" panose="020F0302020204030204" pitchFamily="34" charset="0"/>
+                          <a:ea typeface="+mn-ea"/>
+                          <a:cs typeface="+mn-cs"/>
+                        </a:rPr>
+                        <a:t>50031210892940</a:t>
+                      </a:r>
+                      <a:endParaRPr lang="fr-FR" sz="300" b="0" i="0" u="none" strike="noStrike" dirty="0">
+                        <a:solidFill>
+                          <a:srgbClr val="222B35"/>
+                        </a:solidFill>
+                        <a:effectLst/>
+                        <a:latin typeface="Calibri Light" panose="020F0302020204030204" pitchFamily="34" charset="0"/>
+                      </a:endParaRPr>
+                    </a:p>
+                  </a:txBody>
+                  <a:tcPr marL="0" marR="0" marT="0" marB="0" anchor="ctr">
+                    <a:lnL>
+                      <a:noFill/>
+                    </a:lnL>
+                    <a:lnR>
+                      <a:noFill/>
+                    </a:lnR>
+                    <a:lnT w="12700" cap="flat" cmpd="sng" algn="ctr">
+                      <a:solidFill>
+                        <a:schemeClr val="tx1"/>
+                      </a:solidFill>
+                      <a:prstDash val="solid"/>
+                      <a:round/>
+                      <a:headEnd type="none" w="med" len="med"/>
+                      <a:tailEnd type="none" w="med" len="med"/>
+                    </a:lnT>
+                    <a:lnB>
+                      <a:noFill/>
+                    </a:lnB>
+                  </a:tcPr>
+                </a:tc>
+                <a:tc>
+                  <a:txBody>
+                    <a:bodyPr/>
+                    <a:lstStyle/>
+                    <a:p>
+                      <a:pPr algn="ctr" fontAlgn="ctr"/>
+                      <a:r>
+                        <a:rPr kumimoji="0" lang="fr-FR" sz="300" b="0" i="0" u="none" strike="noStrike" kern="1200" cap="none" spc="0" normalizeH="0" baseline="0" noProof="0" dirty="0">
+                          <a:ln>
+                            <a:noFill/>
+                          </a:ln>
+                          <a:solidFill>
+                            <a:srgbClr val="222B35"/>
+                          </a:solidFill>
+                          <a:effectLst/>
+                          <a:uLnTx/>
+                          <a:uFillTx/>
+                          <a:latin typeface="Calibri Light" panose="020F0302020204030204" pitchFamily="34" charset="0"/>
+                          <a:ea typeface="+mn-ea"/>
+                          <a:cs typeface="+mn-cs"/>
+                        </a:rPr>
+                        <a:t>50031210892940</a:t>
+                      </a:r>
+                      <a:endParaRPr lang="fr-FR" sz="300" b="0" i="0" u="none" strike="noStrike" dirty="0">
+                        <a:solidFill>
+                          <a:srgbClr val="222B35"/>
+                        </a:solidFill>
+                        <a:effectLst/>
+                        <a:latin typeface="Calibri Light" panose="020F0302020204030204" pitchFamily="34" charset="0"/>
+                      </a:endParaRPr>
+                    </a:p>
+                  </a:txBody>
+                  <a:tcPr marL="0" marR="0" marT="0" marB="0" anchor="ctr">
+                    <a:lnL>
+                      <a:noFill/>
+                    </a:lnL>
+                    <a:lnR>
+                      <a:noFill/>
+                    </a:lnR>
+                    <a:lnT w="12700" cap="flat" cmpd="sng" algn="ctr">
+                      <a:solidFill>
+                        <a:schemeClr val="tx1"/>
+                      </a:solidFill>
+                      <a:prstDash val="solid"/>
+                      <a:round/>
+                      <a:headEnd type="none" w="med" len="med"/>
+                      <a:tailEnd type="none" w="med" len="med"/>
+                    </a:lnT>
+                    <a:lnB>
+                      <a:noFill/>
+                    </a:lnB>
+                  </a:tcPr>
+                </a:tc>
+                <a:tc>
+                  <a:txBody>
+                    <a:bodyPr/>
+                    <a:lstStyle/>
+                    <a:p>
+                      <a:pPr algn="ctr" fontAlgn="ctr"/>
+                      <a:r>
+                        <a:rPr kumimoji="0" lang="fr-FR" sz="300" b="0" i="0" u="none" strike="noStrike" kern="1200" cap="none" spc="0" normalizeH="0" baseline="0" noProof="0" dirty="0">
+                          <a:ln>
+                            <a:noFill/>
+                          </a:ln>
+                          <a:solidFill>
+                            <a:srgbClr val="222B35"/>
+                          </a:solidFill>
+                          <a:effectLst/>
+                          <a:uLnTx/>
+                          <a:uFillTx/>
+                          <a:latin typeface="Calibri Light" panose="020F0302020204030204" pitchFamily="34" charset="0"/>
+                          <a:ea typeface="+mn-ea"/>
+                          <a:cs typeface="+mn-cs"/>
+                        </a:rPr>
+                        <a:t>50031210892940</a:t>
+                      </a:r>
+                      <a:endParaRPr lang="fr-FR" sz="300" b="0" i="0" u="none" strike="noStrike" dirty="0">
+                        <a:solidFill>
+                          <a:srgbClr val="222B35"/>
+                        </a:solidFill>
+                        <a:effectLst/>
+                        <a:latin typeface="Calibri Light" panose="020F0302020204030204" pitchFamily="34" charset="0"/>
+                      </a:endParaRPr>
+                    </a:p>
+                  </a:txBody>
+                  <a:tcPr marL="0" marR="0" marT="0" marB="0" anchor="ctr">
+                    <a:lnL>
+                      <a:noFill/>
+                    </a:lnL>
+                    <a:lnR>
+                      <a:noFill/>
+                    </a:lnR>
+                    <a:lnT w="12700" cap="flat" cmpd="sng" algn="ctr">
+                      <a:solidFill>
+                        <a:schemeClr val="tx1"/>
+                      </a:solidFill>
+                      <a:prstDash val="solid"/>
+                      <a:round/>
+                      <a:headEnd type="none" w="med" len="med"/>
+                      <a:tailEnd type="none" w="med" len="med"/>
+                    </a:lnT>
+                    <a:lnB>
+                      <a:noFill/>
+                    </a:lnB>
+                  </a:tcPr>
+                </a:tc>
+                <a:extLst>
+                  <a:ext uri="{0D108BD9-81ED-4DB2-BD59-A6C34878D82A}">
+                    <a16:rowId xmlns:a16="http://schemas.microsoft.com/office/drawing/2014/main" val="1571321464"/>
+                  </a:ext>
+                </a:extLst>
+              </a:tr>
+            </a:tbl>
+          </a:graphicData>
+        </a:graphic>
+      </p:graphicFrame>
     </p:spTree>
     <p:extLst>
       <p:ext uri="{BB962C8B-B14F-4D97-AF65-F5344CB8AC3E}">
@@ -8202,7 +10358,7 @@
           <p:nvPr>
             <p:extLst>
               <p:ext uri="{D42A27DB-BD31-4B8C-83A1-F6EECF244321}">
-                <p14:modId xmlns:p14="http://schemas.microsoft.com/office/powerpoint/2010/main" val="3173557359"/>
+                <p14:modId xmlns:p14="http://schemas.microsoft.com/office/powerpoint/2010/main" val="2440636496"/>
               </p:ext>
             </p:extLst>
           </p:nvPr>
@@ -8415,7 +10571,7 @@
                     <a:lstStyle/>
                     <a:p>
                       <a:pPr algn="l" fontAlgn="b"/>
-                      <a:endParaRPr lang="fr-FR" sz="1100" b="0" i="0" u="none" strike="noStrike">
+                      <a:endParaRPr lang="fr-FR" sz="1100" b="0" i="0" u="none" strike="noStrike" dirty="0">
                         <a:solidFill>
                           <a:srgbClr val="000000"/>
                         </a:solidFill>
@@ -8431,9 +10587,21 @@
                     <a:lnR>
                       <a:noFill/>
                     </a:lnR>
+                    <a:lnT w="12700" cmpd="sng">
+                      <a:noFill/>
+                      <a:prstDash val="solid"/>
+                    </a:lnT>
                     <a:lnB>
                       <a:noFill/>
                     </a:lnB>
+                    <a:lnTlToBr w="12700" cmpd="sng">
+                      <a:noFill/>
+                      <a:prstDash val="solid"/>
+                    </a:lnTlToBr>
+                    <a:lnBlToTr w="12700" cmpd="sng">
+                      <a:noFill/>
+                      <a:prstDash val="solid"/>
+                    </a:lnBlToTr>
                   </a:tcPr>
                 </a:tc>
                 <a:extLst>

</xml_diff>

<commit_message>
text sur le powerpoint en taille 16
</commit_message>
<xml_diff>
--- a/app/src/main/assets/powerpointvierge.pptx
+++ b/app/src/main/assets/powerpointvierge.pptx
@@ -210,7 +210,7 @@
           <a:p>
             <a:fld id="{8EF2C5CC-36BA-4C84-AC43-9F8430F4AE76}" type="datetimeFigureOut">
               <a:rPr lang="fr-FR" smtClean="0"/>
-              <a:t>29/06/2023</a:t>
+              <a:t>30/06/2023</a:t>
             </a:fld>
             <a:endParaRPr lang="fr-FR"/>
           </a:p>
@@ -1404,7 +1404,7 @@
         <p:spPr>
           <a:xfrm>
             <a:off x="6987613" y="981729"/>
-            <a:ext cx="5059804" cy="369332"/>
+            <a:ext cx="5059804" cy="338554"/>
           </a:xfrm>
           <a:prstGeom prst="rect">
             <a:avLst/>
@@ -1426,7 +1426,7 @@
           <a:p>
             <a:pPr algn="ctr"/>
             <a:r>
-              <a:rPr lang="fr-FR" dirty="0">
+              <a:rPr lang="fr-FR" sz="1600" dirty="0">
                 <a:solidFill>
                   <a:schemeClr val="bg1"/>
                 </a:solidFill>
@@ -1451,7 +1451,7 @@
         <p:spPr>
           <a:xfrm>
             <a:off x="6987613" y="3573496"/>
-            <a:ext cx="5059804" cy="369332"/>
+            <a:ext cx="5059804" cy="338554"/>
           </a:xfrm>
           <a:prstGeom prst="rect">
             <a:avLst/>
@@ -1468,7 +1468,7 @@
           <a:p>
             <a:pPr algn="ctr"/>
             <a:r>
-              <a:rPr lang="fr-FR" dirty="0">
+              <a:rPr lang="fr-FR" sz="1600" dirty="0">
                 <a:solidFill>
                   <a:schemeClr val="bg1"/>
                 </a:solidFill>
@@ -1592,7 +1592,7 @@
         <p:spPr>
           <a:xfrm>
             <a:off x="9079975" y="1358667"/>
-            <a:ext cx="2967443" cy="369332"/>
+            <a:ext cx="2967443" cy="338554"/>
           </a:xfrm>
           <a:prstGeom prst="rect">
             <a:avLst/>
@@ -1609,7 +1609,7 @@
           <a:lstStyle/>
           <a:p>
             <a:r>
-              <a:rPr lang="fr-FR" dirty="0"/>
+              <a:rPr lang="fr-FR" sz="1600" dirty="0"/>
               <a:t>Lorem</a:t>
             </a:r>
           </a:p>
@@ -1630,7 +1630,7 @@
         <p:spPr>
           <a:xfrm>
             <a:off x="8969438" y="2785420"/>
-            <a:ext cx="3164383" cy="369332"/>
+            <a:ext cx="3164383" cy="338554"/>
           </a:xfrm>
           <a:prstGeom prst="rect">
             <a:avLst/>
@@ -1644,7 +1644,7 @@
           <a:lstStyle/>
           <a:p>
             <a:r>
-              <a:rPr lang="fr-FR" dirty="0"/>
+              <a:rPr lang="fr-FR" sz="1600" dirty="0"/>
               <a:t> Lorem</a:t>
             </a:r>
           </a:p>
@@ -1665,7 +1665,7 @@
         <p:spPr>
           <a:xfrm>
             <a:off x="8969438" y="2372395"/>
-            <a:ext cx="3035502" cy="369332"/>
+            <a:ext cx="3035502" cy="338554"/>
           </a:xfrm>
           <a:prstGeom prst="rect">
             <a:avLst/>
@@ -1679,7 +1679,7 @@
           <a:lstStyle/>
           <a:p>
             <a:r>
-              <a:rPr lang="fr-FR" dirty="0"/>
+              <a:rPr lang="fr-FR" sz="1600" dirty="0"/>
               <a:t> Lorem</a:t>
             </a:r>
           </a:p>
@@ -1726,7 +1726,7 @@
           <a:lstStyle/>
           <a:p>
             <a:pPr algn="ctr"/>
-            <a:endParaRPr lang="fr-FR"/>
+            <a:endParaRPr lang="fr-FR" sz="1600"/>
           </a:p>
         </p:txBody>
       </p:sp>
@@ -1745,7 +1745,7 @@
         <p:spPr>
           <a:xfrm>
             <a:off x="8969438" y="3181434"/>
-            <a:ext cx="3164383" cy="369332"/>
+            <a:ext cx="3164383" cy="338554"/>
           </a:xfrm>
           <a:prstGeom prst="rect">
             <a:avLst/>
@@ -1759,7 +1759,7 @@
           <a:lstStyle/>
           <a:p>
             <a:r>
-              <a:rPr lang="fr-FR" dirty="0"/>
+              <a:rPr lang="fr-FR" sz="1600" dirty="0"/>
               <a:t> Lorem</a:t>
             </a:r>
           </a:p>
@@ -1780,7 +1780,7 @@
         <p:spPr>
           <a:xfrm>
             <a:off x="187060" y="5308257"/>
-            <a:ext cx="11946761" cy="369332"/>
+            <a:ext cx="11946761" cy="338554"/>
           </a:xfrm>
           <a:prstGeom prst="rect">
             <a:avLst/>
@@ -1797,7 +1797,7 @@
           <a:p>
             <a:pPr algn="ctr"/>
             <a:r>
-              <a:rPr lang="fr-FR" dirty="0">
+              <a:rPr lang="fr-FR" sz="1600" dirty="0">
                 <a:solidFill>
                   <a:schemeClr val="bg1"/>
                 </a:solidFill>
@@ -4718,14 +4718,14 @@
           <p:nvPr>
             <p:extLst>
               <p:ext uri="{D42A27DB-BD31-4B8C-83A1-F6EECF244321}">
-                <p14:modId xmlns:p14="http://schemas.microsoft.com/office/powerpoint/2010/main" val="3104430655"/>
+                <p14:modId xmlns:p14="http://schemas.microsoft.com/office/powerpoint/2010/main" val="3239530694"/>
               </p:ext>
             </p:extLst>
           </p:nvPr>
         </p:nvGraphicFramePr>
         <p:xfrm>
           <a:off x="6350000" y="1143000"/>
-          <a:ext cx="5638800" cy="952500"/>
+          <a:ext cx="5638800" cy="998220"/>
         </p:xfrm>
         <a:graphic>
           <a:graphicData uri="http://schemas.openxmlformats.org/drawingml/2006/table">
@@ -4769,7 +4769,7 @@
                     <a:p>
                       <a:pPr algn="ctr" fontAlgn="ctr"/>
                       <a:r>
-                        <a:rPr lang="fr-FR" sz="1400" b="1" i="0" u="none" strike="noStrike" dirty="0">
+                        <a:rPr lang="fr-FR" sz="1600" b="1" i="0" u="none" strike="noStrike" dirty="0">
                           <a:solidFill>
                             <a:srgbClr val="FFFFFF"/>
                           </a:solidFill>
@@ -4842,7 +4842,7 @@
                     <a:p>
                       <a:pPr algn="ctr" fontAlgn="ctr"/>
                       <a:r>
-                        <a:rPr lang="fr-FR" sz="1400" b="1" i="0" u="none" strike="noStrike">
+                        <a:rPr lang="fr-FR" sz="1600" b="1" i="0" u="none" strike="noStrike">
                           <a:solidFill>
                             <a:srgbClr val="FFFFFF"/>
                           </a:solidFill>
@@ -4878,7 +4878,7 @@
                     <a:p>
                       <a:pPr algn="ctr" fontAlgn="ctr"/>
                       <a:r>
-                        <a:rPr lang="fr-FR" sz="1400" b="1" i="0" u="none" strike="noStrike" dirty="0">
+                        <a:rPr lang="fr-FR" sz="1600" b="1" i="0" u="none" strike="noStrike" dirty="0">
                           <a:solidFill>
                             <a:srgbClr val="FFFFFF"/>
                           </a:solidFill>
@@ -4914,7 +4914,7 @@
                     <a:p>
                       <a:pPr algn="ctr" fontAlgn="ctr"/>
                       <a:r>
-                        <a:rPr lang="fr-FR" sz="1400" b="1" i="0" u="none" strike="noStrike">
+                        <a:rPr lang="fr-FR" sz="1600" b="1" i="0" u="none" strike="noStrike">
                           <a:solidFill>
                             <a:srgbClr val="FFFFFF"/>
                           </a:solidFill>
@@ -4950,7 +4950,7 @@
                     <a:p>
                       <a:pPr algn="ctr" fontAlgn="ctr"/>
                       <a:r>
-                        <a:rPr lang="fr-FR" sz="1400" b="1" i="0" u="none" strike="noStrike">
+                        <a:rPr lang="fr-FR" sz="1600" b="1" i="0" u="none" strike="noStrike">
                           <a:solidFill>
                             <a:srgbClr val="FFFFFF"/>
                           </a:solidFill>
@@ -4993,7 +4993,7 @@
                     <a:p>
                       <a:pPr algn="ctr" fontAlgn="ctr"/>
                       <a:r>
-                        <a:rPr lang="fr-FR" sz="1400" b="1" i="0" u="none" strike="noStrike" dirty="0">
+                        <a:rPr lang="fr-FR" sz="1600" b="1" i="0" u="none" strike="noStrike" dirty="0">
                           <a:solidFill>
                             <a:srgbClr val="222B35"/>
                           </a:solidFill>
@@ -5026,7 +5026,7 @@
                     <a:p>
                       <a:pPr algn="ctr" fontAlgn="ctr"/>
                       <a:r>
-                        <a:rPr lang="fr-FR" sz="1300" b="0" i="0" u="none" strike="noStrike" dirty="0">
+                        <a:rPr lang="fr-FR" sz="1600" b="0" i="0" u="none" strike="noStrike" dirty="0">
                           <a:solidFill>
                             <a:srgbClr val="222B35"/>
                           </a:solidFill>
@@ -5059,7 +5059,7 @@
                     <a:p>
                       <a:pPr algn="ctr" fontAlgn="ctr"/>
                       <a:r>
-                        <a:rPr lang="fr-FR" sz="1300" b="0" i="0" u="none" strike="noStrike">
+                        <a:rPr lang="fr-FR" sz="1600" b="0" i="0" u="none" strike="noStrike">
                           <a:solidFill>
                             <a:srgbClr val="222B35"/>
                           </a:solidFill>
@@ -5092,7 +5092,7 @@
                     <a:p>
                       <a:pPr algn="ctr" fontAlgn="ctr"/>
                       <a:r>
-                        <a:rPr lang="fr-FR" sz="1300" b="0" i="0" u="none" strike="noStrike" dirty="0">
+                        <a:rPr lang="fr-FR" sz="1600" b="0" i="0" u="none" strike="noStrike" dirty="0">
                           <a:solidFill>
                             <a:srgbClr val="222B35"/>
                           </a:solidFill>
@@ -5142,8 +5142,8 @@
         </p:nvSpPr>
         <p:spPr>
           <a:xfrm>
-            <a:off x="11471931" y="6611779"/>
-            <a:ext cx="720069" cy="246221"/>
+            <a:off x="11146521" y="6532953"/>
+            <a:ext cx="1045479" cy="338554"/>
           </a:xfrm>
           <a:prstGeom prst="rect">
             <a:avLst/>
@@ -5158,7 +5158,7 @@
           <a:p>
             <a:pPr algn="l"/>
             <a:r>
-              <a:rPr lang="fr-FR" sz="1000" u="sng" dirty="0"/>
+              <a:rPr lang="fr-FR" sz="1600" u="sng" dirty="0"/>
               <a:t>A vérifier</a:t>
             </a:r>
           </a:p>
@@ -5314,21 +5314,8 @@
                 <a:latin typeface="Arial"/>
                 <a:cs typeface="Times New Roman"/>
               </a:rPr>
-              <a:t>	</a:t>
+              <a:t>Lorem</a:t>
             </a:r>
-            <a:endParaRPr kumimoji="0" lang="fr-FR" sz="1600" b="0" i="0" u="none" strike="noStrike" kern="1200" cap="none" spc="0" normalizeH="0" baseline="0" noProof="0" dirty="0">
-              <a:ln>
-                <a:noFill/>
-              </a:ln>
-              <a:solidFill>
-                <a:srgbClr val="FFFFFF"/>
-              </a:solidFill>
-              <a:effectLst/>
-              <a:uLnTx/>
-              <a:uFillTx/>
-              <a:latin typeface="Arial"/>
-              <a:cs typeface="Times New Roman"/>
-            </a:endParaRPr>
           </a:p>
         </p:txBody>
       </p:sp>
@@ -5393,7 +5380,7 @@
                 <a:latin typeface="Arial"/>
                 <a:cs typeface="Times New Roman"/>
               </a:rPr>
-              <a:t> </a:t>
+              <a:t> Lorem</a:t>
             </a:r>
           </a:p>
         </p:txBody>
@@ -5459,7 +5446,7 @@
                 <a:latin typeface="Arial"/>
                 <a:cs typeface="Times New Roman"/>
               </a:rPr>
-              <a:t> </a:t>
+              <a:t> Lorem</a:t>
             </a:r>
           </a:p>
         </p:txBody>
@@ -7796,7 +7783,7 @@
           <p:nvPr>
             <p:extLst>
               <p:ext uri="{D42A27DB-BD31-4B8C-83A1-F6EECF244321}">
-                <p14:modId xmlns:p14="http://schemas.microsoft.com/office/powerpoint/2010/main" val="2433303040"/>
+                <p14:modId xmlns:p14="http://schemas.microsoft.com/office/powerpoint/2010/main" val="3300877035"/>
               </p:ext>
             </p:extLst>
           </p:nvPr>

</xml_diff>

<commit_message>
suppression du champ Batiment #19
</commit_message>
<xml_diff>
--- a/app/src/main/assets/powerpointvierge.pptx
+++ b/app/src/main/assets/powerpointvierge.pptx
@@ -1183,14 +1183,14 @@
           <p:nvPr>
             <p:extLst>
               <p:ext uri="{D42A27DB-BD31-4B8C-83A1-F6EECF244321}">
-                <p14:modId xmlns:p14="http://schemas.microsoft.com/office/powerpoint/2010/main" val="58483005"/>
+                <p14:modId xmlns:p14="http://schemas.microsoft.com/office/powerpoint/2010/main" val="1764104461"/>
               </p:ext>
             </p:extLst>
           </p:nvPr>
         </p:nvGraphicFramePr>
         <p:xfrm>
-          <a:off x="6957634" y="1452935"/>
-          <a:ext cx="2122341" cy="2035640"/>
+          <a:off x="6957634" y="1710425"/>
+          <a:ext cx="2122341" cy="2523320"/>
         </p:xfrm>
         <a:graphic>
           <a:graphicData uri="http://schemas.openxmlformats.org/drawingml/2006/table">
@@ -1222,6 +1222,26 @@
                         </a:rPr>
                         <a:t>Adresse :</a:t>
                       </a:r>
+                    </a:p>
+                    <a:p>
+                      <a:pPr algn="l" fontAlgn="b"/>
+                      <a:endParaRPr lang="fr-FR" sz="1600" b="1" i="0" u="none" strike="noStrike" dirty="0">
+                        <a:solidFill>
+                          <a:srgbClr val="4472C4"/>
+                        </a:solidFill>
+                        <a:effectLst/>
+                        <a:latin typeface="Calibri" panose="020F0502020204030204" pitchFamily="34" charset="0"/>
+                      </a:endParaRPr>
+                    </a:p>
+                    <a:p>
+                      <a:pPr algn="l" fontAlgn="b"/>
+                      <a:endParaRPr lang="fr-FR" sz="1600" b="1" i="0" u="none" strike="noStrike" dirty="0">
+                        <a:solidFill>
+                          <a:srgbClr val="4472C4"/>
+                        </a:solidFill>
+                        <a:effectLst/>
+                        <a:latin typeface="Calibri" panose="020F0502020204030204" pitchFamily="34" charset="0"/>
+                      </a:endParaRPr>
                     </a:p>
                     <a:p>
                       <a:pPr algn="l" fontAlgn="b"/>
@@ -1403,8 +1423,8 @@
         </p:nvSpPr>
         <p:spPr>
           <a:xfrm>
-            <a:off x="6987613" y="981729"/>
-            <a:ext cx="5059804" cy="338554"/>
+            <a:off x="6957634" y="981729"/>
+            <a:ext cx="5089783" cy="461665"/>
           </a:xfrm>
           <a:prstGeom prst="rect">
             <a:avLst/>
@@ -1426,54 +1446,12 @@
           <a:p>
             <a:pPr algn="ctr"/>
             <a:r>
-              <a:rPr lang="fr-FR" sz="1600" dirty="0">
+              <a:rPr lang="fr-FR" sz="2400" dirty="0">
                 <a:solidFill>
                   <a:schemeClr val="bg1"/>
                 </a:solidFill>
               </a:rPr>
               <a:t>Lorem</a:t>
-            </a:r>
-          </a:p>
-        </p:txBody>
-      </p:sp>
-      <p:sp>
-        <p:nvSpPr>
-          <p:cNvPr id="6" name="description">
-            <a:extLst>
-              <a:ext uri="{FF2B5EF4-FFF2-40B4-BE49-F238E27FC236}">
-                <a16:creationId xmlns:a16="http://schemas.microsoft.com/office/drawing/2014/main" id="{73A6FC50-D200-4978-F0E5-CC3F706A65F6}"/>
-              </a:ext>
-            </a:extLst>
-          </p:cNvPr>
-          <p:cNvSpPr txBox="1"/>
-          <p:nvPr/>
-        </p:nvSpPr>
-        <p:spPr>
-          <a:xfrm>
-            <a:off x="6987613" y="3573496"/>
-            <a:ext cx="5059804" cy="338554"/>
-          </a:xfrm>
-          <a:prstGeom prst="rect">
-            <a:avLst/>
-          </a:prstGeom>
-          <a:solidFill>
-            <a:schemeClr val="tx1"/>
-          </a:solidFill>
-        </p:spPr>
-        <p:txBody>
-          <a:bodyPr wrap="square">
-            <a:spAutoFit/>
-          </a:bodyPr>
-          <a:lstStyle/>
-          <a:p>
-            <a:pPr algn="ctr"/>
-            <a:r>
-              <a:rPr lang="fr-FR" sz="1600" dirty="0">
-                <a:solidFill>
-                  <a:schemeClr val="bg1"/>
-                </a:solidFill>
-              </a:rPr>
-              <a:t> Lorem</a:t>
             </a:r>
           </a:p>
         </p:txBody>
@@ -1591,7 +1569,7 @@
         </p:nvSpPr>
         <p:spPr>
           <a:xfrm>
-            <a:off x="9079975" y="1358667"/>
+            <a:off x="9048137" y="1663213"/>
             <a:ext cx="2967443" cy="338554"/>
           </a:xfrm>
           <a:prstGeom prst="rect">
@@ -1629,7 +1607,7 @@
         </p:nvSpPr>
         <p:spPr>
           <a:xfrm>
-            <a:off x="8969438" y="2785420"/>
+            <a:off x="8969438" y="3543591"/>
             <a:ext cx="3164383" cy="338554"/>
           </a:xfrm>
           <a:prstGeom prst="rect">
@@ -1664,7 +1642,7 @@
         </p:nvSpPr>
         <p:spPr>
           <a:xfrm>
-            <a:off x="8969438" y="2372395"/>
+            <a:off x="8969438" y="3130566"/>
             <a:ext cx="3035502" cy="338554"/>
           </a:xfrm>
           <a:prstGeom prst="rect">
@@ -1744,7 +1722,7 @@
         </p:nvSpPr>
         <p:spPr>
           <a:xfrm>
-            <a:off x="8969438" y="3181434"/>
+            <a:off x="8969438" y="3939605"/>
             <a:ext cx="3164383" cy="338554"/>
           </a:xfrm>
           <a:prstGeom prst="rect">

</xml_diff>

<commit_message>
Powerpoint affichage du chauffage et de l'occupation #25
</commit_message>
<xml_diff>
--- a/app/src/main/assets/powerpointvierge.pptx
+++ b/app/src/main/assets/powerpointvierge.pptx
@@ -210,7 +210,7 @@
           <a:p>
             <a:fld id="{8EF2C5CC-36BA-4C84-AC43-9F8430F4AE76}" type="datetimeFigureOut">
               <a:rPr lang="fr-FR" smtClean="0"/>
-              <a:t>30/06/2023</a:t>
+              <a:t>03/07/2023</a:t>
             </a:fld>
             <a:endParaRPr lang="fr-FR"/>
           </a:p>
@@ -696,6 +696,90 @@
     <p:extLst>
       <p:ext uri="{BB962C8B-B14F-4D97-AF65-F5344CB8AC3E}">
         <p14:creationId xmlns:p14="http://schemas.microsoft.com/office/powerpoint/2010/main" val="2678538685"/>
+      </p:ext>
+    </p:extLst>
+  </p:cSld>
+  <p:clrMapOvr>
+    <a:masterClrMapping/>
+  </p:clrMapOvr>
+</p:notes>
+</file>
+
+<file path=ppt/notesSlides/notesSlide3.xml><?xml version="1.0" encoding="utf-8"?>
+<p:notes xmlns:a="http://schemas.openxmlformats.org/drawingml/2006/main" xmlns:r="http://schemas.openxmlformats.org/officeDocument/2006/relationships" xmlns:p="http://schemas.openxmlformats.org/presentationml/2006/main">
+  <p:cSld>
+    <p:spTree>
+      <p:nvGrpSpPr>
+        <p:cNvPr id="1" name=""/>
+        <p:cNvGrpSpPr/>
+        <p:nvPr/>
+      </p:nvGrpSpPr>
+      <p:grpSpPr>
+        <a:xfrm>
+          <a:off x="0" y="0"/>
+          <a:ext cx="0" cy="0"/>
+          <a:chOff x="0" y="0"/>
+          <a:chExt cx="0" cy="0"/>
+        </a:xfrm>
+      </p:grpSpPr>
+      <p:sp>
+        <p:nvSpPr>
+          <p:cNvPr id="2" name="Espace réservé de l'image des diapositives 1"/>
+          <p:cNvSpPr>
+            <a:spLocks noGrp="1" noRot="1" noChangeAspect="1"/>
+          </p:cNvSpPr>
+          <p:nvPr>
+            <p:ph type="sldImg"/>
+          </p:nvPr>
+        </p:nvSpPr>
+        <p:spPr/>
+      </p:sp>
+      <p:sp>
+        <p:nvSpPr>
+          <p:cNvPr id="3" name="Espace réservé des notes 2"/>
+          <p:cNvSpPr>
+            <a:spLocks noGrp="1"/>
+          </p:cNvSpPr>
+          <p:nvPr>
+            <p:ph type="body" idx="1"/>
+          </p:nvPr>
+        </p:nvSpPr>
+        <p:spPr/>
+        <p:txBody>
+          <a:bodyPr/>
+          <a:lstStyle/>
+          <a:p>
+            <a:endParaRPr lang="fr-FR" dirty="0"/>
+          </a:p>
+        </p:txBody>
+      </p:sp>
+      <p:sp>
+        <p:nvSpPr>
+          <p:cNvPr id="4" name="Espace réservé du numéro de diapositive 3"/>
+          <p:cNvSpPr>
+            <a:spLocks noGrp="1"/>
+          </p:cNvSpPr>
+          <p:nvPr>
+            <p:ph type="sldNum" sz="quarter" idx="5"/>
+          </p:nvPr>
+        </p:nvSpPr>
+        <p:spPr/>
+        <p:txBody>
+          <a:bodyPr/>
+          <a:lstStyle/>
+          <a:p>
+            <a:fld id="{288F5A41-EEB1-4CD0-80B3-15BE976D79DC}" type="slidenum">
+              <a:rPr lang="fr-FR" smtClean="0"/>
+              <a:t>4</a:t>
+            </a:fld>
+            <a:endParaRPr lang="fr-FR"/>
+          </a:p>
+        </p:txBody>
+      </p:sp>
+    </p:spTree>
+    <p:extLst>
+      <p:ext uri="{BB962C8B-B14F-4D97-AF65-F5344CB8AC3E}">
+        <p14:creationId xmlns:p14="http://schemas.microsoft.com/office/powerpoint/2010/main" val="369503213"/>
       </p:ext>
     </p:extLst>
   </p:cSld>
@@ -1450,6 +1534,7 @@
                 <a:solidFill>
                   <a:schemeClr val="bg1"/>
                 </a:solidFill>
+                <a:latin typeface="+mj-lt"/>
               </a:rPr>
               <a:t>Lorem</a:t>
             </a:r>
@@ -1587,7 +1672,9 @@
           <a:lstStyle/>
           <a:p>
             <a:r>
-              <a:rPr lang="fr-FR" sz="1600" dirty="0"/>
+              <a:rPr lang="fr-FR" sz="1600" dirty="0">
+                <a:latin typeface="+mj-lt"/>
+              </a:rPr>
               <a:t>Lorem</a:t>
             </a:r>
           </a:p>
@@ -1622,7 +1709,9 @@
           <a:lstStyle/>
           <a:p>
             <a:r>
-              <a:rPr lang="fr-FR" sz="1600" dirty="0"/>
+              <a:rPr lang="fr-FR" sz="1600" dirty="0">
+                <a:latin typeface="+mj-lt"/>
+              </a:rPr>
               <a:t> Lorem</a:t>
             </a:r>
           </a:p>
@@ -1657,7 +1746,9 @@
           <a:lstStyle/>
           <a:p>
             <a:r>
-              <a:rPr lang="fr-FR" sz="1600" dirty="0"/>
+              <a:rPr lang="fr-FR" sz="1600" dirty="0">
+                <a:latin typeface="+mj-lt"/>
+              </a:rPr>
               <a:t> Lorem</a:t>
             </a:r>
           </a:p>
@@ -1737,7 +1828,9 @@
           <a:lstStyle/>
           <a:p>
             <a:r>
-              <a:rPr lang="fr-FR" sz="1600" dirty="0"/>
+              <a:rPr lang="fr-FR" sz="1600" dirty="0">
+                <a:latin typeface="+mj-lt"/>
+              </a:rPr>
               <a:t> Lorem</a:t>
             </a:r>
           </a:p>
@@ -1779,6 +1872,7 @@
                 <a:solidFill>
                   <a:schemeClr val="bg1"/>
                 </a:solidFill>
+                <a:latin typeface="+mj-lt"/>
               </a:rPr>
               <a:t>Lorem</a:t>
             </a:r>
@@ -9598,7 +9692,7 @@
         <p:spPr>
           <a:xfrm>
             <a:off x="11146521" y="6532953"/>
-            <a:ext cx="1045479" cy="338554"/>
+            <a:ext cx="928075" cy="338554"/>
           </a:xfrm>
           <a:prstGeom prst="rect">
             <a:avLst/>
@@ -9613,7 +9707,9 @@
           <a:p>
             <a:pPr algn="l"/>
             <a:r>
-              <a:rPr lang="fr-FR" sz="1600" u="sng" dirty="0"/>
+              <a:rPr lang="fr-FR" sz="1600" u="sng" dirty="0">
+                <a:latin typeface="+mj-lt"/>
+              </a:rPr>
               <a:t>A vérifier</a:t>
             </a:r>
           </a:p>
@@ -9766,7 +9862,6 @@
                 <a:solidFill>
                   <a:srgbClr val="FFFFFF"/>
                 </a:solidFill>
-                <a:latin typeface="Arial"/>
                 <a:cs typeface="Times New Roman"/>
               </a:rPr>
               <a:t>Lorem</a:t>
@@ -9832,7 +9927,6 @@
                 <a:effectLst/>
                 <a:uLnTx/>
                 <a:uFillTx/>
-                <a:latin typeface="Arial"/>
                 <a:cs typeface="Times New Roman"/>
               </a:rPr>
               <a:t> Lorem</a:t>
@@ -9898,7 +9992,6 @@
                 <a:effectLst/>
                 <a:uLnTx/>
                 <a:uFillTx/>
-                <a:latin typeface="Arial"/>
                 <a:cs typeface="Times New Roman"/>
               </a:rPr>
               <a:t> Lorem</a:t>
@@ -9908,10 +10001,10 @@
       </p:sp>
       <p:graphicFrame>
         <p:nvGraphicFramePr>
-          <p:cNvPr id="8" name="tableauUsageEtOccupation">
+          <p:cNvPr id="5" name="tableauUsageEtOccupation">
             <a:extLst>
               <a:ext uri="{FF2B5EF4-FFF2-40B4-BE49-F238E27FC236}">
-                <a16:creationId xmlns:a16="http://schemas.microsoft.com/office/drawing/2014/main" id="{F62846BA-2936-6D8B-C071-95EB1401F13C}"/>
+                <a16:creationId xmlns:a16="http://schemas.microsoft.com/office/drawing/2014/main" id="{6C29210F-1E28-EB78-7EC4-F0BD9B22A0D7}"/>
               </a:ext>
             </a:extLst>
           </p:cNvPr>
@@ -9921,119 +10014,70 @@
           <p:nvPr>
             <p:extLst>
               <p:ext uri="{D42A27DB-BD31-4B8C-83A1-F6EECF244321}">
-                <p14:modId xmlns:p14="http://schemas.microsoft.com/office/powerpoint/2010/main" val="207158695"/>
+                <p14:modId xmlns:p14="http://schemas.microsoft.com/office/powerpoint/2010/main" val="423831637"/>
               </p:ext>
             </p:extLst>
           </p:nvPr>
         </p:nvGraphicFramePr>
         <p:xfrm>
-          <a:off x="50200" y="1061595"/>
-          <a:ext cx="5998173" cy="743737"/>
+          <a:off x="444500" y="1061595"/>
+          <a:ext cx="5461000" cy="563880"/>
         </p:xfrm>
         <a:graphic>
           <a:graphicData uri="http://schemas.openxmlformats.org/drawingml/2006/table">
             <a:tbl>
               <a:tblPr/>
               <a:tblGrid>
-                <a:gridCol w="382694">
+                <a:gridCol w="688848">
                   <a:extLst>
                     <a:ext uri="{9D8B030D-6E8A-4147-A177-3AD203B41FA5}">
                       <a16:colId xmlns:a16="http://schemas.microsoft.com/office/drawing/2014/main" val="1570197389"/>
                     </a:ext>
                   </a:extLst>
                 </a:gridCol>
-                <a:gridCol w="382694">
-                  <a:extLst>
-                    <a:ext uri="{9D8B030D-6E8A-4147-A177-3AD203B41FA5}">
-                      <a16:colId xmlns:a16="http://schemas.microsoft.com/office/drawing/2014/main" val="2062104135"/>
-                    </a:ext>
-                  </a:extLst>
-                </a:gridCol>
-                <a:gridCol w="394090">
+                <a:gridCol w="709362">
                   <a:extLst>
                     <a:ext uri="{9D8B030D-6E8A-4147-A177-3AD203B41FA5}">
                       <a16:colId xmlns:a16="http://schemas.microsoft.com/office/drawing/2014/main" val="2079264698"/>
                     </a:ext>
                   </a:extLst>
                 </a:gridCol>
-                <a:gridCol w="456648">
-                  <a:extLst>
-                    <a:ext uri="{9D8B030D-6E8A-4147-A177-3AD203B41FA5}">
-                      <a16:colId xmlns:a16="http://schemas.microsoft.com/office/drawing/2014/main" val="1236367479"/>
-                    </a:ext>
-                  </a:extLst>
-                </a:gridCol>
-                <a:gridCol w="381551">
+                <a:gridCol w="686791">
                   <a:extLst>
                     <a:ext uri="{9D8B030D-6E8A-4147-A177-3AD203B41FA5}">
                       <a16:colId xmlns:a16="http://schemas.microsoft.com/office/drawing/2014/main" val="2694132656"/>
                     </a:ext>
                   </a:extLst>
                 </a:gridCol>
-                <a:gridCol w="450775">
-                  <a:extLst>
-                    <a:ext uri="{9D8B030D-6E8A-4147-A177-3AD203B41FA5}">
-                      <a16:colId xmlns:a16="http://schemas.microsoft.com/office/drawing/2014/main" val="276330688"/>
-                    </a:ext>
-                  </a:extLst>
-                </a:gridCol>
-                <a:gridCol w="368374">
+                <a:gridCol w="663072">
                   <a:extLst>
                     <a:ext uri="{9D8B030D-6E8A-4147-A177-3AD203B41FA5}">
                       <a16:colId xmlns:a16="http://schemas.microsoft.com/office/drawing/2014/main" val="878808144"/>
                     </a:ext>
                   </a:extLst>
                 </a:gridCol>
-                <a:gridCol w="431800">
-                  <a:extLst>
-                    <a:ext uri="{9D8B030D-6E8A-4147-A177-3AD203B41FA5}">
-                      <a16:colId xmlns:a16="http://schemas.microsoft.com/office/drawing/2014/main" val="2282394120"/>
-                    </a:ext>
-                  </a:extLst>
-                </a:gridCol>
-                <a:gridCol w="393700">
+                <a:gridCol w="708660">
                   <a:extLst>
                     <a:ext uri="{9D8B030D-6E8A-4147-A177-3AD203B41FA5}">
                       <a16:colId xmlns:a16="http://schemas.microsoft.com/office/drawing/2014/main" val="1758652614"/>
                     </a:ext>
                   </a:extLst>
                 </a:gridCol>
-                <a:gridCol w="431461">
-                  <a:extLst>
-                    <a:ext uri="{9D8B030D-6E8A-4147-A177-3AD203B41FA5}">
-                      <a16:colId xmlns:a16="http://schemas.microsoft.com/office/drawing/2014/main" val="4152945676"/>
-                    </a:ext>
-                  </a:extLst>
-                </a:gridCol>
-                <a:gridCol w="355939">
+                <a:gridCol w="640690">
                   <a:extLst>
                     <a:ext uri="{9D8B030D-6E8A-4147-A177-3AD203B41FA5}">
                       <a16:colId xmlns:a16="http://schemas.microsoft.com/office/drawing/2014/main" val="3050978946"/>
                     </a:ext>
                   </a:extLst>
                 </a:gridCol>
-                <a:gridCol w="410852">
-                  <a:extLst>
-                    <a:ext uri="{9D8B030D-6E8A-4147-A177-3AD203B41FA5}">
-                      <a16:colId xmlns:a16="http://schemas.microsoft.com/office/drawing/2014/main" val="2339646369"/>
-                    </a:ext>
-                  </a:extLst>
-                </a:gridCol>
-                <a:gridCol w="389248">
+                <a:gridCol w="700645">
                   <a:extLst>
                     <a:ext uri="{9D8B030D-6E8A-4147-A177-3AD203B41FA5}">
                       <a16:colId xmlns:a16="http://schemas.microsoft.com/office/drawing/2014/main" val="1687241469"/>
                     </a:ext>
                   </a:extLst>
                 </a:gridCol>
-                <a:gridCol w="400051">
-                  <a:extLst>
-                    <a:ext uri="{9D8B030D-6E8A-4147-A177-3AD203B41FA5}">
-                      <a16:colId xmlns:a16="http://schemas.microsoft.com/office/drawing/2014/main" val="1890204817"/>
-                    </a:ext>
-                  </a:extLst>
-                </a:gridCol>
-                <a:gridCol w="368296">
+                <a:gridCol w="662932">
                   <a:extLst>
                     <a:ext uri="{9D8B030D-6E8A-4147-A177-3AD203B41FA5}">
                       <a16:colId xmlns:a16="http://schemas.microsoft.com/office/drawing/2014/main" val="1918776766"/>
@@ -10067,8 +10111,14 @@
                       <a:headEnd type="none" w="med" len="med"/>
                       <a:tailEnd type="none" w="med" len="med"/>
                     </a:lnL>
-                    <a:lnR>
-                      <a:noFill/>
+                    <a:lnR w="12700" cap="flat" cmpd="sng" algn="ctr">
+                      <a:solidFill>
+                        <a:schemeClr val="tx1"/>
+                      </a:solidFill>
+                      <a:prstDash val="solid"/>
+                      <a:round/>
+                      <a:headEnd type="none" w="med" len="med"/>
+                      <a:tailEnd type="none" w="med" len="med"/>
                     </a:lnR>
                     <a:lnT w="12700" cap="flat" cmpd="sng" algn="ctr">
                       <a:solidFill>
@@ -10079,22 +10129,28 @@
                       <a:headEnd type="none" w="med" len="med"/>
                       <a:tailEnd type="none" w="med" len="med"/>
                     </a:lnT>
-                    <a:lnB>
-                      <a:noFill/>
+                    <a:lnB w="12700" cap="flat" cmpd="sng" algn="ctr">
+                      <a:solidFill>
+                        <a:schemeClr val="tx1"/>
+                      </a:solidFill>
+                      <a:prstDash val="solid"/>
+                      <a:round/>
+                      <a:headEnd type="none" w="med" len="med"/>
+                      <a:tailEnd type="none" w="med" len="med"/>
                     </a:lnB>
                     <a:solidFill>
                       <a:schemeClr val="tx2"/>
                     </a:solidFill>
                   </a:tcPr>
                 </a:tc>
-                <a:tc gridSpan="2">
+                <a:tc>
                   <a:txBody>
                     <a:bodyPr/>
                     <a:lstStyle/>
                     <a:p>
                       <a:pPr algn="ctr" fontAlgn="ctr"/>
                       <a:r>
-                        <a:rPr lang="fr-FR" sz="1400" b="1" i="0" u="none" strike="noStrike" dirty="0">
+                        <a:rPr lang="fr-FR" sz="1200" b="1" i="0" u="none" strike="noStrike" dirty="0">
                           <a:solidFill>
                             <a:srgbClr val="FFFFFF"/>
                           </a:solidFill>
@@ -10106,11 +10162,23 @@
                     </a:p>
                   </a:txBody>
                   <a:tcPr marL="0" marR="0" marT="0" marB="0" anchor="ctr">
-                    <a:lnL>
-                      <a:noFill/>
+                    <a:lnL w="12700" cap="flat" cmpd="sng" algn="ctr">
+                      <a:solidFill>
+                        <a:schemeClr val="tx1"/>
+                      </a:solidFill>
+                      <a:prstDash val="solid"/>
+                      <a:round/>
+                      <a:headEnd type="none" w="med" len="med"/>
+                      <a:tailEnd type="none" w="med" len="med"/>
                     </a:lnL>
-                    <a:lnR>
-                      <a:noFill/>
+                    <a:lnR w="12700" cap="flat" cmpd="sng" algn="ctr">
+                      <a:solidFill>
+                        <a:schemeClr val="tx1"/>
+                      </a:solidFill>
+                      <a:prstDash val="solid"/>
+                      <a:round/>
+                      <a:headEnd type="none" w="med" len="med"/>
+                      <a:tailEnd type="none" w="med" len="med"/>
                     </a:lnR>
                     <a:lnT w="12700" cap="flat" cmpd="sng" algn="ctr">
                       <a:solidFill>
@@ -10121,55 +10189,28 @@
                       <a:headEnd type="none" w="med" len="med"/>
                       <a:tailEnd type="none" w="med" len="med"/>
                     </a:lnT>
-                    <a:lnB>
-                      <a:noFill/>
+                    <a:lnB w="12700" cap="flat" cmpd="sng" algn="ctr">
+                      <a:solidFill>
+                        <a:schemeClr val="tx1"/>
+                      </a:solidFill>
+                      <a:prstDash val="solid"/>
+                      <a:round/>
+                      <a:headEnd type="none" w="med" len="med"/>
+                      <a:tailEnd type="none" w="med" len="med"/>
                     </a:lnB>
                     <a:solidFill>
                       <a:schemeClr val="tx2"/>
                     </a:solidFill>
                   </a:tcPr>
                 </a:tc>
-                <a:tc hMerge="1">
-                  <a:txBody>
-                    <a:bodyPr/>
-                    <a:lstStyle/>
-                    <a:p>
-                      <a:pPr algn="ctr" fontAlgn="ctr"/>
-                      <a:endParaRPr lang="fr-FR" sz="1400" b="1" i="0" u="none" strike="noStrike" dirty="0">
-                        <a:solidFill>
-                          <a:srgbClr val="FFFFFF"/>
-                        </a:solidFill>
-                        <a:effectLst/>
-                        <a:latin typeface="Calibri Light" panose="020F0302020204030204" pitchFamily="34" charset="0"/>
-                      </a:endParaRPr>
-                    </a:p>
-                  </a:txBody>
-                  <a:tcPr marL="0" marR="0" marT="0" marB="0" anchor="ctr">
-                    <a:lnL>
-                      <a:noFill/>
-                    </a:lnL>
-                    <a:lnR>
-                      <a:noFill/>
-                    </a:lnR>
-                    <a:lnT>
-                      <a:noFill/>
-                    </a:lnT>
-                    <a:lnB>
-                      <a:noFill/>
-                    </a:lnB>
-                    <a:solidFill>
-                      <a:srgbClr val="A9D08E"/>
-                    </a:solidFill>
-                  </a:tcPr>
-                </a:tc>
-                <a:tc gridSpan="2">
+                <a:tc>
                   <a:txBody>
                     <a:bodyPr/>
                     <a:lstStyle/>
                     <a:p>
                       <a:pPr algn="ctr" fontAlgn="ctr"/>
                       <a:r>
-                        <a:rPr lang="fr-FR" sz="1400" b="1" i="0" u="none" strike="noStrike" dirty="0">
+                        <a:rPr lang="fr-FR" sz="1200" b="1" i="0" u="none" strike="noStrike" dirty="0">
                           <a:solidFill>
                             <a:srgbClr val="FFFFFF"/>
                           </a:solidFill>
@@ -10181,11 +10222,23 @@
                     </a:p>
                   </a:txBody>
                   <a:tcPr marL="0" marR="0" marT="0" marB="0" anchor="ctr">
-                    <a:lnL>
-                      <a:noFill/>
+                    <a:lnL w="12700" cap="flat" cmpd="sng" algn="ctr">
+                      <a:solidFill>
+                        <a:schemeClr val="tx1"/>
+                      </a:solidFill>
+                      <a:prstDash val="solid"/>
+                      <a:round/>
+                      <a:headEnd type="none" w="med" len="med"/>
+                      <a:tailEnd type="none" w="med" len="med"/>
                     </a:lnL>
-                    <a:lnR>
-                      <a:noFill/>
+                    <a:lnR w="12700" cap="flat" cmpd="sng" algn="ctr">
+                      <a:solidFill>
+                        <a:schemeClr val="tx1"/>
+                      </a:solidFill>
+                      <a:prstDash val="solid"/>
+                      <a:round/>
+                      <a:headEnd type="none" w="med" len="med"/>
+                      <a:tailEnd type="none" w="med" len="med"/>
                     </a:lnR>
                     <a:lnT w="12700" cap="flat" cmpd="sng" algn="ctr">
                       <a:solidFill>
@@ -10196,55 +10249,28 @@
                       <a:headEnd type="none" w="med" len="med"/>
                       <a:tailEnd type="none" w="med" len="med"/>
                     </a:lnT>
-                    <a:lnB>
-                      <a:noFill/>
+                    <a:lnB w="12700" cap="flat" cmpd="sng" algn="ctr">
+                      <a:solidFill>
+                        <a:schemeClr val="tx1"/>
+                      </a:solidFill>
+                      <a:prstDash val="solid"/>
+                      <a:round/>
+                      <a:headEnd type="none" w="med" len="med"/>
+                      <a:tailEnd type="none" w="med" len="med"/>
                     </a:lnB>
                     <a:solidFill>
                       <a:schemeClr val="tx2"/>
                     </a:solidFill>
                   </a:tcPr>
                 </a:tc>
-                <a:tc hMerge="1">
-                  <a:txBody>
-                    <a:bodyPr/>
-                    <a:lstStyle/>
-                    <a:p>
-                      <a:pPr algn="ctr" fontAlgn="ctr"/>
-                      <a:endParaRPr lang="fr-FR" sz="1400" b="1" i="0" u="none" strike="noStrike" dirty="0">
-                        <a:solidFill>
-                          <a:srgbClr val="FFFFFF"/>
-                        </a:solidFill>
-                        <a:effectLst/>
-                        <a:latin typeface="Calibri Light" panose="020F0302020204030204" pitchFamily="34" charset="0"/>
-                      </a:endParaRPr>
-                    </a:p>
-                  </a:txBody>
-                  <a:tcPr marL="0" marR="0" marT="0" marB="0" anchor="ctr">
-                    <a:lnL>
-                      <a:noFill/>
-                    </a:lnL>
-                    <a:lnR>
-                      <a:noFill/>
-                    </a:lnR>
-                    <a:lnT>
-                      <a:noFill/>
-                    </a:lnT>
-                    <a:lnB>
-                      <a:noFill/>
-                    </a:lnB>
-                    <a:solidFill>
-                      <a:srgbClr val="A9D08E"/>
-                    </a:solidFill>
-                  </a:tcPr>
-                </a:tc>
-                <a:tc gridSpan="2">
+                <a:tc>
                   <a:txBody>
                     <a:bodyPr/>
                     <a:lstStyle/>
                     <a:p>
                       <a:pPr algn="ctr" fontAlgn="ctr"/>
                       <a:r>
-                        <a:rPr lang="fr-FR" sz="1400" b="1" i="0" u="none" strike="noStrike" dirty="0">
+                        <a:rPr lang="fr-FR" sz="1200" b="1" i="0" u="none" strike="noStrike" dirty="0">
                           <a:solidFill>
                             <a:srgbClr val="FFFFFF"/>
                           </a:solidFill>
@@ -10256,11 +10282,23 @@
                     </a:p>
                   </a:txBody>
                   <a:tcPr marL="0" marR="0" marT="0" marB="0" anchor="ctr">
-                    <a:lnL>
-                      <a:noFill/>
+                    <a:lnL w="12700" cap="flat" cmpd="sng" algn="ctr">
+                      <a:solidFill>
+                        <a:schemeClr val="tx1"/>
+                      </a:solidFill>
+                      <a:prstDash val="solid"/>
+                      <a:round/>
+                      <a:headEnd type="none" w="med" len="med"/>
+                      <a:tailEnd type="none" w="med" len="med"/>
                     </a:lnL>
-                    <a:lnR>
-                      <a:noFill/>
+                    <a:lnR w="12700" cap="flat" cmpd="sng" algn="ctr">
+                      <a:solidFill>
+                        <a:schemeClr val="tx1"/>
+                      </a:solidFill>
+                      <a:prstDash val="solid"/>
+                      <a:round/>
+                      <a:headEnd type="none" w="med" len="med"/>
+                      <a:tailEnd type="none" w="med" len="med"/>
                     </a:lnR>
                     <a:lnT w="12700" cap="flat" cmpd="sng" algn="ctr">
                       <a:solidFill>
@@ -10271,55 +10309,28 @@
                       <a:headEnd type="none" w="med" len="med"/>
                       <a:tailEnd type="none" w="med" len="med"/>
                     </a:lnT>
-                    <a:lnB>
-                      <a:noFill/>
+                    <a:lnB w="12700" cap="flat" cmpd="sng" algn="ctr">
+                      <a:solidFill>
+                        <a:schemeClr val="tx1"/>
+                      </a:solidFill>
+                      <a:prstDash val="solid"/>
+                      <a:round/>
+                      <a:headEnd type="none" w="med" len="med"/>
+                      <a:tailEnd type="none" w="med" len="med"/>
                     </a:lnB>
                     <a:solidFill>
                       <a:schemeClr val="tx2"/>
                     </a:solidFill>
                   </a:tcPr>
                 </a:tc>
-                <a:tc hMerge="1">
-                  <a:txBody>
-                    <a:bodyPr/>
-                    <a:lstStyle/>
-                    <a:p>
-                      <a:pPr algn="ctr" fontAlgn="ctr"/>
-                      <a:endParaRPr lang="fr-FR" sz="1400" b="1" i="0" u="none" strike="noStrike" dirty="0">
-                        <a:solidFill>
-                          <a:srgbClr val="FFFFFF"/>
-                        </a:solidFill>
-                        <a:effectLst/>
-                        <a:latin typeface="Calibri Light" panose="020F0302020204030204" pitchFamily="34" charset="0"/>
-                      </a:endParaRPr>
-                    </a:p>
-                  </a:txBody>
-                  <a:tcPr marL="0" marR="0" marT="0" marB="0" anchor="ctr">
-                    <a:lnL>
-                      <a:noFill/>
-                    </a:lnL>
-                    <a:lnR>
-                      <a:noFill/>
-                    </a:lnR>
-                    <a:lnT>
-                      <a:noFill/>
-                    </a:lnT>
-                    <a:lnB>
-                      <a:noFill/>
-                    </a:lnB>
-                    <a:solidFill>
-                      <a:srgbClr val="A9D08E"/>
-                    </a:solidFill>
-                  </a:tcPr>
-                </a:tc>
-                <a:tc gridSpan="2">
+                <a:tc>
                   <a:txBody>
                     <a:bodyPr/>
                     <a:lstStyle/>
                     <a:p>
                       <a:pPr algn="ctr" fontAlgn="ctr"/>
                       <a:r>
-                        <a:rPr lang="fr-FR" sz="1400" b="1" i="0" u="none" strike="noStrike" dirty="0">
+                        <a:rPr lang="fr-FR" sz="1200" b="1" i="0" u="none" strike="noStrike" dirty="0">
                           <a:solidFill>
                             <a:srgbClr val="FFFFFF"/>
                           </a:solidFill>
@@ -10331,11 +10342,23 @@
                     </a:p>
                   </a:txBody>
                   <a:tcPr marL="0" marR="0" marT="0" marB="0" anchor="ctr">
-                    <a:lnL>
-                      <a:noFill/>
+                    <a:lnL w="12700" cap="flat" cmpd="sng" algn="ctr">
+                      <a:solidFill>
+                        <a:schemeClr val="tx1"/>
+                      </a:solidFill>
+                      <a:prstDash val="solid"/>
+                      <a:round/>
+                      <a:headEnd type="none" w="med" len="med"/>
+                      <a:tailEnd type="none" w="med" len="med"/>
                     </a:lnL>
-                    <a:lnR>
-                      <a:noFill/>
+                    <a:lnR w="12700" cap="flat" cmpd="sng" algn="ctr">
+                      <a:solidFill>
+                        <a:schemeClr val="tx1"/>
+                      </a:solidFill>
+                      <a:prstDash val="solid"/>
+                      <a:round/>
+                      <a:headEnd type="none" w="med" len="med"/>
+                      <a:tailEnd type="none" w="med" len="med"/>
                     </a:lnR>
                     <a:lnT w="12700" cap="flat" cmpd="sng" algn="ctr">
                       <a:solidFill>
@@ -10346,55 +10369,28 @@
                       <a:headEnd type="none" w="med" len="med"/>
                       <a:tailEnd type="none" w="med" len="med"/>
                     </a:lnT>
-                    <a:lnB>
-                      <a:noFill/>
+                    <a:lnB w="12700" cap="flat" cmpd="sng" algn="ctr">
+                      <a:solidFill>
+                        <a:schemeClr val="tx1"/>
+                      </a:solidFill>
+                      <a:prstDash val="solid"/>
+                      <a:round/>
+                      <a:headEnd type="none" w="med" len="med"/>
+                      <a:tailEnd type="none" w="med" len="med"/>
                     </a:lnB>
                     <a:solidFill>
                       <a:schemeClr val="tx2"/>
                     </a:solidFill>
                   </a:tcPr>
                 </a:tc>
-                <a:tc hMerge="1">
-                  <a:txBody>
-                    <a:bodyPr/>
-                    <a:lstStyle/>
-                    <a:p>
-                      <a:pPr algn="ctr" fontAlgn="ctr"/>
-                      <a:endParaRPr lang="fr-FR" sz="1400" b="1" i="0" u="none" strike="noStrike" dirty="0">
-                        <a:solidFill>
-                          <a:srgbClr val="FFFFFF"/>
-                        </a:solidFill>
-                        <a:effectLst/>
-                        <a:latin typeface="Calibri Light" panose="020F0302020204030204" pitchFamily="34" charset="0"/>
-                      </a:endParaRPr>
-                    </a:p>
-                  </a:txBody>
-                  <a:tcPr marL="0" marR="0" marT="0" marB="0" anchor="ctr">
-                    <a:lnL>
-                      <a:noFill/>
-                    </a:lnL>
-                    <a:lnR>
-                      <a:noFill/>
-                    </a:lnR>
-                    <a:lnT>
-                      <a:noFill/>
-                    </a:lnT>
-                    <a:lnB>
-                      <a:noFill/>
-                    </a:lnB>
-                    <a:solidFill>
-                      <a:srgbClr val="A9D08E"/>
-                    </a:solidFill>
-                  </a:tcPr>
-                </a:tc>
-                <a:tc gridSpan="2">
+                <a:tc>
                   <a:txBody>
                     <a:bodyPr/>
                     <a:lstStyle/>
                     <a:p>
                       <a:pPr algn="ctr" fontAlgn="ctr"/>
                       <a:r>
-                        <a:rPr lang="fr-FR" sz="1400" b="1" i="0" u="none" strike="noStrike" dirty="0">
+                        <a:rPr lang="fr-FR" sz="1200" b="1" i="0" u="none" strike="noStrike" dirty="0">
                           <a:solidFill>
                             <a:srgbClr val="FFFFFF"/>
                           </a:solidFill>
@@ -10406,11 +10402,23 @@
                     </a:p>
                   </a:txBody>
                   <a:tcPr marL="0" marR="0" marT="0" marB="0" anchor="ctr">
-                    <a:lnL>
-                      <a:noFill/>
+                    <a:lnL w="12700" cap="flat" cmpd="sng" algn="ctr">
+                      <a:solidFill>
+                        <a:schemeClr val="tx1"/>
+                      </a:solidFill>
+                      <a:prstDash val="solid"/>
+                      <a:round/>
+                      <a:headEnd type="none" w="med" len="med"/>
+                      <a:tailEnd type="none" w="med" len="med"/>
                     </a:lnL>
-                    <a:lnR>
-                      <a:noFill/>
+                    <a:lnR w="12700" cap="flat" cmpd="sng" algn="ctr">
+                      <a:solidFill>
+                        <a:schemeClr val="tx1"/>
+                      </a:solidFill>
+                      <a:prstDash val="solid"/>
+                      <a:round/>
+                      <a:headEnd type="none" w="med" len="med"/>
+                      <a:tailEnd type="none" w="med" len="med"/>
                     </a:lnR>
                     <a:lnT w="12700" cap="flat" cmpd="sng" algn="ctr">
                       <a:solidFill>
@@ -10421,55 +10429,28 @@
                       <a:headEnd type="none" w="med" len="med"/>
                       <a:tailEnd type="none" w="med" len="med"/>
                     </a:lnT>
-                    <a:lnB>
-                      <a:noFill/>
+                    <a:lnB w="12700" cap="flat" cmpd="sng" algn="ctr">
+                      <a:solidFill>
+                        <a:schemeClr val="tx1"/>
+                      </a:solidFill>
+                      <a:prstDash val="solid"/>
+                      <a:round/>
+                      <a:headEnd type="none" w="med" len="med"/>
+                      <a:tailEnd type="none" w="med" len="med"/>
                     </a:lnB>
                     <a:solidFill>
                       <a:schemeClr val="tx2"/>
                     </a:solidFill>
                   </a:tcPr>
                 </a:tc>
-                <a:tc hMerge="1">
-                  <a:txBody>
-                    <a:bodyPr/>
-                    <a:lstStyle/>
-                    <a:p>
-                      <a:pPr algn="ctr" fontAlgn="ctr"/>
-                      <a:endParaRPr lang="fr-FR" sz="1400" b="1" i="0" u="none" strike="noStrike" dirty="0">
-                        <a:solidFill>
-                          <a:srgbClr val="FFFFFF"/>
-                        </a:solidFill>
-                        <a:effectLst/>
-                        <a:latin typeface="Calibri Light" panose="020F0302020204030204" pitchFamily="34" charset="0"/>
-                      </a:endParaRPr>
-                    </a:p>
-                  </a:txBody>
-                  <a:tcPr marL="0" marR="0" marT="0" marB="0" anchor="ctr">
-                    <a:lnL>
-                      <a:noFill/>
-                    </a:lnL>
-                    <a:lnR>
-                      <a:noFill/>
-                    </a:lnR>
-                    <a:lnT>
-                      <a:noFill/>
-                    </a:lnT>
-                    <a:lnB>
-                      <a:noFill/>
-                    </a:lnB>
-                    <a:solidFill>
-                      <a:srgbClr val="A9D08E"/>
-                    </a:solidFill>
-                  </a:tcPr>
-                </a:tc>
-                <a:tc gridSpan="2">
+                <a:tc>
                   <a:txBody>
                     <a:bodyPr/>
                     <a:lstStyle/>
                     <a:p>
                       <a:pPr algn="ctr" fontAlgn="ctr"/>
                       <a:r>
-                        <a:rPr lang="fr-FR" sz="1400" b="1" i="0" u="none" strike="noStrike" dirty="0">
+                        <a:rPr lang="fr-FR" sz="1200" b="1" i="0" u="none" strike="noStrike" dirty="0">
                           <a:solidFill>
                             <a:srgbClr val="FFFFFF"/>
                           </a:solidFill>
@@ -10481,11 +10462,23 @@
                     </a:p>
                   </a:txBody>
                   <a:tcPr marL="0" marR="0" marT="0" marB="0" anchor="ctr">
-                    <a:lnL>
-                      <a:noFill/>
+                    <a:lnL w="12700" cap="flat" cmpd="sng" algn="ctr">
+                      <a:solidFill>
+                        <a:schemeClr val="tx1"/>
+                      </a:solidFill>
+                      <a:prstDash val="solid"/>
+                      <a:round/>
+                      <a:headEnd type="none" w="med" len="med"/>
+                      <a:tailEnd type="none" w="med" len="med"/>
                     </a:lnL>
-                    <a:lnR>
-                      <a:noFill/>
+                    <a:lnR w="12700" cap="flat" cmpd="sng" algn="ctr">
+                      <a:solidFill>
+                        <a:schemeClr val="tx1"/>
+                      </a:solidFill>
+                      <a:prstDash val="solid"/>
+                      <a:round/>
+                      <a:headEnd type="none" w="med" len="med"/>
+                      <a:tailEnd type="none" w="med" len="med"/>
                     </a:lnR>
                     <a:lnT w="12700" cap="flat" cmpd="sng" algn="ctr">
                       <a:solidFill>
@@ -10496,55 +10489,28 @@
                       <a:headEnd type="none" w="med" len="med"/>
                       <a:tailEnd type="none" w="med" len="med"/>
                     </a:lnT>
-                    <a:lnB>
-                      <a:noFill/>
+                    <a:lnB w="12700" cap="flat" cmpd="sng" algn="ctr">
+                      <a:solidFill>
+                        <a:schemeClr val="tx1"/>
+                      </a:solidFill>
+                      <a:prstDash val="solid"/>
+                      <a:round/>
+                      <a:headEnd type="none" w="med" len="med"/>
+                      <a:tailEnd type="none" w="med" len="med"/>
                     </a:lnB>
                     <a:solidFill>
                       <a:schemeClr val="tx2"/>
                     </a:solidFill>
                   </a:tcPr>
                 </a:tc>
-                <a:tc hMerge="1">
-                  <a:txBody>
-                    <a:bodyPr/>
-                    <a:lstStyle/>
-                    <a:p>
-                      <a:pPr algn="ctr" fontAlgn="ctr"/>
-                      <a:endParaRPr lang="fr-FR" sz="1400" b="1" i="0" u="none" strike="noStrike" dirty="0">
-                        <a:solidFill>
-                          <a:srgbClr val="FFFFFF"/>
-                        </a:solidFill>
-                        <a:effectLst/>
-                        <a:latin typeface="Calibri Light" panose="020F0302020204030204" pitchFamily="34" charset="0"/>
-                      </a:endParaRPr>
-                    </a:p>
-                  </a:txBody>
-                  <a:tcPr marL="0" marR="0" marT="0" marB="0" anchor="ctr">
-                    <a:lnL>
-                      <a:noFill/>
-                    </a:lnL>
-                    <a:lnR>
-                      <a:noFill/>
-                    </a:lnR>
-                    <a:lnT>
-                      <a:noFill/>
-                    </a:lnT>
-                    <a:lnB>
-                      <a:noFill/>
-                    </a:lnB>
-                    <a:solidFill>
-                      <a:srgbClr val="A9D08E"/>
-                    </a:solidFill>
-                  </a:tcPr>
-                </a:tc>
-                <a:tc gridSpan="2">
+                <a:tc>
                   <a:txBody>
                     <a:bodyPr/>
                     <a:lstStyle/>
                     <a:p>
                       <a:pPr algn="ctr" fontAlgn="ctr"/>
                       <a:r>
-                        <a:rPr lang="fr-FR" sz="1400" b="1" i="0" u="none" strike="noStrike" dirty="0">
+                        <a:rPr lang="fr-FR" sz="1200" b="1" i="0" u="none" strike="noStrike" dirty="0">
                           <a:solidFill>
                             <a:srgbClr val="FFFFFF"/>
                           </a:solidFill>
@@ -10556,8 +10522,14 @@
                     </a:p>
                   </a:txBody>
                   <a:tcPr marL="0" marR="0" marT="0" marB="0" anchor="ctr">
-                    <a:lnL>
-                      <a:noFill/>
+                    <a:lnL w="12700" cap="flat" cmpd="sng" algn="ctr">
+                      <a:solidFill>
+                        <a:schemeClr val="tx1"/>
+                      </a:solidFill>
+                      <a:prstDash val="solid"/>
+                      <a:round/>
+                      <a:headEnd type="none" w="med" len="med"/>
+                      <a:tailEnd type="none" w="med" len="med"/>
                     </a:lnL>
                     <a:lnR w="12700" cap="flat" cmpd="sng" algn="ctr">
                       <a:solidFill>
@@ -10577,85 +10549,6 @@
                       <a:headEnd type="none" w="med" len="med"/>
                       <a:tailEnd type="none" w="med" len="med"/>
                     </a:lnT>
-                    <a:lnB>
-                      <a:noFill/>
-                    </a:lnB>
-                    <a:solidFill>
-                      <a:schemeClr val="tx2"/>
-                    </a:solidFill>
-                  </a:tcPr>
-                </a:tc>
-                <a:tc hMerge="1">
-                  <a:txBody>
-                    <a:bodyPr/>
-                    <a:lstStyle/>
-                    <a:p>
-                      <a:pPr algn="ctr" fontAlgn="ctr"/>
-                      <a:endParaRPr lang="fr-FR" sz="1400" b="1" i="0" u="none" strike="noStrike" dirty="0">
-                        <a:solidFill>
-                          <a:srgbClr val="FFFFFF"/>
-                        </a:solidFill>
-                        <a:effectLst/>
-                        <a:latin typeface="Calibri Light" panose="020F0302020204030204" pitchFamily="34" charset="0"/>
-                      </a:endParaRPr>
-                    </a:p>
-                  </a:txBody>
-                  <a:tcPr marL="0" marR="0" marT="0" marB="0" anchor="ctr">
-                    <a:lnL>
-                      <a:noFill/>
-                    </a:lnL>
-                    <a:lnR>
-                      <a:noFill/>
-                    </a:lnR>
-                    <a:lnT>
-                      <a:noFill/>
-                    </a:lnT>
-                    <a:lnB>
-                      <a:noFill/>
-                    </a:lnB>
-                    <a:solidFill>
-                      <a:srgbClr val="A9D08E"/>
-                    </a:solidFill>
-                  </a:tcPr>
-                </a:tc>
-                <a:extLst>
-                  <a:ext uri="{0D108BD9-81ED-4DB2-BD59-A6C34878D82A}">
-                    <a16:rowId xmlns:a16="http://schemas.microsoft.com/office/drawing/2014/main" val="1773314167"/>
-                  </a:ext>
-                </a:extLst>
-              </a:tr>
-              <a:tr h="195097">
-                <a:tc>
-                  <a:txBody>
-                    <a:bodyPr/>
-                    <a:lstStyle/>
-                    <a:p>
-                      <a:pPr algn="ctr" fontAlgn="ctr"/>
-                      <a:endParaRPr lang="fr-FR" sz="800" b="1" i="0" u="none" strike="noStrike" dirty="0">
-                        <a:solidFill>
-                          <a:srgbClr val="FFFFFF"/>
-                        </a:solidFill>
-                        <a:effectLst/>
-                        <a:latin typeface="Calibri Light" panose="020F0302020204030204" pitchFamily="34" charset="0"/>
-                      </a:endParaRPr>
-                    </a:p>
-                  </a:txBody>
-                  <a:tcPr marL="0" marR="0" marT="0" marB="0" anchor="ctr">
-                    <a:lnL w="12700" cap="flat" cmpd="sng" algn="ctr">
-                      <a:solidFill>
-                        <a:schemeClr val="tx1"/>
-                      </a:solidFill>
-                      <a:prstDash val="solid"/>
-                      <a:round/>
-                      <a:headEnd type="none" w="med" len="med"/>
-                      <a:tailEnd type="none" w="med" len="med"/>
-                    </a:lnL>
-                    <a:lnR>
-                      <a:noFill/>
-                    </a:lnR>
-                    <a:lnT>
-                      <a:noFill/>
-                    </a:lnT>
                     <a:lnB w="12700" cap="flat" cmpd="sng" algn="ctr">
                       <a:solidFill>
                         <a:schemeClr val="tx1"/>
@@ -10670,603 +10563,9 @@
                     </a:solidFill>
                   </a:tcPr>
                 </a:tc>
-                <a:tc>
-                  <a:txBody>
-                    <a:bodyPr/>
-                    <a:lstStyle/>
-                    <a:p>
-                      <a:pPr algn="ctr" fontAlgn="ctr"/>
-                      <a:r>
-                        <a:rPr lang="fr-FR" sz="600" b="1" i="0" u="none" strike="noStrike" dirty="0">
-                          <a:solidFill>
-                            <a:srgbClr val="FFFFFF"/>
-                          </a:solidFill>
-                          <a:effectLst/>
-                          <a:latin typeface="Calibri Light" panose="020F0302020204030204" pitchFamily="34" charset="0"/>
-                        </a:rPr>
-                        <a:t>Occuper</a:t>
-                      </a:r>
-                    </a:p>
-                  </a:txBody>
-                  <a:tcPr marL="0" marR="0" marT="0" marB="0" anchor="ctr">
-                    <a:lnL>
-                      <a:noFill/>
-                    </a:lnL>
-                    <a:lnR>
-                      <a:noFill/>
-                    </a:lnR>
-                    <a:lnT>
-                      <a:noFill/>
-                    </a:lnT>
-                    <a:lnB w="12700" cap="flat" cmpd="sng" algn="ctr">
-                      <a:solidFill>
-                        <a:schemeClr val="tx1"/>
-                      </a:solidFill>
-                      <a:prstDash val="solid"/>
-                      <a:round/>
-                      <a:headEnd type="none" w="med" len="med"/>
-                      <a:tailEnd type="none" w="med" len="med"/>
-                    </a:lnB>
-                    <a:solidFill>
-                      <a:schemeClr val="tx2"/>
-                    </a:solidFill>
-                  </a:tcPr>
-                </a:tc>
-                <a:tc>
-                  <a:txBody>
-                    <a:bodyPr/>
-                    <a:lstStyle/>
-                    <a:p>
-                      <a:pPr algn="ctr" fontAlgn="ctr"/>
-                      <a:r>
-                        <a:rPr lang="fr-FR" sz="600" b="1" i="0" u="none" strike="noStrike" dirty="0">
-                          <a:solidFill>
-                            <a:srgbClr val="FFFFFF"/>
-                          </a:solidFill>
-                          <a:effectLst/>
-                          <a:latin typeface="Calibri Light" panose="020F0302020204030204" pitchFamily="34" charset="0"/>
-                        </a:rPr>
-                        <a:t>Chauffer</a:t>
-                      </a:r>
-                    </a:p>
-                  </a:txBody>
-                  <a:tcPr marL="0" marR="0" marT="0" marB="0" anchor="ctr">
-                    <a:lnL>
-                      <a:noFill/>
-                    </a:lnL>
-                    <a:lnR>
-                      <a:noFill/>
-                    </a:lnR>
-                    <a:lnT>
-                      <a:noFill/>
-                    </a:lnT>
-                    <a:lnB w="12700" cap="flat" cmpd="sng" algn="ctr">
-                      <a:solidFill>
-                        <a:schemeClr val="tx1"/>
-                      </a:solidFill>
-                      <a:prstDash val="solid"/>
-                      <a:round/>
-                      <a:headEnd type="none" w="med" len="med"/>
-                      <a:tailEnd type="none" w="med" len="med"/>
-                    </a:lnB>
-                    <a:solidFill>
-                      <a:schemeClr val="tx2"/>
-                    </a:solidFill>
-                  </a:tcPr>
-                </a:tc>
-                <a:tc>
-                  <a:txBody>
-                    <a:bodyPr/>
-                    <a:lstStyle/>
-                    <a:p>
-                      <a:pPr algn="ctr" fontAlgn="ctr"/>
-                      <a:r>
-                        <a:rPr lang="fr-FR" sz="600" b="1" i="0" u="none" strike="noStrike" dirty="0">
-                          <a:solidFill>
-                            <a:srgbClr val="FFFFFF"/>
-                          </a:solidFill>
-                          <a:effectLst/>
-                          <a:latin typeface="Calibri Light" panose="020F0302020204030204" pitchFamily="34" charset="0"/>
-                        </a:rPr>
-                        <a:t>Occuper</a:t>
-                      </a:r>
-                    </a:p>
-                  </a:txBody>
-                  <a:tcPr marL="0" marR="0" marT="0" marB="0" anchor="ctr">
-                    <a:lnL>
-                      <a:noFill/>
-                    </a:lnL>
-                    <a:lnR>
-                      <a:noFill/>
-                    </a:lnR>
-                    <a:lnT>
-                      <a:noFill/>
-                    </a:lnT>
-                    <a:lnB w="12700" cap="flat" cmpd="sng" algn="ctr">
-                      <a:solidFill>
-                        <a:schemeClr val="tx1"/>
-                      </a:solidFill>
-                      <a:prstDash val="solid"/>
-                      <a:round/>
-                      <a:headEnd type="none" w="med" len="med"/>
-                      <a:tailEnd type="none" w="med" len="med"/>
-                    </a:lnB>
-                    <a:solidFill>
-                      <a:schemeClr val="tx2"/>
-                    </a:solidFill>
-                  </a:tcPr>
-                </a:tc>
-                <a:tc>
-                  <a:txBody>
-                    <a:bodyPr/>
-                    <a:lstStyle/>
-                    <a:p>
-                      <a:pPr algn="ctr" fontAlgn="ctr"/>
-                      <a:r>
-                        <a:rPr lang="fr-FR" sz="600" b="1" i="0" u="none" strike="noStrike" dirty="0">
-                          <a:solidFill>
-                            <a:srgbClr val="FFFFFF"/>
-                          </a:solidFill>
-                          <a:effectLst/>
-                          <a:latin typeface="Calibri Light" panose="020F0302020204030204" pitchFamily="34" charset="0"/>
-                        </a:rPr>
-                        <a:t>Chauffer</a:t>
-                      </a:r>
-                    </a:p>
-                  </a:txBody>
-                  <a:tcPr marL="0" marR="0" marT="0" marB="0" anchor="ctr">
-                    <a:lnL>
-                      <a:noFill/>
-                    </a:lnL>
-                    <a:lnR>
-                      <a:noFill/>
-                    </a:lnR>
-                    <a:lnT>
-                      <a:noFill/>
-                    </a:lnT>
-                    <a:lnB w="12700" cap="flat" cmpd="sng" algn="ctr">
-                      <a:solidFill>
-                        <a:schemeClr val="tx1"/>
-                      </a:solidFill>
-                      <a:prstDash val="solid"/>
-                      <a:round/>
-                      <a:headEnd type="none" w="med" len="med"/>
-                      <a:tailEnd type="none" w="med" len="med"/>
-                    </a:lnB>
-                    <a:solidFill>
-                      <a:schemeClr val="tx2"/>
-                    </a:solidFill>
-                  </a:tcPr>
-                </a:tc>
-                <a:tc>
-                  <a:txBody>
-                    <a:bodyPr/>
-                    <a:lstStyle/>
-                    <a:p>
-                      <a:pPr algn="ctr" fontAlgn="ctr"/>
-                      <a:r>
-                        <a:rPr lang="fr-FR" sz="600" b="1" i="0" u="none" strike="noStrike" dirty="0">
-                          <a:solidFill>
-                            <a:srgbClr val="FFFFFF"/>
-                          </a:solidFill>
-                          <a:effectLst/>
-                          <a:latin typeface="Calibri Light" panose="020F0302020204030204" pitchFamily="34" charset="0"/>
-                        </a:rPr>
-                        <a:t>Occuper</a:t>
-                      </a:r>
-                    </a:p>
-                  </a:txBody>
-                  <a:tcPr marL="0" marR="0" marT="0" marB="0" anchor="ctr">
-                    <a:lnL>
-                      <a:noFill/>
-                    </a:lnL>
-                    <a:lnR>
-                      <a:noFill/>
-                    </a:lnR>
-                    <a:lnT>
-                      <a:noFill/>
-                    </a:lnT>
-                    <a:lnB w="12700" cap="flat" cmpd="sng" algn="ctr">
-                      <a:solidFill>
-                        <a:schemeClr val="tx1"/>
-                      </a:solidFill>
-                      <a:prstDash val="solid"/>
-                      <a:round/>
-                      <a:headEnd type="none" w="med" len="med"/>
-                      <a:tailEnd type="none" w="med" len="med"/>
-                    </a:lnB>
-                    <a:solidFill>
-                      <a:schemeClr val="tx2"/>
-                    </a:solidFill>
-                  </a:tcPr>
-                </a:tc>
-                <a:tc>
-                  <a:txBody>
-                    <a:bodyPr/>
-                    <a:lstStyle/>
-                    <a:p>
-                      <a:pPr algn="ctr" fontAlgn="ctr"/>
-                      <a:r>
-                        <a:rPr lang="fr-FR" sz="600" b="1" i="0" u="none" strike="noStrike" dirty="0">
-                          <a:solidFill>
-                            <a:srgbClr val="FFFFFF"/>
-                          </a:solidFill>
-                          <a:effectLst/>
-                          <a:latin typeface="Calibri Light" panose="020F0302020204030204" pitchFamily="34" charset="0"/>
-                        </a:rPr>
-                        <a:t>Chauffer</a:t>
-                      </a:r>
-                    </a:p>
-                  </a:txBody>
-                  <a:tcPr marL="0" marR="0" marT="0" marB="0" anchor="ctr">
-                    <a:lnL>
-                      <a:noFill/>
-                    </a:lnL>
-                    <a:lnR>
-                      <a:noFill/>
-                    </a:lnR>
-                    <a:lnT>
-                      <a:noFill/>
-                    </a:lnT>
-                    <a:lnB w="12700" cap="flat" cmpd="sng" algn="ctr">
-                      <a:solidFill>
-                        <a:schemeClr val="tx1"/>
-                      </a:solidFill>
-                      <a:prstDash val="solid"/>
-                      <a:round/>
-                      <a:headEnd type="none" w="med" len="med"/>
-                      <a:tailEnd type="none" w="med" len="med"/>
-                    </a:lnB>
-                    <a:solidFill>
-                      <a:schemeClr val="tx2"/>
-                    </a:solidFill>
-                  </a:tcPr>
-                </a:tc>
-                <a:tc>
-                  <a:txBody>
-                    <a:bodyPr/>
-                    <a:lstStyle/>
-                    <a:p>
-                      <a:pPr algn="ctr" fontAlgn="ctr"/>
-                      <a:r>
-                        <a:rPr lang="fr-FR" sz="600" b="1" i="0" u="none" strike="noStrike" dirty="0">
-                          <a:solidFill>
-                            <a:srgbClr val="FFFFFF"/>
-                          </a:solidFill>
-                          <a:effectLst/>
-                          <a:latin typeface="Calibri Light" panose="020F0302020204030204" pitchFamily="34" charset="0"/>
-                        </a:rPr>
-                        <a:t>Occuper</a:t>
-                      </a:r>
-                    </a:p>
-                  </a:txBody>
-                  <a:tcPr marL="0" marR="0" marT="0" marB="0" anchor="ctr">
-                    <a:lnL>
-                      <a:noFill/>
-                    </a:lnL>
-                    <a:lnR>
-                      <a:noFill/>
-                    </a:lnR>
-                    <a:lnT>
-                      <a:noFill/>
-                    </a:lnT>
-                    <a:lnB w="12700" cap="flat" cmpd="sng" algn="ctr">
-                      <a:solidFill>
-                        <a:schemeClr val="tx1"/>
-                      </a:solidFill>
-                      <a:prstDash val="solid"/>
-                      <a:round/>
-                      <a:headEnd type="none" w="med" len="med"/>
-                      <a:tailEnd type="none" w="med" len="med"/>
-                    </a:lnB>
-                    <a:solidFill>
-                      <a:schemeClr val="tx2"/>
-                    </a:solidFill>
-                  </a:tcPr>
-                </a:tc>
-                <a:tc>
-                  <a:txBody>
-                    <a:bodyPr/>
-                    <a:lstStyle/>
-                    <a:p>
-                      <a:pPr algn="ctr" fontAlgn="ctr"/>
-                      <a:r>
-                        <a:rPr lang="fr-FR" sz="600" b="1" i="0" u="none" strike="noStrike" dirty="0">
-                          <a:solidFill>
-                            <a:srgbClr val="FFFFFF"/>
-                          </a:solidFill>
-                          <a:effectLst/>
-                          <a:latin typeface="Calibri Light" panose="020F0302020204030204" pitchFamily="34" charset="0"/>
-                        </a:rPr>
-                        <a:t>Chauffer</a:t>
-                      </a:r>
-                    </a:p>
-                  </a:txBody>
-                  <a:tcPr marL="0" marR="0" marT="0" marB="0" anchor="ctr">
-                    <a:lnL>
-                      <a:noFill/>
-                    </a:lnL>
-                    <a:lnR>
-                      <a:noFill/>
-                    </a:lnR>
-                    <a:lnT>
-                      <a:noFill/>
-                    </a:lnT>
-                    <a:lnB w="12700" cap="flat" cmpd="sng" algn="ctr">
-                      <a:solidFill>
-                        <a:schemeClr val="tx1"/>
-                      </a:solidFill>
-                      <a:prstDash val="solid"/>
-                      <a:round/>
-                      <a:headEnd type="none" w="med" len="med"/>
-                      <a:tailEnd type="none" w="med" len="med"/>
-                    </a:lnB>
-                    <a:solidFill>
-                      <a:schemeClr val="tx2"/>
-                    </a:solidFill>
-                  </a:tcPr>
-                </a:tc>
-                <a:tc>
-                  <a:txBody>
-                    <a:bodyPr/>
-                    <a:lstStyle/>
-                    <a:p>
-                      <a:pPr algn="ctr" fontAlgn="ctr"/>
-                      <a:r>
-                        <a:rPr lang="fr-FR" sz="600" b="1" i="0" u="none" strike="noStrike" dirty="0">
-                          <a:solidFill>
-                            <a:srgbClr val="FFFFFF"/>
-                          </a:solidFill>
-                          <a:effectLst/>
-                          <a:latin typeface="Calibri Light" panose="020F0302020204030204" pitchFamily="34" charset="0"/>
-                        </a:rPr>
-                        <a:t>Occuper</a:t>
-                      </a:r>
-                    </a:p>
-                  </a:txBody>
-                  <a:tcPr marL="0" marR="0" marT="0" marB="0" anchor="ctr">
-                    <a:lnL>
-                      <a:noFill/>
-                    </a:lnL>
-                    <a:lnR>
-                      <a:noFill/>
-                    </a:lnR>
-                    <a:lnT>
-                      <a:noFill/>
-                    </a:lnT>
-                    <a:lnB w="12700" cap="flat" cmpd="sng" algn="ctr">
-                      <a:solidFill>
-                        <a:schemeClr val="tx1"/>
-                      </a:solidFill>
-                      <a:prstDash val="solid"/>
-                      <a:round/>
-                      <a:headEnd type="none" w="med" len="med"/>
-                      <a:tailEnd type="none" w="med" len="med"/>
-                    </a:lnB>
-                    <a:solidFill>
-                      <a:schemeClr val="tx2"/>
-                    </a:solidFill>
-                  </a:tcPr>
-                </a:tc>
-                <a:tc>
-                  <a:txBody>
-                    <a:bodyPr/>
-                    <a:lstStyle/>
-                    <a:p>
-                      <a:pPr algn="ctr" fontAlgn="ctr"/>
-                      <a:r>
-                        <a:rPr lang="fr-FR" sz="600" b="1" i="0" u="none" strike="noStrike" dirty="0">
-                          <a:solidFill>
-                            <a:srgbClr val="FFFFFF"/>
-                          </a:solidFill>
-                          <a:effectLst/>
-                          <a:latin typeface="Calibri Light" panose="020F0302020204030204" pitchFamily="34" charset="0"/>
-                        </a:rPr>
-                        <a:t>Chauffer</a:t>
-                      </a:r>
-                    </a:p>
-                  </a:txBody>
-                  <a:tcPr marL="0" marR="0" marT="0" marB="0" anchor="ctr">
-                    <a:lnL>
-                      <a:noFill/>
-                    </a:lnL>
-                    <a:lnR>
-                      <a:noFill/>
-                    </a:lnR>
-                    <a:lnT>
-                      <a:noFill/>
-                    </a:lnT>
-                    <a:lnB w="12700" cap="flat" cmpd="sng" algn="ctr">
-                      <a:solidFill>
-                        <a:schemeClr val="tx1"/>
-                      </a:solidFill>
-                      <a:prstDash val="solid"/>
-                      <a:round/>
-                      <a:headEnd type="none" w="med" len="med"/>
-                      <a:tailEnd type="none" w="med" len="med"/>
-                    </a:lnB>
-                    <a:solidFill>
-                      <a:schemeClr val="tx2"/>
-                    </a:solidFill>
-                  </a:tcPr>
-                </a:tc>
-                <a:tc>
-                  <a:txBody>
-                    <a:bodyPr/>
-                    <a:lstStyle/>
-                    <a:p>
-                      <a:pPr algn="ctr" fontAlgn="ctr"/>
-                      <a:r>
-                        <a:rPr lang="fr-FR" sz="600" b="1" i="0" u="none" strike="noStrike" dirty="0">
-                          <a:solidFill>
-                            <a:srgbClr val="FFFFFF"/>
-                          </a:solidFill>
-                          <a:effectLst/>
-                          <a:latin typeface="Calibri Light" panose="020F0302020204030204" pitchFamily="34" charset="0"/>
-                        </a:rPr>
-                        <a:t>Occuper</a:t>
-                      </a:r>
-                    </a:p>
-                  </a:txBody>
-                  <a:tcPr marL="0" marR="0" marT="0" marB="0" anchor="ctr">
-                    <a:lnL>
-                      <a:noFill/>
-                    </a:lnL>
-                    <a:lnR>
-                      <a:noFill/>
-                    </a:lnR>
-                    <a:lnT>
-                      <a:noFill/>
-                    </a:lnT>
-                    <a:lnB w="12700" cap="flat" cmpd="sng" algn="ctr">
-                      <a:solidFill>
-                        <a:schemeClr val="tx1"/>
-                      </a:solidFill>
-                      <a:prstDash val="solid"/>
-                      <a:round/>
-                      <a:headEnd type="none" w="med" len="med"/>
-                      <a:tailEnd type="none" w="med" len="med"/>
-                    </a:lnB>
-                    <a:solidFill>
-                      <a:schemeClr val="tx2"/>
-                    </a:solidFill>
-                  </a:tcPr>
-                </a:tc>
-                <a:tc>
-                  <a:txBody>
-                    <a:bodyPr/>
-                    <a:lstStyle/>
-                    <a:p>
-                      <a:pPr algn="ctr" fontAlgn="ctr"/>
-                      <a:r>
-                        <a:rPr lang="fr-FR" sz="600" b="1" i="0" u="none" strike="noStrike" dirty="0">
-                          <a:solidFill>
-                            <a:srgbClr val="FFFFFF"/>
-                          </a:solidFill>
-                          <a:effectLst/>
-                          <a:latin typeface="Calibri Light" panose="020F0302020204030204" pitchFamily="34" charset="0"/>
-                        </a:rPr>
-                        <a:t>Chauffer</a:t>
-                      </a:r>
-                    </a:p>
-                  </a:txBody>
-                  <a:tcPr marL="0" marR="0" marT="0" marB="0" anchor="ctr">
-                    <a:lnL>
-                      <a:noFill/>
-                    </a:lnL>
-                    <a:lnR>
-                      <a:noFill/>
-                    </a:lnR>
-                    <a:lnT>
-                      <a:noFill/>
-                    </a:lnT>
-                    <a:lnB w="12700" cap="flat" cmpd="sng" algn="ctr">
-                      <a:solidFill>
-                        <a:schemeClr val="tx1"/>
-                      </a:solidFill>
-                      <a:prstDash val="solid"/>
-                      <a:round/>
-                      <a:headEnd type="none" w="med" len="med"/>
-                      <a:tailEnd type="none" w="med" len="med"/>
-                    </a:lnB>
-                    <a:solidFill>
-                      <a:schemeClr val="tx2"/>
-                    </a:solidFill>
-                  </a:tcPr>
-                </a:tc>
-                <a:tc>
-                  <a:txBody>
-                    <a:bodyPr/>
-                    <a:lstStyle/>
-                    <a:p>
-                      <a:pPr algn="ctr" fontAlgn="ctr"/>
-                      <a:r>
-                        <a:rPr lang="fr-FR" sz="600" b="1" i="0" u="none" strike="noStrike" dirty="0">
-                          <a:solidFill>
-                            <a:srgbClr val="FFFFFF"/>
-                          </a:solidFill>
-                          <a:effectLst/>
-                          <a:latin typeface="Calibri Light" panose="020F0302020204030204" pitchFamily="34" charset="0"/>
-                        </a:rPr>
-                        <a:t>Occuper</a:t>
-                      </a:r>
-                    </a:p>
-                  </a:txBody>
-                  <a:tcPr marL="0" marR="0" marT="0" marB="0" anchor="ctr">
-                    <a:lnL>
-                      <a:noFill/>
-                    </a:lnL>
-                    <a:lnR>
-                      <a:noFill/>
-                    </a:lnR>
-                    <a:lnT>
-                      <a:noFill/>
-                    </a:lnT>
-                    <a:lnB w="12700" cap="flat" cmpd="sng" algn="ctr">
-                      <a:solidFill>
-                        <a:schemeClr val="tx1"/>
-                      </a:solidFill>
-                      <a:prstDash val="solid"/>
-                      <a:round/>
-                      <a:headEnd type="none" w="med" len="med"/>
-                      <a:tailEnd type="none" w="med" len="med"/>
-                    </a:lnB>
-                    <a:solidFill>
-                      <a:schemeClr val="tx2"/>
-                    </a:solidFill>
-                  </a:tcPr>
-                </a:tc>
-                <a:tc>
-                  <a:txBody>
-                    <a:bodyPr/>
-                    <a:lstStyle/>
-                    <a:p>
-                      <a:pPr algn="ctr" fontAlgn="ctr"/>
-                      <a:r>
-                        <a:rPr lang="fr-FR" sz="600" b="1" i="0" u="none" strike="noStrike" dirty="0">
-                          <a:solidFill>
-                            <a:srgbClr val="FFFFFF"/>
-                          </a:solidFill>
-                          <a:effectLst/>
-                          <a:latin typeface="Calibri Light" panose="020F0302020204030204" pitchFamily="34" charset="0"/>
-                        </a:rPr>
-                        <a:t>Chauffer</a:t>
-                      </a:r>
-                    </a:p>
-                  </a:txBody>
-                  <a:tcPr marL="0" marR="0" marT="0" marB="0" anchor="ctr">
-                    <a:lnL>
-                      <a:noFill/>
-                    </a:lnL>
-                    <a:lnR w="12700" cap="flat" cmpd="sng" algn="ctr">
-                      <a:solidFill>
-                        <a:schemeClr val="tx1"/>
-                      </a:solidFill>
-                      <a:prstDash val="solid"/>
-                      <a:round/>
-                      <a:headEnd type="none" w="med" len="med"/>
-                      <a:tailEnd type="none" w="med" len="med"/>
-                    </a:lnR>
-                    <a:lnT>
-                      <a:noFill/>
-                    </a:lnT>
-                    <a:lnB w="12700" cap="flat" cmpd="sng" algn="ctr">
-                      <a:solidFill>
-                        <a:schemeClr val="tx1"/>
-                      </a:solidFill>
-                      <a:prstDash val="solid"/>
-                      <a:round/>
-                      <a:headEnd type="none" w="med" len="med"/>
-                      <a:tailEnd type="none" w="med" len="med"/>
-                    </a:lnB>
-                    <a:solidFill>
-                      <a:schemeClr val="tx2"/>
-                    </a:solidFill>
-                  </a:tcPr>
-                </a:tc>
                 <a:extLst>
                   <a:ext uri="{0D108BD9-81ED-4DB2-BD59-A6C34878D82A}">
-                    <a16:rowId xmlns:a16="http://schemas.microsoft.com/office/drawing/2014/main" val="1164603379"/>
+                    <a16:rowId xmlns:a16="http://schemas.microsoft.com/office/drawing/2014/main" val="1773314167"/>
                   </a:ext>
                 </a:extLst>
               </a:tr>
@@ -11293,8 +10592,12 @@
                     <a:lnL>
                       <a:noFill/>
                     </a:lnL>
-                    <a:lnR>
-                      <a:noFill/>
+                    <a:lnR w="12700" cap="flat" cmpd="sng" algn="ctr">
+                      <a:noFill/>
+                      <a:prstDash val="solid"/>
+                      <a:round/>
+                      <a:headEnd type="none" w="med" len="med"/>
+                      <a:tailEnd type="none" w="med" len="med"/>
                     </a:lnR>
                     <a:lnT w="12700" cap="flat" cmpd="sng" algn="ctr">
                       <a:solidFill>
@@ -11317,7 +10620,7 @@
                     <a:p>
                       <a:pPr algn="ctr" fontAlgn="ctr"/>
                       <a:r>
-                        <a:rPr kumimoji="0" lang="fr-FR" sz="300" b="0" i="0" u="none" strike="noStrike" kern="1200" cap="none" spc="0" normalizeH="0" baseline="0" noProof="0" dirty="0">
+                        <a:rPr kumimoji="0" lang="fr-FR" sz="700" b="0" i="0" u="none" strike="noStrike" kern="1200" cap="none" spc="0" normalizeH="0" baseline="0" noProof="0" dirty="0">
                           <a:ln>
                             <a:noFill/>
                           </a:ln>
@@ -11333,7 +10636,7 @@
                         </a:rPr>
                         <a:t>50031210892940</a:t>
                       </a:r>
-                      <a:endParaRPr lang="fr-FR" sz="300" b="1" i="0" u="none" strike="noStrike" dirty="0">
+                      <a:endParaRPr lang="fr-FR" sz="700" b="0" i="0" u="none" strike="noStrike" dirty="0">
                         <a:solidFill>
                           <a:srgbClr val="222B35"/>
                         </a:solidFill>
@@ -11343,11 +10646,19 @@
                     </a:p>
                   </a:txBody>
                   <a:tcPr marL="0" marR="0" marT="0" marB="0" anchor="ctr">
-                    <a:lnL>
-                      <a:noFill/>
+                    <a:lnL w="12700" cap="flat" cmpd="sng" algn="ctr">
+                      <a:noFill/>
+                      <a:prstDash val="solid"/>
+                      <a:round/>
+                      <a:headEnd type="none" w="med" len="med"/>
+                      <a:tailEnd type="none" w="med" len="med"/>
                     </a:lnL>
-                    <a:lnR>
-                      <a:noFill/>
+                    <a:lnR w="12700" cap="flat" cmpd="sng" algn="ctr">
+                      <a:noFill/>
+                      <a:prstDash val="solid"/>
+                      <a:round/>
+                      <a:headEnd type="none" w="med" len="med"/>
+                      <a:tailEnd type="none" w="med" len="med"/>
                     </a:lnR>
                     <a:lnT w="12700" cap="flat" cmpd="sng" algn="ctr">
                       <a:solidFill>
@@ -11358,9 +10669,21 @@
                       <a:headEnd type="none" w="med" len="med"/>
                       <a:tailEnd type="none" w="med" len="med"/>
                     </a:lnT>
-                    <a:lnB>
-                      <a:noFill/>
+                    <a:lnB w="12700" cap="flat" cmpd="sng" algn="ctr">
+                      <a:noFill/>
+                      <a:prstDash val="solid"/>
+                      <a:round/>
+                      <a:headEnd type="none" w="med" len="med"/>
+                      <a:tailEnd type="none" w="med" len="med"/>
                     </a:lnB>
+                    <a:lnTlToBr w="12700" cmpd="sng">
+                      <a:noFill/>
+                      <a:prstDash val="solid"/>
+                    </a:lnTlToBr>
+                    <a:lnBlToTr w="12700" cmpd="sng">
+                      <a:noFill/>
+                      <a:prstDash val="solid"/>
+                    </a:lnBlToTr>
                   </a:tcPr>
                 </a:tc>
                 <a:tc>
@@ -11370,7 +10693,7 @@
                     <a:p>
                       <a:pPr algn="ctr" fontAlgn="ctr"/>
                       <a:r>
-                        <a:rPr kumimoji="0" lang="fr-FR" sz="300" b="0" i="0" u="none" strike="noStrike" kern="1200" cap="none" spc="0" normalizeH="0" baseline="0" noProof="0" dirty="0">
+                        <a:rPr kumimoji="0" lang="fr-FR" sz="700" b="0" i="0" u="none" strike="noStrike" kern="1200" cap="none" spc="0" normalizeH="0" baseline="0" noProof="0" dirty="0">
                           <a:ln>
                             <a:noFill/>
                           </a:ln>
@@ -11386,7 +10709,7 @@
                         </a:rPr>
                         <a:t>50031210892940</a:t>
                       </a:r>
-                      <a:endParaRPr lang="fr-FR" sz="300" b="1" i="0" u="none" strike="noStrike" dirty="0">
+                      <a:endParaRPr lang="fr-FR" sz="700" b="0" i="0" u="none" strike="noStrike" dirty="0">
                         <a:solidFill>
                           <a:srgbClr val="222B35"/>
                         </a:solidFill>
@@ -11396,8 +10719,12 @@
                     </a:p>
                   </a:txBody>
                   <a:tcPr marL="0" marR="0" marT="0" marB="0" anchor="ctr">
-                    <a:lnL>
-                      <a:noFill/>
+                    <a:lnL w="12700" cap="flat" cmpd="sng" algn="ctr">
+                      <a:noFill/>
+                      <a:prstDash val="solid"/>
+                      <a:round/>
+                      <a:headEnd type="none" w="med" len="med"/>
+                      <a:tailEnd type="none" w="med" len="med"/>
                     </a:lnL>
                     <a:lnR>
                       <a:noFill/>
@@ -11423,7 +10750,7 @@
                     <a:p>
                       <a:pPr algn="ctr" fontAlgn="ctr"/>
                       <a:r>
-                        <a:rPr kumimoji="0" lang="fr-FR" sz="300" b="0" i="0" u="none" strike="noStrike" kern="1200" cap="none" spc="0" normalizeH="0" baseline="0" noProof="0" dirty="0">
+                        <a:rPr kumimoji="0" lang="fr-FR" sz="700" b="0" i="0" u="none" strike="noStrike" kern="1200" cap="none" spc="0" normalizeH="0" baseline="0" noProof="0" dirty="0">
                           <a:ln>
                             <a:noFill/>
                           </a:ln>
@@ -11439,7 +10766,7 @@
                         </a:rPr>
                         <a:t>50031210892940</a:t>
                       </a:r>
-                      <a:endParaRPr lang="fr-FR" sz="300" b="0" i="0" u="none" strike="noStrike" dirty="0">
+                      <a:endParaRPr lang="fr-FR" sz="700" b="0" i="0" u="none" strike="noStrike" dirty="0">
                         <a:solidFill>
                           <a:srgbClr val="222B35"/>
                         </a:solidFill>
@@ -11476,7 +10803,7 @@
                     <a:p>
                       <a:pPr algn="ctr" fontAlgn="ctr"/>
                       <a:r>
-                        <a:rPr kumimoji="0" lang="fr-FR" sz="300" b="0" i="0" u="none" strike="noStrike" kern="1200" cap="none" spc="0" normalizeH="0" baseline="0" noProof="0" dirty="0">
+                        <a:rPr kumimoji="0" lang="fr-FR" sz="700" b="0" i="0" u="none" strike="noStrike" kern="1200" cap="none" spc="0" normalizeH="0" baseline="0" noProof="0" dirty="0">
                           <a:ln>
                             <a:noFill/>
                           </a:ln>
@@ -11492,7 +10819,7 @@
                         </a:rPr>
                         <a:t>50031210892940</a:t>
                       </a:r>
-                      <a:endParaRPr lang="fr-FR" sz="300" b="0" i="0" u="none" strike="noStrike" dirty="0">
+                      <a:endParaRPr lang="fr-FR" sz="700" b="0" i="0" u="none" strike="noStrike" dirty="0">
                         <a:solidFill>
                           <a:srgbClr val="222B35"/>
                         </a:solidFill>
@@ -11529,7 +10856,7 @@
                     <a:p>
                       <a:pPr algn="ctr" fontAlgn="ctr"/>
                       <a:r>
-                        <a:rPr kumimoji="0" lang="fr-FR" sz="300" b="0" i="0" u="none" strike="noStrike" kern="1200" cap="none" spc="0" normalizeH="0" baseline="0" noProof="0">
+                        <a:rPr kumimoji="0" lang="fr-FR" sz="700" b="0" i="0" u="none" strike="noStrike" kern="1200" cap="none" spc="0" normalizeH="0" baseline="0" noProof="0" dirty="0">
                           <a:ln>
                             <a:noFill/>
                           </a:ln>
@@ -11545,7 +10872,7 @@
                         </a:rPr>
                         <a:t>50031210892940</a:t>
                       </a:r>
-                      <a:endParaRPr lang="fr-FR" sz="300" b="0" i="0" u="none" strike="noStrike">
+                      <a:endParaRPr lang="fr-FR" sz="700" b="0" i="0" u="none" strike="noStrike" dirty="0">
                         <a:solidFill>
                           <a:srgbClr val="222B35"/>
                         </a:solidFill>
@@ -11582,7 +10909,7 @@
                     <a:p>
                       <a:pPr algn="ctr" fontAlgn="ctr"/>
                       <a:r>
-                        <a:rPr kumimoji="0" lang="fr-FR" sz="300" b="0" i="0" u="none" strike="noStrike" kern="1200" cap="none" spc="0" normalizeH="0" baseline="0" noProof="0" dirty="0">
+                        <a:rPr kumimoji="0" lang="fr-FR" sz="700" b="0" i="0" u="none" strike="noStrike" kern="1200" cap="none" spc="0" normalizeH="0" baseline="0" noProof="0" dirty="0">
                           <a:ln>
                             <a:noFill/>
                           </a:ln>
@@ -11598,7 +10925,7 @@
                         </a:rPr>
                         <a:t>50031210892940</a:t>
                       </a:r>
-                      <a:endParaRPr lang="fr-FR" sz="300" b="0" i="0" u="none" strike="noStrike" dirty="0">
+                      <a:endParaRPr lang="fr-FR" sz="700" b="0" i="0" u="none" strike="noStrike" dirty="0">
                         <a:solidFill>
                           <a:srgbClr val="222B35"/>
                         </a:solidFill>
@@ -11635,7 +10962,7 @@
                     <a:p>
                       <a:pPr algn="ctr" fontAlgn="ctr"/>
                       <a:r>
-                        <a:rPr kumimoji="0" lang="fr-FR" sz="300" b="0" i="0" u="none" strike="noStrike" kern="1200" cap="none" spc="0" normalizeH="0" baseline="0" noProof="0">
+                        <a:rPr kumimoji="0" lang="fr-FR" sz="700" b="0" i="0" u="none" strike="noStrike" kern="1200" cap="none" spc="0" normalizeH="0" baseline="0" noProof="0" dirty="0">
                           <a:ln>
                             <a:noFill/>
                           </a:ln>
@@ -11651,378 +10978,7 @@
                         </a:rPr>
                         <a:t>50031210892940</a:t>
                       </a:r>
-                      <a:endParaRPr lang="fr-FR" sz="300" b="0" i="0" u="none" strike="noStrike" dirty="0">
-                        <a:solidFill>
-                          <a:srgbClr val="222B35"/>
-                        </a:solidFill>
-                        <a:effectLst/>
-                        <a:latin typeface="Calibri Light" panose="020F0302020204030204" pitchFamily="34" charset="0"/>
-                      </a:endParaRPr>
-                    </a:p>
-                  </a:txBody>
-                  <a:tcPr marL="0" marR="0" marT="0" marB="0" anchor="ctr">
-                    <a:lnL>
-                      <a:noFill/>
-                    </a:lnL>
-                    <a:lnR>
-                      <a:noFill/>
-                    </a:lnR>
-                    <a:lnT w="12700" cap="flat" cmpd="sng" algn="ctr">
-                      <a:solidFill>
-                        <a:schemeClr val="tx1"/>
-                      </a:solidFill>
-                      <a:prstDash val="solid"/>
-                      <a:round/>
-                      <a:headEnd type="none" w="med" len="med"/>
-                      <a:tailEnd type="none" w="med" len="med"/>
-                    </a:lnT>
-                    <a:lnB>
-                      <a:noFill/>
-                    </a:lnB>
-                  </a:tcPr>
-                </a:tc>
-                <a:tc>
-                  <a:txBody>
-                    <a:bodyPr/>
-                    <a:lstStyle/>
-                    <a:p>
-                      <a:pPr algn="ctr" fontAlgn="ctr"/>
-                      <a:r>
-                        <a:rPr kumimoji="0" lang="fr-FR" sz="300" b="0" i="0" u="none" strike="noStrike" kern="1200" cap="none" spc="0" normalizeH="0" baseline="0" noProof="0" dirty="0">
-                          <a:ln>
-                            <a:noFill/>
-                          </a:ln>
-                          <a:solidFill>
-                            <a:srgbClr val="222B35"/>
-                          </a:solidFill>
-                          <a:effectLst/>
-                          <a:uLnTx/>
-                          <a:uFillTx/>
-                          <a:latin typeface="Calibri Light" panose="020F0302020204030204" pitchFamily="34" charset="0"/>
-                          <a:ea typeface="+mn-ea"/>
-                          <a:cs typeface="+mn-cs"/>
-                        </a:rPr>
-                        <a:t>50031210892940</a:t>
-                      </a:r>
-                      <a:endParaRPr lang="fr-FR" sz="300" b="0" i="0" u="none" strike="noStrike" dirty="0">
-                        <a:solidFill>
-                          <a:srgbClr val="222B35"/>
-                        </a:solidFill>
-                        <a:effectLst/>
-                        <a:latin typeface="Calibri Light" panose="020F0302020204030204" pitchFamily="34" charset="0"/>
-                      </a:endParaRPr>
-                    </a:p>
-                  </a:txBody>
-                  <a:tcPr marL="0" marR="0" marT="0" marB="0" anchor="ctr">
-                    <a:lnL>
-                      <a:noFill/>
-                    </a:lnL>
-                    <a:lnR>
-                      <a:noFill/>
-                    </a:lnR>
-                    <a:lnT w="12700" cap="flat" cmpd="sng" algn="ctr">
-                      <a:solidFill>
-                        <a:schemeClr val="tx1"/>
-                      </a:solidFill>
-                      <a:prstDash val="solid"/>
-                      <a:round/>
-                      <a:headEnd type="none" w="med" len="med"/>
-                      <a:tailEnd type="none" w="med" len="med"/>
-                    </a:lnT>
-                    <a:lnB>
-                      <a:noFill/>
-                    </a:lnB>
-                  </a:tcPr>
-                </a:tc>
-                <a:tc>
-                  <a:txBody>
-                    <a:bodyPr/>
-                    <a:lstStyle/>
-                    <a:p>
-                      <a:pPr algn="ctr" fontAlgn="ctr"/>
-                      <a:r>
-                        <a:rPr kumimoji="0" lang="fr-FR" sz="300" b="0" i="0" u="none" strike="noStrike" kern="1200" cap="none" spc="0" normalizeH="0" baseline="0" noProof="0">
-                          <a:ln>
-                            <a:noFill/>
-                          </a:ln>
-                          <a:solidFill>
-                            <a:srgbClr val="222B35"/>
-                          </a:solidFill>
-                          <a:effectLst/>
-                          <a:uLnTx/>
-                          <a:uFillTx/>
-                          <a:latin typeface="Calibri Light" panose="020F0302020204030204" pitchFamily="34" charset="0"/>
-                          <a:ea typeface="+mn-ea"/>
-                          <a:cs typeface="+mn-cs"/>
-                        </a:rPr>
-                        <a:t>50031210892940</a:t>
-                      </a:r>
-                      <a:endParaRPr lang="fr-FR" sz="300" b="0" i="0" u="none" strike="noStrike" dirty="0">
-                        <a:solidFill>
-                          <a:srgbClr val="222B35"/>
-                        </a:solidFill>
-                        <a:effectLst/>
-                        <a:latin typeface="Calibri Light" panose="020F0302020204030204" pitchFamily="34" charset="0"/>
-                      </a:endParaRPr>
-                    </a:p>
-                  </a:txBody>
-                  <a:tcPr marL="0" marR="0" marT="0" marB="0" anchor="ctr">
-                    <a:lnL>
-                      <a:noFill/>
-                    </a:lnL>
-                    <a:lnR>
-                      <a:noFill/>
-                    </a:lnR>
-                    <a:lnT w="12700" cap="flat" cmpd="sng" algn="ctr">
-                      <a:solidFill>
-                        <a:schemeClr val="tx1"/>
-                      </a:solidFill>
-                      <a:prstDash val="solid"/>
-                      <a:round/>
-                      <a:headEnd type="none" w="med" len="med"/>
-                      <a:tailEnd type="none" w="med" len="med"/>
-                    </a:lnT>
-                    <a:lnB>
-                      <a:noFill/>
-                    </a:lnB>
-                  </a:tcPr>
-                </a:tc>
-                <a:tc>
-                  <a:txBody>
-                    <a:bodyPr/>
-                    <a:lstStyle/>
-                    <a:p>
-                      <a:pPr algn="ctr" fontAlgn="ctr"/>
-                      <a:r>
-                        <a:rPr kumimoji="0" lang="fr-FR" sz="300" b="0" i="0" u="none" strike="noStrike" kern="1200" cap="none" spc="0" normalizeH="0" baseline="0" noProof="0">
-                          <a:ln>
-                            <a:noFill/>
-                          </a:ln>
-                          <a:solidFill>
-                            <a:srgbClr val="222B35"/>
-                          </a:solidFill>
-                          <a:effectLst/>
-                          <a:uLnTx/>
-                          <a:uFillTx/>
-                          <a:latin typeface="Calibri Light" panose="020F0302020204030204" pitchFamily="34" charset="0"/>
-                          <a:ea typeface="+mn-ea"/>
-                          <a:cs typeface="+mn-cs"/>
-                        </a:rPr>
-                        <a:t>50031210892940</a:t>
-                      </a:r>
-                      <a:endParaRPr lang="fr-FR" sz="300" b="0" i="0" u="none" strike="noStrike" dirty="0">
-                        <a:solidFill>
-                          <a:srgbClr val="222B35"/>
-                        </a:solidFill>
-                        <a:effectLst/>
-                        <a:latin typeface="Calibri Light" panose="020F0302020204030204" pitchFamily="34" charset="0"/>
-                      </a:endParaRPr>
-                    </a:p>
-                  </a:txBody>
-                  <a:tcPr marL="0" marR="0" marT="0" marB="0" anchor="ctr">
-                    <a:lnL>
-                      <a:noFill/>
-                    </a:lnL>
-                    <a:lnR>
-                      <a:noFill/>
-                    </a:lnR>
-                    <a:lnT w="12700" cap="flat" cmpd="sng" algn="ctr">
-                      <a:solidFill>
-                        <a:schemeClr val="tx1"/>
-                      </a:solidFill>
-                      <a:prstDash val="solid"/>
-                      <a:round/>
-                      <a:headEnd type="none" w="med" len="med"/>
-                      <a:tailEnd type="none" w="med" len="med"/>
-                    </a:lnT>
-                    <a:lnB>
-                      <a:noFill/>
-                    </a:lnB>
-                  </a:tcPr>
-                </a:tc>
-                <a:tc>
-                  <a:txBody>
-                    <a:bodyPr/>
-                    <a:lstStyle/>
-                    <a:p>
-                      <a:pPr algn="ctr" fontAlgn="ctr"/>
-                      <a:r>
-                        <a:rPr kumimoji="0" lang="fr-FR" sz="300" b="0" i="0" u="none" strike="noStrike" kern="1200" cap="none" spc="0" normalizeH="0" baseline="0" noProof="0">
-                          <a:ln>
-                            <a:noFill/>
-                          </a:ln>
-                          <a:solidFill>
-                            <a:srgbClr val="222B35"/>
-                          </a:solidFill>
-                          <a:effectLst/>
-                          <a:uLnTx/>
-                          <a:uFillTx/>
-                          <a:latin typeface="Calibri Light" panose="020F0302020204030204" pitchFamily="34" charset="0"/>
-                          <a:ea typeface="+mn-ea"/>
-                          <a:cs typeface="+mn-cs"/>
-                        </a:rPr>
-                        <a:t>50031210892940</a:t>
-                      </a:r>
-                      <a:endParaRPr lang="fr-FR" sz="300" b="0" i="0" u="none" strike="noStrike" dirty="0">
-                        <a:solidFill>
-                          <a:srgbClr val="222B35"/>
-                        </a:solidFill>
-                        <a:effectLst/>
-                        <a:latin typeface="Calibri Light" panose="020F0302020204030204" pitchFamily="34" charset="0"/>
-                      </a:endParaRPr>
-                    </a:p>
-                  </a:txBody>
-                  <a:tcPr marL="0" marR="0" marT="0" marB="0" anchor="ctr">
-                    <a:lnL>
-                      <a:noFill/>
-                    </a:lnL>
-                    <a:lnR>
-                      <a:noFill/>
-                    </a:lnR>
-                    <a:lnT w="12700" cap="flat" cmpd="sng" algn="ctr">
-                      <a:solidFill>
-                        <a:schemeClr val="tx1"/>
-                      </a:solidFill>
-                      <a:prstDash val="solid"/>
-                      <a:round/>
-                      <a:headEnd type="none" w="med" len="med"/>
-                      <a:tailEnd type="none" w="med" len="med"/>
-                    </a:lnT>
-                    <a:lnB>
-                      <a:noFill/>
-                    </a:lnB>
-                  </a:tcPr>
-                </a:tc>
-                <a:tc>
-                  <a:txBody>
-                    <a:bodyPr/>
-                    <a:lstStyle/>
-                    <a:p>
-                      <a:pPr algn="ctr" fontAlgn="ctr"/>
-                      <a:r>
-                        <a:rPr kumimoji="0" lang="fr-FR" sz="300" b="0" i="0" u="none" strike="noStrike" kern="1200" cap="none" spc="0" normalizeH="0" baseline="0" noProof="0">
-                          <a:ln>
-                            <a:noFill/>
-                          </a:ln>
-                          <a:solidFill>
-                            <a:srgbClr val="222B35"/>
-                          </a:solidFill>
-                          <a:effectLst/>
-                          <a:uLnTx/>
-                          <a:uFillTx/>
-                          <a:latin typeface="Calibri Light" panose="020F0302020204030204" pitchFamily="34" charset="0"/>
-                          <a:ea typeface="+mn-ea"/>
-                          <a:cs typeface="+mn-cs"/>
-                        </a:rPr>
-                        <a:t>50031210892940</a:t>
-                      </a:r>
-                      <a:endParaRPr lang="fr-FR" sz="300" b="0" i="0" u="none" strike="noStrike" dirty="0">
-                        <a:solidFill>
-                          <a:srgbClr val="222B35"/>
-                        </a:solidFill>
-                        <a:effectLst/>
-                        <a:latin typeface="Calibri Light" panose="020F0302020204030204" pitchFamily="34" charset="0"/>
-                      </a:endParaRPr>
-                    </a:p>
-                  </a:txBody>
-                  <a:tcPr marL="0" marR="0" marT="0" marB="0" anchor="ctr">
-                    <a:lnL>
-                      <a:noFill/>
-                    </a:lnL>
-                    <a:lnR>
-                      <a:noFill/>
-                    </a:lnR>
-                    <a:lnT w="12700" cap="flat" cmpd="sng" algn="ctr">
-                      <a:solidFill>
-                        <a:schemeClr val="tx1"/>
-                      </a:solidFill>
-                      <a:prstDash val="solid"/>
-                      <a:round/>
-                      <a:headEnd type="none" w="med" len="med"/>
-                      <a:tailEnd type="none" w="med" len="med"/>
-                    </a:lnT>
-                    <a:lnB>
-                      <a:noFill/>
-                    </a:lnB>
-                  </a:tcPr>
-                </a:tc>
-                <a:tc>
-                  <a:txBody>
-                    <a:bodyPr/>
-                    <a:lstStyle/>
-                    <a:p>
-                      <a:pPr algn="ctr" fontAlgn="ctr"/>
-                      <a:r>
-                        <a:rPr kumimoji="0" lang="fr-FR" sz="300" b="0" i="0" u="none" strike="noStrike" kern="1200" cap="none" spc="0" normalizeH="0" baseline="0" noProof="0" dirty="0">
-                          <a:ln>
-                            <a:noFill/>
-                          </a:ln>
-                          <a:solidFill>
-                            <a:srgbClr val="222B35"/>
-                          </a:solidFill>
-                          <a:effectLst/>
-                          <a:uLnTx/>
-                          <a:uFillTx/>
-                          <a:latin typeface="Calibri Light" panose="020F0302020204030204" pitchFamily="34" charset="0"/>
-                          <a:ea typeface="+mn-ea"/>
-                          <a:cs typeface="+mn-cs"/>
-                        </a:rPr>
-                        <a:t>50031210892940</a:t>
-                      </a:r>
-                      <a:endParaRPr lang="fr-FR" sz="300" b="0" i="0" u="none" strike="noStrike" dirty="0">
-                        <a:solidFill>
-                          <a:srgbClr val="222B35"/>
-                        </a:solidFill>
-                        <a:effectLst/>
-                        <a:latin typeface="Calibri Light" panose="020F0302020204030204" pitchFamily="34" charset="0"/>
-                      </a:endParaRPr>
-                    </a:p>
-                  </a:txBody>
-                  <a:tcPr marL="0" marR="0" marT="0" marB="0" anchor="ctr">
-                    <a:lnL>
-                      <a:noFill/>
-                    </a:lnL>
-                    <a:lnR>
-                      <a:noFill/>
-                    </a:lnR>
-                    <a:lnT w="12700" cap="flat" cmpd="sng" algn="ctr">
-                      <a:solidFill>
-                        <a:schemeClr val="tx1"/>
-                      </a:solidFill>
-                      <a:prstDash val="solid"/>
-                      <a:round/>
-                      <a:headEnd type="none" w="med" len="med"/>
-                      <a:tailEnd type="none" w="med" len="med"/>
-                    </a:lnT>
-                    <a:lnB>
-                      <a:noFill/>
-                    </a:lnB>
-                  </a:tcPr>
-                </a:tc>
-                <a:tc>
-                  <a:txBody>
-                    <a:bodyPr/>
-                    <a:lstStyle/>
-                    <a:p>
-                      <a:pPr algn="ctr" fontAlgn="ctr"/>
-                      <a:r>
-                        <a:rPr kumimoji="0" lang="fr-FR" sz="300" b="0" i="0" u="none" strike="noStrike" kern="1200" cap="none" spc="0" normalizeH="0" baseline="0" noProof="0" dirty="0">
-                          <a:ln>
-                            <a:noFill/>
-                          </a:ln>
-                          <a:solidFill>
-                            <a:srgbClr val="222B35"/>
-                          </a:solidFill>
-                          <a:effectLst/>
-                          <a:uLnTx/>
-                          <a:uFillTx/>
-                          <a:latin typeface="Calibri Light" panose="020F0302020204030204" pitchFamily="34" charset="0"/>
-                          <a:ea typeface="+mn-ea"/>
-                          <a:cs typeface="+mn-cs"/>
-                        </a:rPr>
-                        <a:t>50031210892940</a:t>
-                      </a:r>
-                      <a:endParaRPr lang="fr-FR" sz="300" b="0" i="0" u="none" strike="noStrike" dirty="0">
+                      <a:endParaRPr lang="fr-FR" sz="700" b="0" i="0" u="none" strike="noStrike" dirty="0">
                         <a:solidFill>
                           <a:srgbClr val="222B35"/>
                         </a:solidFill>
@@ -12062,6 +11018,46 @@
           </a:graphicData>
         </a:graphic>
       </p:graphicFrame>
+      <p:sp>
+        <p:nvSpPr>
+          <p:cNvPr id="9" name="ZoneTexte 8">
+            <a:extLst>
+              <a:ext uri="{FF2B5EF4-FFF2-40B4-BE49-F238E27FC236}">
+                <a16:creationId xmlns:a16="http://schemas.microsoft.com/office/drawing/2014/main" id="{F8C35876-63A1-2873-FC06-DC0F7F6A18E7}"/>
+              </a:ext>
+            </a:extLst>
+          </p:cNvPr>
+          <p:cNvSpPr txBox="1"/>
+          <p:nvPr/>
+        </p:nvSpPr>
+        <p:spPr>
+          <a:xfrm>
+            <a:off x="0" y="6610497"/>
+            <a:ext cx="2032608" cy="276999"/>
+          </a:xfrm>
+          <a:prstGeom prst="rect">
+            <a:avLst/>
+          </a:prstGeom>
+          <a:noFill/>
+        </p:spPr>
+        <p:txBody>
+          <a:bodyPr wrap="none" rtlCol="0">
+            <a:spAutoFit/>
+          </a:bodyPr>
+          <a:lstStyle/>
+          <a:p>
+            <a:pPr algn="l"/>
+            <a:r>
+              <a:rPr lang="fr-FR" sz="1200"/>
+              <a:t>Occuper : 🙂 </a:t>
+            </a:r>
+            <a:r>
+              <a:rPr lang="fr-FR" sz="1200" dirty="0"/>
+              <a:t>/ Chauffer : 🔥  </a:t>
+            </a:r>
+          </a:p>
+        </p:txBody>
+      </p:sp>
     </p:spTree>
     <p:extLst>
       <p:ext uri="{BB962C8B-B14F-4D97-AF65-F5344CB8AC3E}">
@@ -16982,76 +15978,16 @@
         <a:srgbClr val="954F72"/>
       </a:folHlink>
     </a:clrScheme>
-    <a:fontScheme name="Century Gothic">
+    <a:fontScheme name="super polices">
       <a:majorFont>
-        <a:latin typeface="Century Gothic" panose="020F0302020204030204"/>
+        <a:latin typeface="Calibri Light"/>
         <a:ea typeface=""/>
         <a:cs typeface=""/>
-        <a:font script="Jpan" typeface="メイリオ"/>
-        <a:font script="Hang" typeface="맑은 고딕"/>
-        <a:font script="Hans" typeface="宋体"/>
-        <a:font script="Hant" typeface="新細明體"/>
-        <a:font script="Arab" typeface="Times New Roman"/>
-        <a:font script="Hebr" typeface="Times New Roman"/>
-        <a:font script="Thai" typeface="Angsana New"/>
-        <a:font script="Ethi" typeface="Nyala"/>
-        <a:font script="Beng" typeface="Vrinda"/>
-        <a:font script="Gujr" typeface="Shruti"/>
-        <a:font script="Khmr" typeface="MoolBoran"/>
-        <a:font script="Knda" typeface="Tunga"/>
-        <a:font script="Guru" typeface="Raavi"/>
-        <a:font script="Cans" typeface="Euphemia"/>
-        <a:font script="Cher" typeface="Plantagenet Cherokee"/>
-        <a:font script="Yiii" typeface="Microsoft Yi Baiti"/>
-        <a:font script="Tibt" typeface="Microsoft Himalaya"/>
-        <a:font script="Thaa" typeface="MV Boli"/>
-        <a:font script="Deva" typeface="Mangal"/>
-        <a:font script="Telu" typeface="Gautami"/>
-        <a:font script="Taml" typeface="Latha"/>
-        <a:font script="Syrc" typeface="Estrangelo Edessa"/>
-        <a:font script="Orya" typeface="Kalinga"/>
-        <a:font script="Mlym" typeface="Kartika"/>
-        <a:font script="Laoo" typeface="DokChampa"/>
-        <a:font script="Sinh" typeface="Iskoola Pota"/>
-        <a:font script="Mong" typeface="Mongolian Baiti"/>
-        <a:font script="Viet" typeface="Times New Roman"/>
-        <a:font script="Uigh" typeface="Microsoft Uighur"/>
-        <a:font script="Geor" typeface="Sylfaen"/>
       </a:majorFont>
       <a:minorFont>
-        <a:latin typeface="Century Gothic" panose="020F0302020204030204"/>
+        <a:latin typeface="Calibri Light"/>
         <a:ea typeface=""/>
         <a:cs typeface=""/>
-        <a:font script="Jpan" typeface="メイリオ"/>
-        <a:font script="Hang" typeface="맑은 고딕"/>
-        <a:font script="Hans" typeface="宋体"/>
-        <a:font script="Hant" typeface="新細明體"/>
-        <a:font script="Arab" typeface="Arial"/>
-        <a:font script="Hebr" typeface="Arial"/>
-        <a:font script="Thai" typeface="Cordia New"/>
-        <a:font script="Ethi" typeface="Nyala"/>
-        <a:font script="Beng" typeface="Vrinda"/>
-        <a:font script="Gujr" typeface="Shruti"/>
-        <a:font script="Khmr" typeface="DaunPenh"/>
-        <a:font script="Knda" typeface="Tunga"/>
-        <a:font script="Guru" typeface="Raavi"/>
-        <a:font script="Cans" typeface="Euphemia"/>
-        <a:font script="Cher" typeface="Plantagenet Cherokee"/>
-        <a:font script="Yiii" typeface="Microsoft Yi Baiti"/>
-        <a:font script="Tibt" typeface="Microsoft Himalaya"/>
-        <a:font script="Thaa" typeface="MV Boli"/>
-        <a:font script="Deva" typeface="Mangal"/>
-        <a:font script="Telu" typeface="Gautami"/>
-        <a:font script="Taml" typeface="Latha"/>
-        <a:font script="Syrc" typeface="Estrangelo Edessa"/>
-        <a:font script="Orya" typeface="Kalinga"/>
-        <a:font script="Mlym" typeface="Kartika"/>
-        <a:font script="Laoo" typeface="DokChampa"/>
-        <a:font script="Sinh" typeface="Iskoola Pota"/>
-        <a:font script="Mong" typeface="Mongolian Baiti"/>
-        <a:font script="Viet" typeface="Arial"/>
-        <a:font script="Uigh" typeface="Microsoft Uighur"/>
-        <a:font script="Geor" typeface="Sylfaen"/>
       </a:minorFont>
     </a:fontScheme>
     <a:fmtScheme name="Office">

</xml_diff>

<commit_message>
Création de nouvelles slides lorsqu'il y a trop d'éléments #30
</commit_message>
<xml_diff>
--- a/app/src/main/assets/powerpointvierge.pptx
+++ b/app/src/main/assets/powerpointvierge.pptx
@@ -210,7 +210,7 @@
           <a:p>
             <a:fld id="{8EF2C5CC-36BA-4C84-AC43-9F8430F4AE76}" type="datetimeFigureOut">
               <a:rPr lang="fr-FR" smtClean="0"/>
-              <a:t>03/07/2023</a:t>
+              <a:t>04/07/2023</a:t>
             </a:fld>
             <a:endParaRPr lang="fr-FR"/>
           </a:p>
@@ -11234,7 +11234,7 @@
           <p:nvPr>
             <p:extLst>
               <p:ext uri="{D42A27DB-BD31-4B8C-83A1-F6EECF244321}">
-                <p14:modId xmlns:p14="http://schemas.microsoft.com/office/powerpoint/2010/main" val="3300877035"/>
+                <p14:modId xmlns:p14="http://schemas.microsoft.com/office/powerpoint/2010/main" val="1288635993"/>
               </p:ext>
             </p:extLst>
           </p:nvPr>
@@ -11532,7 +11532,7 @@
                     <a:p>
                       <a:pPr algn="ctr" fontAlgn="ctr"/>
                       <a:r>
-                        <a:rPr lang="fr-FR" sz="1100" b="1" i="0" u="none" strike="noStrike" dirty="0">
+                        <a:rPr lang="fr-FR" sz="1200" b="1" i="0" u="none" strike="noStrike" dirty="0">
                           <a:solidFill>
                             <a:srgbClr val="BF8F00"/>
                           </a:solidFill>
@@ -11715,42 +11715,42 @@
           <p:nvPr>
             <p:extLst>
               <p:ext uri="{D42A27DB-BD31-4B8C-83A1-F6EECF244321}">
-                <p14:modId xmlns:p14="http://schemas.microsoft.com/office/powerpoint/2010/main" val="71210251"/>
+                <p14:modId xmlns:p14="http://schemas.microsoft.com/office/powerpoint/2010/main" val="4046711861"/>
               </p:ext>
             </p:extLst>
           </p:nvPr>
         </p:nvGraphicFramePr>
         <p:xfrm>
-          <a:off x="240860" y="1681622"/>
-          <a:ext cx="5855139" cy="640080"/>
+          <a:off x="249724" y="1681622"/>
+          <a:ext cx="5846272" cy="487680"/>
         </p:xfrm>
         <a:graphic>
           <a:graphicData uri="http://schemas.openxmlformats.org/drawingml/2006/table">
             <a:tbl>
               <a:tblPr/>
               <a:tblGrid>
-                <a:gridCol w="1373640">
+                <a:gridCol w="1838156">
                   <a:extLst>
                     <a:ext uri="{9D8B030D-6E8A-4147-A177-3AD203B41FA5}">
                       <a16:colId xmlns:a16="http://schemas.microsoft.com/office/drawing/2014/main" val="2619375881"/>
                     </a:ext>
                   </a:extLst>
                 </a:gridCol>
-                <a:gridCol w="1432019">
+                <a:gridCol w="1257300">
                   <a:extLst>
                     <a:ext uri="{9D8B030D-6E8A-4147-A177-3AD203B41FA5}">
                       <a16:colId xmlns:a16="http://schemas.microsoft.com/office/drawing/2014/main" val="783090913"/>
                     </a:ext>
                   </a:extLst>
                 </a:gridCol>
-                <a:gridCol w="1493833">
+                <a:gridCol w="1196340">
                   <a:extLst>
                     <a:ext uri="{9D8B030D-6E8A-4147-A177-3AD203B41FA5}">
                       <a16:colId xmlns:a16="http://schemas.microsoft.com/office/drawing/2014/main" val="2949780271"/>
                     </a:ext>
                   </a:extLst>
                 </a:gridCol>
-                <a:gridCol w="1555647">
+                <a:gridCol w="1554476">
                   <a:extLst>
                     <a:ext uri="{9D8B030D-6E8A-4147-A177-3AD203B41FA5}">
                       <a16:colId xmlns:a16="http://schemas.microsoft.com/office/drawing/2014/main" val="3115914078"/>
@@ -11898,7 +11898,7 @@
                     <a:lstStyle/>
                     <a:p>
                       <a:pPr algn="l" fontAlgn="b"/>
-                      <a:endParaRPr lang="fr-FR" sz="800" b="0" i="0" u="none" strike="noStrike">
+                      <a:endParaRPr lang="fr-FR" sz="800" b="0" i="0" u="none" strike="noStrike" dirty="0">
                         <a:solidFill>
                           <a:srgbClr val="000000"/>
                         </a:solidFill>
@@ -11966,7 +11966,7 @@
                     <a:p>
                       <a:pPr algn="ctr" fontAlgn="ctr"/>
                       <a:r>
-                        <a:rPr lang="fr-FR" sz="1100" b="1" i="0" u="none" strike="noStrike" dirty="0">
+                        <a:rPr lang="fr-FR" sz="1200" b="1" i="0" u="none" strike="noStrike" dirty="0">
                           <a:solidFill>
                             <a:srgbClr val="BF8F00"/>
                           </a:solidFill>
@@ -12092,27 +12092,7 @@
                           <a:effectLst/>
                           <a:latin typeface="Calibri Light" panose="020F0302020204030204" pitchFamily="34" charset="0"/>
                         </a:rPr>
-                        <a:t> 20 cm </a:t>
-                      </a:r>
-                      <a:r>
-                        <a:rPr lang="fr-FR" sz="1100" b="0" i="0" u="none" strike="noStrike" dirty="0" err="1">
-                          <a:solidFill>
-                            <a:srgbClr val="000000"/>
-                          </a:solidFill>
-                          <a:effectLst/>
-                          <a:latin typeface="Calibri Light" panose="020F0302020204030204" pitchFamily="34" charset="0"/>
-                        </a:rPr>
-                        <a:t>cm</a:t>
-                      </a:r>
-                      <a:r>
-                        <a:rPr lang="fr-FR" sz="1100" b="0" i="0" u="none" strike="noStrike" dirty="0">
-                          <a:solidFill>
-                            <a:srgbClr val="000000"/>
-                          </a:solidFill>
-                          <a:effectLst/>
-                          <a:latin typeface="Calibri Light" panose="020F0302020204030204" pitchFamily="34" charset="0"/>
-                        </a:rPr>
-                        <a:t>)</a:t>
+                        <a:t> 20 cm)</a:t>
                       </a:r>
                     </a:p>
                   </a:txBody>
@@ -12156,56 +12136,56 @@
           <p:nvPr>
             <p:extLst>
               <p:ext uri="{D42A27DB-BD31-4B8C-83A1-F6EECF244321}">
-                <p14:modId xmlns:p14="http://schemas.microsoft.com/office/powerpoint/2010/main" val="849732058"/>
+                <p14:modId xmlns:p14="http://schemas.microsoft.com/office/powerpoint/2010/main" val="2458960969"/>
               </p:ext>
             </p:extLst>
           </p:nvPr>
         </p:nvGraphicFramePr>
         <p:xfrm>
           <a:off x="240861" y="2593249"/>
-          <a:ext cx="5855138" cy="608949"/>
+          <a:ext cx="5855138" cy="456549"/>
         </p:xfrm>
         <a:graphic>
           <a:graphicData uri="http://schemas.openxmlformats.org/drawingml/2006/table">
             <a:tbl>
               <a:tblPr/>
               <a:tblGrid>
-                <a:gridCol w="1127770">
+                <a:gridCol w="914171">
                   <a:extLst>
                     <a:ext uri="{9D8B030D-6E8A-4147-A177-3AD203B41FA5}">
                       <a16:colId xmlns:a16="http://schemas.microsoft.com/office/drawing/2014/main" val="1591265950"/>
                     </a:ext>
                   </a:extLst>
                 </a:gridCol>
-                <a:gridCol w="760086">
+                <a:gridCol w="1083343">
                   <a:extLst>
                     <a:ext uri="{9D8B030D-6E8A-4147-A177-3AD203B41FA5}">
                       <a16:colId xmlns:a16="http://schemas.microsoft.com/office/drawing/2014/main" val="2936319664"/>
                     </a:ext>
                   </a:extLst>
                 </a:gridCol>
-                <a:gridCol w="667394">
+                <a:gridCol w="685800">
                   <a:extLst>
                     <a:ext uri="{9D8B030D-6E8A-4147-A177-3AD203B41FA5}">
                       <a16:colId xmlns:a16="http://schemas.microsoft.com/office/drawing/2014/main" val="2739869232"/>
                     </a:ext>
                   </a:extLst>
                 </a:gridCol>
-                <a:gridCol w="983409">
+                <a:gridCol w="1047750">
                   <a:extLst>
                     <a:ext uri="{9D8B030D-6E8A-4147-A177-3AD203B41FA5}">
                       <a16:colId xmlns:a16="http://schemas.microsoft.com/office/drawing/2014/main" val="1367575770"/>
                     </a:ext>
                   </a:extLst>
                 </a:gridCol>
-                <a:gridCol w="368274">
+                <a:gridCol w="428625">
                   <a:extLst>
                     <a:ext uri="{9D8B030D-6E8A-4147-A177-3AD203B41FA5}">
                       <a16:colId xmlns:a16="http://schemas.microsoft.com/office/drawing/2014/main" val="3215154033"/>
                     </a:ext>
                   </a:extLst>
                 </a:gridCol>
-                <a:gridCol w="1948205">
+                <a:gridCol w="1695449">
                   <a:extLst>
                     <a:ext uri="{9D8B030D-6E8A-4147-A177-3AD203B41FA5}">
                       <a16:colId xmlns:a16="http://schemas.microsoft.com/office/drawing/2014/main" val="3144723141"/>
@@ -12373,7 +12353,7 @@
                     <a:lstStyle/>
                     <a:p>
                       <a:pPr algn="l" fontAlgn="b"/>
-                      <a:endParaRPr lang="fr-FR" sz="500" b="0" i="0" u="none" strike="noStrike">
+                      <a:endParaRPr lang="fr-FR" sz="500" b="0" i="0" u="none" strike="noStrike" dirty="0">
                         <a:solidFill>
                           <a:srgbClr val="000000"/>
                         </a:solidFill>
@@ -12493,7 +12473,7 @@
                   </a:ext>
                 </a:extLst>
               </a:tr>
-              <a:tr h="301036">
+              <a:tr h="68787">
                 <a:tc>
                   <a:txBody>
                     <a:bodyPr/>
@@ -12501,7 +12481,7 @@
                     <a:p>
                       <a:pPr algn="ctr" fontAlgn="ctr"/>
                       <a:r>
-                        <a:rPr lang="fr-FR" sz="1100" b="1" i="0" u="none" strike="noStrike" dirty="0">
+                        <a:rPr lang="fr-FR" sz="1200" b="1" i="0" u="none" strike="noStrike" dirty="0">
                           <a:solidFill>
                             <a:srgbClr val="1F4E78"/>
                           </a:solidFill>
@@ -12734,14 +12714,14 @@
           <p:nvPr>
             <p:extLst>
               <p:ext uri="{D42A27DB-BD31-4B8C-83A1-F6EECF244321}">
-                <p14:modId xmlns:p14="http://schemas.microsoft.com/office/powerpoint/2010/main" val="241841151"/>
+                <p14:modId xmlns:p14="http://schemas.microsoft.com/office/powerpoint/2010/main" val="1608758697"/>
               </p:ext>
             </p:extLst>
           </p:nvPr>
         </p:nvGraphicFramePr>
         <p:xfrm>
-          <a:off x="240862" y="3332339"/>
-          <a:ext cx="5855137" cy="685800"/>
+          <a:off x="240860" y="3191805"/>
+          <a:ext cx="5855137" cy="533400"/>
         </p:xfrm>
         <a:graphic>
           <a:graphicData uri="http://schemas.openxmlformats.org/drawingml/2006/table">
@@ -12755,14 +12735,14 @@
                     </a:ext>
                   </a:extLst>
                 </a:gridCol>
-                <a:gridCol w="1097839">
+                <a:gridCol w="933425">
                   <a:extLst>
                     <a:ext uri="{9D8B030D-6E8A-4147-A177-3AD203B41FA5}">
                       <a16:colId xmlns:a16="http://schemas.microsoft.com/office/drawing/2014/main" val="1316683716"/>
                     </a:ext>
                   </a:extLst>
                 </a:gridCol>
-                <a:gridCol w="1184185">
+                <a:gridCol w="1348599">
                   <a:extLst>
                     <a:ext uri="{9D8B030D-6E8A-4147-A177-3AD203B41FA5}">
                       <a16:colId xmlns:a16="http://schemas.microsoft.com/office/drawing/2014/main" val="2861349103"/>
@@ -12917,7 +12897,7 @@
                     <a:lstStyle/>
                     <a:p>
                       <a:pPr algn="l" fontAlgn="b"/>
-                      <a:endParaRPr lang="fr-FR" sz="1100" b="0" i="0" u="none" strike="noStrike">
+                      <a:endParaRPr lang="fr-FR" sz="1100" b="0" i="0" u="none" strike="noStrike" dirty="0">
                         <a:solidFill>
                           <a:srgbClr val="000000"/>
                         </a:solidFill>
@@ -12985,7 +12965,7 @@
                     <a:p>
                       <a:pPr algn="ctr" fontAlgn="ctr"/>
                       <a:r>
-                        <a:rPr lang="fr-FR" sz="1100" b="1" i="0" u="none" strike="noStrike" dirty="0">
+                        <a:rPr lang="fr-FR" sz="1200" b="1" i="0" u="none" strike="noStrike" dirty="0">
                           <a:solidFill>
                             <a:srgbClr val="BF8F00"/>
                           </a:solidFill>
@@ -13084,7 +13064,7 @@
                     <a:p>
                       <a:pPr algn="ctr" fontAlgn="ctr"/>
                       <a:r>
-                        <a:rPr lang="fr-FR" sz="1100" b="0" i="0" u="none" strike="noStrike">
+                        <a:rPr lang="fr-FR" sz="1100" b="0" i="0" u="none" strike="noStrike" dirty="0">
                           <a:solidFill>
                             <a:srgbClr val="000000"/>
                           </a:solidFill>
@@ -13093,13 +13073,6 @@
                         </a:rPr>
                         <a:t>sdf</a:t>
                       </a:r>
-                      <a:endParaRPr lang="fr-FR" sz="1100" b="0" i="0" u="none" strike="noStrike" dirty="0">
-                        <a:solidFill>
-                          <a:srgbClr val="000000"/>
-                        </a:solidFill>
-                        <a:effectLst/>
-                        <a:latin typeface="Calibri Light" panose="020F0302020204030204" pitchFamily="34" charset="0"/>
-                      </a:endParaRPr>
                     </a:p>
                   </a:txBody>
                   <a:tcPr marL="0" marR="0" marT="0" marB="0" anchor="ctr">
@@ -13395,58 +13368,51 @@
           <p:nvPr>
             <p:extLst>
               <p:ext uri="{D42A27DB-BD31-4B8C-83A1-F6EECF244321}">
-                <p14:modId xmlns:p14="http://schemas.microsoft.com/office/powerpoint/2010/main" val="2670342612"/>
+                <p14:modId xmlns:p14="http://schemas.microsoft.com/office/powerpoint/2010/main" val="1023202048"/>
               </p:ext>
             </p:extLst>
           </p:nvPr>
         </p:nvGraphicFramePr>
         <p:xfrm>
           <a:off x="127001" y="1016000"/>
-          <a:ext cx="6113543" cy="533400"/>
+          <a:ext cx="6113542" cy="533400"/>
         </p:xfrm>
         <a:graphic>
           <a:graphicData uri="http://schemas.openxmlformats.org/drawingml/2006/table">
             <a:tbl>
               <a:tblPr/>
               <a:tblGrid>
-                <a:gridCol w="2255921">
+                <a:gridCol w="1990557">
                   <a:extLst>
                     <a:ext uri="{9D8B030D-6E8A-4147-A177-3AD203B41FA5}">
                       <a16:colId xmlns:a16="http://schemas.microsoft.com/office/drawing/2014/main" val="1793937056"/>
                     </a:ext>
                   </a:extLst>
                 </a:gridCol>
-                <a:gridCol w="1434766">
+                <a:gridCol w="2069431">
                   <a:extLst>
                     <a:ext uri="{9D8B030D-6E8A-4147-A177-3AD203B41FA5}">
                       <a16:colId xmlns:a16="http://schemas.microsoft.com/office/drawing/2014/main" val="2524973161"/>
                     </a:ext>
                   </a:extLst>
                 </a:gridCol>
-                <a:gridCol w="906879">
+                <a:gridCol w="2053554">
                   <a:extLst>
                     <a:ext uri="{9D8B030D-6E8A-4147-A177-3AD203B41FA5}">
                       <a16:colId xmlns:a16="http://schemas.microsoft.com/office/drawing/2014/main" val="1103319014"/>
                     </a:ext>
                   </a:extLst>
                 </a:gridCol>
-                <a:gridCol w="1515977">
-                  <a:extLst>
-                    <a:ext uri="{9D8B030D-6E8A-4147-A177-3AD203B41FA5}">
-                      <a16:colId xmlns:a16="http://schemas.microsoft.com/office/drawing/2014/main" val="136666475"/>
-                    </a:ext>
-                  </a:extLst>
-                </a:gridCol>
               </a:tblGrid>
               <a:tr h="182880">
-                <a:tc gridSpan="4">
+                <a:tc gridSpan="3">
                   <a:txBody>
                     <a:bodyPr/>
                     <a:lstStyle/>
                     <a:p>
                       <a:pPr algn="ctr" fontAlgn="ctr"/>
                       <a:r>
-                        <a:rPr lang="fr-FR" sz="1100" b="1" i="0" u="none" strike="noStrike">
+                        <a:rPr lang="fr-FR" sz="1100" b="1" i="0" u="none" strike="noStrike" dirty="0">
                           <a:solidFill>
                             <a:srgbClr val="FFFFFF"/>
                           </a:solidFill>
@@ -13495,23 +13461,13 @@
                   </a:txBody>
                   <a:tcPr/>
                 </a:tc>
-                <a:tc hMerge="1">
-                  <a:txBody>
-                    <a:bodyPr/>
-                    <a:lstStyle/>
-                    <a:p>
-                      <a:endParaRPr lang="fr-FR"/>
-                    </a:p>
-                  </a:txBody>
-                  <a:tcPr/>
-                </a:tc>
                 <a:extLst>
                   <a:ext uri="{0D108BD9-81ED-4DB2-BD59-A6C34878D82A}">
                     <a16:rowId xmlns:a16="http://schemas.microsoft.com/office/drawing/2014/main" val="2812696214"/>
                   </a:ext>
                 </a:extLst>
               </a:tr>
-              <a:tr h="121920">
+              <a:tr h="160688">
                 <a:tc>
                   <a:txBody>
                     <a:bodyPr/>
@@ -13578,37 +13534,7 @@
                     <a:lstStyle/>
                     <a:p>
                       <a:pPr algn="l" fontAlgn="b"/>
-                      <a:endParaRPr lang="fr-FR" sz="1100" b="0" i="0" u="none" strike="noStrike">
-                        <a:solidFill>
-                          <a:srgbClr val="000000"/>
-                        </a:solidFill>
-                        <a:effectLst/>
-                        <a:latin typeface="Calibri Light" panose="020F0302020204030204" pitchFamily="34" charset="0"/>
-                      </a:endParaRPr>
-                    </a:p>
-                  </a:txBody>
-                  <a:tcPr marL="0" marR="0" marT="0" marB="0" anchor="b">
-                    <a:lnL>
-                      <a:noFill/>
-                    </a:lnL>
-                    <a:lnR>
-                      <a:noFill/>
-                    </a:lnR>
-                    <a:lnT>
-                      <a:noFill/>
-                    </a:lnT>
-                    <a:lnB>
-                      <a:noFill/>
-                    </a:lnB>
-                  </a:tcPr>
-                </a:tc>
-                <a:tc>
-                  <a:txBody>
-                    <a:bodyPr/>
-                    <a:lstStyle/>
-                    <a:p>
-                      <a:pPr algn="l" fontAlgn="b"/>
-                      <a:endParaRPr lang="fr-FR" sz="1100" b="0" i="0" u="none" strike="noStrike">
+                      <a:endParaRPr lang="fr-FR" sz="1100" b="0" i="0" u="none" strike="noStrike" dirty="0">
                         <a:solidFill>
                           <a:srgbClr val="000000"/>
                         </a:solidFill>
@@ -13679,7 +13605,7 @@
                     <a:p>
                       <a:pPr algn="ctr" fontAlgn="ctr"/>
                       <a:r>
-                        <a:rPr lang="fr-FR" sz="1100" b="0" i="0" u="none" strike="noStrike">
+                        <a:rPr lang="fr-FR" sz="1100" b="0" i="0" u="none" strike="noStrike" dirty="0">
                           <a:solidFill>
                             <a:srgbClr val="000000"/>
                           </a:solidFill>
@@ -13687,39 +13613,6 @@
                           <a:latin typeface="Calibri Light" panose="020F0302020204030204" pitchFamily="34" charset="0"/>
                         </a:rPr>
                         <a:t>Tube fluorescent</a:t>
-                      </a:r>
-                    </a:p>
-                  </a:txBody>
-                  <a:tcPr marL="0" marR="0" marT="0" marB="0" anchor="ctr">
-                    <a:lnL>
-                      <a:noFill/>
-                    </a:lnL>
-                    <a:lnR>
-                      <a:noFill/>
-                    </a:lnR>
-                    <a:lnT>
-                      <a:noFill/>
-                    </a:lnT>
-                    <a:lnB>
-                      <a:noFill/>
-                    </a:lnB>
-                  </a:tcPr>
-                </a:tc>
-                <a:tc>
-                  <a:txBody>
-                    <a:bodyPr/>
-                    <a:lstStyle/>
-                    <a:p>
-                      <a:pPr algn="ctr" fontAlgn="ctr"/>
-                      <a:r>
-                        <a:rPr lang="fr-FR" sz="1100" b="0" i="0" u="none" strike="noStrike">
-                          <a:solidFill>
-                            <a:srgbClr val="000000"/>
-                          </a:solidFill>
-                          <a:effectLst/>
-                          <a:latin typeface="Calibri Light" panose="020F0302020204030204" pitchFamily="34" charset="0"/>
-                        </a:rPr>
-                        <a:t>régulé par</a:t>
                       </a:r>
                     </a:p>
                   </a:txBody>
@@ -13752,7 +13645,7 @@
                           <a:effectLst/>
                           <a:latin typeface="Calibri Light" panose="020F0302020204030204" pitchFamily="34" charset="0"/>
                         </a:rPr>
-                        <a:t>interrupteur</a:t>
+                        <a:t>régulé par</a:t>
                       </a:r>
                     </a:p>
                   </a:txBody>
@@ -13796,51 +13689,44 @@
           <p:nvPr>
             <p:extLst>
               <p:ext uri="{D42A27DB-BD31-4B8C-83A1-F6EECF244321}">
-                <p14:modId xmlns:p14="http://schemas.microsoft.com/office/powerpoint/2010/main" val="2440636496"/>
+                <p14:modId xmlns:p14="http://schemas.microsoft.com/office/powerpoint/2010/main" val="963408227"/>
               </p:ext>
             </p:extLst>
           </p:nvPr>
         </p:nvGraphicFramePr>
         <p:xfrm>
           <a:off x="127000" y="2249859"/>
-          <a:ext cx="6113545" cy="533400"/>
+          <a:ext cx="6113543" cy="533400"/>
         </p:xfrm>
         <a:graphic>
           <a:graphicData uri="http://schemas.openxmlformats.org/drawingml/2006/table">
             <a:tbl>
               <a:tblPr/>
               <a:tblGrid>
-                <a:gridCol w="1589932">
+                <a:gridCol w="2009754">
                   <a:extLst>
                     <a:ext uri="{9D8B030D-6E8A-4147-A177-3AD203B41FA5}">
                       <a16:colId xmlns:a16="http://schemas.microsoft.com/office/drawing/2014/main" val="486084234"/>
                     </a:ext>
                   </a:extLst>
                 </a:gridCol>
-                <a:gridCol w="1969465">
+                <a:gridCol w="2040610">
                   <a:extLst>
                     <a:ext uri="{9D8B030D-6E8A-4147-A177-3AD203B41FA5}">
                       <a16:colId xmlns:a16="http://schemas.microsoft.com/office/drawing/2014/main" val="3582835150"/>
                     </a:ext>
                   </a:extLst>
                 </a:gridCol>
-                <a:gridCol w="1277074">
+                <a:gridCol w="2063179">
                   <a:extLst>
                     <a:ext uri="{9D8B030D-6E8A-4147-A177-3AD203B41FA5}">
                       <a16:colId xmlns:a16="http://schemas.microsoft.com/office/drawing/2014/main" val="3359446599"/>
                     </a:ext>
                   </a:extLst>
                 </a:gridCol>
-                <a:gridCol w="1277074">
-                  <a:extLst>
-                    <a:ext uri="{9D8B030D-6E8A-4147-A177-3AD203B41FA5}">
-                      <a16:colId xmlns:a16="http://schemas.microsoft.com/office/drawing/2014/main" val="1107751077"/>
-                    </a:ext>
-                  </a:extLst>
-                </a:gridCol>
               </a:tblGrid>
               <a:tr h="182880">
-                <a:tc gridSpan="4">
+                <a:tc gridSpan="3">
                   <a:txBody>
                     <a:bodyPr/>
                     <a:lstStyle/>
@@ -13856,6 +13742,13 @@
                         </a:rPr>
                         <a:t>VENTILATION</a:t>
                       </a:r>
+                      <a:endParaRPr lang="fr-FR" sz="1100" b="1" i="0" u="none" strike="noStrike" dirty="0">
+                        <a:solidFill>
+                          <a:srgbClr val="FFFFFF"/>
+                        </a:solidFill>
+                        <a:effectLst/>
+                        <a:latin typeface="Calibri Light" panose="020F0302020204030204" pitchFamily="34" charset="0"/>
+                      </a:endParaRPr>
                     </a:p>
                   </a:txBody>
                   <a:tcPr marL="0" marR="0" marT="0" marB="0" anchor="ctr">
@@ -13875,16 +13768,6 @@
                       <a:srgbClr val="BF8F00"/>
                     </a:solidFill>
                   </a:tcPr>
-                </a:tc>
-                <a:tc hMerge="1">
-                  <a:txBody>
-                    <a:bodyPr/>
-                    <a:lstStyle/>
-                    <a:p>
-                      <a:endParaRPr lang="fr-FR"/>
-                    </a:p>
-                  </a:txBody>
-                  <a:tcPr/>
                 </a:tc>
                 <a:tc hMerge="1">
                   <a:txBody>
@@ -13979,36 +13862,6 @@
                     <a:lstStyle/>
                     <a:p>
                       <a:pPr algn="l" fontAlgn="b"/>
-                      <a:endParaRPr lang="fr-FR" sz="1100" b="0" i="0" u="none" strike="noStrike">
-                        <a:solidFill>
-                          <a:srgbClr val="000000"/>
-                        </a:solidFill>
-                        <a:effectLst/>
-                        <a:latin typeface="Calibri Light" panose="020F0302020204030204" pitchFamily="34" charset="0"/>
-                      </a:endParaRPr>
-                    </a:p>
-                  </a:txBody>
-                  <a:tcPr marL="0" marR="0" marT="0" marB="0" anchor="b">
-                    <a:lnL>
-                      <a:noFill/>
-                    </a:lnL>
-                    <a:lnR>
-                      <a:noFill/>
-                    </a:lnR>
-                    <a:lnT>
-                      <a:noFill/>
-                    </a:lnT>
-                    <a:lnB>
-                      <a:noFill/>
-                    </a:lnB>
-                  </a:tcPr>
-                </a:tc>
-                <a:tc>
-                  <a:txBody>
-                    <a:bodyPr/>
-                    <a:lstStyle/>
-                    <a:p>
-                      <a:pPr algn="l" fontAlgn="b"/>
                       <a:endParaRPr lang="fr-FR" sz="1100" b="0" i="0" u="none" strike="noStrike" dirty="0">
                         <a:solidFill>
                           <a:srgbClr val="000000"/>
@@ -14025,21 +13878,12 @@
                     <a:lnR>
                       <a:noFill/>
                     </a:lnR>
-                    <a:lnT w="12700" cmpd="sng">
-                      <a:noFill/>
-                      <a:prstDash val="solid"/>
+                    <a:lnT>
+                      <a:noFill/>
                     </a:lnT>
                     <a:lnB>
                       <a:noFill/>
                     </a:lnB>
-                    <a:lnTlToBr w="12700" cmpd="sng">
-                      <a:noFill/>
-                      <a:prstDash val="solid"/>
-                    </a:lnTlToBr>
-                    <a:lnBlToTr w="12700" cmpd="sng">
-                      <a:noFill/>
-                      <a:prstDash val="solid"/>
-                    </a:lnBlToTr>
                   </a:tcPr>
                 </a:tc>
                 <a:extLst>
@@ -14056,7 +13900,7 @@
                     <a:p>
                       <a:pPr algn="ctr" fontAlgn="ctr"/>
                       <a:r>
-                        <a:rPr lang="fr-FR" sz="1100" b="1" i="0" u="none" strike="noStrike" dirty="0">
+                        <a:rPr lang="fr-FR" sz="1100" b="1" i="0" u="none" strike="noStrike">
                           <a:solidFill>
                             <a:srgbClr val="1F4E78"/>
                           </a:solidFill>
@@ -14065,6 +13909,13 @@
                         </a:rPr>
                         <a:t>COULOIR</a:t>
                       </a:r>
+                      <a:endParaRPr lang="fr-FR" sz="1100" b="1" i="0" u="none" strike="noStrike" dirty="0">
+                        <a:solidFill>
+                          <a:srgbClr val="1F4E78"/>
+                        </a:solidFill>
+                        <a:effectLst/>
+                        <a:latin typeface="Calibri Light" panose="020F0302020204030204" pitchFamily="34" charset="0"/>
+                      </a:endParaRPr>
                     </a:p>
                   </a:txBody>
                   <a:tcPr marL="0" marR="0" marT="0" marB="0" anchor="ctr">
@@ -14089,7 +13940,7 @@
                     <a:p>
                       <a:pPr algn="ctr" fontAlgn="ctr"/>
                       <a:r>
-                        <a:rPr lang="fr-FR" sz="1100" b="0" i="0" u="none" strike="noStrike" dirty="0">
+                        <a:rPr lang="fr-FR" sz="1100" b="0" i="0" u="none" strike="noStrike">
                           <a:solidFill>
                             <a:srgbClr val="000000"/>
                           </a:solidFill>
@@ -14098,6 +13949,13 @@
                         </a:rPr>
                         <a:t>Ventilation naturelle</a:t>
                       </a:r>
+                      <a:endParaRPr lang="fr-FR" sz="1100" b="0" i="0" u="none" strike="noStrike" dirty="0">
+                        <a:solidFill>
+                          <a:srgbClr val="000000"/>
+                        </a:solidFill>
+                        <a:effectLst/>
+                        <a:latin typeface="Calibri Light" panose="020F0302020204030204" pitchFamily="34" charset="0"/>
+                      </a:endParaRPr>
                     </a:p>
                   </a:txBody>
                   <a:tcPr marL="0" marR="0" marT="0" marB="0" anchor="ctr">
@@ -14122,48 +13980,22 @@
                     <a:p>
                       <a:pPr algn="ctr" fontAlgn="ctr"/>
                       <a:r>
-                        <a:rPr lang="fr-FR" sz="1100" b="0" i="0" u="none" strike="noStrike" dirty="0">
+                        <a:rPr lang="fr-FR" sz="1100" b="0" i="0" u="none" strike="noStrike">
                           <a:solidFill>
                             <a:srgbClr val="000000"/>
                           </a:solidFill>
                           <a:effectLst/>
                           <a:latin typeface="Calibri Light" panose="020F0302020204030204" pitchFamily="34" charset="0"/>
                         </a:rPr>
-                        <a:t>E</a:t>
+                        <a:t>régulé par</a:t>
                       </a:r>
-                    </a:p>
-                  </a:txBody>
-                  <a:tcPr marL="0" marR="0" marT="0" marB="0" anchor="ctr">
-                    <a:lnL>
-                      <a:noFill/>
-                    </a:lnL>
-                    <a:lnR>
-                      <a:noFill/>
-                    </a:lnR>
-                    <a:lnT>
-                      <a:noFill/>
-                    </a:lnT>
-                    <a:lnB>
-                      <a:noFill/>
-                    </a:lnB>
-                  </a:tcPr>
-                </a:tc>
-                <a:tc>
-                  <a:txBody>
-                    <a:bodyPr/>
-                    <a:lstStyle/>
-                    <a:p>
-                      <a:pPr algn="ctr" fontAlgn="ctr"/>
-                      <a:r>
-                        <a:rPr lang="fr-FR" sz="1100" b="0" i="0" u="none" strike="noStrike" dirty="0">
-                          <a:solidFill>
-                            <a:srgbClr val="000000"/>
-                          </a:solidFill>
-                          <a:effectLst/>
-                          <a:latin typeface="Calibri Light" panose="020F0302020204030204" pitchFamily="34" charset="0"/>
-                        </a:rPr>
-                        <a:t>a</a:t>
-                      </a:r>
+                      <a:endParaRPr lang="fr-FR" sz="1100" b="0" i="0" u="none" strike="noStrike" dirty="0">
+                        <a:solidFill>
+                          <a:srgbClr val="000000"/>
+                        </a:solidFill>
+                        <a:effectLst/>
+                        <a:latin typeface="Calibri Light" panose="020F0302020204030204" pitchFamily="34" charset="0"/>
+                      </a:endParaRPr>
                     </a:p>
                   </a:txBody>
                   <a:tcPr marL="0" marR="0" marT="0" marB="0" anchor="ctr">

</xml_diff>

<commit_message>
suppression du "A vérifier" en bas à droite #33
</commit_message>
<xml_diff>
--- a/app/src/main/assets/powerpointvierge.pptx
+++ b/app/src/main/assets/powerpointvierge.pptx
@@ -9677,44 +9677,6 @@
           </a:graphicData>
         </a:graphic>
       </p:graphicFrame>
-      <p:sp>
-        <p:nvSpPr>
-          <p:cNvPr id="3" name="ZoneTexte 2">
-            <a:extLst>
-              <a:ext uri="{FF2B5EF4-FFF2-40B4-BE49-F238E27FC236}">
-                <a16:creationId xmlns:a16="http://schemas.microsoft.com/office/drawing/2014/main" id="{64F13A8C-57E2-AFB6-B140-5892D2A0FD02}"/>
-              </a:ext>
-            </a:extLst>
-          </p:cNvPr>
-          <p:cNvSpPr txBox="1"/>
-          <p:nvPr/>
-        </p:nvSpPr>
-        <p:spPr>
-          <a:xfrm>
-            <a:off x="11146521" y="6532953"/>
-            <a:ext cx="928075" cy="338554"/>
-          </a:xfrm>
-          <a:prstGeom prst="rect">
-            <a:avLst/>
-          </a:prstGeom>
-          <a:noFill/>
-        </p:spPr>
-        <p:txBody>
-          <a:bodyPr wrap="none" rtlCol="0">
-            <a:spAutoFit/>
-          </a:bodyPr>
-          <a:lstStyle/>
-          <a:p>
-            <a:pPr algn="l"/>
-            <a:r>
-              <a:rPr lang="fr-FR" sz="1600" u="sng" dirty="0">
-                <a:latin typeface="+mj-lt"/>
-              </a:rPr>
-              <a:t>A vérifier</a:t>
-            </a:r>
-          </a:p>
-        </p:txBody>
-      </p:sp>
     </p:spTree>
     <p:extLst>
       <p:ext uri="{BB962C8B-B14F-4D97-AF65-F5344CB8AC3E}">
@@ -11033,7 +10995,7 @@
         <p:spPr>
           <a:xfrm>
             <a:off x="0" y="6610497"/>
-            <a:ext cx="2032608" cy="276999"/>
+            <a:ext cx="1926810" cy="276999"/>
           </a:xfrm>
           <a:prstGeom prst="rect">
             <a:avLst/>
@@ -11048,12 +11010,8 @@
           <a:p>
             <a:pPr algn="l"/>
             <a:r>
-              <a:rPr lang="fr-FR" sz="1200"/>
-              <a:t>Occuper : 🙂 </a:t>
-            </a:r>
-            <a:r>
               <a:rPr lang="fr-FR" sz="1200" dirty="0"/>
-              <a:t>/ Chauffer : 🔥  </a:t>
+              <a:t>Occupé : 🙂 / Chauffé : 🔥  </a:t>
             </a:r>
           </a:p>
         </p:txBody>
@@ -11838,7 +11796,7 @@
                     <a:lstStyle/>
                     <a:p>
                       <a:pPr algn="l" fontAlgn="b"/>
-                      <a:endParaRPr lang="fr-FR" sz="800" b="0" i="0" u="none" strike="noStrike">
+                      <a:endParaRPr lang="fr-FR" sz="800" b="0" i="0" u="none" strike="noStrike" dirty="0">
                         <a:solidFill>
                           <a:srgbClr val="000000"/>
                         </a:solidFill>
@@ -12136,7 +12094,7 @@
           <p:nvPr>
             <p:extLst>
               <p:ext uri="{D42A27DB-BD31-4B8C-83A1-F6EECF244321}">
-                <p14:modId xmlns:p14="http://schemas.microsoft.com/office/powerpoint/2010/main" val="2458960969"/>
+                <p14:modId xmlns:p14="http://schemas.microsoft.com/office/powerpoint/2010/main" val="161465348"/>
               </p:ext>
             </p:extLst>
           </p:nvPr>
@@ -12323,7 +12281,7 @@
                     <a:lstStyle/>
                     <a:p>
                       <a:pPr algn="l" fontAlgn="b"/>
-                      <a:endParaRPr lang="fr-FR" sz="500" b="0" i="0" u="none" strike="noStrike">
+                      <a:endParaRPr lang="fr-FR" sz="500" b="0" i="0" u="none" strike="noStrike" dirty="0">
                         <a:solidFill>
                           <a:srgbClr val="000000"/>
                         </a:solidFill>
@@ -12837,7 +12795,7 @@
                     <a:lstStyle/>
                     <a:p>
                       <a:pPr algn="l" fontAlgn="b"/>
-                      <a:endParaRPr lang="fr-FR" sz="1100" b="0" i="0" u="none" strike="noStrike">
+                      <a:endParaRPr lang="fr-FR" sz="1100" b="0" i="0" u="none" strike="noStrike" dirty="0">
                         <a:solidFill>
                           <a:srgbClr val="000000"/>
                         </a:solidFill>

</xml_diff>

<commit_message>
slide titre et A vérifier en italique #34 #33
</commit_message>
<xml_diff>
--- a/app/src/main/assets/powerpointvierge.pptx
+++ b/app/src/main/assets/powerpointvierge.pptx
@@ -8,8 +8,8 @@
     <p:notesMasterId r:id="rId10"/>
   </p:notesMasterIdLst>
   <p:sldIdLst>
-    <p:sldId id="717" r:id="rId2"/>
-    <p:sldId id="757" r:id="rId3"/>
+    <p:sldId id="758" r:id="rId2"/>
+    <p:sldId id="717" r:id="rId3"/>
     <p:sldId id="752" r:id="rId4"/>
     <p:sldId id="742" r:id="rId5"/>
     <p:sldId id="730" r:id="rId6"/>
@@ -210,7 +210,7 @@
           <a:p>
             <a:fld id="{8EF2C5CC-36BA-4C84-AC43-9F8430F4AE76}" type="datetimeFigureOut">
               <a:rPr lang="fr-FR" smtClean="0"/>
-              <a:t>04/07/2023</a:t>
+              <a:t>05/07/2023</a:t>
             </a:fld>
             <a:endParaRPr lang="fr-FR"/>
           </a:p>
@@ -540,90 +540,6 @@
           <a:bodyPr/>
           <a:lstStyle/>
           <a:p>
-            <a:fld id="{288F5A41-EEB1-4CD0-80B3-15BE976D79DC}" type="slidenum">
-              <a:rPr lang="fr-FR" smtClean="0"/>
-              <a:t>2</a:t>
-            </a:fld>
-            <a:endParaRPr lang="fr-FR"/>
-          </a:p>
-        </p:txBody>
-      </p:sp>
-    </p:spTree>
-    <p:extLst>
-      <p:ext uri="{BB962C8B-B14F-4D97-AF65-F5344CB8AC3E}">
-        <p14:creationId xmlns:p14="http://schemas.microsoft.com/office/powerpoint/2010/main" val="1623189358"/>
-      </p:ext>
-    </p:extLst>
-  </p:cSld>
-  <p:clrMapOvr>
-    <a:masterClrMapping/>
-  </p:clrMapOvr>
-</p:notes>
-</file>
-
-<file path=ppt/notesSlides/notesSlide2.xml><?xml version="1.0" encoding="utf-8"?>
-<p:notes xmlns:a="http://schemas.openxmlformats.org/drawingml/2006/main" xmlns:r="http://schemas.openxmlformats.org/officeDocument/2006/relationships" xmlns:p="http://schemas.openxmlformats.org/presentationml/2006/main">
-  <p:cSld>
-    <p:spTree>
-      <p:nvGrpSpPr>
-        <p:cNvPr id="1" name=""/>
-        <p:cNvGrpSpPr/>
-        <p:nvPr/>
-      </p:nvGrpSpPr>
-      <p:grpSpPr>
-        <a:xfrm>
-          <a:off x="0" y="0"/>
-          <a:ext cx="0" cy="0"/>
-          <a:chOff x="0" y="0"/>
-          <a:chExt cx="0" cy="0"/>
-        </a:xfrm>
-      </p:grpSpPr>
-      <p:sp>
-        <p:nvSpPr>
-          <p:cNvPr id="2" name="Espace réservé de l'image des diapositives 1"/>
-          <p:cNvSpPr>
-            <a:spLocks noGrp="1" noRot="1" noChangeAspect="1"/>
-          </p:cNvSpPr>
-          <p:nvPr>
-            <p:ph type="sldImg"/>
-          </p:nvPr>
-        </p:nvSpPr>
-        <p:spPr/>
-      </p:sp>
-      <p:sp>
-        <p:nvSpPr>
-          <p:cNvPr id="3" name="Espace réservé des notes 2"/>
-          <p:cNvSpPr>
-            <a:spLocks noGrp="1"/>
-          </p:cNvSpPr>
-          <p:nvPr>
-            <p:ph type="body" idx="1"/>
-          </p:nvPr>
-        </p:nvSpPr>
-        <p:spPr/>
-        <p:txBody>
-          <a:bodyPr/>
-          <a:lstStyle/>
-          <a:p>
-            <a:endParaRPr lang="fr-FR"/>
-          </a:p>
-        </p:txBody>
-      </p:sp>
-      <p:sp>
-        <p:nvSpPr>
-          <p:cNvPr id="4" name="Espace réservé du numéro de diapositive 3"/>
-          <p:cNvSpPr>
-            <a:spLocks noGrp="1"/>
-          </p:cNvSpPr>
-          <p:nvPr>
-            <p:ph type="sldNum" sz="quarter" idx="5"/>
-          </p:nvPr>
-        </p:nvSpPr>
-        <p:spPr/>
-        <p:txBody>
-          <a:bodyPr/>
-          <a:lstStyle/>
-          <a:p>
             <a:pPr marL="0" marR="0" lvl="0" indent="0" algn="r" defTabSz="914400" rtl="0" eaLnBrk="1" fontAlgn="auto" latinLnBrk="0" hangingPunct="1">
               <a:lnSpc>
                 <a:spcPct val="100000"/>
@@ -705,7 +621,7 @@
 </p:notes>
 </file>
 
-<file path=ppt/notesSlides/notesSlide3.xml><?xml version="1.0" encoding="utf-8"?>
+<file path=ppt/notesSlides/notesSlide2.xml><?xml version="1.0" encoding="utf-8"?>
 <p:notes xmlns:a="http://schemas.openxmlformats.org/drawingml/2006/main" xmlns:r="http://schemas.openxmlformats.org/officeDocument/2006/relationships" xmlns:p="http://schemas.openxmlformats.org/presentationml/2006/main">
   <p:cSld>
     <p:spTree>
@@ -1236,6 +1152,156 @@
 </file>
 
 <file path=ppt/slides/slide1.xml><?xml version="1.0" encoding="utf-8"?>
+<p:sld xmlns:a="http://schemas.openxmlformats.org/drawingml/2006/main" xmlns:r="http://schemas.openxmlformats.org/officeDocument/2006/relationships" xmlns:p="http://schemas.openxmlformats.org/presentationml/2006/main" showMasterSp="0">
+  <p:cSld>
+    <p:bg>
+      <p:bgPr>
+        <a:solidFill>
+          <a:srgbClr val="004C64"/>
+        </a:solidFill>
+        <a:effectLst/>
+      </p:bgPr>
+    </p:bg>
+    <p:spTree>
+      <p:nvGrpSpPr>
+        <p:cNvPr id="1" name=""/>
+        <p:cNvGrpSpPr/>
+        <p:nvPr/>
+      </p:nvGrpSpPr>
+      <p:grpSpPr>
+        <a:xfrm>
+          <a:off x="0" y="0"/>
+          <a:ext cx="0" cy="0"/>
+          <a:chOff x="0" y="0"/>
+          <a:chExt cx="0" cy="0"/>
+        </a:xfrm>
+      </p:grpSpPr>
+      <p:sp>
+        <p:nvSpPr>
+          <p:cNvPr id="2" name="nomBatiment">
+            <a:extLst>
+              <a:ext uri="{FF2B5EF4-FFF2-40B4-BE49-F238E27FC236}">
+                <a16:creationId xmlns:a16="http://schemas.microsoft.com/office/drawing/2014/main" id="{F704E601-27C1-8356-9928-7E46556F357F}"/>
+              </a:ext>
+            </a:extLst>
+          </p:cNvPr>
+          <p:cNvSpPr txBox="1"/>
+          <p:nvPr/>
+        </p:nvSpPr>
+        <p:spPr>
+          <a:xfrm>
+            <a:off x="2914094" y="5653404"/>
+            <a:ext cx="6363809" cy="646331"/>
+          </a:xfrm>
+          <a:prstGeom prst="rect">
+            <a:avLst/>
+          </a:prstGeom>
+          <a:noFill/>
+        </p:spPr>
+        <p:txBody>
+          <a:bodyPr wrap="square" rtlCol="0">
+            <a:spAutoFit/>
+          </a:bodyPr>
+          <a:lstStyle/>
+          <a:p>
+            <a:pPr marL="0" marR="0" lvl="0" indent="0" algn="ctr" defTabSz="914400" rtl="0" eaLnBrk="1" fontAlgn="auto" latinLnBrk="0" hangingPunct="1">
+              <a:lnSpc>
+                <a:spcPct val="100000"/>
+              </a:lnSpc>
+              <a:spcBef>
+                <a:spcPts val="0"/>
+              </a:spcBef>
+              <a:spcAft>
+                <a:spcPts val="0"/>
+              </a:spcAft>
+              <a:buClrTx/>
+              <a:buSzTx/>
+              <a:buFontTx/>
+              <a:buNone/>
+              <a:tabLst/>
+              <a:defRPr/>
+            </a:pPr>
+            <a:r>
+              <a:rPr kumimoji="0" lang="fr-FR" sz="3600" b="1" i="0" u="none" strike="noStrike" kern="1200" cap="none" spc="0" normalizeH="0" baseline="0" noProof="0" dirty="0">
+                <a:ln>
+                  <a:noFill/>
+                </a:ln>
+                <a:solidFill>
+                  <a:srgbClr val="FFFFFF">
+                    <a:lumMod val="95000"/>
+                  </a:srgbClr>
+                </a:solidFill>
+                <a:effectLst/>
+                <a:uLnTx/>
+                <a:uFillTx/>
+                <a:latin typeface="Century Gothic" panose="020B0502020202020204" pitchFamily="34" charset="0"/>
+                <a:ea typeface="Arial" charset="0"/>
+                <a:cs typeface="Arial" charset="0"/>
+              </a:rPr>
+              <a:t>NOM DU BATIMENT</a:t>
+            </a:r>
+          </a:p>
+        </p:txBody>
+      </p:sp>
+      <p:sp>
+        <p:nvSpPr>
+          <p:cNvPr id="3" name="photoBatiment">
+            <a:extLst>
+              <a:ext uri="{FF2B5EF4-FFF2-40B4-BE49-F238E27FC236}">
+                <a16:creationId xmlns:a16="http://schemas.microsoft.com/office/drawing/2014/main" id="{E4216167-2048-D4F6-F2E6-18E798CF9B88}"/>
+              </a:ext>
+            </a:extLst>
+          </p:cNvPr>
+          <p:cNvSpPr/>
+          <p:nvPr/>
+        </p:nvSpPr>
+        <p:spPr>
+          <a:xfrm>
+            <a:off x="988744" y="558265"/>
+            <a:ext cx="10214511" cy="4860758"/>
+          </a:xfrm>
+          <a:prstGeom prst="rect">
+            <a:avLst/>
+          </a:prstGeom>
+          <a:noFill/>
+        </p:spPr>
+        <p:style>
+          <a:lnRef idx="2">
+            <a:schemeClr val="accent6"/>
+          </a:lnRef>
+          <a:fillRef idx="1">
+            <a:schemeClr val="lt1"/>
+          </a:fillRef>
+          <a:effectRef idx="0">
+            <a:schemeClr val="accent6"/>
+          </a:effectRef>
+          <a:fontRef idx="minor">
+            <a:schemeClr val="dk1"/>
+          </a:fontRef>
+        </p:style>
+        <p:txBody>
+          <a:bodyPr rtlCol="0" anchor="ctr"/>
+          <a:lstStyle/>
+          <a:p>
+            <a:pPr algn="ctr"/>
+            <a:endParaRPr lang="fr-FR" sz="1600"/>
+          </a:p>
+        </p:txBody>
+      </p:sp>
+    </p:spTree>
+    <p:extLst>
+      <p:ext uri="{BB962C8B-B14F-4D97-AF65-F5344CB8AC3E}">
+        <p14:creationId xmlns:p14="http://schemas.microsoft.com/office/powerpoint/2010/main" val="2316373579"/>
+      </p:ext>
+    </p:extLst>
+  </p:cSld>
+  <p:clrMapOvr>
+    <a:masterClrMapping/>
+  </p:clrMapOvr>
+</p:sld>
+</file>
+
+<file path=ppt/slides/slide2.xml><?xml version="1.0" encoding="utf-8"?>
 <p:sld xmlns:a="http://schemas.openxmlformats.org/drawingml/2006/main" xmlns:r="http://schemas.openxmlformats.org/officeDocument/2006/relationships" xmlns:p="http://schemas.openxmlformats.org/presentationml/2006/main">
   <p:cSld>
     <p:spTree>
@@ -1879,107 +1945,12 @@
           </a:p>
         </p:txBody>
       </p:sp>
-    </p:spTree>
-    <p:extLst>
-      <p:ext uri="{BB962C8B-B14F-4D97-AF65-F5344CB8AC3E}">
-        <p14:creationId xmlns:p14="http://schemas.microsoft.com/office/powerpoint/2010/main" val="1768793509"/>
-      </p:ext>
-    </p:extLst>
-  </p:cSld>
-  <p:clrMapOvr>
-    <a:masterClrMapping/>
-  </p:clrMapOvr>
-</p:sld>
-</file>
-
-<file path=ppt/slides/slide2.xml><?xml version="1.0" encoding="utf-8"?>
-<p:sld xmlns:a="http://schemas.openxmlformats.org/drawingml/2006/main" xmlns:r="http://schemas.openxmlformats.org/officeDocument/2006/relationships" xmlns:p="http://schemas.openxmlformats.org/presentationml/2006/main" show="0">
-  <p:cSld>
-    <p:spTree>
-      <p:nvGrpSpPr>
-        <p:cNvPr id="1" name=""/>
-        <p:cNvGrpSpPr/>
-        <p:nvPr/>
-      </p:nvGrpSpPr>
-      <p:grpSpPr>
-        <a:xfrm>
-          <a:off x="0" y="0"/>
-          <a:ext cx="0" cy="0"/>
-          <a:chOff x="0" y="0"/>
-          <a:chExt cx="0" cy="0"/>
-        </a:xfrm>
-      </p:grpSpPr>
       <p:sp>
         <p:nvSpPr>
-          <p:cNvPr id="2" name="ZoneTexte 1">
+          <p:cNvPr id="6" name="Rectangle 5">
             <a:extLst>
               <a:ext uri="{FF2B5EF4-FFF2-40B4-BE49-F238E27FC236}">
-                <a16:creationId xmlns:a16="http://schemas.microsoft.com/office/drawing/2014/main" id="{9A3F21BE-81C8-A6E2-2C26-0364865E9526}"/>
-              </a:ext>
-            </a:extLst>
-          </p:cNvPr>
-          <p:cNvSpPr txBox="1"/>
-          <p:nvPr/>
-        </p:nvSpPr>
-        <p:spPr>
-          <a:xfrm>
-            <a:off x="1327164" y="219636"/>
-            <a:ext cx="8936335" cy="461665"/>
-          </a:xfrm>
-          <a:prstGeom prst="rect">
-            <a:avLst/>
-          </a:prstGeom>
-          <a:noFill/>
-        </p:spPr>
-        <p:txBody>
-          <a:bodyPr wrap="square" rtlCol="0">
-            <a:spAutoFit/>
-          </a:bodyPr>
-          <a:lstStyle/>
-          <a:p>
-            <a:pPr marL="0" marR="0" lvl="0" indent="0" algn="ctr" defTabSz="914400" rtl="0" eaLnBrk="1" fontAlgn="auto" latinLnBrk="0" hangingPunct="1">
-              <a:lnSpc>
-                <a:spcPct val="100000"/>
-              </a:lnSpc>
-              <a:spcBef>
-                <a:spcPts val="0"/>
-              </a:spcBef>
-              <a:spcAft>
-                <a:spcPts val="0"/>
-              </a:spcAft>
-              <a:buClrTx/>
-              <a:buSzTx/>
-              <a:buFontTx/>
-              <a:buNone/>
-              <a:tabLst/>
-              <a:defRPr/>
-            </a:pPr>
-            <a:r>
-              <a:rPr kumimoji="0" lang="fr-FR" sz="2400" b="1" i="0" u="none" strike="noStrike" kern="1200" cap="none" spc="0" normalizeH="0" baseline="0" noProof="0">
-                <a:ln>
-                  <a:noFill/>
-                </a:ln>
-                <a:solidFill>
-                  <a:srgbClr val="FFFFFF"/>
-                </a:solidFill>
-                <a:effectLst/>
-                <a:uLnTx/>
-                <a:uFillTx/>
-                <a:latin typeface="Century Gothic" panose="020B0502020202020204" pitchFamily="34" charset="0"/>
-                <a:ea typeface="Arial Narrow" charset="0"/>
-                <a:cs typeface="Arial Narrow" charset="0"/>
-              </a:rPr>
-              <a:t>Eléments de légende</a:t>
-            </a:r>
-          </a:p>
-        </p:txBody>
-      </p:sp>
-      <p:sp>
-        <p:nvSpPr>
-          <p:cNvPr id="3" name="Rectangle 2">
-            <a:extLst>
-              <a:ext uri="{FF2B5EF4-FFF2-40B4-BE49-F238E27FC236}">
-                <a16:creationId xmlns:a16="http://schemas.microsoft.com/office/drawing/2014/main" id="{3A88BE90-490B-8A42-46C4-0B60BE4F31F8}"/>
+                <a16:creationId xmlns:a16="http://schemas.microsoft.com/office/drawing/2014/main" id="{FBA75960-E7E8-AF97-4221-58E2857C510C}"/>
               </a:ext>
             </a:extLst>
           </p:cNvPr>
@@ -1988,7 +1959,7 @@
         </p:nvSpPr>
         <p:spPr>
           <a:xfrm>
-            <a:off x="282387" y="1237129"/>
+            <a:off x="-11267765" y="1237129"/>
             <a:ext cx="259977" cy="161365"/>
           </a:xfrm>
           <a:prstGeom prst="rect">
@@ -2028,10 +1999,10 @@
       </p:sp>
       <p:sp>
         <p:nvSpPr>
-          <p:cNvPr id="4" name="Rectangle 3">
+          <p:cNvPr id="10" name="Rectangle 9">
             <a:extLst>
               <a:ext uri="{FF2B5EF4-FFF2-40B4-BE49-F238E27FC236}">
-                <a16:creationId xmlns:a16="http://schemas.microsoft.com/office/drawing/2014/main" id="{87893CEE-1CD9-5FE6-7EF5-5FE4D13D26E6}"/>
+                <a16:creationId xmlns:a16="http://schemas.microsoft.com/office/drawing/2014/main" id="{14B1D967-A312-59F6-CFA8-A59F0ED1528A}"/>
               </a:ext>
             </a:extLst>
           </p:cNvPr>
@@ -2040,7 +2011,7 @@
         </p:nvSpPr>
         <p:spPr>
           <a:xfrm>
-            <a:off x="282387" y="1532964"/>
+            <a:off x="-11267765" y="1532964"/>
             <a:ext cx="259977" cy="161365"/>
           </a:xfrm>
           <a:prstGeom prst="rect">
@@ -2087,10 +2058,10 @@
       </p:sp>
       <p:sp>
         <p:nvSpPr>
-          <p:cNvPr id="5" name="Rectangle 4">
+          <p:cNvPr id="12" name="Rectangle 11">
             <a:extLst>
               <a:ext uri="{FF2B5EF4-FFF2-40B4-BE49-F238E27FC236}">
-                <a16:creationId xmlns:a16="http://schemas.microsoft.com/office/drawing/2014/main" id="{00F0F544-B0CF-52BD-0BCD-F2553C648288}"/>
+                <a16:creationId xmlns:a16="http://schemas.microsoft.com/office/drawing/2014/main" id="{2B5B5EF8-C9DD-FE24-EB3C-2060801CAB67}"/>
               </a:ext>
             </a:extLst>
           </p:cNvPr>
@@ -2099,7 +2070,7 @@
         </p:nvSpPr>
         <p:spPr>
           <a:xfrm>
-            <a:off x="282387" y="1828799"/>
+            <a:off x="-11267765" y="1828799"/>
             <a:ext cx="259977" cy="161365"/>
           </a:xfrm>
           <a:prstGeom prst="rect">
@@ -2144,10 +2115,10 @@
       </p:sp>
       <p:sp>
         <p:nvSpPr>
-          <p:cNvPr id="6" name="Rectangle 5">
+          <p:cNvPr id="14" name="Rectangle 13">
             <a:extLst>
               <a:ext uri="{FF2B5EF4-FFF2-40B4-BE49-F238E27FC236}">
-                <a16:creationId xmlns:a16="http://schemas.microsoft.com/office/drawing/2014/main" id="{4B6A7066-C4CA-D1D8-F0B4-8BC1A318C94E}"/>
+                <a16:creationId xmlns:a16="http://schemas.microsoft.com/office/drawing/2014/main" id="{EAF08B30-5BBE-409A-8D99-0B53D4F9AC2F}"/>
               </a:ext>
             </a:extLst>
           </p:cNvPr>
@@ -2156,7 +2127,7 @@
         </p:nvSpPr>
         <p:spPr>
           <a:xfrm>
-            <a:off x="282386" y="2124634"/>
+            <a:off x="-11267766" y="2124634"/>
             <a:ext cx="259977" cy="161365"/>
           </a:xfrm>
           <a:prstGeom prst="rect">
@@ -2198,10 +2169,10 @@
       </p:sp>
       <p:sp>
         <p:nvSpPr>
-          <p:cNvPr id="7" name="ZoneTexte 6">
+          <p:cNvPr id="15" name="ZoneTexte 14">
             <a:extLst>
               <a:ext uri="{FF2B5EF4-FFF2-40B4-BE49-F238E27FC236}">
-                <a16:creationId xmlns:a16="http://schemas.microsoft.com/office/drawing/2014/main" id="{A228EE50-A1D0-00D4-F530-8CE3AC0B5788}"/>
+                <a16:creationId xmlns:a16="http://schemas.microsoft.com/office/drawing/2014/main" id="{B7D8F53E-F593-9972-4908-C4E57EFA2051}"/>
               </a:ext>
             </a:extLst>
           </p:cNvPr>
@@ -2210,7 +2181,7 @@
         </p:nvSpPr>
         <p:spPr>
           <a:xfrm>
-            <a:off x="599513" y="1208254"/>
+            <a:off x="-10950639" y="1208254"/>
             <a:ext cx="448324" cy="190240"/>
           </a:xfrm>
           <a:prstGeom prst="rect">
@@ -2233,10 +2204,10 @@
       </p:sp>
       <p:sp>
         <p:nvSpPr>
-          <p:cNvPr id="8" name="ZoneTexte 7">
+          <p:cNvPr id="16" name="ZoneTexte 15">
             <a:extLst>
               <a:ext uri="{FF2B5EF4-FFF2-40B4-BE49-F238E27FC236}">
-                <a16:creationId xmlns:a16="http://schemas.microsoft.com/office/drawing/2014/main" id="{68E043A2-0B3E-A092-CA04-3C09E9AF9800}"/>
+                <a16:creationId xmlns:a16="http://schemas.microsoft.com/office/drawing/2014/main" id="{27E53488-2213-18C6-AE4F-F2055FFA3ED4}"/>
               </a:ext>
             </a:extLst>
           </p:cNvPr>
@@ -2245,7 +2216,7 @@
         </p:nvSpPr>
         <p:spPr>
           <a:xfrm>
-            <a:off x="599513" y="1527640"/>
+            <a:off x="-10950639" y="1527640"/>
             <a:ext cx="448324" cy="190240"/>
           </a:xfrm>
           <a:prstGeom prst="rect">
@@ -2268,10 +2239,10 @@
       </p:sp>
       <p:sp>
         <p:nvSpPr>
-          <p:cNvPr id="9" name="ZoneTexte 8">
+          <p:cNvPr id="17" name="ZoneTexte 16">
             <a:extLst>
               <a:ext uri="{FF2B5EF4-FFF2-40B4-BE49-F238E27FC236}">
-                <a16:creationId xmlns:a16="http://schemas.microsoft.com/office/drawing/2014/main" id="{65081B51-347B-FCC2-2B90-F060277DACBE}"/>
+                <a16:creationId xmlns:a16="http://schemas.microsoft.com/office/drawing/2014/main" id="{271956E9-7126-D7D9-8977-9E148837A58A}"/>
               </a:ext>
             </a:extLst>
           </p:cNvPr>
@@ -2280,7 +2251,7 @@
         </p:nvSpPr>
         <p:spPr>
           <a:xfrm>
-            <a:off x="613886" y="1804162"/>
+            <a:off x="-10936266" y="1804162"/>
             <a:ext cx="448324" cy="190240"/>
           </a:xfrm>
           <a:prstGeom prst="rect">
@@ -2303,10 +2274,10 @@
       </p:sp>
       <p:sp>
         <p:nvSpPr>
-          <p:cNvPr id="10" name="ZoneTexte 9">
+          <p:cNvPr id="18" name="ZoneTexte 17">
             <a:extLst>
               <a:ext uri="{FF2B5EF4-FFF2-40B4-BE49-F238E27FC236}">
-                <a16:creationId xmlns:a16="http://schemas.microsoft.com/office/drawing/2014/main" id="{F9C0CE74-92EE-1034-6509-3A44F12E2C3D}"/>
+                <a16:creationId xmlns:a16="http://schemas.microsoft.com/office/drawing/2014/main" id="{925ED091-9BCC-DF55-3071-82DB50DE135B}"/>
               </a:ext>
             </a:extLst>
           </p:cNvPr>
@@ -2315,7 +2286,7 @@
         </p:nvSpPr>
         <p:spPr>
           <a:xfrm>
-            <a:off x="613886" y="2108733"/>
+            <a:off x="-10936266" y="2108733"/>
             <a:ext cx="448324" cy="190240"/>
           </a:xfrm>
           <a:prstGeom prst="rect">
@@ -2338,10 +2309,10 @@
       </p:sp>
       <p:sp>
         <p:nvSpPr>
-          <p:cNvPr id="11" name="Rectangle 10">
+          <p:cNvPr id="19" name="Rectangle 18">
             <a:extLst>
               <a:ext uri="{FF2B5EF4-FFF2-40B4-BE49-F238E27FC236}">
-                <a16:creationId xmlns:a16="http://schemas.microsoft.com/office/drawing/2014/main" id="{41F39233-9B8A-8A56-CB51-F21AF905588B}"/>
+                <a16:creationId xmlns:a16="http://schemas.microsoft.com/office/drawing/2014/main" id="{F8E8DDA4-336B-F63C-9BD2-8A011268993E}"/>
               </a:ext>
             </a:extLst>
           </p:cNvPr>
@@ -2350,7 +2321,7 @@
         </p:nvSpPr>
         <p:spPr>
           <a:xfrm>
-            <a:off x="1335550" y="1222691"/>
+            <a:off x="-10214602" y="1222691"/>
             <a:ext cx="259977" cy="161365"/>
           </a:xfrm>
           <a:prstGeom prst="rect">
@@ -2388,10 +2359,10 @@
       </p:sp>
       <p:sp>
         <p:nvSpPr>
-          <p:cNvPr id="12" name="ZoneTexte 11">
+          <p:cNvPr id="20" name="ZoneTexte 19">
             <a:extLst>
               <a:ext uri="{FF2B5EF4-FFF2-40B4-BE49-F238E27FC236}">
-                <a16:creationId xmlns:a16="http://schemas.microsoft.com/office/drawing/2014/main" id="{5C5D2799-4326-5227-ADEF-7176984988AD}"/>
+                <a16:creationId xmlns:a16="http://schemas.microsoft.com/office/drawing/2014/main" id="{9AC00840-2C79-E6CC-3FD9-405FFC42FB34}"/>
               </a:ext>
             </a:extLst>
           </p:cNvPr>
@@ -2400,7 +2371,7 @@
         </p:nvSpPr>
         <p:spPr>
           <a:xfrm>
-            <a:off x="1717113" y="1208254"/>
+            <a:off x="-9833039" y="1208254"/>
             <a:ext cx="868311" cy="190240"/>
           </a:xfrm>
           <a:prstGeom prst="rect">
@@ -2423,10 +2394,10 @@
       </p:sp>
       <p:sp>
         <p:nvSpPr>
-          <p:cNvPr id="13" name="Rectangle 12">
+          <p:cNvPr id="21" name="Rectangle 20">
             <a:extLst>
               <a:ext uri="{FF2B5EF4-FFF2-40B4-BE49-F238E27FC236}">
-                <a16:creationId xmlns:a16="http://schemas.microsoft.com/office/drawing/2014/main" id="{0D4D069F-F097-4907-EA49-68CCFB1EB56A}"/>
+                <a16:creationId xmlns:a16="http://schemas.microsoft.com/office/drawing/2014/main" id="{C5F56A52-EA7E-C181-2D5F-EA74C9D78130}"/>
               </a:ext>
             </a:extLst>
           </p:cNvPr>
@@ -2435,7 +2406,7 @@
         </p:nvSpPr>
         <p:spPr>
           <a:xfrm>
-            <a:off x="1327164" y="1532964"/>
+            <a:off x="-10222988" y="1532964"/>
             <a:ext cx="259977" cy="161365"/>
           </a:xfrm>
           <a:prstGeom prst="rect">
@@ -2478,10 +2449,10 @@
       </p:sp>
       <p:sp>
         <p:nvSpPr>
-          <p:cNvPr id="14" name="ZoneTexte 13">
+          <p:cNvPr id="22" name="ZoneTexte 21">
             <a:extLst>
               <a:ext uri="{FF2B5EF4-FFF2-40B4-BE49-F238E27FC236}">
-                <a16:creationId xmlns:a16="http://schemas.microsoft.com/office/drawing/2014/main" id="{3C391C77-29B5-D98D-90C5-919D0E240AE4}"/>
+                <a16:creationId xmlns:a16="http://schemas.microsoft.com/office/drawing/2014/main" id="{B1A85DD6-AE74-07A4-94F0-EEFBD93A4925}"/>
               </a:ext>
             </a:extLst>
           </p:cNvPr>
@@ -2490,7 +2461,7 @@
         </p:nvSpPr>
         <p:spPr>
           <a:xfrm>
-            <a:off x="1717113" y="1518526"/>
+            <a:off x="-9833039" y="1518526"/>
             <a:ext cx="868311" cy="190240"/>
           </a:xfrm>
           <a:prstGeom prst="rect">
@@ -2513,10 +2484,10 @@
       </p:sp>
       <p:sp>
         <p:nvSpPr>
-          <p:cNvPr id="15" name="Rectangle 14">
+          <p:cNvPr id="23" name="Rectangle 22">
             <a:extLst>
               <a:ext uri="{FF2B5EF4-FFF2-40B4-BE49-F238E27FC236}">
-                <a16:creationId xmlns:a16="http://schemas.microsoft.com/office/drawing/2014/main" id="{57767782-3FE0-2F0D-C636-88C2731F9A7C}"/>
+                <a16:creationId xmlns:a16="http://schemas.microsoft.com/office/drawing/2014/main" id="{396DBAF4-158A-510C-6A69-A2D96127FB21}"/>
               </a:ext>
             </a:extLst>
           </p:cNvPr>
@@ -2525,7 +2496,7 @@
         </p:nvSpPr>
         <p:spPr>
           <a:xfrm>
-            <a:off x="1327164" y="1844763"/>
+            <a:off x="-10222988" y="1844763"/>
             <a:ext cx="259977" cy="161365"/>
           </a:xfrm>
           <a:prstGeom prst="rect">
@@ -2566,10 +2537,10 @@
       </p:sp>
       <p:sp>
         <p:nvSpPr>
-          <p:cNvPr id="16" name="ZoneTexte 15">
+          <p:cNvPr id="24" name="ZoneTexte 23">
             <a:extLst>
               <a:ext uri="{FF2B5EF4-FFF2-40B4-BE49-F238E27FC236}">
-                <a16:creationId xmlns:a16="http://schemas.microsoft.com/office/drawing/2014/main" id="{BBC81B5D-F605-20D1-523B-0A93121A2A82}"/>
+                <a16:creationId xmlns:a16="http://schemas.microsoft.com/office/drawing/2014/main" id="{B1E97DDC-7F59-1827-21FA-5728AE6D87B8}"/>
               </a:ext>
             </a:extLst>
           </p:cNvPr>
@@ -2578,7 +2549,7 @@
         </p:nvSpPr>
         <p:spPr>
           <a:xfrm>
-            <a:off x="1717112" y="1812801"/>
+            <a:off x="-9833040" y="1812801"/>
             <a:ext cx="868311" cy="190240"/>
           </a:xfrm>
           <a:prstGeom prst="rect">
@@ -2601,10 +2572,10 @@
       </p:sp>
       <p:sp>
         <p:nvSpPr>
-          <p:cNvPr id="17" name="Rectangle 16">
+          <p:cNvPr id="25" name="Rectangle 24">
             <a:extLst>
               <a:ext uri="{FF2B5EF4-FFF2-40B4-BE49-F238E27FC236}">
-                <a16:creationId xmlns:a16="http://schemas.microsoft.com/office/drawing/2014/main" id="{1AAA32CD-F612-1F7B-2DBA-24CCD0E34F42}"/>
+                <a16:creationId xmlns:a16="http://schemas.microsoft.com/office/drawing/2014/main" id="{7D0C72CD-314C-1933-739A-0624BF7C83D9}"/>
               </a:ext>
             </a:extLst>
           </p:cNvPr>
@@ -2613,7 +2584,7 @@
         </p:nvSpPr>
         <p:spPr>
           <a:xfrm>
-            <a:off x="1327136" y="2119677"/>
+            <a:off x="-10223016" y="2119677"/>
             <a:ext cx="259977" cy="161365"/>
           </a:xfrm>
           <a:prstGeom prst="rect">
@@ -2654,10 +2625,10 @@
       </p:sp>
       <p:sp>
         <p:nvSpPr>
-          <p:cNvPr id="18" name="ZoneTexte 17">
+          <p:cNvPr id="26" name="ZoneTexte 25">
             <a:extLst>
               <a:ext uri="{FF2B5EF4-FFF2-40B4-BE49-F238E27FC236}">
-                <a16:creationId xmlns:a16="http://schemas.microsoft.com/office/drawing/2014/main" id="{874FB7A9-4BF8-7F38-7E5F-B16504EDA9DB}"/>
+                <a16:creationId xmlns:a16="http://schemas.microsoft.com/office/drawing/2014/main" id="{48994F6F-7969-521A-5336-620FFD50993F}"/>
               </a:ext>
             </a:extLst>
           </p:cNvPr>
@@ -2666,7 +2637,7 @@
         </p:nvSpPr>
         <p:spPr>
           <a:xfrm>
-            <a:off x="1717111" y="2119677"/>
+            <a:off x="-9833041" y="2119677"/>
             <a:ext cx="868311" cy="190240"/>
           </a:xfrm>
           <a:prstGeom prst="rect">
@@ -2689,10 +2660,10 @@
       </p:sp>
       <p:grpSp>
         <p:nvGrpSpPr>
-          <p:cNvPr id="22" name="Groupe 21">
+          <p:cNvPr id="27" name="Groupe 26">
             <a:extLst>
               <a:ext uri="{FF2B5EF4-FFF2-40B4-BE49-F238E27FC236}">
-                <a16:creationId xmlns:a16="http://schemas.microsoft.com/office/drawing/2014/main" id="{791C41C3-2928-383A-3DCD-20DA9F9952C4}"/>
+                <a16:creationId xmlns:a16="http://schemas.microsoft.com/office/drawing/2014/main" id="{A87E510E-1C8F-FAFF-60AB-83EE34011BE8}"/>
               </a:ext>
             </a:extLst>
           </p:cNvPr>
@@ -2701,7 +2672,7 @@
         </p:nvGrpSpPr>
         <p:grpSpPr>
           <a:xfrm>
-            <a:off x="304816" y="2874859"/>
+            <a:off x="-11245336" y="2874859"/>
             <a:ext cx="260819" cy="294490"/>
             <a:chOff x="4920297" y="2761668"/>
             <a:chExt cx="233680" cy="263847"/>
@@ -2709,10 +2680,10 @@
         </p:grpSpPr>
         <p:sp>
           <p:nvSpPr>
-            <p:cNvPr id="21" name="Rectangle 20">
+            <p:cNvPr id="28" name="Rectangle 27">
               <a:extLst>
                 <a:ext uri="{FF2B5EF4-FFF2-40B4-BE49-F238E27FC236}">
-                  <a16:creationId xmlns:a16="http://schemas.microsoft.com/office/drawing/2014/main" id="{A19B8650-12D9-F4F6-0AC4-A0972CF8392B}"/>
+                  <a16:creationId xmlns:a16="http://schemas.microsoft.com/office/drawing/2014/main" id="{7CDF683A-9036-9ABC-762C-567C43A7688F}"/>
                 </a:ext>
               </a:extLst>
             </p:cNvPr>
@@ -2761,10 +2732,10 @@
         </p:sp>
         <p:pic>
           <p:nvPicPr>
-            <p:cNvPr id="20" name="Image 19" descr="Une image contenant noir, obscurité&#10;&#10;Description générée automatiquement">
+            <p:cNvPr id="29" name="Image 28" descr="Une image contenant noir, obscurité&#10;&#10;Description générée automatiquement">
               <a:extLst>
                 <a:ext uri="{FF2B5EF4-FFF2-40B4-BE49-F238E27FC236}">
-                  <a16:creationId xmlns:a16="http://schemas.microsoft.com/office/drawing/2014/main" id="{7C37E2EA-B042-3DB9-EAA2-FA3EC7EA5AF0}"/>
+                  <a16:creationId xmlns:a16="http://schemas.microsoft.com/office/drawing/2014/main" id="{2FB3136E-5CE9-43F0-F78D-6DF9606704CB}"/>
                 </a:ext>
               </a:extLst>
             </p:cNvPr>
@@ -2774,7 +2745,7 @@
             <p:nvPr/>
           </p:nvPicPr>
           <p:blipFill rotWithShape="1">
-            <a:blip r:embed="rId3">
+            <a:blip r:embed="rId2">
               <a:duotone>
                 <a:schemeClr val="accent5">
                   <a:shade val="45000"/>
@@ -2804,10 +2775,10 @@
       </p:grpSp>
       <p:sp>
         <p:nvSpPr>
-          <p:cNvPr id="23" name="ZoneTexte 22">
+          <p:cNvPr id="30" name="ZoneTexte 29">
             <a:extLst>
               <a:ext uri="{FF2B5EF4-FFF2-40B4-BE49-F238E27FC236}">
-                <a16:creationId xmlns:a16="http://schemas.microsoft.com/office/drawing/2014/main" id="{0D8BA2EA-0772-377B-DBEB-510A36FA5BDE}"/>
+                <a16:creationId xmlns:a16="http://schemas.microsoft.com/office/drawing/2014/main" id="{56C162F3-B978-20BD-08F5-D3306EB5A186}"/>
               </a:ext>
             </a:extLst>
           </p:cNvPr>
@@ -2816,7 +2787,7 @@
         </p:nvSpPr>
         <p:spPr>
           <a:xfrm>
-            <a:off x="635407" y="2926984"/>
+            <a:off x="-10914745" y="2926984"/>
             <a:ext cx="331304" cy="190240"/>
           </a:xfrm>
           <a:prstGeom prst="rect">
@@ -2839,10 +2810,10 @@
       </p:sp>
       <p:grpSp>
         <p:nvGrpSpPr>
-          <p:cNvPr id="27" name="Groupe 26">
+          <p:cNvPr id="31" name="Groupe 30">
             <a:extLst>
               <a:ext uri="{FF2B5EF4-FFF2-40B4-BE49-F238E27FC236}">
-                <a16:creationId xmlns:a16="http://schemas.microsoft.com/office/drawing/2014/main" id="{390A2CD3-1C44-DCB4-CB9C-F3E66DBD639D}"/>
+                <a16:creationId xmlns:a16="http://schemas.microsoft.com/office/drawing/2014/main" id="{32D49815-D015-3783-F799-C2430B16608C}"/>
               </a:ext>
             </a:extLst>
           </p:cNvPr>
@@ -2851,7 +2822,7 @@
         </p:nvGrpSpPr>
         <p:grpSpPr>
           <a:xfrm>
-            <a:off x="297402" y="3311033"/>
+            <a:off x="-11252750" y="3311033"/>
             <a:ext cx="268233" cy="255984"/>
             <a:chOff x="5256484" y="2724151"/>
             <a:chExt cx="536465" cy="511968"/>
@@ -2859,10 +2830,10 @@
         </p:grpSpPr>
         <p:sp>
           <p:nvSpPr>
-            <p:cNvPr id="26" name="Rectangle 25">
+            <p:cNvPr id="32" name="Rectangle 31">
               <a:extLst>
                 <a:ext uri="{FF2B5EF4-FFF2-40B4-BE49-F238E27FC236}">
-                  <a16:creationId xmlns:a16="http://schemas.microsoft.com/office/drawing/2014/main" id="{A92E0574-7401-BF56-4383-9736BB602BDD}"/>
+                  <a16:creationId xmlns:a16="http://schemas.microsoft.com/office/drawing/2014/main" id="{4F00D072-3F87-7117-E80D-89EBEE07FC59}"/>
                 </a:ext>
               </a:extLst>
             </p:cNvPr>
@@ -2911,10 +2882,10 @@
         </p:sp>
         <p:pic>
           <p:nvPicPr>
-            <p:cNvPr id="25" name="Image 24" descr="Une image contenant noir, obscurité&#10;&#10;Description générée automatiquement">
+            <p:cNvPr id="33" name="Image 32" descr="Une image contenant noir, obscurité&#10;&#10;Description générée automatiquement">
               <a:extLst>
                 <a:ext uri="{FF2B5EF4-FFF2-40B4-BE49-F238E27FC236}">
-                  <a16:creationId xmlns:a16="http://schemas.microsoft.com/office/drawing/2014/main" id="{82F95605-7840-E225-57E7-335C7616181E}"/>
+                  <a16:creationId xmlns:a16="http://schemas.microsoft.com/office/drawing/2014/main" id="{15E4193F-D85A-AF49-729E-850EF8570ED4}"/>
                 </a:ext>
               </a:extLst>
             </p:cNvPr>
@@ -2924,7 +2895,7 @@
             <p:nvPr/>
           </p:nvPicPr>
           <p:blipFill rotWithShape="1">
-            <a:blip r:embed="rId4">
+            <a:blip r:embed="rId3">
               <a:duotone>
                 <a:schemeClr val="accent5">
                   <a:shade val="45000"/>
@@ -2954,10 +2925,10 @@
       </p:grpSp>
       <p:sp>
         <p:nvSpPr>
-          <p:cNvPr id="28" name="ZoneTexte 27">
+          <p:cNvPr id="34" name="ZoneTexte 33">
             <a:extLst>
               <a:ext uri="{FF2B5EF4-FFF2-40B4-BE49-F238E27FC236}">
-                <a16:creationId xmlns:a16="http://schemas.microsoft.com/office/drawing/2014/main" id="{CCF5E0BD-22C5-F25F-9C8F-6544DCB7843B}"/>
+                <a16:creationId xmlns:a16="http://schemas.microsoft.com/office/drawing/2014/main" id="{D49BD364-4D22-1B0C-65E1-FE85FB01478D}"/>
               </a:ext>
             </a:extLst>
           </p:cNvPr>
@@ -2966,7 +2937,7 @@
         </p:nvSpPr>
         <p:spPr>
           <a:xfrm>
-            <a:off x="635407" y="3347884"/>
+            <a:off x="-10914745" y="3347884"/>
             <a:ext cx="510840" cy="190240"/>
           </a:xfrm>
           <a:prstGeom prst="rect">
@@ -2989,10 +2960,10 @@
       </p:sp>
       <p:grpSp>
         <p:nvGrpSpPr>
-          <p:cNvPr id="32" name="Groupe 31">
+          <p:cNvPr id="35" name="Groupe 34">
             <a:extLst>
               <a:ext uri="{FF2B5EF4-FFF2-40B4-BE49-F238E27FC236}">
-                <a16:creationId xmlns:a16="http://schemas.microsoft.com/office/drawing/2014/main" id="{4A958CDC-8527-FFF3-D76C-99DC19ED0F19}"/>
+                <a16:creationId xmlns:a16="http://schemas.microsoft.com/office/drawing/2014/main" id="{EB933E16-FB0F-2641-9F65-BAB382CA353E}"/>
               </a:ext>
             </a:extLst>
           </p:cNvPr>
@@ -3001,7 +2972,7 @@
         </p:nvGrpSpPr>
         <p:grpSpPr>
           <a:xfrm>
-            <a:off x="2930271" y="2953204"/>
+            <a:off x="-8619881" y="2953204"/>
             <a:ext cx="254374" cy="320334"/>
             <a:chOff x="5078132" y="3088349"/>
             <a:chExt cx="853562" cy="1083071"/>
@@ -3009,10 +2980,10 @@
         </p:grpSpPr>
         <p:sp>
           <p:nvSpPr>
-            <p:cNvPr id="31" name="Rectangle 30">
+            <p:cNvPr id="36" name="Rectangle 35">
               <a:extLst>
                 <a:ext uri="{FF2B5EF4-FFF2-40B4-BE49-F238E27FC236}">
-                  <a16:creationId xmlns:a16="http://schemas.microsoft.com/office/drawing/2014/main" id="{6F5284BC-0A40-AC82-D573-3432962F30B8}"/>
+                  <a16:creationId xmlns:a16="http://schemas.microsoft.com/office/drawing/2014/main" id="{C56CF576-2929-3638-3494-C4A938845204}"/>
                 </a:ext>
               </a:extLst>
             </p:cNvPr>
@@ -3061,10 +3032,10 @@
         </p:sp>
         <p:pic>
           <p:nvPicPr>
-            <p:cNvPr id="30" name="Image 29" descr="Une image contenant noir, obscurité&#10;&#10;Description générée automatiquement">
+            <p:cNvPr id="37" name="Image 36" descr="Une image contenant noir, obscurité&#10;&#10;Description générée automatiquement">
               <a:extLst>
                 <a:ext uri="{FF2B5EF4-FFF2-40B4-BE49-F238E27FC236}">
-                  <a16:creationId xmlns:a16="http://schemas.microsoft.com/office/drawing/2014/main" id="{EC75B6D0-3FED-A60A-F005-74C291DDFE51}"/>
+                  <a16:creationId xmlns:a16="http://schemas.microsoft.com/office/drawing/2014/main" id="{B39D6245-F3E5-EC05-0DE7-718731A63B88}"/>
                 </a:ext>
               </a:extLst>
             </p:cNvPr>
@@ -3074,7 +3045,7 @@
             <p:nvPr/>
           </p:nvPicPr>
           <p:blipFill rotWithShape="1">
-            <a:blip r:embed="rId5">
+            <a:blip r:embed="rId4">
               <a:duotone>
                 <a:schemeClr val="accent4">
                   <a:shade val="45000"/>
@@ -3104,10 +3075,10 @@
       </p:grpSp>
       <p:sp>
         <p:nvSpPr>
-          <p:cNvPr id="33" name="ZoneTexte 32">
+          <p:cNvPr id="38" name="ZoneTexte 37">
             <a:extLst>
               <a:ext uri="{FF2B5EF4-FFF2-40B4-BE49-F238E27FC236}">
-                <a16:creationId xmlns:a16="http://schemas.microsoft.com/office/drawing/2014/main" id="{0318DB3F-91C0-0216-D385-484BF13DE7E6}"/>
+                <a16:creationId xmlns:a16="http://schemas.microsoft.com/office/drawing/2014/main" id="{4965DFA4-3300-3519-69D3-41A249588C70}"/>
               </a:ext>
             </a:extLst>
           </p:cNvPr>
@@ -3116,7 +3087,7 @@
         </p:nvSpPr>
         <p:spPr>
           <a:xfrm>
-            <a:off x="3292327" y="3003813"/>
+            <a:off x="-8257825" y="3003813"/>
             <a:ext cx="969299" cy="190240"/>
           </a:xfrm>
           <a:prstGeom prst="rect">
@@ -3139,10 +3110,10 @@
       </p:sp>
       <p:grpSp>
         <p:nvGrpSpPr>
-          <p:cNvPr id="34" name="Groupe 33">
+          <p:cNvPr id="39" name="Groupe 38">
             <a:extLst>
               <a:ext uri="{FF2B5EF4-FFF2-40B4-BE49-F238E27FC236}">
-                <a16:creationId xmlns:a16="http://schemas.microsoft.com/office/drawing/2014/main" id="{8E626D13-12A7-2FDA-DE5C-61B062CE76B7}"/>
+                <a16:creationId xmlns:a16="http://schemas.microsoft.com/office/drawing/2014/main" id="{603D4F21-B0A6-5457-4FCE-D7CCDC469C69}"/>
               </a:ext>
             </a:extLst>
           </p:cNvPr>
@@ -3151,7 +3122,7 @@
         </p:nvGrpSpPr>
         <p:grpSpPr>
           <a:xfrm>
-            <a:off x="2926970" y="3319989"/>
+            <a:off x="-8623182" y="3319989"/>
             <a:ext cx="254374" cy="320334"/>
             <a:chOff x="5078132" y="3088349"/>
             <a:chExt cx="853562" cy="1083071"/>
@@ -3159,10 +3130,10 @@
         </p:grpSpPr>
         <p:sp>
           <p:nvSpPr>
-            <p:cNvPr id="35" name="Rectangle 34">
+            <p:cNvPr id="40" name="Rectangle 39">
               <a:extLst>
                 <a:ext uri="{FF2B5EF4-FFF2-40B4-BE49-F238E27FC236}">
-                  <a16:creationId xmlns:a16="http://schemas.microsoft.com/office/drawing/2014/main" id="{DAE1066E-BCE8-ECF9-B8B0-B8E235B97106}"/>
+                  <a16:creationId xmlns:a16="http://schemas.microsoft.com/office/drawing/2014/main" id="{C667A3DC-6B6D-17EF-F16D-71F93D996318}"/>
                 </a:ext>
               </a:extLst>
             </p:cNvPr>
@@ -3211,10 +3182,10 @@
         </p:sp>
         <p:pic>
           <p:nvPicPr>
-            <p:cNvPr id="36" name="Image 35" descr="Une image contenant noir, obscurité&#10;&#10;Description générée automatiquement">
+            <p:cNvPr id="41" name="Image 40" descr="Une image contenant noir, obscurité&#10;&#10;Description générée automatiquement">
               <a:extLst>
                 <a:ext uri="{FF2B5EF4-FFF2-40B4-BE49-F238E27FC236}">
-                  <a16:creationId xmlns:a16="http://schemas.microsoft.com/office/drawing/2014/main" id="{18990A6B-F96E-8DD3-DD49-A7015BAD446F}"/>
+                  <a16:creationId xmlns:a16="http://schemas.microsoft.com/office/drawing/2014/main" id="{0C5BB01F-4262-D9FB-F98C-C8FDDDEE10D3}"/>
                 </a:ext>
               </a:extLst>
             </p:cNvPr>
@@ -3224,7 +3195,7 @@
             <p:nvPr/>
           </p:nvPicPr>
           <p:blipFill rotWithShape="1">
-            <a:blip r:embed="rId5">
+            <a:blip r:embed="rId4">
               <a:duotone>
                 <a:schemeClr val="accent2">
                   <a:shade val="45000"/>
@@ -3254,10 +3225,10 @@
       </p:grpSp>
       <p:sp>
         <p:nvSpPr>
-          <p:cNvPr id="37" name="ZoneTexte 36">
+          <p:cNvPr id="42" name="ZoneTexte 41">
             <a:extLst>
               <a:ext uri="{FF2B5EF4-FFF2-40B4-BE49-F238E27FC236}">
-                <a16:creationId xmlns:a16="http://schemas.microsoft.com/office/drawing/2014/main" id="{3D8579AF-44C3-4046-A1E5-76F9F1A6F4A0}"/>
+                <a16:creationId xmlns:a16="http://schemas.microsoft.com/office/drawing/2014/main" id="{DD4746CA-A4A0-BA2B-490F-74C125C5866E}"/>
               </a:ext>
             </a:extLst>
           </p:cNvPr>
@@ -3266,7 +3237,7 @@
         </p:nvSpPr>
         <p:spPr>
           <a:xfrm>
-            <a:off x="3280151" y="3334787"/>
+            <a:off x="-8270001" y="3334787"/>
             <a:ext cx="1288297" cy="190240"/>
           </a:xfrm>
           <a:prstGeom prst="rect">
@@ -3289,10 +3260,10 @@
       </p:sp>
       <p:grpSp>
         <p:nvGrpSpPr>
-          <p:cNvPr id="38" name="Groupe 37">
+          <p:cNvPr id="43" name="Groupe 42">
             <a:extLst>
               <a:ext uri="{FF2B5EF4-FFF2-40B4-BE49-F238E27FC236}">
-                <a16:creationId xmlns:a16="http://schemas.microsoft.com/office/drawing/2014/main" id="{E546D7D3-DBB4-8FF8-D471-B7CA1E2D4F31}"/>
+                <a16:creationId xmlns:a16="http://schemas.microsoft.com/office/drawing/2014/main" id="{134010B6-5583-C20A-0EEA-F6C529433F56}"/>
               </a:ext>
             </a:extLst>
           </p:cNvPr>
@@ -3301,7 +3272,7 @@
         </p:nvGrpSpPr>
         <p:grpSpPr>
           <a:xfrm>
-            <a:off x="2926970" y="3690023"/>
+            <a:off x="-8623182" y="3690023"/>
             <a:ext cx="254374" cy="320334"/>
             <a:chOff x="5078132" y="3088349"/>
             <a:chExt cx="853562" cy="1083071"/>
@@ -3309,10 +3280,10 @@
         </p:grpSpPr>
         <p:sp>
           <p:nvSpPr>
-            <p:cNvPr id="39" name="Rectangle 38">
+            <p:cNvPr id="44" name="Rectangle 43">
               <a:extLst>
                 <a:ext uri="{FF2B5EF4-FFF2-40B4-BE49-F238E27FC236}">
-                  <a16:creationId xmlns:a16="http://schemas.microsoft.com/office/drawing/2014/main" id="{C7492DA8-A1DE-9FCE-080F-C6F3ABCC343C}"/>
+                  <a16:creationId xmlns:a16="http://schemas.microsoft.com/office/drawing/2014/main" id="{5B73842F-94B1-4F1E-89DF-D2FA0A9090A5}"/>
                 </a:ext>
               </a:extLst>
             </p:cNvPr>
@@ -3361,10 +3332,10 @@
         </p:sp>
         <p:pic>
           <p:nvPicPr>
-            <p:cNvPr id="40" name="Image 39" descr="Une image contenant noir, obscurité&#10;&#10;Description générée automatiquement">
+            <p:cNvPr id="45" name="Image 44" descr="Une image contenant noir, obscurité&#10;&#10;Description générée automatiquement">
               <a:extLst>
                 <a:ext uri="{FF2B5EF4-FFF2-40B4-BE49-F238E27FC236}">
-                  <a16:creationId xmlns:a16="http://schemas.microsoft.com/office/drawing/2014/main" id="{69D9A4E1-7B87-C520-0CBB-B0E9A7D7A163}"/>
+                  <a16:creationId xmlns:a16="http://schemas.microsoft.com/office/drawing/2014/main" id="{37EECBC0-B7D3-A03E-939D-48EF53AD477C}"/>
                 </a:ext>
               </a:extLst>
             </p:cNvPr>
@@ -3374,7 +3345,7 @@
             <p:nvPr/>
           </p:nvPicPr>
           <p:blipFill rotWithShape="1">
-            <a:blip r:embed="rId5">
+            <a:blip r:embed="rId4">
               <a:duotone>
                 <a:schemeClr val="accent6">
                   <a:shade val="45000"/>
@@ -3404,10 +3375,10 @@
       </p:grpSp>
       <p:sp>
         <p:nvSpPr>
-          <p:cNvPr id="41" name="ZoneTexte 40">
+          <p:cNvPr id="46" name="ZoneTexte 45">
             <a:extLst>
               <a:ext uri="{FF2B5EF4-FFF2-40B4-BE49-F238E27FC236}">
-                <a16:creationId xmlns:a16="http://schemas.microsoft.com/office/drawing/2014/main" id="{29471419-DBD2-E923-B183-D3BC57D6664A}"/>
+                <a16:creationId xmlns:a16="http://schemas.microsoft.com/office/drawing/2014/main" id="{FC720043-3CF6-1532-36B9-437246F8F54E}"/>
               </a:ext>
             </a:extLst>
           </p:cNvPr>
@@ -3416,7 +3387,7 @@
         </p:nvSpPr>
         <p:spPr>
           <a:xfrm>
-            <a:off x="3292327" y="3724997"/>
+            <a:off x="-8257825" y="3724997"/>
             <a:ext cx="986933" cy="190240"/>
           </a:xfrm>
           <a:prstGeom prst="rect">
@@ -3439,10 +3410,10 @@
       </p:sp>
       <p:grpSp>
         <p:nvGrpSpPr>
-          <p:cNvPr id="42" name="Groupe 41">
+          <p:cNvPr id="47" name="Groupe 46">
             <a:extLst>
               <a:ext uri="{FF2B5EF4-FFF2-40B4-BE49-F238E27FC236}">
-                <a16:creationId xmlns:a16="http://schemas.microsoft.com/office/drawing/2014/main" id="{575C6D02-D2DB-AE27-B782-72C52C9582B2}"/>
+                <a16:creationId xmlns:a16="http://schemas.microsoft.com/office/drawing/2014/main" id="{5C38534D-B6CE-834C-E069-12F90E76CEEF}"/>
               </a:ext>
             </a:extLst>
           </p:cNvPr>
@@ -3451,7 +3422,7 @@
         </p:nvGrpSpPr>
         <p:grpSpPr>
           <a:xfrm>
-            <a:off x="2926970" y="4060057"/>
+            <a:off x="-8623182" y="4060057"/>
             <a:ext cx="254374" cy="320334"/>
             <a:chOff x="5078132" y="3088349"/>
             <a:chExt cx="853562" cy="1083071"/>
@@ -3459,10 +3430,10 @@
         </p:grpSpPr>
         <p:sp>
           <p:nvSpPr>
-            <p:cNvPr id="43" name="Rectangle 42">
+            <p:cNvPr id="48" name="Rectangle 47">
               <a:extLst>
                 <a:ext uri="{FF2B5EF4-FFF2-40B4-BE49-F238E27FC236}">
-                  <a16:creationId xmlns:a16="http://schemas.microsoft.com/office/drawing/2014/main" id="{418C623D-2B26-0887-AB4B-F05914028CE1}"/>
+                  <a16:creationId xmlns:a16="http://schemas.microsoft.com/office/drawing/2014/main" id="{B4C9C97D-C300-AE51-9377-69F51EF0C340}"/>
                 </a:ext>
               </a:extLst>
             </p:cNvPr>
@@ -3511,10 +3482,10 @@
         </p:sp>
         <p:pic>
           <p:nvPicPr>
-            <p:cNvPr id="44" name="Image 43" descr="Une image contenant noir, obscurité&#10;&#10;Description générée automatiquement">
+            <p:cNvPr id="49" name="Image 48" descr="Une image contenant noir, obscurité&#10;&#10;Description générée automatiquement">
               <a:extLst>
                 <a:ext uri="{FF2B5EF4-FFF2-40B4-BE49-F238E27FC236}">
-                  <a16:creationId xmlns:a16="http://schemas.microsoft.com/office/drawing/2014/main" id="{97FD0E4A-DCD5-0FA3-AB0C-DBA52B62AD3E}"/>
+                  <a16:creationId xmlns:a16="http://schemas.microsoft.com/office/drawing/2014/main" id="{470902B1-F00D-15FC-39FB-862D6D184BCF}"/>
                 </a:ext>
               </a:extLst>
             </p:cNvPr>
@@ -3524,7 +3495,7 @@
             <p:nvPr/>
           </p:nvPicPr>
           <p:blipFill rotWithShape="1">
-            <a:blip r:embed="rId5">
+            <a:blip r:embed="rId4">
               <a:duotone>
                 <a:prstClr val="black"/>
                 <a:schemeClr val="accent4">
@@ -3554,10 +3525,10 @@
       </p:grpSp>
       <p:sp>
         <p:nvSpPr>
-          <p:cNvPr id="45" name="ZoneTexte 44">
+          <p:cNvPr id="50" name="ZoneTexte 49">
             <a:extLst>
               <a:ext uri="{FF2B5EF4-FFF2-40B4-BE49-F238E27FC236}">
-                <a16:creationId xmlns:a16="http://schemas.microsoft.com/office/drawing/2014/main" id="{E8AD15AE-7EB5-7E6E-E1F9-8052848B9D51}"/>
+                <a16:creationId xmlns:a16="http://schemas.microsoft.com/office/drawing/2014/main" id="{1E1832D7-C71F-5A75-0693-FA844F3EBF95}"/>
               </a:ext>
             </a:extLst>
           </p:cNvPr>
@@ -3566,7 +3537,7 @@
         </p:nvSpPr>
         <p:spPr>
           <a:xfrm>
-            <a:off x="3274693" y="4105477"/>
+            <a:off x="-8275459" y="4105477"/>
             <a:ext cx="1015787" cy="190240"/>
           </a:xfrm>
           <a:prstGeom prst="rect">
@@ -3589,10 +3560,10 @@
       </p:sp>
       <p:pic>
         <p:nvPicPr>
-          <p:cNvPr id="47" name="Image 46" descr="Une image contenant noir, obscurité&#10;&#10;Description générée automatiquement">
+          <p:cNvPr id="51" name="Image 50" descr="Une image contenant noir, obscurité&#10;&#10;Description générée automatiquement">
             <a:extLst>
               <a:ext uri="{FF2B5EF4-FFF2-40B4-BE49-F238E27FC236}">
-                <a16:creationId xmlns:a16="http://schemas.microsoft.com/office/drawing/2014/main" id="{6B6A43D7-4E9A-5B54-7DDA-A38578D0E36C}"/>
+                <a16:creationId xmlns:a16="http://schemas.microsoft.com/office/drawing/2014/main" id="{1C3E2042-CFE4-6DF8-BBFE-C332FDB220AC}"/>
               </a:ext>
             </a:extLst>
           </p:cNvPr>
@@ -3602,7 +3573,7 @@
           <p:nvPr/>
         </p:nvPicPr>
         <p:blipFill rotWithShape="1">
-          <a:blip r:embed="rId6">
+          <a:blip r:embed="rId5">
             <a:duotone>
               <a:schemeClr val="accent5">
                 <a:shade val="45000"/>
@@ -3621,7 +3592,7 @@
         </p:blipFill>
         <p:spPr>
           <a:xfrm>
-            <a:off x="2938644" y="4483451"/>
+            <a:off x="-8611508" y="4483451"/>
             <a:ext cx="265815" cy="188659"/>
           </a:xfrm>
           <a:prstGeom prst="rect">
@@ -3631,10 +3602,10 @@
       </p:pic>
       <p:sp>
         <p:nvSpPr>
-          <p:cNvPr id="48" name="ZoneTexte 47">
+          <p:cNvPr id="52" name="ZoneTexte 51">
             <a:extLst>
               <a:ext uri="{FF2B5EF4-FFF2-40B4-BE49-F238E27FC236}">
-                <a16:creationId xmlns:a16="http://schemas.microsoft.com/office/drawing/2014/main" id="{53FE53F7-F4DC-4FB9-C76F-C683E5C33BDA}"/>
+                <a16:creationId xmlns:a16="http://schemas.microsoft.com/office/drawing/2014/main" id="{98F7E99D-D899-2E69-8340-F150CC5975D9}"/>
               </a:ext>
             </a:extLst>
           </p:cNvPr>
@@ -3643,7 +3614,7 @@
         </p:nvSpPr>
         <p:spPr>
           <a:xfrm>
-            <a:off x="3269082" y="4473265"/>
+            <a:off x="-8281070" y="4473265"/>
             <a:ext cx="310466" cy="190240"/>
           </a:xfrm>
           <a:prstGeom prst="rect">
@@ -3666,10 +3637,10 @@
       </p:sp>
       <p:grpSp>
         <p:nvGrpSpPr>
-          <p:cNvPr id="52" name="Groupe 51">
+          <p:cNvPr id="53" name="Groupe 52">
             <a:extLst>
               <a:ext uri="{FF2B5EF4-FFF2-40B4-BE49-F238E27FC236}">
-                <a16:creationId xmlns:a16="http://schemas.microsoft.com/office/drawing/2014/main" id="{5A0BE7F3-909A-3A37-7420-2287972B1641}"/>
+                <a16:creationId xmlns:a16="http://schemas.microsoft.com/office/drawing/2014/main" id="{6D97EB62-C240-9A31-63B7-5D44EAB73354}"/>
               </a:ext>
             </a:extLst>
           </p:cNvPr>
@@ -3678,7 +3649,7 @@
         </p:nvGrpSpPr>
         <p:grpSpPr>
           <a:xfrm>
-            <a:off x="5372956" y="3394124"/>
+            <a:off x="-6177196" y="3394124"/>
             <a:ext cx="288000" cy="288000"/>
             <a:chOff x="5475382" y="3886190"/>
             <a:chExt cx="1264766" cy="1544351"/>
@@ -3686,10 +3657,10 @@
         </p:grpSpPr>
         <p:sp>
           <p:nvSpPr>
-            <p:cNvPr id="51" name="Forme libre : forme 50">
+            <p:cNvPr id="54" name="Forme libre : forme 53">
               <a:extLst>
                 <a:ext uri="{FF2B5EF4-FFF2-40B4-BE49-F238E27FC236}">
-                  <a16:creationId xmlns:a16="http://schemas.microsoft.com/office/drawing/2014/main" id="{DC9E4FDF-27E1-4DB4-B756-E00646C1E59E}"/>
+                  <a16:creationId xmlns:a16="http://schemas.microsoft.com/office/drawing/2014/main" id="{C73D0675-4621-921B-3C33-CC24F5FE5475}"/>
                 </a:ext>
               </a:extLst>
             </p:cNvPr>
@@ -3837,10 +3808,10 @@
         </p:sp>
         <p:pic>
           <p:nvPicPr>
-            <p:cNvPr id="50" name="Image 49" descr="Une image contenant noir, obscurité&#10;&#10;Description générée automatiquement">
+            <p:cNvPr id="55" name="Image 54" descr="Une image contenant noir, obscurité&#10;&#10;Description générée automatiquement">
               <a:extLst>
                 <a:ext uri="{FF2B5EF4-FFF2-40B4-BE49-F238E27FC236}">
-                  <a16:creationId xmlns:a16="http://schemas.microsoft.com/office/drawing/2014/main" id="{A812AA71-B1EF-7D6B-CC3A-F8A0894CF5C4}"/>
+                  <a16:creationId xmlns:a16="http://schemas.microsoft.com/office/drawing/2014/main" id="{41BB9EAB-5E87-6FD4-F9F0-A09C2E534D8A}"/>
                 </a:ext>
               </a:extLst>
             </p:cNvPr>
@@ -3850,7 +3821,7 @@
             <p:nvPr/>
           </p:nvPicPr>
           <p:blipFill rotWithShape="1">
-            <a:blip r:embed="rId7">
+            <a:blip r:embed="rId6">
               <a:duotone>
                 <a:schemeClr val="accent5">
                   <a:shade val="45000"/>
@@ -3880,10 +3851,10 @@
       </p:grpSp>
       <p:sp>
         <p:nvSpPr>
-          <p:cNvPr id="53" name="ZoneTexte 52">
+          <p:cNvPr id="56" name="ZoneTexte 55">
             <a:extLst>
               <a:ext uri="{FF2B5EF4-FFF2-40B4-BE49-F238E27FC236}">
-                <a16:creationId xmlns:a16="http://schemas.microsoft.com/office/drawing/2014/main" id="{5802B2F3-B69D-B49F-0D0B-5356A3A02180}"/>
+                <a16:creationId xmlns:a16="http://schemas.microsoft.com/office/drawing/2014/main" id="{D9CE00C3-8515-9A9D-7EEF-B509E69F7939}"/>
               </a:ext>
             </a:extLst>
           </p:cNvPr>
@@ -3892,7 +3863,7 @@
         </p:nvSpPr>
         <p:spPr>
           <a:xfrm>
-            <a:off x="5766488" y="3470395"/>
+            <a:off x="-5783664" y="3470395"/>
             <a:ext cx="882737" cy="190240"/>
           </a:xfrm>
           <a:prstGeom prst="rect">
@@ -3920,10 +3891,10 @@
       </p:sp>
       <p:grpSp>
         <p:nvGrpSpPr>
-          <p:cNvPr id="54" name="Groupe 53">
+          <p:cNvPr id="57" name="Groupe 56">
             <a:extLst>
               <a:ext uri="{FF2B5EF4-FFF2-40B4-BE49-F238E27FC236}">
-                <a16:creationId xmlns:a16="http://schemas.microsoft.com/office/drawing/2014/main" id="{BE06F1DF-DC05-B2E1-8C66-36B8B3406AB2}"/>
+                <a16:creationId xmlns:a16="http://schemas.microsoft.com/office/drawing/2014/main" id="{DFA730D8-B802-F08E-89A9-2B2C0579F441}"/>
               </a:ext>
             </a:extLst>
           </p:cNvPr>
@@ -3932,7 +3903,7 @@
         </p:nvGrpSpPr>
         <p:grpSpPr>
           <a:xfrm>
-            <a:off x="5379603" y="3012602"/>
+            <a:off x="-6170549" y="3012602"/>
             <a:ext cx="288000" cy="288000"/>
             <a:chOff x="5475382" y="3886190"/>
             <a:chExt cx="1264766" cy="1544351"/>
@@ -3940,10 +3911,10 @@
         </p:grpSpPr>
         <p:sp>
           <p:nvSpPr>
-            <p:cNvPr id="55" name="Forme libre : forme 54">
+            <p:cNvPr id="58" name="Forme libre : forme 57">
               <a:extLst>
                 <a:ext uri="{FF2B5EF4-FFF2-40B4-BE49-F238E27FC236}">
-                  <a16:creationId xmlns:a16="http://schemas.microsoft.com/office/drawing/2014/main" id="{27DA52C8-AA19-1517-81EE-2B036785A961}"/>
+                  <a16:creationId xmlns:a16="http://schemas.microsoft.com/office/drawing/2014/main" id="{2F7FD695-9CBA-1C88-B0E9-B7C53164A830}"/>
                 </a:ext>
               </a:extLst>
             </p:cNvPr>
@@ -4091,10 +4062,10 @@
         </p:sp>
         <p:pic>
           <p:nvPicPr>
-            <p:cNvPr id="56" name="Image 55" descr="Une image contenant noir, obscurité&#10;&#10;Description générée automatiquement">
+            <p:cNvPr id="59" name="Image 58" descr="Une image contenant noir, obscurité&#10;&#10;Description générée automatiquement">
               <a:extLst>
                 <a:ext uri="{FF2B5EF4-FFF2-40B4-BE49-F238E27FC236}">
-                  <a16:creationId xmlns:a16="http://schemas.microsoft.com/office/drawing/2014/main" id="{75128442-E773-A4AA-DCED-AFB869280D02}"/>
+                  <a16:creationId xmlns:a16="http://schemas.microsoft.com/office/drawing/2014/main" id="{11255D90-01A9-0D51-10B6-766175B8C0FB}"/>
                 </a:ext>
               </a:extLst>
             </p:cNvPr>
@@ -4104,7 +4075,7 @@
             <p:nvPr/>
           </p:nvPicPr>
           <p:blipFill rotWithShape="1">
-            <a:blip r:embed="rId7">
+            <a:blip r:embed="rId6">
               <a:duotone>
                 <a:schemeClr val="accent4">
                   <a:shade val="45000"/>
@@ -4134,10 +4105,10 @@
       </p:grpSp>
       <p:sp>
         <p:nvSpPr>
-          <p:cNvPr id="57" name="ZoneTexte 56">
+          <p:cNvPr id="60" name="ZoneTexte 59">
             <a:extLst>
               <a:ext uri="{FF2B5EF4-FFF2-40B4-BE49-F238E27FC236}">
-                <a16:creationId xmlns:a16="http://schemas.microsoft.com/office/drawing/2014/main" id="{FB2BF5BA-87BF-813C-BFDB-77EBEC3961D1}"/>
+                <a16:creationId xmlns:a16="http://schemas.microsoft.com/office/drawing/2014/main" id="{6A8A2725-23A6-9D98-91F4-A708909D0058}"/>
               </a:ext>
             </a:extLst>
           </p:cNvPr>
@@ -4146,7 +4117,7 @@
         </p:nvSpPr>
         <p:spPr>
           <a:xfrm>
-            <a:off x="5766488" y="3068023"/>
+            <a:off x="-5783664" y="3068023"/>
             <a:ext cx="948461" cy="190240"/>
           </a:xfrm>
           <a:prstGeom prst="rect">
@@ -4169,10 +4140,10 @@
       </p:sp>
       <p:grpSp>
         <p:nvGrpSpPr>
-          <p:cNvPr id="58" name="Groupe 57">
+          <p:cNvPr id="61" name="Groupe 60">
             <a:extLst>
               <a:ext uri="{FF2B5EF4-FFF2-40B4-BE49-F238E27FC236}">
-                <a16:creationId xmlns:a16="http://schemas.microsoft.com/office/drawing/2014/main" id="{A5769FE6-E038-4B8B-F866-4F85C9E3228E}"/>
+                <a16:creationId xmlns:a16="http://schemas.microsoft.com/office/drawing/2014/main" id="{CDA2D685-E900-A65C-F735-36E6B56134A0}"/>
               </a:ext>
             </a:extLst>
           </p:cNvPr>
@@ -4181,7 +4152,7 @@
         </p:nvGrpSpPr>
         <p:grpSpPr>
           <a:xfrm>
-            <a:off x="5349856" y="3791549"/>
+            <a:off x="-6200296" y="3791549"/>
             <a:ext cx="288000" cy="288000"/>
             <a:chOff x="5475382" y="3886190"/>
             <a:chExt cx="1264766" cy="1544351"/>
@@ -4189,10 +4160,10 @@
         </p:grpSpPr>
         <p:sp>
           <p:nvSpPr>
-            <p:cNvPr id="59" name="Forme libre : forme 58">
+            <p:cNvPr id="62" name="Forme libre : forme 61">
               <a:extLst>
                 <a:ext uri="{FF2B5EF4-FFF2-40B4-BE49-F238E27FC236}">
-                  <a16:creationId xmlns:a16="http://schemas.microsoft.com/office/drawing/2014/main" id="{552762D3-75EF-AFE4-28B4-82DDAA8B4DA9}"/>
+                  <a16:creationId xmlns:a16="http://schemas.microsoft.com/office/drawing/2014/main" id="{60591622-E1B5-B221-FA76-E678422FB371}"/>
                 </a:ext>
               </a:extLst>
             </p:cNvPr>
@@ -4340,10 +4311,10 @@
         </p:sp>
         <p:pic>
           <p:nvPicPr>
-            <p:cNvPr id="60" name="Image 59" descr="Une image contenant noir, obscurité&#10;&#10;Description générée automatiquement">
+            <p:cNvPr id="63" name="Image 62" descr="Une image contenant noir, obscurité&#10;&#10;Description générée automatiquement">
               <a:extLst>
                 <a:ext uri="{FF2B5EF4-FFF2-40B4-BE49-F238E27FC236}">
-                  <a16:creationId xmlns:a16="http://schemas.microsoft.com/office/drawing/2014/main" id="{28A16E8A-8A91-460D-22B6-D1D4D4D4E849}"/>
+                  <a16:creationId xmlns:a16="http://schemas.microsoft.com/office/drawing/2014/main" id="{D41293FF-2C5F-A2A0-57F8-35027E5AE3B6}"/>
                 </a:ext>
               </a:extLst>
             </p:cNvPr>
@@ -4353,7 +4324,7 @@
             <p:nvPr/>
           </p:nvPicPr>
           <p:blipFill rotWithShape="1">
-            <a:blip r:embed="rId7">
+            <a:blip r:embed="rId6">
               <a:duotone>
                 <a:schemeClr val="accent2">
                   <a:shade val="45000"/>
@@ -4383,10 +4354,10 @@
       </p:grpSp>
       <p:sp>
         <p:nvSpPr>
-          <p:cNvPr id="61" name="ZoneTexte 60">
+          <p:cNvPr id="64" name="ZoneTexte 63">
             <a:extLst>
               <a:ext uri="{FF2B5EF4-FFF2-40B4-BE49-F238E27FC236}">
-                <a16:creationId xmlns:a16="http://schemas.microsoft.com/office/drawing/2014/main" id="{1AFD592A-EAC1-A10B-0106-C5BFC018F32D}"/>
+                <a16:creationId xmlns:a16="http://schemas.microsoft.com/office/drawing/2014/main" id="{8CF29C38-3134-150D-3000-332068144F0B}"/>
               </a:ext>
             </a:extLst>
           </p:cNvPr>
@@ -4395,7 +4366,7 @@
         </p:nvSpPr>
         <p:spPr>
           <a:xfrm>
-            <a:off x="5766487" y="3846970"/>
+            <a:off x="-5783665" y="3846970"/>
             <a:ext cx="1267458" cy="190240"/>
           </a:xfrm>
           <a:prstGeom prst="rect">
@@ -4418,10 +4389,10 @@
       </p:sp>
       <p:grpSp>
         <p:nvGrpSpPr>
-          <p:cNvPr id="62" name="Groupe 61">
+          <p:cNvPr id="65" name="Groupe 64">
             <a:extLst>
               <a:ext uri="{FF2B5EF4-FFF2-40B4-BE49-F238E27FC236}">
-                <a16:creationId xmlns:a16="http://schemas.microsoft.com/office/drawing/2014/main" id="{5F37CF1C-B83D-F2BC-4B9F-3FC7F6086A75}"/>
+                <a16:creationId xmlns:a16="http://schemas.microsoft.com/office/drawing/2014/main" id="{50848A6C-79E8-0C7B-6264-32648EC95A7D}"/>
               </a:ext>
             </a:extLst>
           </p:cNvPr>
@@ -4430,7 +4401,7 @@
         </p:nvGrpSpPr>
         <p:grpSpPr>
           <a:xfrm>
-            <a:off x="5380526" y="4241931"/>
+            <a:off x="-6169626" y="4241931"/>
             <a:ext cx="288000" cy="288000"/>
             <a:chOff x="5475382" y="3886190"/>
             <a:chExt cx="1264766" cy="1544351"/>
@@ -4438,10 +4409,10 @@
         </p:grpSpPr>
         <p:sp>
           <p:nvSpPr>
-            <p:cNvPr id="63" name="Forme libre : forme 62">
+            <p:cNvPr id="66" name="Forme libre : forme 65">
               <a:extLst>
                 <a:ext uri="{FF2B5EF4-FFF2-40B4-BE49-F238E27FC236}">
-                  <a16:creationId xmlns:a16="http://schemas.microsoft.com/office/drawing/2014/main" id="{FD27DBA1-CC75-CA58-579E-5566D76A85EF}"/>
+                  <a16:creationId xmlns:a16="http://schemas.microsoft.com/office/drawing/2014/main" id="{E9C42CC1-FB1E-B4DB-3259-C10D26A3E8CD}"/>
                 </a:ext>
               </a:extLst>
             </p:cNvPr>
@@ -4589,10 +4560,10 @@
         </p:sp>
         <p:pic>
           <p:nvPicPr>
-            <p:cNvPr id="64" name="Image 63" descr="Une image contenant noir, obscurité&#10;&#10;Description générée automatiquement">
+            <p:cNvPr id="67" name="Image 66" descr="Une image contenant noir, obscurité&#10;&#10;Description générée automatiquement">
               <a:extLst>
                 <a:ext uri="{FF2B5EF4-FFF2-40B4-BE49-F238E27FC236}">
-                  <a16:creationId xmlns:a16="http://schemas.microsoft.com/office/drawing/2014/main" id="{349EEDB3-8212-2593-791B-2C0385843463}"/>
+                  <a16:creationId xmlns:a16="http://schemas.microsoft.com/office/drawing/2014/main" id="{0883AC08-20CF-3922-ED3D-BD5E220F2E66}"/>
                 </a:ext>
               </a:extLst>
             </p:cNvPr>
@@ -4602,7 +4573,7 @@
             <p:nvPr/>
           </p:nvPicPr>
           <p:blipFill rotWithShape="1">
-            <a:blip r:embed="rId7">
+            <a:blip r:embed="rId6">
               <a:extLst>
                 <a:ext uri="{28A0092B-C50C-407E-A947-70E740481C1C}">
                   <a14:useLocalDpi xmlns:a14="http://schemas.microsoft.com/office/drawing/2010/main" val="0"/>
@@ -4625,10 +4596,10 @@
       </p:grpSp>
       <p:sp>
         <p:nvSpPr>
-          <p:cNvPr id="65" name="ZoneTexte 64">
+          <p:cNvPr id="68" name="ZoneTexte 67">
             <a:extLst>
               <a:ext uri="{FF2B5EF4-FFF2-40B4-BE49-F238E27FC236}">
-                <a16:creationId xmlns:a16="http://schemas.microsoft.com/office/drawing/2014/main" id="{9A55CEC4-B942-C7FA-AE8B-211118FF7108}"/>
+                <a16:creationId xmlns:a16="http://schemas.microsoft.com/office/drawing/2014/main" id="{B3045167-1985-308D-E8DC-9A1C56423D50}"/>
               </a:ext>
             </a:extLst>
           </p:cNvPr>
@@ -4637,7 +4608,7 @@
         </p:nvSpPr>
         <p:spPr>
           <a:xfrm>
-            <a:off x="5766487" y="4330568"/>
+            <a:off x="-5783665" y="4330568"/>
             <a:ext cx="972505" cy="190240"/>
           </a:xfrm>
           <a:prstGeom prst="rect">
@@ -4652,7 +4623,7 @@
           <a:lstStyle/>
           <a:p>
             <a:r>
-              <a:rPr lang="fr-FR" sz="1000"/>
+              <a:rPr lang="fr-FR" sz="1000" dirty="0"/>
               <a:t>Ballon ECS fioul</a:t>
             </a:r>
           </a:p>
@@ -4663,7 +4634,7 @@
           <p:cNvPr id="69" name="Groupe 68">
             <a:extLst>
               <a:ext uri="{FF2B5EF4-FFF2-40B4-BE49-F238E27FC236}">
-                <a16:creationId xmlns:a16="http://schemas.microsoft.com/office/drawing/2014/main" id="{1A0C1535-7C91-F7AC-8204-CDBDD5AD8115}"/>
+                <a16:creationId xmlns:a16="http://schemas.microsoft.com/office/drawing/2014/main" id="{CC361A1E-D080-B63D-0E32-DC33FA05E2E2}"/>
               </a:ext>
             </a:extLst>
           </p:cNvPr>
@@ -4672,7 +4643,7 @@
         </p:nvGrpSpPr>
         <p:grpSpPr>
           <a:xfrm>
-            <a:off x="2904145" y="4775170"/>
+            <a:off x="-8646007" y="4775170"/>
             <a:ext cx="286633" cy="258890"/>
             <a:chOff x="4716027" y="3533069"/>
             <a:chExt cx="2628454" cy="2374055"/>
@@ -4680,10 +4651,10 @@
         </p:grpSpPr>
         <p:sp>
           <p:nvSpPr>
-            <p:cNvPr id="68" name="Rectangle 67">
+            <p:cNvPr id="70" name="Rectangle 69">
               <a:extLst>
                 <a:ext uri="{FF2B5EF4-FFF2-40B4-BE49-F238E27FC236}">
-                  <a16:creationId xmlns:a16="http://schemas.microsoft.com/office/drawing/2014/main" id="{F1EBB104-7CEC-7CCF-6D71-6696381FB427}"/>
+                  <a16:creationId xmlns:a16="http://schemas.microsoft.com/office/drawing/2014/main" id="{0C3E06FA-31B0-265F-5230-FCCEC2CF85AF}"/>
                 </a:ext>
               </a:extLst>
             </p:cNvPr>
@@ -4732,10 +4703,10 @@
         </p:sp>
         <p:pic>
           <p:nvPicPr>
-            <p:cNvPr id="67" name="Image 66" descr="Une image contenant noir, obscurité&#10;&#10;Description générée automatiquement">
+            <p:cNvPr id="71" name="Image 70" descr="Une image contenant noir, obscurité&#10;&#10;Description générée automatiquement">
               <a:extLst>
                 <a:ext uri="{FF2B5EF4-FFF2-40B4-BE49-F238E27FC236}">
-                  <a16:creationId xmlns:a16="http://schemas.microsoft.com/office/drawing/2014/main" id="{C288A738-30A1-FD57-597A-1D3BE9B8B904}"/>
+                  <a16:creationId xmlns:a16="http://schemas.microsoft.com/office/drawing/2014/main" id="{C5FBBD6F-077C-0DB3-BE44-1C3C97E5B0E9}"/>
                 </a:ext>
               </a:extLst>
             </p:cNvPr>
@@ -4745,7 +4716,7 @@
             <p:nvPr/>
           </p:nvPicPr>
           <p:blipFill rotWithShape="1">
-            <a:blip r:embed="rId8">
+            <a:blip r:embed="rId7">
               <a:duotone>
                 <a:schemeClr val="accent1">
                   <a:shade val="45000"/>
@@ -4775,10 +4746,10 @@
       </p:grpSp>
       <p:sp>
         <p:nvSpPr>
-          <p:cNvPr id="70" name="ZoneTexte 69">
+          <p:cNvPr id="72" name="ZoneTexte 71">
             <a:extLst>
               <a:ext uri="{FF2B5EF4-FFF2-40B4-BE49-F238E27FC236}">
-                <a16:creationId xmlns:a16="http://schemas.microsoft.com/office/drawing/2014/main" id="{EF1A33C2-19FC-36FE-8755-27ECD0FFCB6F}"/>
+                <a16:creationId xmlns:a16="http://schemas.microsoft.com/office/drawing/2014/main" id="{2551CF47-6BC6-58C2-8CA4-AC43E544CE13}"/>
               </a:ext>
             </a:extLst>
           </p:cNvPr>
@@ -4787,7 +4758,7 @@
         </p:nvSpPr>
         <p:spPr>
           <a:xfrm>
-            <a:off x="3280151" y="4809495"/>
+            <a:off x="-8270001" y="4809495"/>
             <a:ext cx="1094333" cy="190240"/>
           </a:xfrm>
           <a:prstGeom prst="rect">
@@ -4810,10 +4781,10 @@
       </p:sp>
       <p:pic>
         <p:nvPicPr>
-          <p:cNvPr id="72" name="Image 71" descr="Une image contenant noir, obscurité&#10;&#10;Description générée automatiquement">
+          <p:cNvPr id="73" name="Image 72" descr="Une image contenant noir, obscurité&#10;&#10;Description générée automatiquement">
             <a:extLst>
               <a:ext uri="{FF2B5EF4-FFF2-40B4-BE49-F238E27FC236}">
-                <a16:creationId xmlns:a16="http://schemas.microsoft.com/office/drawing/2014/main" id="{7187D590-4F06-54E2-4D7B-34D52809E743}"/>
+                <a16:creationId xmlns:a16="http://schemas.microsoft.com/office/drawing/2014/main" id="{EC48EA24-B47C-8AE8-8640-E582A4E7A020}"/>
               </a:ext>
             </a:extLst>
           </p:cNvPr>
@@ -4823,7 +4794,7 @@
           <p:nvPr/>
         </p:nvPicPr>
         <p:blipFill rotWithShape="1">
-          <a:blip r:embed="rId9">
+          <a:blip r:embed="rId8">
             <a:duotone>
               <a:schemeClr val="accent1">
                 <a:shade val="45000"/>
@@ -4842,7 +4813,7 @@
         </p:blipFill>
         <p:spPr>
           <a:xfrm>
-            <a:off x="287002" y="3602273"/>
+            <a:off x="-11263150" y="3602273"/>
             <a:ext cx="254374" cy="272932"/>
           </a:xfrm>
           <a:prstGeom prst="rect">
@@ -4852,10 +4823,10 @@
       </p:pic>
       <p:grpSp>
         <p:nvGrpSpPr>
-          <p:cNvPr id="84" name="Groupe 83">
+          <p:cNvPr id="74" name="Groupe 73">
             <a:extLst>
               <a:ext uri="{FF2B5EF4-FFF2-40B4-BE49-F238E27FC236}">
-                <a16:creationId xmlns:a16="http://schemas.microsoft.com/office/drawing/2014/main" id="{3500EFE8-A6AB-BE08-0BEC-EA1CF4975BD3}"/>
+                <a16:creationId xmlns:a16="http://schemas.microsoft.com/office/drawing/2014/main" id="{ADC1A61A-57D6-06BA-2490-3D3E68FF2030}"/>
               </a:ext>
             </a:extLst>
           </p:cNvPr>
@@ -4864,7 +4835,7 @@
         </p:nvGrpSpPr>
         <p:grpSpPr>
           <a:xfrm>
-            <a:off x="7652114" y="3013676"/>
+            <a:off x="-3898038" y="3013676"/>
             <a:ext cx="354440" cy="461665"/>
             <a:chOff x="3809867" y="3752278"/>
             <a:chExt cx="2357195" cy="3070294"/>
@@ -4872,10 +4843,10 @@
         </p:grpSpPr>
         <p:sp>
           <p:nvSpPr>
-            <p:cNvPr id="83" name="Forme libre : forme 82">
+            <p:cNvPr id="75" name="Forme libre : forme 74">
               <a:extLst>
                 <a:ext uri="{FF2B5EF4-FFF2-40B4-BE49-F238E27FC236}">
-                  <a16:creationId xmlns:a16="http://schemas.microsoft.com/office/drawing/2014/main" id="{38A24A73-8E11-129A-28E8-AD96226B1114}"/>
+                  <a16:creationId xmlns:a16="http://schemas.microsoft.com/office/drawing/2014/main" id="{62DB5C45-8047-6C48-6218-BC5B8AC37B8A}"/>
                 </a:ext>
               </a:extLst>
             </p:cNvPr>
@@ -5095,10 +5066,10 @@
         </p:sp>
         <p:pic>
           <p:nvPicPr>
-            <p:cNvPr id="74" name="Image 73" descr="Une image contenant noir, obscurité&#10;&#10;Description générée automatiquement">
+            <p:cNvPr id="76" name="Image 75" descr="Une image contenant noir, obscurité&#10;&#10;Description générée automatiquement">
               <a:extLst>
                 <a:ext uri="{FF2B5EF4-FFF2-40B4-BE49-F238E27FC236}">
-                  <a16:creationId xmlns:a16="http://schemas.microsoft.com/office/drawing/2014/main" id="{8AE254AC-5B77-AE60-F254-FF1DA1C222D7}"/>
+                  <a16:creationId xmlns:a16="http://schemas.microsoft.com/office/drawing/2014/main" id="{7A5D5029-9E64-BF81-650B-F379E563E33A}"/>
                 </a:ext>
               </a:extLst>
             </p:cNvPr>
@@ -5108,7 +5079,7 @@
             <p:nvPr/>
           </p:nvPicPr>
           <p:blipFill rotWithShape="1">
-            <a:blip r:embed="rId10">
+            <a:blip r:embed="rId9">
               <a:duotone>
                 <a:schemeClr val="accent2">
                   <a:shade val="45000"/>
@@ -5138,10 +5109,10 @@
       </p:grpSp>
       <p:grpSp>
         <p:nvGrpSpPr>
-          <p:cNvPr id="81" name="Groupe 80">
+          <p:cNvPr id="77" name="Groupe 76">
             <a:extLst>
               <a:ext uri="{FF2B5EF4-FFF2-40B4-BE49-F238E27FC236}">
-                <a16:creationId xmlns:a16="http://schemas.microsoft.com/office/drawing/2014/main" id="{2ABADDE0-11A1-BE54-C3EC-D187C0DD6D18}"/>
+                <a16:creationId xmlns:a16="http://schemas.microsoft.com/office/drawing/2014/main" id="{E0234CF3-11BE-6E70-EBC7-52EE55FFCE0B}"/>
               </a:ext>
             </a:extLst>
           </p:cNvPr>
@@ -5150,7 +5121,7 @@
         </p:nvGrpSpPr>
         <p:grpSpPr>
           <a:xfrm>
-            <a:off x="282386" y="3934211"/>
+            <a:off x="-11267766" y="3934211"/>
             <a:ext cx="283249" cy="286013"/>
             <a:chOff x="458732" y="3070037"/>
             <a:chExt cx="2013612" cy="2033261"/>
@@ -5158,10 +5129,10 @@
         </p:grpSpPr>
         <p:sp>
           <p:nvSpPr>
-            <p:cNvPr id="80" name="Forme libre : forme 79">
+            <p:cNvPr id="78" name="Forme libre : forme 77">
               <a:extLst>
                 <a:ext uri="{FF2B5EF4-FFF2-40B4-BE49-F238E27FC236}">
-                  <a16:creationId xmlns:a16="http://schemas.microsoft.com/office/drawing/2014/main" id="{15539CCF-72B9-75D0-1875-F87B271365B4}"/>
+                  <a16:creationId xmlns:a16="http://schemas.microsoft.com/office/drawing/2014/main" id="{6D98AF31-B12A-F98F-710C-203BD0391C63}"/>
                 </a:ext>
               </a:extLst>
             </p:cNvPr>
@@ -5293,10 +5264,10 @@
         </p:sp>
         <p:pic>
           <p:nvPicPr>
-            <p:cNvPr id="76" name="Image 75" descr="Une image contenant noir, obscurité&#10;&#10;Description générée automatiquement">
+            <p:cNvPr id="79" name="Image 78" descr="Une image contenant noir, obscurité&#10;&#10;Description générée automatiquement">
               <a:extLst>
                 <a:ext uri="{FF2B5EF4-FFF2-40B4-BE49-F238E27FC236}">
-                  <a16:creationId xmlns:a16="http://schemas.microsoft.com/office/drawing/2014/main" id="{34D702BB-291B-6763-6F12-7FBD83D64A90}"/>
+                  <a16:creationId xmlns:a16="http://schemas.microsoft.com/office/drawing/2014/main" id="{B5F5CBF9-EE94-C8D6-FACF-340FBF87A7E1}"/>
                 </a:ext>
               </a:extLst>
             </p:cNvPr>
@@ -5306,7 +5277,7 @@
             <p:nvPr/>
           </p:nvPicPr>
           <p:blipFill rotWithShape="1">
-            <a:blip r:embed="rId11">
+            <a:blip r:embed="rId10">
               <a:duotone>
                 <a:schemeClr val="accent1">
                   <a:shade val="45000"/>
@@ -5336,10 +5307,10 @@
       </p:grpSp>
       <p:sp>
         <p:nvSpPr>
-          <p:cNvPr id="79" name="ZoneTexte 78">
+          <p:cNvPr id="80" name="ZoneTexte 79">
             <a:extLst>
               <a:ext uri="{FF2B5EF4-FFF2-40B4-BE49-F238E27FC236}">
-                <a16:creationId xmlns:a16="http://schemas.microsoft.com/office/drawing/2014/main" id="{7F6B25B5-EEFB-7423-70D7-9A447B0071E1}"/>
+                <a16:creationId xmlns:a16="http://schemas.microsoft.com/office/drawing/2014/main" id="{9F2826C3-D5A7-E7FE-142C-56571A3F80B6}"/>
               </a:ext>
             </a:extLst>
           </p:cNvPr>
@@ -5348,7 +5319,7 @@
         </p:nvSpPr>
         <p:spPr>
           <a:xfrm>
-            <a:off x="615805" y="3663663"/>
+            <a:off x="-10934347" y="3663663"/>
             <a:ext cx="289626" cy="190240"/>
           </a:xfrm>
           <a:prstGeom prst="rect">
@@ -5371,10 +5342,10 @@
       </p:sp>
       <p:sp>
         <p:nvSpPr>
-          <p:cNvPr id="82" name="ZoneTexte 81">
+          <p:cNvPr id="81" name="ZoneTexte 80">
             <a:extLst>
               <a:ext uri="{FF2B5EF4-FFF2-40B4-BE49-F238E27FC236}">
-                <a16:creationId xmlns:a16="http://schemas.microsoft.com/office/drawing/2014/main" id="{D477B24A-A66C-436C-8D9E-4E1A3AF53164}"/>
+                <a16:creationId xmlns:a16="http://schemas.microsoft.com/office/drawing/2014/main" id="{91A9CFAD-58CE-2663-5A9C-F6C99144A3FB}"/>
               </a:ext>
             </a:extLst>
           </p:cNvPr>
@@ -5383,7 +5354,7 @@
         </p:nvSpPr>
         <p:spPr>
           <a:xfrm>
-            <a:off x="615805" y="3961471"/>
+            <a:off x="-10934347" y="3961471"/>
             <a:ext cx="619845" cy="190240"/>
           </a:xfrm>
           <a:prstGeom prst="rect">
@@ -5406,10 +5377,10 @@
       </p:sp>
       <p:sp>
         <p:nvSpPr>
-          <p:cNvPr id="85" name="ZoneTexte 84">
+          <p:cNvPr id="82" name="ZoneTexte 81">
             <a:extLst>
               <a:ext uri="{FF2B5EF4-FFF2-40B4-BE49-F238E27FC236}">
-                <a16:creationId xmlns:a16="http://schemas.microsoft.com/office/drawing/2014/main" id="{17F8C71E-8E13-A27E-80C4-7A6593696FE6}"/>
+                <a16:creationId xmlns:a16="http://schemas.microsoft.com/office/drawing/2014/main" id="{FD271353-D121-03BA-84E4-B3AE630B36E5}"/>
               </a:ext>
             </a:extLst>
           </p:cNvPr>
@@ -5418,7 +5389,7 @@
         </p:nvSpPr>
         <p:spPr>
           <a:xfrm>
-            <a:off x="8137609" y="3164560"/>
+            <a:off x="-3412543" y="3164560"/>
             <a:ext cx="956475" cy="190240"/>
           </a:xfrm>
           <a:prstGeom prst="rect">
@@ -5441,10 +5412,10 @@
       </p:sp>
       <p:grpSp>
         <p:nvGrpSpPr>
-          <p:cNvPr id="86" name="Groupe 85">
+          <p:cNvPr id="83" name="Groupe 82">
             <a:extLst>
               <a:ext uri="{FF2B5EF4-FFF2-40B4-BE49-F238E27FC236}">
-                <a16:creationId xmlns:a16="http://schemas.microsoft.com/office/drawing/2014/main" id="{CBBD7B35-93B1-97D4-9FD9-FCF1B073781B}"/>
+                <a16:creationId xmlns:a16="http://schemas.microsoft.com/office/drawing/2014/main" id="{8CA1BFAD-A9DD-B4D3-104E-F311C2190B91}"/>
               </a:ext>
             </a:extLst>
           </p:cNvPr>
@@ -5453,7 +5424,7 @@
         </p:nvGrpSpPr>
         <p:grpSpPr>
           <a:xfrm>
-            <a:off x="7660062" y="3568602"/>
+            <a:off x="-3890090" y="3568602"/>
             <a:ext cx="354440" cy="461665"/>
             <a:chOff x="3809867" y="3752278"/>
             <a:chExt cx="2357195" cy="3070294"/>
@@ -5461,10 +5432,10 @@
         </p:grpSpPr>
         <p:sp>
           <p:nvSpPr>
-            <p:cNvPr id="87" name="Forme libre : forme 86">
+            <p:cNvPr id="84" name="Forme libre : forme 83">
               <a:extLst>
                 <a:ext uri="{FF2B5EF4-FFF2-40B4-BE49-F238E27FC236}">
-                  <a16:creationId xmlns:a16="http://schemas.microsoft.com/office/drawing/2014/main" id="{B2AE02DA-2DF4-2326-5E3A-E47A2F82035C}"/>
+                  <a16:creationId xmlns:a16="http://schemas.microsoft.com/office/drawing/2014/main" id="{EB757597-8387-8615-A938-2A8008126C5B}"/>
                 </a:ext>
               </a:extLst>
             </p:cNvPr>
@@ -5684,10 +5655,10 @@
         </p:sp>
         <p:pic>
           <p:nvPicPr>
-            <p:cNvPr id="88" name="Image 87" descr="Une image contenant noir, obscurité&#10;&#10;Description générée automatiquement">
+            <p:cNvPr id="85" name="Image 84" descr="Une image contenant noir, obscurité&#10;&#10;Description générée automatiquement">
               <a:extLst>
                 <a:ext uri="{FF2B5EF4-FFF2-40B4-BE49-F238E27FC236}">
-                  <a16:creationId xmlns:a16="http://schemas.microsoft.com/office/drawing/2014/main" id="{6C144C0C-B736-D1D1-36D4-1A9F67D43567}"/>
+                  <a16:creationId xmlns:a16="http://schemas.microsoft.com/office/drawing/2014/main" id="{4A42D7C2-E858-7D8A-031F-BD903EE8714B}"/>
                 </a:ext>
               </a:extLst>
             </p:cNvPr>
@@ -5697,7 +5668,7 @@
             <p:nvPr/>
           </p:nvPicPr>
           <p:blipFill rotWithShape="1">
-            <a:blip r:embed="rId10">
+            <a:blip r:embed="rId9">
               <a:grayscl/>
               <a:extLst>
                 <a:ext uri="{28A0092B-C50C-407E-A947-70E740481C1C}">
@@ -5721,10 +5692,10 @@
       </p:grpSp>
       <p:sp>
         <p:nvSpPr>
-          <p:cNvPr id="89" name="ZoneTexte 88">
+          <p:cNvPr id="86" name="ZoneTexte 85">
             <a:extLst>
               <a:ext uri="{FF2B5EF4-FFF2-40B4-BE49-F238E27FC236}">
-                <a16:creationId xmlns:a16="http://schemas.microsoft.com/office/drawing/2014/main" id="{76B44E47-EB25-264F-A3A7-C3E0897719BA}"/>
+                <a16:creationId xmlns:a16="http://schemas.microsoft.com/office/drawing/2014/main" id="{87903EEE-5CFE-58EF-9298-9F28F641AFAD}"/>
               </a:ext>
             </a:extLst>
           </p:cNvPr>
@@ -5733,7 +5704,7 @@
         </p:nvSpPr>
         <p:spPr>
           <a:xfrm>
-            <a:off x="8088809" y="3718222"/>
+            <a:off x="-3461343" y="3718222"/>
             <a:ext cx="661523" cy="190240"/>
           </a:xfrm>
           <a:prstGeom prst="rect">
@@ -5756,10 +5727,10 @@
       </p:sp>
       <p:pic>
         <p:nvPicPr>
-          <p:cNvPr id="91" name="Image 90" descr="Une image contenant noir, obscurité&#10;&#10;Description générée automatiquement">
+          <p:cNvPr id="87" name="Image 86" descr="Une image contenant noir, obscurité&#10;&#10;Description générée automatiquement">
             <a:extLst>
               <a:ext uri="{FF2B5EF4-FFF2-40B4-BE49-F238E27FC236}">
-                <a16:creationId xmlns:a16="http://schemas.microsoft.com/office/drawing/2014/main" id="{201D8366-A5EF-30C3-009E-63605943AA84}"/>
+                <a16:creationId xmlns:a16="http://schemas.microsoft.com/office/drawing/2014/main" id="{D9518950-2AB9-52E6-69AB-9BEB19AAB1F0}"/>
               </a:ext>
             </a:extLst>
           </p:cNvPr>
@@ -5769,7 +5740,7 @@
           <p:nvPr/>
         </p:nvPicPr>
         <p:blipFill rotWithShape="1">
-          <a:blip r:embed="rId12">
+          <a:blip r:embed="rId11">
             <a:duotone>
               <a:schemeClr val="accent6">
                 <a:shade val="45000"/>
@@ -5788,7 +5759,7 @@
         </p:blipFill>
         <p:spPr>
           <a:xfrm>
-            <a:off x="7636095" y="4206585"/>
+            <a:off x="-3914057" y="4206585"/>
             <a:ext cx="356334" cy="294491"/>
           </a:xfrm>
           <a:prstGeom prst="rect">
@@ -5798,10 +5769,10 @@
       </p:pic>
       <p:sp>
         <p:nvSpPr>
-          <p:cNvPr id="92" name="ZoneTexte 91">
+          <p:cNvPr id="88" name="ZoneTexte 87">
             <a:extLst>
               <a:ext uri="{FF2B5EF4-FFF2-40B4-BE49-F238E27FC236}">
-                <a16:creationId xmlns:a16="http://schemas.microsoft.com/office/drawing/2014/main" id="{2F32E489-ED47-E4D9-7A56-06BF8CA0D9F6}"/>
+                <a16:creationId xmlns:a16="http://schemas.microsoft.com/office/drawing/2014/main" id="{3959E743-430F-2699-69D0-BD93AA2E26C6}"/>
               </a:ext>
             </a:extLst>
           </p:cNvPr>
@@ -5810,7 +5781,7 @@
         </p:nvSpPr>
         <p:spPr>
           <a:xfrm>
-            <a:off x="8066623" y="4258710"/>
+            <a:off x="-3483529" y="4258710"/>
             <a:ext cx="517252" cy="190240"/>
           </a:xfrm>
           <a:prstGeom prst="rect">
@@ -5833,10 +5804,10 @@
       </p:sp>
       <p:grpSp>
         <p:nvGrpSpPr>
-          <p:cNvPr id="96" name="Groupe 95">
+          <p:cNvPr id="89" name="Groupe 88">
             <a:extLst>
               <a:ext uri="{FF2B5EF4-FFF2-40B4-BE49-F238E27FC236}">
-                <a16:creationId xmlns:a16="http://schemas.microsoft.com/office/drawing/2014/main" id="{A5CEA1F5-4EEC-3C3B-AEAC-6A2B9A886955}"/>
+                <a16:creationId xmlns:a16="http://schemas.microsoft.com/office/drawing/2014/main" id="{381CCB35-74D1-6C06-0317-576820EA3B95}"/>
               </a:ext>
             </a:extLst>
           </p:cNvPr>
@@ -5845,7 +5816,7 @@
         </p:nvGrpSpPr>
         <p:grpSpPr>
           <a:xfrm>
-            <a:off x="330379" y="5697143"/>
+            <a:off x="-11219773" y="5697143"/>
             <a:ext cx="319632" cy="325221"/>
             <a:chOff x="7528968" y="3400818"/>
             <a:chExt cx="1732390" cy="1762681"/>
@@ -5853,10 +5824,10 @@
         </p:grpSpPr>
         <p:sp>
           <p:nvSpPr>
-            <p:cNvPr id="95" name="Ellipse 94">
+            <p:cNvPr id="90" name="Ellipse 89">
               <a:extLst>
                 <a:ext uri="{FF2B5EF4-FFF2-40B4-BE49-F238E27FC236}">
-                  <a16:creationId xmlns:a16="http://schemas.microsoft.com/office/drawing/2014/main" id="{2485147A-593B-E4BB-F9CE-F4FB977A053D}"/>
+                  <a16:creationId xmlns:a16="http://schemas.microsoft.com/office/drawing/2014/main" id="{697CD629-03B2-A012-CD71-E03E6C490642}"/>
                 </a:ext>
               </a:extLst>
             </p:cNvPr>
@@ -5902,10 +5873,10 @@
         </p:sp>
         <p:pic>
           <p:nvPicPr>
-            <p:cNvPr id="94" name="Image 93" descr="Une image contenant noir, obscurité&#10;&#10;Description générée automatiquement">
+            <p:cNvPr id="91" name="Image 90" descr="Une image contenant noir, obscurité&#10;&#10;Description générée automatiquement">
               <a:extLst>
                 <a:ext uri="{FF2B5EF4-FFF2-40B4-BE49-F238E27FC236}">
-                  <a16:creationId xmlns:a16="http://schemas.microsoft.com/office/drawing/2014/main" id="{A2577DA2-8ED7-A1F9-6155-A98D4643AB7E}"/>
+                  <a16:creationId xmlns:a16="http://schemas.microsoft.com/office/drawing/2014/main" id="{FFB7B058-1C77-D541-1EBF-E8A4D1AF8AB6}"/>
                 </a:ext>
               </a:extLst>
             </p:cNvPr>
@@ -5915,7 +5886,7 @@
             <p:nvPr/>
           </p:nvPicPr>
           <p:blipFill rotWithShape="1">
-            <a:blip r:embed="rId13">
+            <a:blip r:embed="rId12">
               <a:extLst>
                 <a:ext uri="{28A0092B-C50C-407E-A947-70E740481C1C}">
                   <a14:useLocalDpi xmlns:a14="http://schemas.microsoft.com/office/drawing/2010/main" val="0"/>
@@ -5938,10 +5909,10 @@
       </p:grpSp>
       <p:sp>
         <p:nvSpPr>
-          <p:cNvPr id="97" name="ZoneTexte 96">
+          <p:cNvPr id="92" name="ZoneTexte 91">
             <a:extLst>
               <a:ext uri="{FF2B5EF4-FFF2-40B4-BE49-F238E27FC236}">
-                <a16:creationId xmlns:a16="http://schemas.microsoft.com/office/drawing/2014/main" id="{0247D511-D920-8A7B-A0DC-ED5FC533FBBB}"/>
+                <a16:creationId xmlns:a16="http://schemas.microsoft.com/office/drawing/2014/main" id="{4946321E-5D61-FF43-E5C5-3DCE6EF94E1A}"/>
               </a:ext>
             </a:extLst>
           </p:cNvPr>
@@ -5950,7 +5921,7 @@
         </p:nvSpPr>
         <p:spPr>
           <a:xfrm>
-            <a:off x="726327" y="5776365"/>
+            <a:off x="-10823825" y="5776365"/>
             <a:ext cx="719231" cy="190240"/>
           </a:xfrm>
           <a:prstGeom prst="rect">
@@ -5973,10 +5944,10 @@
       </p:sp>
       <p:pic>
         <p:nvPicPr>
-          <p:cNvPr id="99" name="Image 98" descr="Une image contenant noir, obscurité&#10;&#10;Description générée automatiquement">
+          <p:cNvPr id="93" name="Image 92" descr="Une image contenant noir, obscurité&#10;&#10;Description générée automatiquement">
             <a:extLst>
               <a:ext uri="{FF2B5EF4-FFF2-40B4-BE49-F238E27FC236}">
-                <a16:creationId xmlns:a16="http://schemas.microsoft.com/office/drawing/2014/main" id="{B4BB3FEE-267E-4E40-ABFF-1E4EA30E867F}"/>
+                <a16:creationId xmlns:a16="http://schemas.microsoft.com/office/drawing/2014/main" id="{638A5A50-5E37-7B20-9A83-4DE1B3516F6A}"/>
               </a:ext>
             </a:extLst>
           </p:cNvPr>
@@ -5986,7 +5957,7 @@
           <p:nvPr/>
         </p:nvPicPr>
         <p:blipFill rotWithShape="1">
-          <a:blip r:embed="rId14">
+          <a:blip r:embed="rId13">
             <a:duotone>
               <a:schemeClr val="accent1">
                 <a:shade val="45000"/>
@@ -6005,7 +5976,7 @@
         </p:blipFill>
         <p:spPr>
           <a:xfrm>
-            <a:off x="254298" y="4332289"/>
+            <a:off x="-11295854" y="4332289"/>
             <a:ext cx="348734" cy="351752"/>
           </a:xfrm>
           <a:prstGeom prst="rect">
@@ -6015,10 +5986,10 @@
       </p:pic>
       <p:sp>
         <p:nvSpPr>
-          <p:cNvPr id="100" name="ZoneTexte 99">
+          <p:cNvPr id="94" name="ZoneTexte 93">
             <a:extLst>
               <a:ext uri="{FF2B5EF4-FFF2-40B4-BE49-F238E27FC236}">
-                <a16:creationId xmlns:a16="http://schemas.microsoft.com/office/drawing/2014/main" id="{24A9F36E-E6CE-9204-C574-AFA98306E9B3}"/>
+                <a16:creationId xmlns:a16="http://schemas.microsoft.com/office/drawing/2014/main" id="{FDCB91EB-B249-E021-B797-7338761C88B4}"/>
               </a:ext>
             </a:extLst>
           </p:cNvPr>
@@ -6027,7 +5998,7 @@
         </p:nvSpPr>
         <p:spPr>
           <a:xfrm>
-            <a:off x="650011" y="4421883"/>
+            <a:off x="-10900141" y="4421883"/>
             <a:ext cx="986933" cy="190240"/>
           </a:xfrm>
           <a:prstGeom prst="rect">
@@ -6050,10 +6021,171 @@
       </p:sp>
       <p:pic>
         <p:nvPicPr>
-          <p:cNvPr id="101" name="Image 100" descr="Une image contenant noir, obscurité&#10;&#10;Description générée automatiquement">
+          <p:cNvPr id="95" name="Image 94" descr="Une image contenant noir, obscurité&#10;&#10;Description générée automatiquement">
             <a:extLst>
               <a:ext uri="{FF2B5EF4-FFF2-40B4-BE49-F238E27FC236}">
-                <a16:creationId xmlns:a16="http://schemas.microsoft.com/office/drawing/2014/main" id="{DCB98ED4-13EA-2622-E0DD-48C82999DC56}"/>
+                <a16:creationId xmlns:a16="http://schemas.microsoft.com/office/drawing/2014/main" id="{C6E5DE1E-B537-15C3-3DB2-310031CD9184}"/>
+              </a:ext>
+            </a:extLst>
+          </p:cNvPr>
+          <p:cNvPicPr>
+            <a:picLocks noChangeAspect="1"/>
+          </p:cNvPicPr>
+          <p:nvPr/>
+        </p:nvPicPr>
+        <p:blipFill rotWithShape="1">
+          <a:blip r:embed="rId13">
+            <a:duotone>
+              <a:schemeClr val="accent4">
+                <a:shade val="45000"/>
+                <a:satMod val="135000"/>
+              </a:schemeClr>
+              <a:prstClr val="white"/>
+            </a:duotone>
+            <a:extLst>
+              <a:ext uri="{28A0092B-C50C-407E-A947-70E740481C1C}">
+                <a14:useLocalDpi xmlns:a14="http://schemas.microsoft.com/office/drawing/2010/main" val="0"/>
+              </a:ext>
+            </a:extLst>
+          </a:blip>
+          <a:srcRect l="20618" t="9934" r="16389" b="26528"/>
+          <a:stretch/>
+        </p:blipFill>
+        <p:spPr>
+          <a:xfrm>
+            <a:off x="-11288578" y="4775669"/>
+            <a:ext cx="348734" cy="351752"/>
+          </a:xfrm>
+          <a:prstGeom prst="rect">
+            <a:avLst/>
+          </a:prstGeom>
+        </p:spPr>
+      </p:pic>
+      <p:sp>
+        <p:nvSpPr>
+          <p:cNvPr id="96" name="ZoneTexte 95">
+            <a:extLst>
+              <a:ext uri="{FF2B5EF4-FFF2-40B4-BE49-F238E27FC236}">
+                <a16:creationId xmlns:a16="http://schemas.microsoft.com/office/drawing/2014/main" id="{BC4AF96D-4C27-7563-E59E-584378764CBD}"/>
+              </a:ext>
+            </a:extLst>
+          </p:cNvPr>
+          <p:cNvSpPr txBox="1"/>
+          <p:nvPr/>
+        </p:nvSpPr>
+        <p:spPr>
+          <a:xfrm>
+            <a:off x="-10867362" y="4847273"/>
+            <a:ext cx="940445" cy="190240"/>
+          </a:xfrm>
+          <a:prstGeom prst="rect">
+            <a:avLst/>
+          </a:prstGeom>
+          <a:noFill/>
+        </p:spPr>
+        <p:txBody>
+          <a:bodyPr wrap="none" lIns="18000" tIns="18000" rIns="18000" bIns="18000" rtlCol="0">
+            <a:spAutoFit/>
+          </a:bodyPr>
+          <a:lstStyle/>
+          <a:p>
+            <a:r>
+              <a:rPr lang="fr-FR" sz="1000"/>
+              <a:t>Compteur gaz</a:t>
+            </a:r>
+          </a:p>
+        </p:txBody>
+      </p:sp>
+      <p:pic>
+        <p:nvPicPr>
+          <p:cNvPr id="97" name="Image 96" descr="Une image contenant noir, obscurité&#10;&#10;Description générée automatiquement">
+            <a:extLst>
+              <a:ext uri="{FF2B5EF4-FFF2-40B4-BE49-F238E27FC236}">
+                <a16:creationId xmlns:a16="http://schemas.microsoft.com/office/drawing/2014/main" id="{29DEA43A-3861-6518-7332-1806652B0D8F}"/>
+              </a:ext>
+            </a:extLst>
+          </p:cNvPr>
+          <p:cNvPicPr>
+            <a:picLocks noChangeAspect="1"/>
+          </p:cNvPicPr>
+          <p:nvPr/>
+        </p:nvPicPr>
+        <p:blipFill rotWithShape="1">
+          <a:blip r:embed="rId14">
+            <a:duotone>
+              <a:schemeClr val="accent2">
+                <a:shade val="45000"/>
+                <a:satMod val="135000"/>
+              </a:schemeClr>
+              <a:prstClr val="white"/>
+            </a:duotone>
+            <a:extLst>
+              <a:ext uri="{28A0092B-C50C-407E-A947-70E740481C1C}">
+                <a14:useLocalDpi xmlns:a14="http://schemas.microsoft.com/office/drawing/2010/main" val="0"/>
+              </a:ext>
+            </a:extLst>
+          </a:blip>
+          <a:srcRect l="28202" t="14323" r="27011" b="32256"/>
+          <a:stretch/>
+        </p:blipFill>
+        <p:spPr>
+          <a:xfrm>
+            <a:off x="-1058971" y="3034124"/>
+            <a:ext cx="301812" cy="360000"/>
+          </a:xfrm>
+          <a:prstGeom prst="rect">
+            <a:avLst/>
+          </a:prstGeom>
+        </p:spPr>
+      </p:pic>
+      <p:pic>
+        <p:nvPicPr>
+          <p:cNvPr id="98" name="Image 97" descr="Une image contenant noir, obscurité&#10;&#10;Description générée automatiquement">
+            <a:extLst>
+              <a:ext uri="{FF2B5EF4-FFF2-40B4-BE49-F238E27FC236}">
+                <a16:creationId xmlns:a16="http://schemas.microsoft.com/office/drawing/2014/main" id="{11AC3FE7-4770-5534-D2AE-88B93FD5F392}"/>
+              </a:ext>
+            </a:extLst>
+          </p:cNvPr>
+          <p:cNvPicPr>
+            <a:picLocks noChangeAspect="1"/>
+          </p:cNvPicPr>
+          <p:nvPr/>
+        </p:nvPicPr>
+        <p:blipFill rotWithShape="1">
+          <a:blip r:embed="rId14">
+            <a:duotone>
+              <a:schemeClr val="accent6">
+                <a:shade val="45000"/>
+                <a:satMod val="135000"/>
+              </a:schemeClr>
+              <a:prstClr val="white"/>
+            </a:duotone>
+            <a:extLst>
+              <a:ext uri="{28A0092B-C50C-407E-A947-70E740481C1C}">
+                <a14:useLocalDpi xmlns:a14="http://schemas.microsoft.com/office/drawing/2010/main" val="0"/>
+              </a:ext>
+            </a:extLst>
+          </a:blip>
+          <a:srcRect l="28202" t="14323" r="27011" b="32256"/>
+          <a:stretch/>
+        </p:blipFill>
+        <p:spPr>
+          <a:xfrm flipV="1">
+            <a:off x="-1058971" y="3493903"/>
+            <a:ext cx="301812" cy="360000"/>
+          </a:xfrm>
+          <a:prstGeom prst="rect">
+            <a:avLst/>
+          </a:prstGeom>
+        </p:spPr>
+      </p:pic>
+      <p:pic>
+        <p:nvPicPr>
+          <p:cNvPr id="99" name="Image 98" descr="Une image contenant noir, obscurité&#10;&#10;Description générée automatiquement">
+            <a:extLst>
+              <a:ext uri="{FF2B5EF4-FFF2-40B4-BE49-F238E27FC236}">
+                <a16:creationId xmlns:a16="http://schemas.microsoft.com/office/drawing/2014/main" id="{4AEDFDD5-1389-BCF1-B940-C2CD98F8F62E}"/>
               </a:ext>
             </a:extLst>
           </p:cNvPr>
@@ -6077,173 +6209,12 @@
               </a:ext>
             </a:extLst>
           </a:blip>
-          <a:srcRect l="20618" t="9934" r="16389" b="26528"/>
-          <a:stretch/>
-        </p:blipFill>
-        <p:spPr>
-          <a:xfrm>
-            <a:off x="261574" y="4775669"/>
-            <a:ext cx="348734" cy="351752"/>
-          </a:xfrm>
-          <a:prstGeom prst="rect">
-            <a:avLst/>
-          </a:prstGeom>
-        </p:spPr>
-      </p:pic>
-      <p:sp>
-        <p:nvSpPr>
-          <p:cNvPr id="102" name="ZoneTexte 101">
-            <a:extLst>
-              <a:ext uri="{FF2B5EF4-FFF2-40B4-BE49-F238E27FC236}">
-                <a16:creationId xmlns:a16="http://schemas.microsoft.com/office/drawing/2014/main" id="{D1CFA9E5-E0AC-E63B-F7C6-2E3B7731F59B}"/>
-              </a:ext>
-            </a:extLst>
-          </p:cNvPr>
-          <p:cNvSpPr txBox="1"/>
-          <p:nvPr/>
-        </p:nvSpPr>
-        <p:spPr>
-          <a:xfrm>
-            <a:off x="682790" y="4847273"/>
-            <a:ext cx="940445" cy="190240"/>
-          </a:xfrm>
-          <a:prstGeom prst="rect">
-            <a:avLst/>
-          </a:prstGeom>
-          <a:noFill/>
-        </p:spPr>
-        <p:txBody>
-          <a:bodyPr wrap="none" lIns="18000" tIns="18000" rIns="18000" bIns="18000" rtlCol="0">
-            <a:spAutoFit/>
-          </a:bodyPr>
-          <a:lstStyle/>
-          <a:p>
-            <a:r>
-              <a:rPr lang="fr-FR" sz="1000"/>
-              <a:t>Compteur gaz</a:t>
-            </a:r>
-          </a:p>
-        </p:txBody>
-      </p:sp>
-      <p:pic>
-        <p:nvPicPr>
-          <p:cNvPr id="24" name="Image 23" descr="Une image contenant noir, obscurité&#10;&#10;Description générée automatiquement">
-            <a:extLst>
-              <a:ext uri="{FF2B5EF4-FFF2-40B4-BE49-F238E27FC236}">
-                <a16:creationId xmlns:a16="http://schemas.microsoft.com/office/drawing/2014/main" id="{C9C9E75C-774E-4694-7393-CB42B9D97439}"/>
-              </a:ext>
-            </a:extLst>
-          </p:cNvPr>
-          <p:cNvPicPr>
-            <a:picLocks noChangeAspect="1"/>
-          </p:cNvPicPr>
-          <p:nvPr/>
-        </p:nvPicPr>
-        <p:blipFill rotWithShape="1">
-          <a:blip r:embed="rId15">
-            <a:duotone>
-              <a:schemeClr val="accent2">
-                <a:shade val="45000"/>
-                <a:satMod val="135000"/>
-              </a:schemeClr>
-              <a:prstClr val="white"/>
-            </a:duotone>
-            <a:extLst>
-              <a:ext uri="{28A0092B-C50C-407E-A947-70E740481C1C}">
-                <a14:useLocalDpi xmlns:a14="http://schemas.microsoft.com/office/drawing/2010/main" val="0"/>
-              </a:ext>
-            </a:extLst>
-          </a:blip>
-          <a:srcRect l="28202" t="14323" r="27011" b="32256"/>
-          <a:stretch/>
-        </p:blipFill>
-        <p:spPr>
-          <a:xfrm>
-            <a:off x="10491181" y="3034124"/>
-            <a:ext cx="301812" cy="360000"/>
-          </a:xfrm>
-          <a:prstGeom prst="rect">
-            <a:avLst/>
-          </a:prstGeom>
-        </p:spPr>
-      </p:pic>
-      <p:pic>
-        <p:nvPicPr>
-          <p:cNvPr id="29" name="Image 28" descr="Une image contenant noir, obscurité&#10;&#10;Description générée automatiquement">
-            <a:extLst>
-              <a:ext uri="{FF2B5EF4-FFF2-40B4-BE49-F238E27FC236}">
-                <a16:creationId xmlns:a16="http://schemas.microsoft.com/office/drawing/2014/main" id="{C4F5491F-057E-4F1B-65C8-1C1317CFC0C8}"/>
-              </a:ext>
-            </a:extLst>
-          </p:cNvPr>
-          <p:cNvPicPr>
-            <a:picLocks noChangeAspect="1"/>
-          </p:cNvPicPr>
-          <p:nvPr/>
-        </p:nvPicPr>
-        <p:blipFill rotWithShape="1">
-          <a:blip r:embed="rId15">
-            <a:duotone>
-              <a:schemeClr val="accent6">
-                <a:shade val="45000"/>
-                <a:satMod val="135000"/>
-              </a:schemeClr>
-              <a:prstClr val="white"/>
-            </a:duotone>
-            <a:extLst>
-              <a:ext uri="{28A0092B-C50C-407E-A947-70E740481C1C}">
-                <a14:useLocalDpi xmlns:a14="http://schemas.microsoft.com/office/drawing/2010/main" val="0"/>
-              </a:ext>
-            </a:extLst>
-          </a:blip>
           <a:srcRect l="28202" t="14323" r="27011" b="32256"/>
           <a:stretch/>
         </p:blipFill>
         <p:spPr>
           <a:xfrm flipV="1">
-            <a:off x="10491181" y="3493903"/>
-            <a:ext cx="301812" cy="360000"/>
-          </a:xfrm>
-          <a:prstGeom prst="rect">
-            <a:avLst/>
-          </a:prstGeom>
-        </p:spPr>
-      </p:pic>
-      <p:pic>
-        <p:nvPicPr>
-          <p:cNvPr id="46" name="Image 45" descr="Une image contenant noir, obscurité&#10;&#10;Description générée automatiquement">
-            <a:extLst>
-              <a:ext uri="{FF2B5EF4-FFF2-40B4-BE49-F238E27FC236}">
-                <a16:creationId xmlns:a16="http://schemas.microsoft.com/office/drawing/2014/main" id="{AA9878F8-EC4D-F98E-1C8B-A1D9E37B0F6A}"/>
-              </a:ext>
-            </a:extLst>
-          </p:cNvPr>
-          <p:cNvPicPr>
-            <a:picLocks noChangeAspect="1"/>
-          </p:cNvPicPr>
-          <p:nvPr/>
-        </p:nvPicPr>
-        <p:blipFill rotWithShape="1">
-          <a:blip r:embed="rId15">
-            <a:duotone>
-              <a:schemeClr val="accent4">
-                <a:shade val="45000"/>
-                <a:satMod val="135000"/>
-              </a:schemeClr>
-              <a:prstClr val="white"/>
-            </a:duotone>
-            <a:extLst>
-              <a:ext uri="{28A0092B-C50C-407E-A947-70E740481C1C}">
-                <a14:useLocalDpi xmlns:a14="http://schemas.microsoft.com/office/drawing/2010/main" val="0"/>
-              </a:ext>
-            </a:extLst>
-          </a:blip>
-          <a:srcRect l="28202" t="14323" r="27011" b="32256"/>
-          <a:stretch/>
-        </p:blipFill>
-        <p:spPr>
-          <a:xfrm flipV="1">
-            <a:off x="10491181" y="3988855"/>
+            <a:off x="-1058971" y="3988855"/>
             <a:ext cx="301812" cy="360000"/>
           </a:xfrm>
           <a:prstGeom prst="rect">
@@ -6253,10 +6224,10 @@
       </p:pic>
       <p:sp>
         <p:nvSpPr>
-          <p:cNvPr id="49" name="ZoneTexte 48">
+          <p:cNvPr id="100" name="ZoneTexte 99">
             <a:extLst>
               <a:ext uri="{FF2B5EF4-FFF2-40B4-BE49-F238E27FC236}">
-                <a16:creationId xmlns:a16="http://schemas.microsoft.com/office/drawing/2014/main" id="{F39C9C94-B791-F404-9ADE-4BB2D75C6639}"/>
+                <a16:creationId xmlns:a16="http://schemas.microsoft.com/office/drawing/2014/main" id="{936B2B78-D3FD-F695-FCA7-B5A9B518A950}"/>
               </a:ext>
             </a:extLst>
           </p:cNvPr>
@@ -6265,7 +6236,7 @@
         </p:nvSpPr>
         <p:spPr>
           <a:xfrm>
-            <a:off x="10880267" y="3064110"/>
+            <a:off x="-669885" y="3064110"/>
             <a:ext cx="560534" cy="190240"/>
           </a:xfrm>
           <a:prstGeom prst="rect">
@@ -6288,10 +6259,10 @@
       </p:sp>
       <p:sp>
         <p:nvSpPr>
-          <p:cNvPr id="66" name="ZoneTexte 65">
+          <p:cNvPr id="101" name="ZoneTexte 100">
             <a:extLst>
               <a:ext uri="{FF2B5EF4-FFF2-40B4-BE49-F238E27FC236}">
-                <a16:creationId xmlns:a16="http://schemas.microsoft.com/office/drawing/2014/main" id="{A9675B33-17E6-C051-32A4-00F6990A3A13}"/>
+                <a16:creationId xmlns:a16="http://schemas.microsoft.com/office/drawing/2014/main" id="{70C96C95-D1AA-3F43-0835-F2473CE1943C}"/>
               </a:ext>
             </a:extLst>
           </p:cNvPr>
@@ -6300,7 +6271,7 @@
         </p:nvSpPr>
         <p:spPr>
           <a:xfrm>
-            <a:off x="10899983" y="3600112"/>
+            <a:off x="-650169" y="3600112"/>
             <a:ext cx="297642" cy="190240"/>
           </a:xfrm>
           <a:prstGeom prst="rect">
@@ -6323,10 +6294,10 @@
       </p:sp>
       <p:sp>
         <p:nvSpPr>
-          <p:cNvPr id="71" name="ZoneTexte 70">
+          <p:cNvPr id="102" name="ZoneTexte 101">
             <a:extLst>
               <a:ext uri="{FF2B5EF4-FFF2-40B4-BE49-F238E27FC236}">
-                <a16:creationId xmlns:a16="http://schemas.microsoft.com/office/drawing/2014/main" id="{0FCDA5DD-A1F1-0BEE-CE87-689E2141C98B}"/>
+                <a16:creationId xmlns:a16="http://schemas.microsoft.com/office/drawing/2014/main" id="{548ADD9B-E63C-E302-47F7-9356F0387749}"/>
               </a:ext>
             </a:extLst>
           </p:cNvPr>
@@ -6335,7 +6306,7 @@
         </p:nvSpPr>
         <p:spPr>
           <a:xfrm>
-            <a:off x="10878755" y="4090951"/>
+            <a:off x="-671397" y="4090951"/>
             <a:ext cx="469162" cy="190240"/>
           </a:xfrm>
           <a:prstGeom prst="rect">
@@ -6359,7 +6330,7 @@
     </p:spTree>
     <p:extLst>
       <p:ext uri="{BB962C8B-B14F-4D97-AF65-F5344CB8AC3E}">
-        <p14:creationId xmlns:p14="http://schemas.microsoft.com/office/powerpoint/2010/main" val="2880284437"/>
+        <p14:creationId xmlns:p14="http://schemas.microsoft.com/office/powerpoint/2010/main" val="1768793509"/>
       </p:ext>
     </p:extLst>
   </p:cSld>
@@ -10995,7 +10966,7 @@
         <p:spPr>
           <a:xfrm>
             <a:off x="0" y="6610497"/>
-            <a:ext cx="1926810" cy="276999"/>
+            <a:ext cx="1009892" cy="276999"/>
           </a:xfrm>
           <a:prstGeom prst="rect">
             <a:avLst/>
@@ -11011,7 +10982,7 @@
             <a:pPr algn="l"/>
             <a:r>
               <a:rPr lang="fr-FR" sz="1200" dirty="0"/>
-              <a:t>Occupé : 🙂 / Chauffé : 🔥  </a:t>
+              <a:t>Chauffé : 🔥  </a:t>
             </a:r>
           </a:p>
         </p:txBody>
@@ -13118,7 +13089,7 @@
         <p:spPr>
           <a:xfrm>
             <a:off x="0" y="6642556"/>
-            <a:ext cx="720069" cy="246221"/>
+            <a:ext cx="655949" cy="246221"/>
           </a:xfrm>
           <a:prstGeom prst="rect">
             <a:avLst/>
@@ -13133,7 +13104,7 @@
           <a:p>
             <a:pPr algn="l"/>
             <a:r>
-              <a:rPr lang="fr-FR" sz="1000" u="sng" dirty="0"/>
+              <a:rPr lang="fr-FR" sz="1000" i="1" dirty="0"/>
               <a:t>A vérifier</a:t>
             </a:r>
           </a:p>
@@ -14362,7 +14333,7 @@
         <p:spPr>
           <a:xfrm>
             <a:off x="0" y="6642556"/>
-            <a:ext cx="720069" cy="246221"/>
+            <a:ext cx="655949" cy="246221"/>
           </a:xfrm>
           <a:prstGeom prst="rect">
             <a:avLst/>
@@ -14377,7 +14348,7 @@
           <a:p>
             <a:pPr algn="l"/>
             <a:r>
-              <a:rPr lang="fr-FR" sz="1000" u="sng" dirty="0"/>
+              <a:rPr lang="fr-FR" sz="1000" i="1" dirty="0"/>
               <a:t>A vérifier</a:t>
             </a:r>
           </a:p>
@@ -15426,7 +15397,7 @@
         <p:spPr>
           <a:xfrm>
             <a:off x="0" y="6642556"/>
-            <a:ext cx="720069" cy="246221"/>
+            <a:ext cx="655949" cy="246221"/>
           </a:xfrm>
           <a:prstGeom prst="rect">
             <a:avLst/>
@@ -15441,7 +15412,7 @@
           <a:p>
             <a:pPr algn="l"/>
             <a:r>
-              <a:rPr lang="fr-FR" sz="1000" u="sng" dirty="0"/>
+              <a:rPr lang="fr-FR" sz="1000" i="1" dirty="0"/>
               <a:t>A vérifier</a:t>
             </a:r>
           </a:p>
@@ -15568,14 +15539,14 @@
           <p:nvPr>
             <p:extLst>
               <p:ext uri="{D42A27DB-BD31-4B8C-83A1-F6EECF244321}">
-                <p14:modId xmlns:p14="http://schemas.microsoft.com/office/powerpoint/2010/main" val="3606062103"/>
+                <p14:modId xmlns:p14="http://schemas.microsoft.com/office/powerpoint/2010/main" val="1239158914"/>
               </p:ext>
             </p:extLst>
           </p:nvPr>
         </p:nvGraphicFramePr>
         <p:xfrm>
-          <a:off x="241075" y="1179000"/>
-          <a:ext cx="5040000" cy="335280"/>
+          <a:off x="1452891" y="1658052"/>
+          <a:ext cx="3892683" cy="335280"/>
         </p:xfrm>
         <a:graphic>
           <a:graphicData uri="http://schemas.openxmlformats.org/drawingml/2006/table">
@@ -15584,7 +15555,7 @@
                 <a:tableStyleId>{5C22544A-7EE6-4342-B048-85BDC9FD1C3A}</a:tableStyleId>
               </a:tblPr>
               <a:tblGrid>
-                <a:gridCol w="5040000">
+                <a:gridCol w="3892683">
                   <a:extLst>
                     <a:ext uri="{9D8B030D-6E8A-4147-A177-3AD203B41FA5}">
                       <a16:colId xmlns:a16="http://schemas.microsoft.com/office/drawing/2014/main" val="487097777"/>
@@ -15613,36 +15584,28 @@
                   </a:txBody>
                   <a:tcPr anchor="ctr">
                     <a:lnL w="12700" cap="flat" cmpd="sng" algn="ctr">
-                      <a:solidFill>
-                        <a:schemeClr val="tx1"/>
-                      </a:solidFill>
+                      <a:noFill/>
                       <a:prstDash val="solid"/>
                       <a:round/>
                       <a:headEnd type="none" w="med" len="med"/>
                       <a:tailEnd type="none" w="med" len="med"/>
                     </a:lnL>
                     <a:lnR w="12700" cap="flat" cmpd="sng" algn="ctr">
-                      <a:solidFill>
-                        <a:schemeClr val="tx1"/>
-                      </a:solidFill>
+                      <a:noFill/>
                       <a:prstDash val="solid"/>
                       <a:round/>
                       <a:headEnd type="none" w="med" len="med"/>
                       <a:tailEnd type="none" w="med" len="med"/>
                     </a:lnR>
                     <a:lnT w="12700" cap="flat" cmpd="sng" algn="ctr">
-                      <a:solidFill>
-                        <a:schemeClr val="tx1"/>
-                      </a:solidFill>
+                      <a:noFill/>
                       <a:prstDash val="solid"/>
                       <a:round/>
                       <a:headEnd type="none" w="med" len="med"/>
                       <a:tailEnd type="none" w="med" len="med"/>
                     </a:lnT>
                     <a:lnB w="12700" cap="flat" cmpd="sng" algn="ctr">
-                      <a:solidFill>
-                        <a:schemeClr val="tx1"/>
-                      </a:solidFill>
+                      <a:noFill/>
                       <a:prstDash val="solid"/>
                       <a:round/>
                       <a:headEnd type="none" w="med" len="med"/>
@@ -15711,6 +15674,436 @@
           <a:p>
             <a:pPr algn="ctr"/>
             <a:endParaRPr lang="fr-FR"/>
+          </a:p>
+        </p:txBody>
+      </p:sp>
+      <p:sp>
+        <p:nvSpPr>
+          <p:cNvPr id="8" name="Flèche : droite 7">
+            <a:extLst>
+              <a:ext uri="{FF2B5EF4-FFF2-40B4-BE49-F238E27FC236}">
+                <a16:creationId xmlns:a16="http://schemas.microsoft.com/office/drawing/2014/main" id="{B13036D7-7F92-9A38-ABCE-394B6DFCE288}"/>
+              </a:ext>
+            </a:extLst>
+          </p:cNvPr>
+          <p:cNvSpPr/>
+          <p:nvPr/>
+        </p:nvSpPr>
+        <p:spPr>
+          <a:xfrm rot="5400000">
+            <a:off x="-1672829" y="3461936"/>
+            <a:ext cx="4490913" cy="883145"/>
+          </a:xfrm>
+          <a:prstGeom prst="rightArrow">
+            <a:avLst/>
+          </a:prstGeom>
+          <a:gradFill flip="none" rotWithShape="1">
+            <a:gsLst>
+              <a:gs pos="0">
+                <a:schemeClr val="accent6">
+                  <a:lumMod val="20000"/>
+                  <a:lumOff val="80000"/>
+                </a:schemeClr>
+              </a:gs>
+              <a:gs pos="100000">
+                <a:schemeClr val="accent6">
+                  <a:lumMod val="60000"/>
+                  <a:lumOff val="40000"/>
+                </a:schemeClr>
+              </a:gs>
+            </a:gsLst>
+            <a:lin ang="0" scaled="0"/>
+            <a:tileRect/>
+          </a:gradFill>
+        </p:spPr>
+        <p:style>
+          <a:lnRef idx="2">
+            <a:schemeClr val="accent1">
+              <a:shade val="15000"/>
+            </a:schemeClr>
+          </a:lnRef>
+          <a:fillRef idx="1">
+            <a:schemeClr val="accent1"/>
+          </a:fillRef>
+          <a:effectRef idx="0">
+            <a:schemeClr val="accent1"/>
+          </a:effectRef>
+          <a:fontRef idx="minor">
+            <a:schemeClr val="lt1"/>
+          </a:fontRef>
+        </p:style>
+        <p:txBody>
+          <a:bodyPr rtlCol="0" anchor="ctr"/>
+          <a:lstStyle>
+            <a:defPPr>
+              <a:defRPr lang="fr-FR"/>
+            </a:defPPr>
+            <a:lvl1pPr marL="0" algn="l" defTabSz="914400" rtl="0" eaLnBrk="1" latinLnBrk="0" hangingPunct="1">
+              <a:defRPr sz="1800" kern="1200">
+                <a:solidFill>
+                  <a:schemeClr val="lt1"/>
+                </a:solidFill>
+                <a:latin typeface="+mn-lt"/>
+                <a:ea typeface="+mn-ea"/>
+                <a:cs typeface="+mn-cs"/>
+              </a:defRPr>
+            </a:lvl1pPr>
+            <a:lvl2pPr marL="457200" algn="l" defTabSz="914400" rtl="0" eaLnBrk="1" latinLnBrk="0" hangingPunct="1">
+              <a:defRPr sz="1800" kern="1200">
+                <a:solidFill>
+                  <a:schemeClr val="lt1"/>
+                </a:solidFill>
+                <a:latin typeface="+mn-lt"/>
+                <a:ea typeface="+mn-ea"/>
+                <a:cs typeface="+mn-cs"/>
+              </a:defRPr>
+            </a:lvl2pPr>
+            <a:lvl3pPr marL="914400" algn="l" defTabSz="914400" rtl="0" eaLnBrk="1" latinLnBrk="0" hangingPunct="1">
+              <a:defRPr sz="1800" kern="1200">
+                <a:solidFill>
+                  <a:schemeClr val="lt1"/>
+                </a:solidFill>
+                <a:latin typeface="+mn-lt"/>
+                <a:ea typeface="+mn-ea"/>
+                <a:cs typeface="+mn-cs"/>
+              </a:defRPr>
+            </a:lvl3pPr>
+            <a:lvl4pPr marL="1371600" algn="l" defTabSz="914400" rtl="0" eaLnBrk="1" latinLnBrk="0" hangingPunct="1">
+              <a:defRPr sz="1800" kern="1200">
+                <a:solidFill>
+                  <a:schemeClr val="lt1"/>
+                </a:solidFill>
+                <a:latin typeface="+mn-lt"/>
+                <a:ea typeface="+mn-ea"/>
+                <a:cs typeface="+mn-cs"/>
+              </a:defRPr>
+            </a:lvl4pPr>
+            <a:lvl5pPr marL="1828800" algn="l" defTabSz="914400" rtl="0" eaLnBrk="1" latinLnBrk="0" hangingPunct="1">
+              <a:defRPr sz="1800" kern="1200">
+                <a:solidFill>
+                  <a:schemeClr val="lt1"/>
+                </a:solidFill>
+                <a:latin typeface="+mn-lt"/>
+                <a:ea typeface="+mn-ea"/>
+                <a:cs typeface="+mn-cs"/>
+              </a:defRPr>
+            </a:lvl5pPr>
+            <a:lvl6pPr marL="2286000" algn="l" defTabSz="914400" rtl="0" eaLnBrk="1" latinLnBrk="0" hangingPunct="1">
+              <a:defRPr sz="1800" kern="1200">
+                <a:solidFill>
+                  <a:schemeClr val="lt1"/>
+                </a:solidFill>
+                <a:latin typeface="+mn-lt"/>
+                <a:ea typeface="+mn-ea"/>
+                <a:cs typeface="+mn-cs"/>
+              </a:defRPr>
+            </a:lvl6pPr>
+            <a:lvl7pPr marL="2743200" algn="l" defTabSz="914400" rtl="0" eaLnBrk="1" latinLnBrk="0" hangingPunct="1">
+              <a:defRPr sz="1800" kern="1200">
+                <a:solidFill>
+                  <a:schemeClr val="lt1"/>
+                </a:solidFill>
+                <a:latin typeface="+mn-lt"/>
+                <a:ea typeface="+mn-ea"/>
+                <a:cs typeface="+mn-cs"/>
+              </a:defRPr>
+            </a:lvl7pPr>
+            <a:lvl8pPr marL="3200400" algn="l" defTabSz="914400" rtl="0" eaLnBrk="1" latinLnBrk="0" hangingPunct="1">
+              <a:defRPr sz="1800" kern="1200">
+                <a:solidFill>
+                  <a:schemeClr val="lt1"/>
+                </a:solidFill>
+                <a:latin typeface="+mn-lt"/>
+                <a:ea typeface="+mn-ea"/>
+                <a:cs typeface="+mn-cs"/>
+              </a:defRPr>
+            </a:lvl8pPr>
+            <a:lvl9pPr marL="3657600" algn="l" defTabSz="914400" rtl="0" eaLnBrk="1" latinLnBrk="0" hangingPunct="1">
+              <a:defRPr sz="1800" kern="1200">
+                <a:solidFill>
+                  <a:schemeClr val="lt1"/>
+                </a:solidFill>
+                <a:latin typeface="+mn-lt"/>
+                <a:ea typeface="+mn-ea"/>
+                <a:cs typeface="+mn-cs"/>
+              </a:defRPr>
+            </a:lvl9pPr>
+          </a:lstStyle>
+          <a:p>
+            <a:pPr algn="ctr"/>
+            <a:endParaRPr lang="fr-FR"/>
+          </a:p>
+        </p:txBody>
+      </p:sp>
+      <p:sp>
+        <p:nvSpPr>
+          <p:cNvPr id="9" name="ZoneTexte 2">
+            <a:extLst>
+              <a:ext uri="{FF2B5EF4-FFF2-40B4-BE49-F238E27FC236}">
+                <a16:creationId xmlns:a16="http://schemas.microsoft.com/office/drawing/2014/main" id="{DEF03BF0-B956-1290-C668-21D06152DFEC}"/>
+              </a:ext>
+            </a:extLst>
+          </p:cNvPr>
+          <p:cNvSpPr txBox="1"/>
+          <p:nvPr/>
+        </p:nvSpPr>
+        <p:spPr>
+          <a:xfrm>
+            <a:off x="64626" y="1034687"/>
+            <a:ext cx="1388265" cy="369332"/>
+          </a:xfrm>
+          <a:prstGeom prst="rect">
+            <a:avLst/>
+          </a:prstGeom>
+          <a:solidFill>
+            <a:schemeClr val="accent6"/>
+          </a:solidFill>
+        </p:spPr>
+        <p:txBody>
+          <a:bodyPr wrap="none" rtlCol="0">
+            <a:spAutoFit/>
+          </a:bodyPr>
+          <a:lstStyle>
+            <a:defPPr>
+              <a:defRPr lang="fr-FR"/>
+            </a:defPPr>
+            <a:lvl1pPr marL="0" algn="l" defTabSz="914400" rtl="0" eaLnBrk="1" latinLnBrk="0" hangingPunct="1">
+              <a:defRPr sz="1800" kern="1200">
+                <a:solidFill>
+                  <a:schemeClr val="tx1"/>
+                </a:solidFill>
+                <a:latin typeface="+mn-lt"/>
+                <a:ea typeface="+mn-ea"/>
+                <a:cs typeface="+mn-cs"/>
+              </a:defRPr>
+            </a:lvl1pPr>
+            <a:lvl2pPr marL="457200" algn="l" defTabSz="914400" rtl="0" eaLnBrk="1" latinLnBrk="0" hangingPunct="1">
+              <a:defRPr sz="1800" kern="1200">
+                <a:solidFill>
+                  <a:schemeClr val="tx1"/>
+                </a:solidFill>
+                <a:latin typeface="+mn-lt"/>
+                <a:ea typeface="+mn-ea"/>
+                <a:cs typeface="+mn-cs"/>
+              </a:defRPr>
+            </a:lvl2pPr>
+            <a:lvl3pPr marL="914400" algn="l" defTabSz="914400" rtl="0" eaLnBrk="1" latinLnBrk="0" hangingPunct="1">
+              <a:defRPr sz="1800" kern="1200">
+                <a:solidFill>
+                  <a:schemeClr val="tx1"/>
+                </a:solidFill>
+                <a:latin typeface="+mn-lt"/>
+                <a:ea typeface="+mn-ea"/>
+                <a:cs typeface="+mn-cs"/>
+              </a:defRPr>
+            </a:lvl3pPr>
+            <a:lvl4pPr marL="1371600" algn="l" defTabSz="914400" rtl="0" eaLnBrk="1" latinLnBrk="0" hangingPunct="1">
+              <a:defRPr sz="1800" kern="1200">
+                <a:solidFill>
+                  <a:schemeClr val="tx1"/>
+                </a:solidFill>
+                <a:latin typeface="+mn-lt"/>
+                <a:ea typeface="+mn-ea"/>
+                <a:cs typeface="+mn-cs"/>
+              </a:defRPr>
+            </a:lvl4pPr>
+            <a:lvl5pPr marL="1828800" algn="l" defTabSz="914400" rtl="0" eaLnBrk="1" latinLnBrk="0" hangingPunct="1">
+              <a:defRPr sz="1800" kern="1200">
+                <a:solidFill>
+                  <a:schemeClr val="tx1"/>
+                </a:solidFill>
+                <a:latin typeface="+mn-lt"/>
+                <a:ea typeface="+mn-ea"/>
+                <a:cs typeface="+mn-cs"/>
+              </a:defRPr>
+            </a:lvl5pPr>
+            <a:lvl6pPr marL="2286000" algn="l" defTabSz="914400" rtl="0" eaLnBrk="1" latinLnBrk="0" hangingPunct="1">
+              <a:defRPr sz="1800" kern="1200">
+                <a:solidFill>
+                  <a:schemeClr val="tx1"/>
+                </a:solidFill>
+                <a:latin typeface="+mn-lt"/>
+                <a:ea typeface="+mn-ea"/>
+                <a:cs typeface="+mn-cs"/>
+              </a:defRPr>
+            </a:lvl6pPr>
+            <a:lvl7pPr marL="2743200" algn="l" defTabSz="914400" rtl="0" eaLnBrk="1" latinLnBrk="0" hangingPunct="1">
+              <a:defRPr sz="1800" kern="1200">
+                <a:solidFill>
+                  <a:schemeClr val="tx1"/>
+                </a:solidFill>
+                <a:latin typeface="+mn-lt"/>
+                <a:ea typeface="+mn-ea"/>
+                <a:cs typeface="+mn-cs"/>
+              </a:defRPr>
+            </a:lvl7pPr>
+            <a:lvl8pPr marL="3200400" algn="l" defTabSz="914400" rtl="0" eaLnBrk="1" latinLnBrk="0" hangingPunct="1">
+              <a:defRPr sz="1800" kern="1200">
+                <a:solidFill>
+                  <a:schemeClr val="tx1"/>
+                </a:solidFill>
+                <a:latin typeface="+mn-lt"/>
+                <a:ea typeface="+mn-ea"/>
+                <a:cs typeface="+mn-cs"/>
+              </a:defRPr>
+            </a:lvl8pPr>
+            <a:lvl9pPr marL="3657600" algn="l" defTabSz="914400" rtl="0" eaLnBrk="1" latinLnBrk="0" hangingPunct="1">
+              <a:defRPr sz="1800" kern="1200">
+                <a:solidFill>
+                  <a:schemeClr val="tx1"/>
+                </a:solidFill>
+                <a:latin typeface="+mn-lt"/>
+                <a:ea typeface="+mn-ea"/>
+                <a:cs typeface="+mn-cs"/>
+              </a:defRPr>
+            </a:lvl9pPr>
+          </a:lstStyle>
+          <a:p>
+            <a:pPr algn="l"/>
+            <a:r>
+              <a:rPr lang="fr-FR" dirty="0">
+                <a:solidFill>
+                  <a:schemeClr val="bg1"/>
+                </a:solidFill>
+              </a:rPr>
+              <a:t>Impact faible</a:t>
+            </a:r>
+          </a:p>
+        </p:txBody>
+      </p:sp>
+      <p:sp>
+        <p:nvSpPr>
+          <p:cNvPr id="10" name="ZoneTexte 3">
+            <a:extLst>
+              <a:ext uri="{FF2B5EF4-FFF2-40B4-BE49-F238E27FC236}">
+                <a16:creationId xmlns:a16="http://schemas.microsoft.com/office/drawing/2014/main" id="{D78553FD-B6D9-49A1-6BE1-389BF57203F6}"/>
+              </a:ext>
+            </a:extLst>
+          </p:cNvPr>
+          <p:cNvSpPr txBox="1"/>
+          <p:nvPr/>
+        </p:nvSpPr>
+        <p:spPr>
+          <a:xfrm>
+            <a:off x="64626" y="6310065"/>
+            <a:ext cx="1256883" cy="369332"/>
+          </a:xfrm>
+          <a:prstGeom prst="rect">
+            <a:avLst/>
+          </a:prstGeom>
+          <a:solidFill>
+            <a:schemeClr val="accent6"/>
+          </a:solidFill>
+        </p:spPr>
+        <p:txBody>
+          <a:bodyPr wrap="none" rtlCol="0">
+            <a:spAutoFit/>
+          </a:bodyPr>
+          <a:lstStyle>
+            <a:defPPr>
+              <a:defRPr lang="fr-FR"/>
+            </a:defPPr>
+            <a:lvl1pPr marL="0" algn="l" defTabSz="914400" rtl="0" eaLnBrk="1" latinLnBrk="0" hangingPunct="1">
+              <a:defRPr sz="1800" kern="1200">
+                <a:solidFill>
+                  <a:schemeClr val="tx1"/>
+                </a:solidFill>
+                <a:latin typeface="+mn-lt"/>
+                <a:ea typeface="+mn-ea"/>
+                <a:cs typeface="+mn-cs"/>
+              </a:defRPr>
+            </a:lvl1pPr>
+            <a:lvl2pPr marL="457200" algn="l" defTabSz="914400" rtl="0" eaLnBrk="1" latinLnBrk="0" hangingPunct="1">
+              <a:defRPr sz="1800" kern="1200">
+                <a:solidFill>
+                  <a:schemeClr val="tx1"/>
+                </a:solidFill>
+                <a:latin typeface="+mn-lt"/>
+                <a:ea typeface="+mn-ea"/>
+                <a:cs typeface="+mn-cs"/>
+              </a:defRPr>
+            </a:lvl2pPr>
+            <a:lvl3pPr marL="914400" algn="l" defTabSz="914400" rtl="0" eaLnBrk="1" latinLnBrk="0" hangingPunct="1">
+              <a:defRPr sz="1800" kern="1200">
+                <a:solidFill>
+                  <a:schemeClr val="tx1"/>
+                </a:solidFill>
+                <a:latin typeface="+mn-lt"/>
+                <a:ea typeface="+mn-ea"/>
+                <a:cs typeface="+mn-cs"/>
+              </a:defRPr>
+            </a:lvl3pPr>
+            <a:lvl4pPr marL="1371600" algn="l" defTabSz="914400" rtl="0" eaLnBrk="1" latinLnBrk="0" hangingPunct="1">
+              <a:defRPr sz="1800" kern="1200">
+                <a:solidFill>
+                  <a:schemeClr val="tx1"/>
+                </a:solidFill>
+                <a:latin typeface="+mn-lt"/>
+                <a:ea typeface="+mn-ea"/>
+                <a:cs typeface="+mn-cs"/>
+              </a:defRPr>
+            </a:lvl4pPr>
+            <a:lvl5pPr marL="1828800" algn="l" defTabSz="914400" rtl="0" eaLnBrk="1" latinLnBrk="0" hangingPunct="1">
+              <a:defRPr sz="1800" kern="1200">
+                <a:solidFill>
+                  <a:schemeClr val="tx1"/>
+                </a:solidFill>
+                <a:latin typeface="+mn-lt"/>
+                <a:ea typeface="+mn-ea"/>
+                <a:cs typeface="+mn-cs"/>
+              </a:defRPr>
+            </a:lvl5pPr>
+            <a:lvl6pPr marL="2286000" algn="l" defTabSz="914400" rtl="0" eaLnBrk="1" latinLnBrk="0" hangingPunct="1">
+              <a:defRPr sz="1800" kern="1200">
+                <a:solidFill>
+                  <a:schemeClr val="tx1"/>
+                </a:solidFill>
+                <a:latin typeface="+mn-lt"/>
+                <a:ea typeface="+mn-ea"/>
+                <a:cs typeface="+mn-cs"/>
+              </a:defRPr>
+            </a:lvl6pPr>
+            <a:lvl7pPr marL="2743200" algn="l" defTabSz="914400" rtl="0" eaLnBrk="1" latinLnBrk="0" hangingPunct="1">
+              <a:defRPr sz="1800" kern="1200">
+                <a:solidFill>
+                  <a:schemeClr val="tx1"/>
+                </a:solidFill>
+                <a:latin typeface="+mn-lt"/>
+                <a:ea typeface="+mn-ea"/>
+                <a:cs typeface="+mn-cs"/>
+              </a:defRPr>
+            </a:lvl7pPr>
+            <a:lvl8pPr marL="3200400" algn="l" defTabSz="914400" rtl="0" eaLnBrk="1" latinLnBrk="0" hangingPunct="1">
+              <a:defRPr sz="1800" kern="1200">
+                <a:solidFill>
+                  <a:schemeClr val="tx1"/>
+                </a:solidFill>
+                <a:latin typeface="+mn-lt"/>
+                <a:ea typeface="+mn-ea"/>
+                <a:cs typeface="+mn-cs"/>
+              </a:defRPr>
+            </a:lvl8pPr>
+            <a:lvl9pPr marL="3657600" algn="l" defTabSz="914400" rtl="0" eaLnBrk="1" latinLnBrk="0" hangingPunct="1">
+              <a:defRPr sz="1800" kern="1200">
+                <a:solidFill>
+                  <a:schemeClr val="tx1"/>
+                </a:solidFill>
+                <a:latin typeface="+mn-lt"/>
+                <a:ea typeface="+mn-ea"/>
+                <a:cs typeface="+mn-cs"/>
+              </a:defRPr>
+            </a:lvl9pPr>
+          </a:lstStyle>
+          <a:p>
+            <a:pPr algn="l"/>
+            <a:r>
+              <a:rPr lang="fr-FR" dirty="0">
+                <a:solidFill>
+                  <a:schemeClr val="bg1"/>
+                </a:solidFill>
+              </a:rPr>
+              <a:t>Impact Fort</a:t>
+            </a:r>
           </a:p>
         </p:txBody>
       </p:sp>

</xml_diff>

<commit_message>
Mise en form des sols et des menuiseries sur le powerpoint #34
</commit_message>
<xml_diff>
--- a/app/src/main/assets/powerpointvierge.pptx
+++ b/app/src/main/assets/powerpointvierge.pptx
@@ -1580,7 +1580,7 @@
             <a:avLst/>
           </a:prstGeom>
           <a:solidFill>
-            <a:schemeClr val="tx1"/>
+            <a:srgbClr val="004C64"/>
           </a:solidFill>
           <a:ln>
             <a:solidFill>
@@ -1923,7 +1923,7 @@
             <a:avLst/>
           </a:prstGeom>
           <a:solidFill>
-            <a:schemeClr val="tx1"/>
+            <a:srgbClr val="004C64"/>
           </a:solidFill>
         </p:spPr>
         <p:txBody>
@@ -6443,7 +6443,7 @@
             <a:avLst/>
           </a:prstGeom>
           <a:solidFill>
-            <a:schemeClr val="tx1"/>
+            <a:srgbClr val="004C64"/>
           </a:solidFill>
         </p:spPr>
         <p:txBody>
@@ -9764,7 +9764,7 @@
             <a:avLst/>
           </a:prstGeom>
           <a:solidFill>
-            <a:schemeClr val="tx1"/>
+            <a:srgbClr val="004C64"/>
           </a:solidFill>
         </p:spPr>
         <p:txBody>
@@ -9823,7 +9823,7 @@
             <a:avLst/>
           </a:prstGeom>
           <a:solidFill>
-            <a:schemeClr val="tx1"/>
+            <a:srgbClr val="004C64"/>
           </a:solidFill>
         </p:spPr>
         <p:txBody>
@@ -9888,7 +9888,7 @@
             <a:avLst/>
           </a:prstGeom>
           <a:solidFill>
-            <a:schemeClr val="tx1"/>
+            <a:srgbClr val="004C64"/>
           </a:solidFill>
         </p:spPr>
         <p:txBody>
@@ -11031,14 +11031,14 @@
         </p:nvSpPr>
         <p:spPr>
           <a:xfrm>
-            <a:off x="6436824" y="5253369"/>
-            <a:ext cx="5505452" cy="338554"/>
+            <a:off x="249724" y="5419393"/>
+            <a:ext cx="5855136" cy="338554"/>
           </a:xfrm>
           <a:prstGeom prst="rect">
             <a:avLst/>
           </a:prstGeom>
           <a:solidFill>
-            <a:schemeClr val="tx1"/>
+            <a:srgbClr val="004C64"/>
           </a:solidFill>
         </p:spPr>
         <p:txBody>
@@ -12065,56 +12065,49 @@
           <p:nvPr>
             <p:extLst>
               <p:ext uri="{D42A27DB-BD31-4B8C-83A1-F6EECF244321}">
-                <p14:modId xmlns:p14="http://schemas.microsoft.com/office/powerpoint/2010/main" val="161465348"/>
+                <p14:modId xmlns:p14="http://schemas.microsoft.com/office/powerpoint/2010/main" val="812776460"/>
               </p:ext>
             </p:extLst>
           </p:nvPr>
         </p:nvGraphicFramePr>
         <p:xfrm>
           <a:off x="240861" y="2593249"/>
-          <a:ext cx="5855138" cy="456549"/>
+          <a:ext cx="5863999" cy="456549"/>
         </p:xfrm>
         <a:graphic>
           <a:graphicData uri="http://schemas.openxmlformats.org/drawingml/2006/table">
             <a:tbl>
               <a:tblPr/>
               <a:tblGrid>
-                <a:gridCol w="914171">
+                <a:gridCol w="987872">
                   <a:extLst>
                     <a:ext uri="{9D8B030D-6E8A-4147-A177-3AD203B41FA5}">
                       <a16:colId xmlns:a16="http://schemas.microsoft.com/office/drawing/2014/main" val="1591265950"/>
                     </a:ext>
                   </a:extLst>
                 </a:gridCol>
-                <a:gridCol w="1083343">
+                <a:gridCol w="1170682">
                   <a:extLst>
                     <a:ext uri="{9D8B030D-6E8A-4147-A177-3AD203B41FA5}">
                       <a16:colId xmlns:a16="http://schemas.microsoft.com/office/drawing/2014/main" val="2936319664"/>
                     </a:ext>
                   </a:extLst>
                 </a:gridCol>
-                <a:gridCol w="685800">
+                <a:gridCol w="741089">
                   <a:extLst>
                     <a:ext uri="{9D8B030D-6E8A-4147-A177-3AD203B41FA5}">
                       <a16:colId xmlns:a16="http://schemas.microsoft.com/office/drawing/2014/main" val="2739869232"/>
                     </a:ext>
                   </a:extLst>
                 </a:gridCol>
-                <a:gridCol w="1047750">
+                <a:gridCol w="1132220">
                   <a:extLst>
                     <a:ext uri="{9D8B030D-6E8A-4147-A177-3AD203B41FA5}">
                       <a16:colId xmlns:a16="http://schemas.microsoft.com/office/drawing/2014/main" val="1367575770"/>
                     </a:ext>
                   </a:extLst>
                 </a:gridCol>
-                <a:gridCol w="428625">
-                  <a:extLst>
-                    <a:ext uri="{9D8B030D-6E8A-4147-A177-3AD203B41FA5}">
-                      <a16:colId xmlns:a16="http://schemas.microsoft.com/office/drawing/2014/main" val="3215154033"/>
-                    </a:ext>
-                  </a:extLst>
-                </a:gridCol>
-                <a:gridCol w="1695449">
+                <a:gridCol w="1832136">
                   <a:extLst>
                     <a:ext uri="{9D8B030D-6E8A-4147-A177-3AD203B41FA5}">
                       <a16:colId xmlns:a16="http://schemas.microsoft.com/office/drawing/2014/main" val="3144723141"/>
@@ -12123,7 +12116,7 @@
                 </a:gridCol>
               </a:tblGrid>
               <a:tr h="164201">
-                <a:tc gridSpan="6">
+                <a:tc gridSpan="5">
                   <a:txBody>
                     <a:bodyPr/>
                     <a:lstStyle/>
@@ -12197,17 +12190,12 @@
                       <a:endParaRPr lang="fr-FR"/>
                     </a:p>
                   </a:txBody>
-                  <a:tcPr/>
-                </a:tc>
-                <a:tc hMerge="1">
-                  <a:txBody>
-                    <a:bodyPr/>
-                    <a:lstStyle/>
-                    <a:p>
-                      <a:endParaRPr lang="fr-FR"/>
-                    </a:p>
-                  </a:txBody>
-                  <a:tcPr/>
+                  <a:tcPr>
+                    <a:lnL w="12700" cmpd="sng">
+                      <a:noFill/>
+                      <a:prstDash val="solid"/>
+                    </a:lnL>
+                  </a:tcPr>
                 </a:tc>
                 <a:extLst>
                   <a:ext uri="{0D108BD9-81ED-4DB2-BD59-A6C34878D82A}">
@@ -12358,39 +12346,6 @@
                     <a:lnR>
                       <a:noFill/>
                     </a:lnR>
-                    <a:lnT>
-                      <a:noFill/>
-                    </a:lnT>
-                    <a:lnB>
-                      <a:noFill/>
-                    </a:lnB>
-                  </a:tcPr>
-                </a:tc>
-                <a:tc>
-                  <a:txBody>
-                    <a:bodyPr/>
-                    <a:lstStyle/>
-                    <a:p>
-                      <a:pPr algn="l" fontAlgn="b"/>
-                      <a:endParaRPr lang="fr-FR" sz="500" b="0" i="0" u="none" strike="noStrike">
-                        <a:solidFill>
-                          <a:srgbClr val="000000"/>
-                        </a:solidFill>
-                        <a:effectLst/>
-                        <a:latin typeface="Arial" panose="020B0604020202020204" pitchFamily="34" charset="0"/>
-                      </a:endParaRPr>
-                    </a:p>
-                  </a:txBody>
-                  <a:tcPr marL="0" marR="0" marT="0" marB="0" anchor="b">
-                    <a:lnL>
-                      <a:noFill/>
-                    </a:lnL>
-                    <a:lnR>
-                      <a:noFill/>
-                    </a:lnR>
-                    <a:lnT>
-                      <a:noFill/>
-                    </a:lnT>
                     <a:lnB>
                       <a:noFill/>
                     </a:lnB>
@@ -12559,48 +12514,22 @@
                     <a:p>
                       <a:pPr algn="ctr" fontAlgn="ctr"/>
                       <a:r>
-                        <a:rPr lang="fr-FR" sz="1100" b="0" i="0" u="none" strike="noStrike" dirty="0">
+                        <a:rPr lang="fr-FR" sz="1100" b="0" i="0" u="none" strike="noStrike">
                           <a:solidFill>
                             <a:srgbClr val="000000"/>
                           </a:solidFill>
                           <a:effectLst/>
                           <a:latin typeface="Calibri Light" panose="020F0302020204030204" pitchFamily="34" charset="0"/>
                         </a:rPr>
-                        <a:t>Avec</a:t>
+                        <a:t> </a:t>
                       </a:r>
-                    </a:p>
-                  </a:txBody>
-                  <a:tcPr marL="0" marR="0" marT="0" marB="0" anchor="ctr">
-                    <a:lnL>
-                      <a:noFill/>
-                    </a:lnL>
-                    <a:lnR>
-                      <a:noFill/>
-                    </a:lnR>
-                    <a:lnT>
-                      <a:noFill/>
-                    </a:lnT>
-                    <a:lnB>
-                      <a:noFill/>
-                    </a:lnB>
-                  </a:tcPr>
-                </a:tc>
-                <a:tc>
-                  <a:txBody>
-                    <a:bodyPr/>
-                    <a:lstStyle/>
-                    <a:p>
-                      <a:pPr algn="ctr" fontAlgn="ctr"/>
-                      <a:r>
-                        <a:rPr lang="fr-FR" sz="1100" b="0" i="0" u="none" strike="noStrike" dirty="0">
-                          <a:solidFill>
-                            <a:srgbClr val="000000"/>
-                          </a:solidFill>
-                          <a:effectLst/>
-                          <a:latin typeface="Calibri Light" panose="020F0302020204030204" pitchFamily="34" charset="0"/>
-                        </a:rPr>
-                        <a:t>Super rideau</a:t>
-                      </a:r>
+                      <a:endParaRPr lang="fr-FR" sz="1100" b="0" i="0" u="none" strike="noStrike" dirty="0">
+                        <a:solidFill>
+                          <a:srgbClr val="000000"/>
+                        </a:solidFill>
+                        <a:effectLst/>
+                        <a:latin typeface="Calibri Light" panose="020F0302020204030204" pitchFamily="34" charset="0"/>
+                      </a:endParaRPr>
                     </a:p>
                   </a:txBody>
                   <a:tcPr marL="0" marR="0" marT="0" marB="0" anchor="ctr">
@@ -12643,13 +12572,13 @@
           <p:nvPr>
             <p:extLst>
               <p:ext uri="{D42A27DB-BD31-4B8C-83A1-F6EECF244321}">
-                <p14:modId xmlns:p14="http://schemas.microsoft.com/office/powerpoint/2010/main" val="1608758697"/>
+                <p14:modId xmlns:p14="http://schemas.microsoft.com/office/powerpoint/2010/main" val="2807137965"/>
               </p:ext>
             </p:extLst>
           </p:nvPr>
         </p:nvGraphicFramePr>
         <p:xfrm>
-          <a:off x="240860" y="3191805"/>
+          <a:off x="249724" y="3225402"/>
           <a:ext cx="5855137" cy="533400"/>
         </p:xfrm>
         <a:graphic>
@@ -12657,28 +12586,28 @@
             <a:tbl>
               <a:tblPr/>
               <a:tblGrid>
-                <a:gridCol w="2117553">
+                <a:gridCol w="1895948">
                   <a:extLst>
                     <a:ext uri="{9D8B030D-6E8A-4147-A177-3AD203B41FA5}">
                       <a16:colId xmlns:a16="http://schemas.microsoft.com/office/drawing/2014/main" val="75992090"/>
                     </a:ext>
                   </a:extLst>
                 </a:gridCol>
-                <a:gridCol w="933425">
+                <a:gridCol w="1116531">
                   <a:extLst>
                     <a:ext uri="{9D8B030D-6E8A-4147-A177-3AD203B41FA5}">
                       <a16:colId xmlns:a16="http://schemas.microsoft.com/office/drawing/2014/main" val="1316683716"/>
                     </a:ext>
                   </a:extLst>
                 </a:gridCol>
-                <a:gridCol w="1348599">
+                <a:gridCol w="1357163">
                   <a:extLst>
                     <a:ext uri="{9D8B030D-6E8A-4147-A177-3AD203B41FA5}">
                       <a16:colId xmlns:a16="http://schemas.microsoft.com/office/drawing/2014/main" val="2861349103"/>
                     </a:ext>
                   </a:extLst>
                 </a:gridCol>
-                <a:gridCol w="1455560">
+                <a:gridCol w="1485495">
                   <a:extLst>
                     <a:ext uri="{9D8B030D-6E8A-4147-A177-3AD203B41FA5}">
                       <a16:colId xmlns:a16="http://schemas.microsoft.com/office/drawing/2014/main" val="753739910"/>
@@ -12796,7 +12725,7 @@
                     <a:lstStyle/>
                     <a:p>
                       <a:pPr algn="l" fontAlgn="b"/>
-                      <a:endParaRPr lang="fr-FR" sz="1100" b="0" i="0" u="none" strike="noStrike">
+                      <a:endParaRPr lang="fr-FR" sz="1100" b="0" i="0" u="none" strike="noStrike" dirty="0">
                         <a:solidFill>
                           <a:srgbClr val="000000"/>
                         </a:solidFill>
@@ -12967,7 +12896,7 @@
                           <a:effectLst/>
                           <a:latin typeface="Calibri Light" panose="020F0302020204030204" pitchFamily="34" charset="0"/>
                         </a:rPr>
-                        <a:t>probablement non isolé</a:t>
+                        <a:t>probablement no</a:t>
                       </a:r>
                     </a:p>
                   </a:txBody>
@@ -13043,8 +12972,8 @@
         </p:nvSpPr>
         <p:spPr>
           <a:xfrm>
-            <a:off x="6436822" y="1006729"/>
-            <a:ext cx="5505453" cy="4224490"/>
+            <a:off x="6436822" y="1006728"/>
+            <a:ext cx="5505453" cy="5631635"/>
           </a:xfrm>
           <a:prstGeom prst="rect">
             <a:avLst/>
@@ -13237,7 +13166,7 @@
             <a:avLst/>
           </a:prstGeom>
           <a:solidFill>
-            <a:schemeClr val="tx1"/>
+            <a:srgbClr val="004C64"/>
           </a:solidFill>
         </p:spPr>
         <p:txBody>
@@ -14470,7 +14399,7 @@
             <a:avLst/>
           </a:prstGeom>
           <a:solidFill>
-            <a:schemeClr val="tx1"/>
+            <a:srgbClr val="004C64"/>
           </a:solidFill>
         </p:spPr>
         <p:txBody>
@@ -16123,9 +16052,9 @@
 <file path=ppt/theme/theme1.xml><?xml version="1.0" encoding="utf-8"?>
 <a:theme xmlns:a="http://schemas.openxmlformats.org/drawingml/2006/main" name="1_Thème Office">
   <a:themeElements>
-    <a:clrScheme name="Modele">
+    <a:clrScheme name="Personnalisé 1">
       <a:dk1>
-        <a:srgbClr val="004353"/>
+        <a:srgbClr val="222B35"/>
       </a:dk1>
       <a:lt1>
         <a:srgbClr val="FFFFFF"/>

</xml_diff>

<commit_message>
Texte dans le tableau pour le bâtiment. #34
</commit_message>
<xml_diff>
--- a/app/src/main/assets/powerpointvierge.pptx
+++ b/app/src/main/assets/powerpointvierge.pptx
@@ -1320,7 +1320,7 @@
       </p:grpSpPr>
       <p:graphicFrame>
         <p:nvGraphicFramePr>
-          <p:cNvPr id="2" name="Tableau 1">
+          <p:cNvPr id="2" name="tableauBatiment">
             <a:extLst>
               <a:ext uri="{FF2B5EF4-FFF2-40B4-BE49-F238E27FC236}">
                 <a16:creationId xmlns:a16="http://schemas.microsoft.com/office/drawing/2014/main" id="{EC8882B8-ACF8-8824-9F96-BCED09999A33}"/>
@@ -1333,24 +1333,31 @@
           <p:nvPr>
             <p:extLst>
               <p:ext uri="{D42A27DB-BD31-4B8C-83A1-F6EECF244321}">
-                <p14:modId xmlns:p14="http://schemas.microsoft.com/office/powerpoint/2010/main" val="1764104461"/>
+                <p14:modId xmlns:p14="http://schemas.microsoft.com/office/powerpoint/2010/main" val="1886633544"/>
               </p:ext>
             </p:extLst>
           </p:nvPr>
         </p:nvGraphicFramePr>
         <p:xfrm>
           <a:off x="6957634" y="1710425"/>
-          <a:ext cx="2122341" cy="2523320"/>
+          <a:ext cx="5089784" cy="2523320"/>
         </p:xfrm>
         <a:graphic>
           <a:graphicData uri="http://schemas.openxmlformats.org/drawingml/2006/table">
             <a:tbl>
               <a:tblPr/>
               <a:tblGrid>
-                <a:gridCol w="2122341">
+                <a:gridCol w="2156869">
                   <a:extLst>
                     <a:ext uri="{9D8B030D-6E8A-4147-A177-3AD203B41FA5}">
                       <a16:colId xmlns:a16="http://schemas.microsoft.com/office/drawing/2014/main" val="4068634004"/>
+                    </a:ext>
+                  </a:extLst>
+                </a:gridCol>
+                <a:gridCol w="2932915">
+                  <a:extLst>
+                    <a:ext uri="{9D8B030D-6E8A-4147-A177-3AD203B41FA5}">
+                      <a16:colId xmlns:a16="http://schemas.microsoft.com/office/drawing/2014/main" val="2224875818"/>
                     </a:ext>
                   </a:extLst>
                 </a:gridCol>
@@ -1365,7 +1372,7 @@
                       <a:r>
                         <a:rPr lang="fr-FR" sz="1600" b="1" i="0" u="none" strike="noStrike" dirty="0">
                           <a:solidFill>
-                            <a:srgbClr val="4472C4"/>
+                            <a:schemeClr val="tx1"/>
                           </a:solidFill>
                           <a:effectLst/>
                           <a:latin typeface="Calibri" panose="020F0502020204030204" pitchFamily="34" charset="0"/>
@@ -1377,7 +1384,7 @@
                       <a:pPr algn="l" fontAlgn="b"/>
                       <a:endParaRPr lang="fr-FR" sz="1600" b="1" i="0" u="none" strike="noStrike" dirty="0">
                         <a:solidFill>
-                          <a:srgbClr val="4472C4"/>
+                          <a:schemeClr val="tx1"/>
                         </a:solidFill>
                         <a:effectLst/>
                         <a:latin typeface="Calibri" panose="020F0502020204030204" pitchFamily="34" charset="0"/>
@@ -1387,7 +1394,7 @@
                       <a:pPr algn="l" fontAlgn="b"/>
                       <a:endParaRPr lang="fr-FR" sz="1600" b="1" i="0" u="none" strike="noStrike" dirty="0">
                         <a:solidFill>
-                          <a:srgbClr val="4472C4"/>
+                          <a:schemeClr val="tx1"/>
                         </a:solidFill>
                         <a:effectLst/>
                         <a:latin typeface="Calibri" panose="020F0502020204030204" pitchFamily="34" charset="0"/>
@@ -1397,7 +1404,7 @@
                       <a:pPr algn="l" fontAlgn="b"/>
                       <a:endParaRPr lang="fr-FR" sz="1600" b="1" i="0" u="none" strike="noStrike" dirty="0">
                         <a:solidFill>
-                          <a:srgbClr val="4472C4"/>
+                          <a:schemeClr val="tx1"/>
                         </a:solidFill>
                         <a:effectLst/>
                         <a:latin typeface="Calibri" panose="020F0502020204030204" pitchFamily="34" charset="0"/>
@@ -1407,7 +1414,7 @@
                       <a:pPr algn="l" fontAlgn="b"/>
                       <a:endParaRPr lang="fr-FR" sz="1600" b="1" i="0" u="none" strike="noStrike" dirty="0">
                         <a:solidFill>
-                          <a:srgbClr val="4472C4"/>
+                          <a:schemeClr val="tx1"/>
                         </a:solidFill>
                         <a:effectLst/>
                         <a:latin typeface="Calibri" panose="020F0502020204030204" pitchFamily="34" charset="0"/>
@@ -1415,6 +1422,39 @@
                     </a:p>
                   </a:txBody>
                   <a:tcPr marL="0" marR="0" marT="0" marB="0" anchor="b">
+                    <a:lnL>
+                      <a:noFill/>
+                    </a:lnL>
+                    <a:lnR>
+                      <a:noFill/>
+                    </a:lnR>
+                    <a:lnT>
+                      <a:noFill/>
+                    </a:lnT>
+                    <a:lnB>
+                      <a:noFill/>
+                    </a:lnB>
+                  </a:tcPr>
+                </a:tc>
+                <a:tc>
+                  <a:txBody>
+                    <a:bodyPr/>
+                    <a:lstStyle/>
+                    <a:p>
+                      <a:pPr algn="l" fontAlgn="b"/>
+                      <a:r>
+                        <a:rPr lang="fr-FR" sz="1600" b="0" i="0" u="none" strike="noStrike" dirty="0">
+                          <a:solidFill>
+                            <a:schemeClr val="tx1"/>
+                          </a:solidFill>
+                          <a:effectLst/>
+                          <a:latin typeface="Calibri" panose="020F0502020204030204" pitchFamily="34" charset="0"/>
+                        </a:rPr>
+                        <a:t>Adresse</a:t>
+                      </a:r>
+                    </a:p>
+                  </a:txBody>
+                  <a:tcPr marL="0" marR="0" marT="0" marB="0">
                     <a:lnL>
                       <a:noFill/>
                     </a:lnL>
@@ -1445,12 +1485,45 @@
                       <a:r>
                         <a:rPr lang="fr-FR" sz="1600" b="1" i="0" u="none" strike="noStrike" dirty="0">
                           <a:solidFill>
-                            <a:srgbClr val="4472C4"/>
+                            <a:schemeClr val="tx1"/>
                           </a:solidFill>
                           <a:effectLst/>
                           <a:latin typeface="Calibri" panose="020F0502020204030204" pitchFamily="34" charset="0"/>
                         </a:rPr>
                         <a:t>Surface totale chauffée :</a:t>
+                      </a:r>
+                    </a:p>
+                  </a:txBody>
+                  <a:tcPr marL="0" marR="0" marT="0" marB="0" anchor="b">
+                    <a:lnL>
+                      <a:noFill/>
+                    </a:lnL>
+                    <a:lnR>
+                      <a:noFill/>
+                    </a:lnR>
+                    <a:lnT>
+                      <a:noFill/>
+                    </a:lnT>
+                    <a:lnB>
+                      <a:noFill/>
+                    </a:lnB>
+                  </a:tcPr>
+                </a:tc>
+                <a:tc>
+                  <a:txBody>
+                    <a:bodyPr/>
+                    <a:lstStyle/>
+                    <a:p>
+                      <a:pPr algn="l" fontAlgn="b"/>
+                      <a:r>
+                        <a:rPr lang="fr-FR" sz="1600" b="0" i="0" u="none" strike="noStrike" dirty="0">
+                          <a:solidFill>
+                            <a:schemeClr val="tx1"/>
+                          </a:solidFill>
+                          <a:effectLst/>
+                          <a:latin typeface="Calibri" panose="020F0502020204030204" pitchFamily="34" charset="0"/>
+                        </a:rPr>
+                        <a:t>Surface</a:t>
                       </a:r>
                     </a:p>
                   </a:txBody>
@@ -1485,12 +1558,45 @@
                       <a:r>
                         <a:rPr lang="fr-FR" sz="1600" b="1" i="0" u="none" strike="noStrike" dirty="0">
                           <a:solidFill>
-                            <a:srgbClr val="70AD47"/>
+                            <a:schemeClr val="tx1"/>
                           </a:solidFill>
                           <a:effectLst/>
                           <a:latin typeface="Calibri" panose="020F0502020204030204" pitchFamily="34" charset="0"/>
                         </a:rPr>
                         <a:t>Date de construction :</a:t>
+                      </a:r>
+                    </a:p>
+                  </a:txBody>
+                  <a:tcPr marL="0" marR="0" marT="0" marB="0" anchor="b">
+                    <a:lnL>
+                      <a:noFill/>
+                    </a:lnL>
+                    <a:lnR>
+                      <a:noFill/>
+                    </a:lnR>
+                    <a:lnT>
+                      <a:noFill/>
+                    </a:lnT>
+                    <a:lnB>
+                      <a:noFill/>
+                    </a:lnB>
+                  </a:tcPr>
+                </a:tc>
+                <a:tc>
+                  <a:txBody>
+                    <a:bodyPr/>
+                    <a:lstStyle/>
+                    <a:p>
+                      <a:pPr algn="l" fontAlgn="b"/>
+                      <a:r>
+                        <a:rPr lang="fr-FR" sz="1600" b="0" i="0" u="none" strike="noStrike" dirty="0">
+                          <a:solidFill>
+                            <a:schemeClr val="tx1"/>
+                          </a:solidFill>
+                          <a:effectLst/>
+                          <a:latin typeface="Calibri" panose="020F0502020204030204" pitchFamily="34" charset="0"/>
+                        </a:rPr>
+                        <a:t>Date de construction</a:t>
                       </a:r>
                     </a:p>
                   </a:txBody>
@@ -1531,6 +1637,39 @@
                           <a:latin typeface="Calibri" panose="020F0502020204030204" pitchFamily="34" charset="0"/>
                         </a:rPr>
                         <a:t>Date de rénovation : </a:t>
+                      </a:r>
+                    </a:p>
+                  </a:txBody>
+                  <a:tcPr marL="0" marR="0" marT="0" marB="0" anchor="b">
+                    <a:lnL>
+                      <a:noFill/>
+                    </a:lnL>
+                    <a:lnR>
+                      <a:noFill/>
+                    </a:lnR>
+                    <a:lnT>
+                      <a:noFill/>
+                    </a:lnT>
+                    <a:lnB>
+                      <a:noFill/>
+                    </a:lnB>
+                  </a:tcPr>
+                </a:tc>
+                <a:tc>
+                  <a:txBody>
+                    <a:bodyPr/>
+                    <a:lstStyle/>
+                    <a:p>
+                      <a:pPr algn="l" fontAlgn="b"/>
+                      <a:r>
+                        <a:rPr lang="fr-FR" sz="1600" b="0" i="0" u="none" strike="noStrike" dirty="0">
+                          <a:solidFill>
+                            <a:schemeClr val="tx1"/>
+                          </a:solidFill>
+                          <a:effectLst/>
+                          <a:latin typeface="Calibri" panose="020F0502020204030204" pitchFamily="34" charset="0"/>
+                        </a:rPr>
+                        <a:t>Date de rénovation</a:t>
                       </a:r>
                     </a:p>
                   </a:txBody>
@@ -1708,120 +1847,6 @@
       </p:sp>
       <p:sp>
         <p:nvSpPr>
-          <p:cNvPr id="9" name="adresse">
-            <a:extLst>
-              <a:ext uri="{FF2B5EF4-FFF2-40B4-BE49-F238E27FC236}">
-                <a16:creationId xmlns:a16="http://schemas.microsoft.com/office/drawing/2014/main" id="{1EC9E7A0-D5D2-9BF7-A2C2-7AEB10C42069}"/>
-              </a:ext>
-            </a:extLst>
-          </p:cNvPr>
-          <p:cNvSpPr txBox="1"/>
-          <p:nvPr/>
-        </p:nvSpPr>
-        <p:spPr>
-          <a:xfrm>
-            <a:off x="9048137" y="1663213"/>
-            <a:ext cx="2967443" cy="338554"/>
-          </a:xfrm>
-          <a:prstGeom prst="rect">
-            <a:avLst/>
-          </a:prstGeom>
-          <a:noFill/>
-          <a:ln>
-            <a:noFill/>
-          </a:ln>
-        </p:spPr>
-        <p:txBody>
-          <a:bodyPr wrap="square">
-            <a:spAutoFit/>
-          </a:bodyPr>
-          <a:lstStyle/>
-          <a:p>
-            <a:r>
-              <a:rPr lang="fr-FR" sz="1600" dirty="0">
-                <a:latin typeface="+mj-lt"/>
-              </a:rPr>
-              <a:t>Lorem</a:t>
-            </a:r>
-          </a:p>
-        </p:txBody>
-      </p:sp>
-      <p:sp>
-        <p:nvSpPr>
-          <p:cNvPr id="8" name="dateDeConstruction">
-            <a:extLst>
-              <a:ext uri="{FF2B5EF4-FFF2-40B4-BE49-F238E27FC236}">
-                <a16:creationId xmlns:a16="http://schemas.microsoft.com/office/drawing/2014/main" id="{F1BC16A5-2797-7FF1-399C-09E71756A267}"/>
-              </a:ext>
-            </a:extLst>
-          </p:cNvPr>
-          <p:cNvSpPr txBox="1"/>
-          <p:nvPr/>
-        </p:nvSpPr>
-        <p:spPr>
-          <a:xfrm>
-            <a:off x="8969438" y="3543591"/>
-            <a:ext cx="3164383" cy="338554"/>
-          </a:xfrm>
-          <a:prstGeom prst="rect">
-            <a:avLst/>
-          </a:prstGeom>
-          <a:noFill/>
-        </p:spPr>
-        <p:txBody>
-          <a:bodyPr wrap="square">
-            <a:spAutoFit/>
-          </a:bodyPr>
-          <a:lstStyle/>
-          <a:p>
-            <a:r>
-              <a:rPr lang="fr-FR" sz="1600" dirty="0">
-                <a:latin typeface="+mj-lt"/>
-              </a:rPr>
-              <a:t> Lorem</a:t>
-            </a:r>
-          </a:p>
-        </p:txBody>
-      </p:sp>
-      <p:sp>
-        <p:nvSpPr>
-          <p:cNvPr id="11" name="surfaceTotaleChauffe">
-            <a:extLst>
-              <a:ext uri="{FF2B5EF4-FFF2-40B4-BE49-F238E27FC236}">
-                <a16:creationId xmlns:a16="http://schemas.microsoft.com/office/drawing/2014/main" id="{3C6B9D1B-5C33-9EE0-C618-3EA11606C0E7}"/>
-              </a:ext>
-            </a:extLst>
-          </p:cNvPr>
-          <p:cNvSpPr txBox="1"/>
-          <p:nvPr/>
-        </p:nvSpPr>
-        <p:spPr>
-          <a:xfrm>
-            <a:off x="8969438" y="3130566"/>
-            <a:ext cx="3035502" cy="338554"/>
-          </a:xfrm>
-          <a:prstGeom prst="rect">
-            <a:avLst/>
-          </a:prstGeom>
-          <a:noFill/>
-        </p:spPr>
-        <p:txBody>
-          <a:bodyPr wrap="square">
-            <a:spAutoFit/>
-          </a:bodyPr>
-          <a:lstStyle/>
-          <a:p>
-            <a:r>
-              <a:rPr lang="fr-FR" sz="1600" dirty="0">
-                <a:latin typeface="+mj-lt"/>
-              </a:rPr>
-              <a:t> Lorem</a:t>
-            </a:r>
-          </a:p>
-        </p:txBody>
-      </p:sp>
-      <p:sp>
-        <p:nvSpPr>
           <p:cNvPr id="3" name="photoBatiment">
             <a:extLst>
               <a:ext uri="{FF2B5EF4-FFF2-40B4-BE49-F238E27FC236}">
@@ -1862,43 +1887,6 @@
           <a:p>
             <a:pPr algn="ctr"/>
             <a:endParaRPr lang="fr-FR" sz="1600"/>
-          </a:p>
-        </p:txBody>
-      </p:sp>
-      <p:sp>
-        <p:nvSpPr>
-          <p:cNvPr id="5" name="dateDeRenovation">
-            <a:extLst>
-              <a:ext uri="{FF2B5EF4-FFF2-40B4-BE49-F238E27FC236}">
-                <a16:creationId xmlns:a16="http://schemas.microsoft.com/office/drawing/2014/main" id="{3DC72CFC-0878-7269-A075-1A04C98052A0}"/>
-              </a:ext>
-            </a:extLst>
-          </p:cNvPr>
-          <p:cNvSpPr txBox="1"/>
-          <p:nvPr/>
-        </p:nvSpPr>
-        <p:spPr>
-          <a:xfrm>
-            <a:off x="8969438" y="3939605"/>
-            <a:ext cx="3164383" cy="338554"/>
-          </a:xfrm>
-          <a:prstGeom prst="rect">
-            <a:avLst/>
-          </a:prstGeom>
-          <a:noFill/>
-        </p:spPr>
-        <p:txBody>
-          <a:bodyPr wrap="square">
-            <a:spAutoFit/>
-          </a:bodyPr>
-          <a:lstStyle/>
-          <a:p>
-            <a:r>
-              <a:rPr lang="fr-FR" sz="1600" dirty="0">
-                <a:latin typeface="+mj-lt"/>
-              </a:rPr>
-              <a:t> Lorem</a:t>
-            </a:r>
           </a:p>
         </p:txBody>
       </p:sp>

</xml_diff>

<commit_message>
emplacement du champ description, à déplacer en bas à droite de la slide #33
</commit_message>
<xml_diff>
--- a/app/src/main/assets/powerpointvierge.pptx
+++ b/app/src/main/assets/powerpointvierge.pptx
@@ -1859,8 +1859,8 @@
         </p:nvSpPr>
         <p:spPr>
           <a:xfrm>
-            <a:off x="187060" y="1006729"/>
-            <a:ext cx="6575247" cy="4224490"/>
+            <a:off x="187060" y="1006728"/>
+            <a:ext cx="6575247" cy="5674137"/>
           </a:xfrm>
           <a:prstGeom prst="rect">
             <a:avLst/>
@@ -1904,8 +1904,8 @@
         </p:nvSpPr>
         <p:spPr>
           <a:xfrm>
-            <a:off x="187060" y="5308257"/>
-            <a:ext cx="11946761" cy="338554"/>
+            <a:off x="6914431" y="4603839"/>
+            <a:ext cx="5176187" cy="338554"/>
           </a:xfrm>
           <a:prstGeom prst="rect">
             <a:avLst/>
@@ -12053,7 +12053,7 @@
           <p:nvPr>
             <p:extLst>
               <p:ext uri="{D42A27DB-BD31-4B8C-83A1-F6EECF244321}">
-                <p14:modId xmlns:p14="http://schemas.microsoft.com/office/powerpoint/2010/main" val="812776460"/>
+                <p14:modId xmlns:p14="http://schemas.microsoft.com/office/powerpoint/2010/main" val="305968006"/>
               </p:ext>
             </p:extLst>
           </p:nvPr>
@@ -12334,9 +12334,21 @@
                     <a:lnR>
                       <a:noFill/>
                     </a:lnR>
+                    <a:lnT w="12700" cmpd="sng">
+                      <a:noFill/>
+                      <a:prstDash val="solid"/>
+                    </a:lnT>
                     <a:lnB>
                       <a:noFill/>
                     </a:lnB>
+                    <a:lnTlToBr w="12700" cmpd="sng">
+                      <a:noFill/>
+                      <a:prstDash val="solid"/>
+                    </a:lnTlToBr>
+                    <a:lnBlToTr w="12700" cmpd="sng">
+                      <a:noFill/>
+                      <a:prstDash val="solid"/>
+                    </a:lnBlToTr>
                   </a:tcPr>
                 </a:tc>
                 <a:extLst>
@@ -12502,7 +12514,7 @@
                     <a:p>
                       <a:pPr algn="ctr" fontAlgn="ctr"/>
                       <a:r>
-                        <a:rPr lang="fr-FR" sz="1100" b="0" i="0" u="none" strike="noStrike">
+                        <a:rPr lang="fr-FR" sz="1100" b="0" i="0" u="none" strike="noStrike" dirty="0">
                           <a:solidFill>
                             <a:srgbClr val="000000"/>
                           </a:solidFill>
@@ -12511,13 +12523,6 @@
                         </a:rPr>
                         <a:t> </a:t>
                       </a:r>
-                      <a:endParaRPr lang="fr-FR" sz="1100" b="0" i="0" u="none" strike="noStrike" dirty="0">
-                        <a:solidFill>
-                          <a:srgbClr val="000000"/>
-                        </a:solidFill>
-                        <a:effectLst/>
-                        <a:latin typeface="Calibri Light" panose="020F0302020204030204" pitchFamily="34" charset="0"/>
-                      </a:endParaRPr>
                     </a:p>
                   </a:txBody>
                   <a:tcPr marL="0" marR="0" marT="0" marB="0" anchor="ctr">

</xml_diff>

<commit_message>
Couleur spécifique par nom de zone  #33
</commit_message>
<xml_diff>
--- a/app/src/main/assets/powerpointvierge.pptx
+++ b/app/src/main/assets/powerpointvierge.pptx
@@ -210,7 +210,7 @@
           <a:p>
             <a:fld id="{8EF2C5CC-36BA-4C84-AC43-9F8430F4AE76}" type="datetimeFigureOut">
               <a:rPr lang="fr-FR" smtClean="0"/>
-              <a:t>05/07/2023</a:t>
+              <a:t>06/07/2023</a:t>
             </a:fld>
             <a:endParaRPr lang="fr-FR"/>
           </a:p>
@@ -1285,6 +1285,364 @@
           <a:p>
             <a:pPr algn="ctr"/>
             <a:endParaRPr lang="fr-FR" sz="1600"/>
+          </a:p>
+        </p:txBody>
+      </p:sp>
+      <p:sp>
+        <p:nvSpPr>
+          <p:cNvPr id="4" name="ZoneTexte 3">
+            <a:extLst>
+              <a:ext uri="{FF2B5EF4-FFF2-40B4-BE49-F238E27FC236}">
+                <a16:creationId xmlns:a16="http://schemas.microsoft.com/office/drawing/2014/main" id="{E0FFAC67-6CF3-0BEA-D07B-B92AC3FFF12D}"/>
+              </a:ext>
+            </a:extLst>
+          </p:cNvPr>
+          <p:cNvSpPr txBox="1"/>
+          <p:nvPr/>
+        </p:nvSpPr>
+        <p:spPr>
+          <a:xfrm>
+            <a:off x="-3263900" y="188933"/>
+            <a:ext cx="2497287" cy="369332"/>
+          </a:xfrm>
+          <a:prstGeom prst="rect">
+            <a:avLst/>
+          </a:prstGeom>
+          <a:noFill/>
+        </p:spPr>
+        <p:txBody>
+          <a:bodyPr wrap="none" rtlCol="0">
+            <a:spAutoFit/>
+          </a:bodyPr>
+          <a:lstStyle/>
+          <a:p>
+            <a:pPr algn="l"/>
+            <a:r>
+              <a:rPr lang="fr-FR" dirty="0"/>
+              <a:t>Couleurs pour les zones :</a:t>
+            </a:r>
+          </a:p>
+        </p:txBody>
+      </p:sp>
+      <p:sp>
+        <p:nvSpPr>
+          <p:cNvPr id="5" name="colorZone1">
+            <a:extLst>
+              <a:ext uri="{FF2B5EF4-FFF2-40B4-BE49-F238E27FC236}">
+                <a16:creationId xmlns:a16="http://schemas.microsoft.com/office/drawing/2014/main" id="{4B700C27-948D-328D-17D1-09EBA917948D}"/>
+              </a:ext>
+            </a:extLst>
+          </p:cNvPr>
+          <p:cNvSpPr txBox="1"/>
+          <p:nvPr/>
+        </p:nvSpPr>
+        <p:spPr>
+          <a:xfrm>
+            <a:off x="-3378200" y="823933"/>
+            <a:ext cx="1227387" cy="369332"/>
+          </a:xfrm>
+          <a:prstGeom prst="rect">
+            <a:avLst/>
+          </a:prstGeom>
+          <a:noFill/>
+        </p:spPr>
+        <p:txBody>
+          <a:bodyPr wrap="none" rtlCol="0">
+            <a:spAutoFit/>
+          </a:bodyPr>
+          <a:lstStyle/>
+          <a:p>
+            <a:pPr algn="l"/>
+            <a:r>
+              <a:rPr lang="fr-FR" dirty="0">
+                <a:solidFill>
+                  <a:schemeClr val="accent2">
+                    <a:lumMod val="75000"/>
+                  </a:schemeClr>
+                </a:solidFill>
+              </a:rPr>
+              <a:t>colorZone1</a:t>
+            </a:r>
+          </a:p>
+        </p:txBody>
+      </p:sp>
+      <p:sp>
+        <p:nvSpPr>
+          <p:cNvPr id="6" name="colorZone2">
+            <a:extLst>
+              <a:ext uri="{FF2B5EF4-FFF2-40B4-BE49-F238E27FC236}">
+                <a16:creationId xmlns:a16="http://schemas.microsoft.com/office/drawing/2014/main" id="{017382E0-5331-4A00-78A4-E92C7E4695CD}"/>
+              </a:ext>
+            </a:extLst>
+          </p:cNvPr>
+          <p:cNvSpPr txBox="1"/>
+          <p:nvPr/>
+        </p:nvSpPr>
+        <p:spPr>
+          <a:xfrm>
+            <a:off x="-3378200" y="1458933"/>
+            <a:ext cx="1227387" cy="369332"/>
+          </a:xfrm>
+          <a:prstGeom prst="rect">
+            <a:avLst/>
+          </a:prstGeom>
+          <a:noFill/>
+        </p:spPr>
+        <p:txBody>
+          <a:bodyPr wrap="none" rtlCol="0">
+            <a:spAutoFit/>
+          </a:bodyPr>
+          <a:lstStyle/>
+          <a:p>
+            <a:pPr algn="l"/>
+            <a:r>
+              <a:rPr lang="fr-FR" dirty="0">
+                <a:solidFill>
+                  <a:schemeClr val="tx2"/>
+                </a:solidFill>
+              </a:rPr>
+              <a:t>colorZone2</a:t>
+            </a:r>
+          </a:p>
+        </p:txBody>
+      </p:sp>
+      <p:sp>
+        <p:nvSpPr>
+          <p:cNvPr id="7" name="colorZone3">
+            <a:extLst>
+              <a:ext uri="{FF2B5EF4-FFF2-40B4-BE49-F238E27FC236}">
+                <a16:creationId xmlns:a16="http://schemas.microsoft.com/office/drawing/2014/main" id="{789B951A-6A23-BA81-AB1E-F863E175B1B8}"/>
+              </a:ext>
+            </a:extLst>
+          </p:cNvPr>
+          <p:cNvSpPr txBox="1"/>
+          <p:nvPr/>
+        </p:nvSpPr>
+        <p:spPr>
+          <a:xfrm>
+            <a:off x="-3378200" y="2093933"/>
+            <a:ext cx="1227387" cy="369332"/>
+          </a:xfrm>
+          <a:prstGeom prst="rect">
+            <a:avLst/>
+          </a:prstGeom>
+          <a:noFill/>
+        </p:spPr>
+        <p:txBody>
+          <a:bodyPr wrap="none" rtlCol="0">
+            <a:spAutoFit/>
+          </a:bodyPr>
+          <a:lstStyle/>
+          <a:p>
+            <a:pPr algn="l"/>
+            <a:r>
+              <a:rPr lang="fr-FR" dirty="0">
+                <a:solidFill>
+                  <a:schemeClr val="accent1"/>
+                </a:solidFill>
+              </a:rPr>
+              <a:t>colorZone3</a:t>
+            </a:r>
+          </a:p>
+        </p:txBody>
+      </p:sp>
+      <p:sp>
+        <p:nvSpPr>
+          <p:cNvPr id="8" name="colorZone4">
+            <a:extLst>
+              <a:ext uri="{FF2B5EF4-FFF2-40B4-BE49-F238E27FC236}">
+                <a16:creationId xmlns:a16="http://schemas.microsoft.com/office/drawing/2014/main" id="{DE37428B-D6F5-0151-6392-EFB19176CA66}"/>
+              </a:ext>
+            </a:extLst>
+          </p:cNvPr>
+          <p:cNvSpPr txBox="1"/>
+          <p:nvPr/>
+        </p:nvSpPr>
+        <p:spPr>
+          <a:xfrm>
+            <a:off x="-3378200" y="2728933"/>
+            <a:ext cx="1227387" cy="369332"/>
+          </a:xfrm>
+          <a:prstGeom prst="rect">
+            <a:avLst/>
+          </a:prstGeom>
+          <a:noFill/>
+        </p:spPr>
+        <p:txBody>
+          <a:bodyPr wrap="none" rtlCol="0">
+            <a:spAutoFit/>
+          </a:bodyPr>
+          <a:lstStyle/>
+          <a:p>
+            <a:pPr algn="l"/>
+            <a:r>
+              <a:rPr lang="fr-FR" dirty="0">
+                <a:solidFill>
+                  <a:schemeClr val="accent2"/>
+                </a:solidFill>
+              </a:rPr>
+              <a:t>colorZone4</a:t>
+            </a:r>
+          </a:p>
+        </p:txBody>
+      </p:sp>
+      <p:sp>
+        <p:nvSpPr>
+          <p:cNvPr id="9" name="colorZone5">
+            <a:extLst>
+              <a:ext uri="{FF2B5EF4-FFF2-40B4-BE49-F238E27FC236}">
+                <a16:creationId xmlns:a16="http://schemas.microsoft.com/office/drawing/2014/main" id="{D0749796-B837-B563-224E-DDE2D4AD6826}"/>
+              </a:ext>
+            </a:extLst>
+          </p:cNvPr>
+          <p:cNvSpPr txBox="1"/>
+          <p:nvPr/>
+        </p:nvSpPr>
+        <p:spPr>
+          <a:xfrm>
+            <a:off x="-3378200" y="3363933"/>
+            <a:ext cx="1227387" cy="369332"/>
+          </a:xfrm>
+          <a:prstGeom prst="rect">
+            <a:avLst/>
+          </a:prstGeom>
+          <a:noFill/>
+        </p:spPr>
+        <p:txBody>
+          <a:bodyPr wrap="none" rtlCol="0">
+            <a:spAutoFit/>
+          </a:bodyPr>
+          <a:lstStyle/>
+          <a:p>
+            <a:pPr algn="l"/>
+            <a:r>
+              <a:rPr lang="fr-FR" dirty="0">
+                <a:solidFill>
+                  <a:schemeClr val="accent3"/>
+                </a:solidFill>
+              </a:rPr>
+              <a:t>colorZone5</a:t>
+            </a:r>
+          </a:p>
+        </p:txBody>
+      </p:sp>
+      <p:sp>
+        <p:nvSpPr>
+          <p:cNvPr id="10" name="colorZone6">
+            <a:extLst>
+              <a:ext uri="{FF2B5EF4-FFF2-40B4-BE49-F238E27FC236}">
+                <a16:creationId xmlns:a16="http://schemas.microsoft.com/office/drawing/2014/main" id="{BF52A5D7-A860-761D-D72F-54AAAFED5838}"/>
+              </a:ext>
+            </a:extLst>
+          </p:cNvPr>
+          <p:cNvSpPr txBox="1"/>
+          <p:nvPr/>
+        </p:nvSpPr>
+        <p:spPr>
+          <a:xfrm>
+            <a:off x="-3378200" y="3998933"/>
+            <a:ext cx="1227387" cy="369332"/>
+          </a:xfrm>
+          <a:prstGeom prst="rect">
+            <a:avLst/>
+          </a:prstGeom>
+          <a:noFill/>
+        </p:spPr>
+        <p:txBody>
+          <a:bodyPr wrap="none" rtlCol="0">
+            <a:spAutoFit/>
+          </a:bodyPr>
+          <a:lstStyle/>
+          <a:p>
+            <a:pPr algn="l"/>
+            <a:r>
+              <a:rPr lang="fr-FR" dirty="0">
+                <a:solidFill>
+                  <a:schemeClr val="accent4"/>
+                </a:solidFill>
+              </a:rPr>
+              <a:t>colorZone6</a:t>
+            </a:r>
+          </a:p>
+        </p:txBody>
+      </p:sp>
+      <p:sp>
+        <p:nvSpPr>
+          <p:cNvPr id="11" name="colorZone7">
+            <a:extLst>
+              <a:ext uri="{FF2B5EF4-FFF2-40B4-BE49-F238E27FC236}">
+                <a16:creationId xmlns:a16="http://schemas.microsoft.com/office/drawing/2014/main" id="{208F39D4-E058-5364-305B-B1A9E1792A8A}"/>
+              </a:ext>
+            </a:extLst>
+          </p:cNvPr>
+          <p:cNvSpPr txBox="1"/>
+          <p:nvPr/>
+        </p:nvSpPr>
+        <p:spPr>
+          <a:xfrm>
+            <a:off x="-3378200" y="4633933"/>
+            <a:ext cx="1227387" cy="369332"/>
+          </a:xfrm>
+          <a:prstGeom prst="rect">
+            <a:avLst/>
+          </a:prstGeom>
+          <a:noFill/>
+        </p:spPr>
+        <p:txBody>
+          <a:bodyPr wrap="none" rtlCol="0">
+            <a:spAutoFit/>
+          </a:bodyPr>
+          <a:lstStyle/>
+          <a:p>
+            <a:pPr algn="l"/>
+            <a:r>
+              <a:rPr lang="fr-FR" dirty="0">
+                <a:solidFill>
+                  <a:schemeClr val="accent5"/>
+                </a:solidFill>
+              </a:rPr>
+              <a:t>colorZone7</a:t>
+            </a:r>
+          </a:p>
+        </p:txBody>
+      </p:sp>
+      <p:sp>
+        <p:nvSpPr>
+          <p:cNvPr id="12" name="colorZone8">
+            <a:extLst>
+              <a:ext uri="{FF2B5EF4-FFF2-40B4-BE49-F238E27FC236}">
+                <a16:creationId xmlns:a16="http://schemas.microsoft.com/office/drawing/2014/main" id="{5B222673-AC8D-E17D-04F7-CC9DEB1931A1}"/>
+              </a:ext>
+            </a:extLst>
+          </p:cNvPr>
+          <p:cNvSpPr txBox="1"/>
+          <p:nvPr/>
+        </p:nvSpPr>
+        <p:spPr>
+          <a:xfrm>
+            <a:off x="-3378200" y="5268933"/>
+            <a:ext cx="1227387" cy="369332"/>
+          </a:xfrm>
+          <a:prstGeom prst="rect">
+            <a:avLst/>
+          </a:prstGeom>
+          <a:noFill/>
+        </p:spPr>
+        <p:txBody>
+          <a:bodyPr wrap="none" rtlCol="0">
+            <a:spAutoFit/>
+          </a:bodyPr>
+          <a:lstStyle/>
+          <a:p>
+            <a:pPr algn="l"/>
+            <a:r>
+              <a:rPr lang="fr-FR" dirty="0">
+                <a:solidFill>
+                  <a:schemeClr val="accent6"/>
+                </a:solidFill>
+              </a:rPr>
+              <a:t>colorZone8</a:t>
+            </a:r>
           </a:p>
         </p:txBody>
       </p:sp>
@@ -9751,9 +10109,7 @@
           <a:prstGeom prst="rect">
             <a:avLst/>
           </a:prstGeom>
-          <a:solidFill>
-            <a:srgbClr val="004C64"/>
-          </a:solidFill>
+          <a:noFill/>
         </p:spPr>
         <p:txBody>
           <a:bodyPr wrap="square" lIns="91440" tIns="45720" rIns="91440" bIns="45720" anchor="t">
@@ -9780,9 +10136,6 @@
             </a:pPr>
             <a:r>
               <a:rPr lang="fr-FR" sz="1600" dirty="0">
-                <a:solidFill>
-                  <a:srgbClr val="FFFFFF"/>
-                </a:solidFill>
                 <a:cs typeface="Times New Roman"/>
               </a:rPr>
               <a:t>Lorem</a:t>
@@ -9810,9 +10163,7 @@
           <a:prstGeom prst="rect">
             <a:avLst/>
           </a:prstGeom>
-          <a:solidFill>
-            <a:srgbClr val="004C64"/>
-          </a:solidFill>
+          <a:noFill/>
         </p:spPr>
         <p:txBody>
           <a:bodyPr wrap="square" lIns="91440" tIns="45720" rIns="91440" bIns="45720" anchor="t">
@@ -9842,9 +10193,6 @@
                 <a:ln>
                   <a:noFill/>
                 </a:ln>
-                <a:solidFill>
-                  <a:srgbClr val="FFFFFF"/>
-                </a:solidFill>
                 <a:effectLst/>
                 <a:uLnTx/>
                 <a:uFillTx/>
@@ -9875,9 +10223,7 @@
           <a:prstGeom prst="rect">
             <a:avLst/>
           </a:prstGeom>
-          <a:solidFill>
-            <a:srgbClr val="004C64"/>
-          </a:solidFill>
+          <a:noFill/>
         </p:spPr>
         <p:txBody>
           <a:bodyPr wrap="square" lIns="91440" tIns="45720" rIns="91440" bIns="45720" anchor="t">
@@ -9907,9 +10253,6 @@
                 <a:ln>
                   <a:noFill/>
                 </a:ln>
-                <a:solidFill>
-                  <a:srgbClr val="FFFFFF"/>
-                </a:solidFill>
                 <a:effectLst/>
                 <a:uLnTx/>
                 <a:uFillTx/>
@@ -15461,14 +15804,14 @@
           <p:nvPr>
             <p:extLst>
               <p:ext uri="{D42A27DB-BD31-4B8C-83A1-F6EECF244321}">
-                <p14:modId xmlns:p14="http://schemas.microsoft.com/office/powerpoint/2010/main" val="1239158914"/>
+                <p14:modId xmlns:p14="http://schemas.microsoft.com/office/powerpoint/2010/main" val="1940123446"/>
               </p:ext>
             </p:extLst>
           </p:nvPr>
         </p:nvGraphicFramePr>
         <p:xfrm>
-          <a:off x="1452891" y="1658052"/>
-          <a:ext cx="3892683" cy="335280"/>
+          <a:off x="1526340" y="1658052"/>
+          <a:ext cx="3819234" cy="335280"/>
         </p:xfrm>
         <a:graphic>
           <a:graphicData uri="http://schemas.openxmlformats.org/drawingml/2006/table">
@@ -15477,7 +15820,7 @@
                 <a:tableStyleId>{5C22544A-7EE6-4342-B048-85BDC9FD1C3A}</a:tableStyleId>
               </a:tblPr>
               <a:tblGrid>
-                <a:gridCol w="3892683">
+                <a:gridCol w="3819234">
                   <a:extLst>
                     <a:ext uri="{9D8B030D-6E8A-4147-A177-3AD203B41FA5}">
                       <a16:colId xmlns:a16="http://schemas.microsoft.com/office/drawing/2014/main" val="487097777"/>
@@ -15772,7 +16115,7 @@
         <p:spPr>
           <a:xfrm>
             <a:off x="64626" y="1034687"/>
-            <a:ext cx="1388265" cy="369332"/>
+            <a:ext cx="1461714" cy="369332"/>
           </a:xfrm>
           <a:prstGeom prst="rect">
             <a:avLst/>
@@ -15782,7 +16125,7 @@
           </a:solidFill>
         </p:spPr>
         <p:txBody>
-          <a:bodyPr wrap="none" rtlCol="0">
+          <a:bodyPr wrap="square" rtlCol="0">
             <a:spAutoFit/>
           </a:bodyPr>
           <a:lstStyle>
@@ -15908,7 +16251,7 @@
         <p:spPr>
           <a:xfrm>
             <a:off x="64626" y="6310065"/>
-            <a:ext cx="1256883" cy="369332"/>
+            <a:ext cx="1388265" cy="369332"/>
           </a:xfrm>
           <a:prstGeom prst="rect">
             <a:avLst/>
@@ -15918,7 +16261,7 @@
           </a:solidFill>
         </p:spPr>
         <p:txBody>
-          <a:bodyPr wrap="none" rtlCol="0">
+          <a:bodyPr wrap="square" rtlCol="0">
             <a:spAutoFit/>
           </a:bodyPr>
           <a:lstStyle>

</xml_diff>

<commit_message>
Police 12 pour l'approvisionnement et ajouts des images  #38
</commit_message>
<xml_diff>
--- a/app/src/main/assets/powerpointvierge.pptx
+++ b/app/src/main/assets/powerpointvierge.pptx
@@ -210,7 +210,7 @@
           <a:p>
             <a:fld id="{8EF2C5CC-36BA-4C84-AC43-9F8430F4AE76}" type="datetimeFigureOut">
               <a:rPr lang="fr-FR" smtClean="0"/>
-              <a:t>06/07/2023</a:t>
+              <a:t>07/07/2023</a:t>
             </a:fld>
             <a:endParaRPr lang="fr-FR"/>
           </a:p>
@@ -6782,7 +6782,7 @@
         </p:nvSpPr>
         <p:spPr>
           <a:xfrm>
-            <a:off x="6332613" y="4456343"/>
+            <a:off x="6341306" y="5545723"/>
             <a:ext cx="5656187" cy="338554"/>
           </a:xfrm>
           <a:prstGeom prst="rect">
@@ -9584,7 +9584,7 @@
           <p:nvPr>
             <p:extLst>
               <p:ext uri="{D42A27DB-BD31-4B8C-83A1-F6EECF244321}">
-                <p14:modId xmlns:p14="http://schemas.microsoft.com/office/powerpoint/2010/main" val="3239530694"/>
+                <p14:modId xmlns:p14="http://schemas.microsoft.com/office/powerpoint/2010/main" val="909841835"/>
               </p:ext>
             </p:extLst>
           </p:nvPr>
@@ -9859,7 +9859,7 @@
                     <a:p>
                       <a:pPr algn="ctr" fontAlgn="ctr"/>
                       <a:r>
-                        <a:rPr lang="fr-FR" sz="1600" b="1" i="0" u="none" strike="noStrike" dirty="0">
+                        <a:rPr lang="fr-FR" sz="1200" b="1" i="0" u="none" strike="noStrike" dirty="0">
                           <a:solidFill>
                             <a:srgbClr val="222B35"/>
                           </a:solidFill>
@@ -9892,7 +9892,7 @@
                     <a:p>
                       <a:pPr algn="ctr" fontAlgn="ctr"/>
                       <a:r>
-                        <a:rPr lang="fr-FR" sz="1600" b="0" i="0" u="none" strike="noStrike" dirty="0">
+                        <a:rPr lang="fr-FR" sz="1200" b="0" i="0" u="none" strike="noStrike" dirty="0">
                           <a:solidFill>
                             <a:srgbClr val="222B35"/>
                           </a:solidFill>
@@ -9925,7 +9925,7 @@
                     <a:p>
                       <a:pPr algn="ctr" fontAlgn="ctr"/>
                       <a:r>
-                        <a:rPr lang="fr-FR" sz="1600" b="0" i="0" u="none" strike="noStrike">
+                        <a:rPr lang="fr-FR" sz="1200" b="0" i="0" u="none" strike="noStrike" dirty="0">
                           <a:solidFill>
                             <a:srgbClr val="222B35"/>
                           </a:solidFill>
@@ -9958,7 +9958,7 @@
                     <a:p>
                       <a:pPr algn="ctr" fontAlgn="ctr"/>
                       <a:r>
-                        <a:rPr lang="fr-FR" sz="1600" b="0" i="0" u="none" strike="noStrike" dirty="0">
+                        <a:rPr lang="fr-FR" sz="1200" b="0" i="0" u="none" strike="noStrike" dirty="0">
                           <a:solidFill>
                             <a:srgbClr val="222B35"/>
                           </a:solidFill>
@@ -9994,6 +9994,51 @@
           </a:graphicData>
         </a:graphic>
       </p:graphicFrame>
+      <p:sp>
+        <p:nvSpPr>
+          <p:cNvPr id="3" name="photoApprovisionnement">
+            <a:extLst>
+              <a:ext uri="{FF2B5EF4-FFF2-40B4-BE49-F238E27FC236}">
+                <a16:creationId xmlns:a16="http://schemas.microsoft.com/office/drawing/2014/main" id="{882304D8-2C57-2A03-48B9-3758BA0305C5}"/>
+              </a:ext>
+            </a:extLst>
+          </p:cNvPr>
+          <p:cNvSpPr/>
+          <p:nvPr/>
+        </p:nvSpPr>
+        <p:spPr>
+          <a:xfrm>
+            <a:off x="6350001" y="2933700"/>
+            <a:ext cx="5638800" cy="2334775"/>
+          </a:xfrm>
+          <a:prstGeom prst="rect">
+            <a:avLst/>
+          </a:prstGeom>
+          <a:noFill/>
+        </p:spPr>
+        <p:style>
+          <a:lnRef idx="2">
+            <a:schemeClr val="accent6"/>
+          </a:lnRef>
+          <a:fillRef idx="1">
+            <a:schemeClr val="lt1"/>
+          </a:fillRef>
+          <a:effectRef idx="0">
+            <a:schemeClr val="accent6"/>
+          </a:effectRef>
+          <a:fontRef idx="minor">
+            <a:schemeClr val="dk1"/>
+          </a:fontRef>
+        </p:style>
+        <p:txBody>
+          <a:bodyPr rtlCol="0" anchor="ctr"/>
+          <a:lstStyle/>
+          <a:p>
+            <a:pPr algn="ctr"/>
+            <a:endParaRPr lang="fr-FR" sz="1600"/>
+          </a:p>
+        </p:txBody>
+      </p:sp>
     </p:spTree>
     <p:extLst>
       <p:ext uri="{BB962C8B-B14F-4D97-AF65-F5344CB8AC3E}">

</xml_diff>

<commit_message>
générations graphique personnalisé #42
</commit_message>
<xml_diff>
--- a/app/src/main/assets/powerpointvierge.pptx
+++ b/app/src/main/assets/powerpointvierge.pptx
@@ -210,7 +210,7 @@
           <a:p>
             <a:fld id="{8EF2C5CC-36BA-4C84-AC43-9F8430F4AE76}" type="datetimeFigureOut">
               <a:rPr lang="fr-FR" smtClean="0"/>
-              <a:t>07/07/2023</a:t>
+              <a:t>12/07/2023</a:t>
             </a:fld>
             <a:endParaRPr lang="fr-FR"/>
           </a:p>
@@ -6886,864 +6886,10 @@
           <a:lstStyle/>
           <a:p>
             <a:pPr algn="ctr"/>
-            <a:endParaRPr lang="fr-FR"/>
+            <a:endParaRPr lang="fr-FR" dirty="0"/>
           </a:p>
         </p:txBody>
       </p:sp>
-      <p:graphicFrame>
-        <p:nvGraphicFramePr>
-          <p:cNvPr id="13" name="Tableau 18">
-            <a:extLst>
-              <a:ext uri="{FF2B5EF4-FFF2-40B4-BE49-F238E27FC236}">
-                <a16:creationId xmlns:a16="http://schemas.microsoft.com/office/drawing/2014/main" id="{46F1FDA4-FE16-4946-6A46-542EAC6975B2}"/>
-              </a:ext>
-            </a:extLst>
-          </p:cNvPr>
-          <p:cNvGraphicFramePr>
-            <a:graphicFrameLocks noGrp="1"/>
-          </p:cNvGraphicFramePr>
-          <p:nvPr>
-            <p:extLst>
-              <p:ext uri="{D42A27DB-BD31-4B8C-83A1-F6EECF244321}">
-                <p14:modId xmlns:p14="http://schemas.microsoft.com/office/powerpoint/2010/main" val="3142599889"/>
-              </p:ext>
-            </p:extLst>
-          </p:nvPr>
-        </p:nvGraphicFramePr>
-        <p:xfrm>
-          <a:off x="4476750" y="1491784"/>
-          <a:ext cx="1330999" cy="1944000"/>
-        </p:xfrm>
-        <a:graphic>
-          <a:graphicData uri="http://schemas.openxmlformats.org/drawingml/2006/table">
-            <a:tbl>
-              <a:tblPr firstRow="1" bandRow="1">
-                <a:tableStyleId>{5C22544A-7EE6-4342-B048-85BDC9FD1C3A}</a:tableStyleId>
-              </a:tblPr>
-              <a:tblGrid>
-                <a:gridCol w="571500">
-                  <a:extLst>
-                    <a:ext uri="{9D8B030D-6E8A-4147-A177-3AD203B41FA5}">
-                      <a16:colId xmlns:a16="http://schemas.microsoft.com/office/drawing/2014/main" val="202743026"/>
-                    </a:ext>
-                  </a:extLst>
-                </a:gridCol>
-                <a:gridCol w="759499">
-                  <a:extLst>
-                    <a:ext uri="{9D8B030D-6E8A-4147-A177-3AD203B41FA5}">
-                      <a16:colId xmlns:a16="http://schemas.microsoft.com/office/drawing/2014/main" val="3064061004"/>
-                    </a:ext>
-                  </a:extLst>
-                </a:gridCol>
-              </a:tblGrid>
-              <a:tr h="324000">
-                <a:tc>
-                  <a:txBody>
-                    <a:bodyPr/>
-                    <a:lstStyle/>
-                    <a:p>
-                      <a:pPr algn="ctr"/>
-                      <a:endParaRPr lang="fr-FR" sz="1300" b="0" dirty="0">
-                        <a:solidFill>
-                          <a:schemeClr val="tx1"/>
-                        </a:solidFill>
-                        <a:latin typeface="Calibri" panose="020F0502020204030204" pitchFamily="34" charset="0"/>
-                        <a:cs typeface="Calibri" panose="020F0502020204030204" pitchFamily="34" charset="0"/>
-                      </a:endParaRPr>
-                    </a:p>
-                  </a:txBody>
-                  <a:tcPr>
-                    <a:lnL w="12700" cap="flat" cmpd="sng" algn="ctr">
-                      <a:noFill/>
-                      <a:prstDash val="solid"/>
-                      <a:round/>
-                      <a:headEnd type="none" w="med" len="med"/>
-                      <a:tailEnd type="none" w="med" len="med"/>
-                    </a:lnL>
-                    <a:lnR w="12700" cap="flat" cmpd="sng" algn="ctr">
-                      <a:noFill/>
-                      <a:prstDash val="solid"/>
-                      <a:round/>
-                      <a:headEnd type="none" w="med" len="med"/>
-                      <a:tailEnd type="none" w="med" len="med"/>
-                    </a:lnR>
-                    <a:lnT w="12700" cap="flat" cmpd="sng" algn="ctr">
-                      <a:noFill/>
-                      <a:prstDash val="solid"/>
-                      <a:round/>
-                      <a:headEnd type="none" w="med" len="med"/>
-                      <a:tailEnd type="none" w="med" len="med"/>
-                    </a:lnT>
-                    <a:lnB w="12700" cap="flat" cmpd="sng" algn="ctr">
-                      <a:noFill/>
-                      <a:prstDash val="solid"/>
-                      <a:round/>
-                      <a:headEnd type="none" w="med" len="med"/>
-                      <a:tailEnd type="none" w="med" len="med"/>
-                    </a:lnB>
-                    <a:lnTlToBr w="12700" cmpd="sng">
-                      <a:noFill/>
-                      <a:prstDash val="solid"/>
-                    </a:lnTlToBr>
-                    <a:lnBlToTr w="12700" cmpd="sng">
-                      <a:noFill/>
-                      <a:prstDash val="solid"/>
-                    </a:lnBlToTr>
-                    <a:solidFill>
-                      <a:schemeClr val="bg1"/>
-                    </a:solidFill>
-                  </a:tcPr>
-                </a:tc>
-                <a:tc>
-                  <a:txBody>
-                    <a:bodyPr/>
-                    <a:lstStyle/>
-                    <a:p>
-                      <a:pPr algn="ctr"/>
-                      <a:r>
-                        <a:rPr lang="fr-FR" sz="1300" b="0" dirty="0" err="1">
-                          <a:solidFill>
-                            <a:schemeClr val="tx1"/>
-                          </a:solidFill>
-                          <a:latin typeface="Calibri" panose="020F0502020204030204" pitchFamily="34" charset="0"/>
-                          <a:cs typeface="Calibri" panose="020F0502020204030204" pitchFamily="34" charset="0"/>
-                        </a:rPr>
-                        <a:t>kwh</a:t>
-                      </a:r>
-                      <a:r>
-                        <a:rPr lang="fr-FR" sz="1300" b="0" dirty="0">
-                          <a:solidFill>
-                            <a:schemeClr val="tx1"/>
-                          </a:solidFill>
-                          <a:latin typeface="Calibri" panose="020F0502020204030204" pitchFamily="34" charset="0"/>
-                          <a:cs typeface="Calibri" panose="020F0502020204030204" pitchFamily="34" charset="0"/>
-                        </a:rPr>
-                        <a:t>/m²</a:t>
-                      </a:r>
-                    </a:p>
-                  </a:txBody>
-                  <a:tcPr>
-                    <a:lnL w="12700" cap="flat" cmpd="sng" algn="ctr">
-                      <a:noFill/>
-                      <a:prstDash val="solid"/>
-                      <a:round/>
-                      <a:headEnd type="none" w="med" len="med"/>
-                      <a:tailEnd type="none" w="med" len="med"/>
-                    </a:lnL>
-                    <a:lnR w="12700" cap="flat" cmpd="sng" algn="ctr">
-                      <a:noFill/>
-                      <a:prstDash val="solid"/>
-                      <a:round/>
-                      <a:headEnd type="none" w="med" len="med"/>
-                      <a:tailEnd type="none" w="med" len="med"/>
-                    </a:lnR>
-                    <a:lnT w="12700" cap="flat" cmpd="sng" algn="ctr">
-                      <a:noFill/>
-                      <a:prstDash val="solid"/>
-                      <a:round/>
-                      <a:headEnd type="none" w="med" len="med"/>
-                      <a:tailEnd type="none" w="med" len="med"/>
-                    </a:lnT>
-                    <a:lnB w="12700" cap="flat" cmpd="sng" algn="ctr">
-                      <a:noFill/>
-                      <a:prstDash val="solid"/>
-                      <a:round/>
-                      <a:headEnd type="none" w="med" len="med"/>
-                      <a:tailEnd type="none" w="med" len="med"/>
-                    </a:lnB>
-                    <a:lnTlToBr w="12700" cmpd="sng">
-                      <a:noFill/>
-                      <a:prstDash val="solid"/>
-                    </a:lnTlToBr>
-                    <a:lnBlToTr w="12700" cmpd="sng">
-                      <a:noFill/>
-                      <a:prstDash val="solid"/>
-                    </a:lnBlToTr>
-                    <a:solidFill>
-                      <a:schemeClr val="bg1"/>
-                    </a:solidFill>
-                  </a:tcPr>
-                </a:tc>
-                <a:extLst>
-                  <a:ext uri="{0D108BD9-81ED-4DB2-BD59-A6C34878D82A}">
-                    <a16:rowId xmlns:a16="http://schemas.microsoft.com/office/drawing/2014/main" val="3332005047"/>
-                  </a:ext>
-                </a:extLst>
-              </a:tr>
-              <a:tr h="324000">
-                <a:tc>
-                  <a:txBody>
-                    <a:bodyPr/>
-                    <a:lstStyle/>
-                    <a:p>
-                      <a:pPr algn="ctr"/>
-                      <a:endParaRPr lang="fr-FR" sz="1300" b="0" dirty="0">
-                        <a:solidFill>
-                          <a:schemeClr val="tx1"/>
-                        </a:solidFill>
-                        <a:latin typeface="Calibri" panose="020F0502020204030204" pitchFamily="34" charset="0"/>
-                        <a:cs typeface="Calibri" panose="020F0502020204030204" pitchFamily="34" charset="0"/>
-                      </a:endParaRPr>
-                    </a:p>
-                  </a:txBody>
-                  <a:tcPr>
-                    <a:lnL w="12700" cap="flat" cmpd="sng" algn="ctr">
-                      <a:noFill/>
-                      <a:prstDash val="solid"/>
-                      <a:round/>
-                      <a:headEnd type="none" w="med" len="med"/>
-                      <a:tailEnd type="none" w="med" len="med"/>
-                    </a:lnL>
-                    <a:lnR w="12700" cap="flat" cmpd="sng" algn="ctr">
-                      <a:noFill/>
-                      <a:prstDash val="solid"/>
-                      <a:round/>
-                      <a:headEnd type="none" w="med" len="med"/>
-                      <a:tailEnd type="none" w="med" len="med"/>
-                    </a:lnR>
-                    <a:lnT w="12700" cap="flat" cmpd="sng" algn="ctr">
-                      <a:noFill/>
-                      <a:prstDash val="solid"/>
-                      <a:round/>
-                      <a:headEnd type="none" w="med" len="med"/>
-                      <a:tailEnd type="none" w="med" len="med"/>
-                    </a:lnT>
-                    <a:lnB w="12700" cap="flat" cmpd="sng" algn="ctr">
-                      <a:noFill/>
-                      <a:prstDash val="solid"/>
-                      <a:round/>
-                      <a:headEnd type="none" w="med" len="med"/>
-                      <a:tailEnd type="none" w="med" len="med"/>
-                    </a:lnB>
-                    <a:lnTlToBr w="12700" cmpd="sng">
-                      <a:noFill/>
-                      <a:prstDash val="solid"/>
-                    </a:lnTlToBr>
-                    <a:lnBlToTr w="12700" cmpd="sng">
-                      <a:noFill/>
-                      <a:prstDash val="solid"/>
-                    </a:lnBlToTr>
-                    <a:solidFill>
-                      <a:schemeClr val="bg1"/>
-                    </a:solidFill>
-                  </a:tcPr>
-                </a:tc>
-                <a:tc>
-                  <a:txBody>
-                    <a:bodyPr/>
-                    <a:lstStyle/>
-                    <a:p>
-                      <a:pPr algn="ctr"/>
-                      <a:r>
-                        <a:rPr lang="fr-FR" sz="1300" b="0" dirty="0" err="1">
-                          <a:solidFill>
-                            <a:schemeClr val="tx1"/>
-                          </a:solidFill>
-                          <a:latin typeface="Calibri" panose="020F0502020204030204" pitchFamily="34" charset="0"/>
-                          <a:cs typeface="Calibri" panose="020F0502020204030204" pitchFamily="34" charset="0"/>
-                        </a:rPr>
-                        <a:t>kwh</a:t>
-                      </a:r>
-                      <a:r>
-                        <a:rPr lang="fr-FR" sz="1300" b="0" dirty="0">
-                          <a:solidFill>
-                            <a:schemeClr val="tx1"/>
-                          </a:solidFill>
-                          <a:latin typeface="Calibri" panose="020F0502020204030204" pitchFamily="34" charset="0"/>
-                          <a:cs typeface="Calibri" panose="020F0502020204030204" pitchFamily="34" charset="0"/>
-                        </a:rPr>
-                        <a:t>/m²</a:t>
-                      </a:r>
-                    </a:p>
-                  </a:txBody>
-                  <a:tcPr>
-                    <a:lnL w="12700" cap="flat" cmpd="sng" algn="ctr">
-                      <a:noFill/>
-                      <a:prstDash val="solid"/>
-                      <a:round/>
-                      <a:headEnd type="none" w="med" len="med"/>
-                      <a:tailEnd type="none" w="med" len="med"/>
-                    </a:lnL>
-                    <a:lnR w="12700" cap="flat" cmpd="sng" algn="ctr">
-                      <a:noFill/>
-                      <a:prstDash val="solid"/>
-                      <a:round/>
-                      <a:headEnd type="none" w="med" len="med"/>
-                      <a:tailEnd type="none" w="med" len="med"/>
-                    </a:lnR>
-                    <a:lnT w="12700" cap="flat" cmpd="sng" algn="ctr">
-                      <a:noFill/>
-                      <a:prstDash val="solid"/>
-                      <a:round/>
-                      <a:headEnd type="none" w="med" len="med"/>
-                      <a:tailEnd type="none" w="med" len="med"/>
-                    </a:lnT>
-                    <a:lnB w="12700" cap="flat" cmpd="sng" algn="ctr">
-                      <a:noFill/>
-                      <a:prstDash val="solid"/>
-                      <a:round/>
-                      <a:headEnd type="none" w="med" len="med"/>
-                      <a:tailEnd type="none" w="med" len="med"/>
-                    </a:lnB>
-                    <a:lnTlToBr w="12700" cmpd="sng">
-                      <a:noFill/>
-                      <a:prstDash val="solid"/>
-                    </a:lnTlToBr>
-                    <a:lnBlToTr w="12700" cmpd="sng">
-                      <a:noFill/>
-                      <a:prstDash val="solid"/>
-                    </a:lnBlToTr>
-                    <a:solidFill>
-                      <a:schemeClr val="bg1"/>
-                    </a:solidFill>
-                  </a:tcPr>
-                </a:tc>
-                <a:extLst>
-                  <a:ext uri="{0D108BD9-81ED-4DB2-BD59-A6C34878D82A}">
-                    <a16:rowId xmlns:a16="http://schemas.microsoft.com/office/drawing/2014/main" val="1367113328"/>
-                  </a:ext>
-                </a:extLst>
-              </a:tr>
-              <a:tr h="324000">
-                <a:tc>
-                  <a:txBody>
-                    <a:bodyPr/>
-                    <a:lstStyle/>
-                    <a:p>
-                      <a:pPr algn="ctr"/>
-                      <a:endParaRPr lang="fr-FR" sz="1300" b="0" dirty="0">
-                        <a:solidFill>
-                          <a:schemeClr val="tx1"/>
-                        </a:solidFill>
-                        <a:latin typeface="Calibri" panose="020F0502020204030204" pitchFamily="34" charset="0"/>
-                        <a:cs typeface="Calibri" panose="020F0502020204030204" pitchFamily="34" charset="0"/>
-                      </a:endParaRPr>
-                    </a:p>
-                  </a:txBody>
-                  <a:tcPr>
-                    <a:lnL w="12700" cap="flat" cmpd="sng" algn="ctr">
-                      <a:noFill/>
-                      <a:prstDash val="solid"/>
-                      <a:round/>
-                      <a:headEnd type="none" w="med" len="med"/>
-                      <a:tailEnd type="none" w="med" len="med"/>
-                    </a:lnL>
-                    <a:lnR w="12700" cap="flat" cmpd="sng" algn="ctr">
-                      <a:noFill/>
-                      <a:prstDash val="solid"/>
-                      <a:round/>
-                      <a:headEnd type="none" w="med" len="med"/>
-                      <a:tailEnd type="none" w="med" len="med"/>
-                    </a:lnR>
-                    <a:lnT w="12700" cap="flat" cmpd="sng" algn="ctr">
-                      <a:noFill/>
-                      <a:prstDash val="solid"/>
-                      <a:round/>
-                      <a:headEnd type="none" w="med" len="med"/>
-                      <a:tailEnd type="none" w="med" len="med"/>
-                    </a:lnT>
-                    <a:lnB w="12700" cap="flat" cmpd="sng" algn="ctr">
-                      <a:noFill/>
-                      <a:prstDash val="solid"/>
-                      <a:round/>
-                      <a:headEnd type="none" w="med" len="med"/>
-                      <a:tailEnd type="none" w="med" len="med"/>
-                    </a:lnB>
-                    <a:lnTlToBr w="12700" cmpd="sng">
-                      <a:noFill/>
-                      <a:prstDash val="solid"/>
-                    </a:lnTlToBr>
-                    <a:lnBlToTr w="12700" cmpd="sng">
-                      <a:noFill/>
-                      <a:prstDash val="solid"/>
-                    </a:lnBlToTr>
-                    <a:solidFill>
-                      <a:schemeClr val="bg1"/>
-                    </a:solidFill>
-                  </a:tcPr>
-                </a:tc>
-                <a:tc>
-                  <a:txBody>
-                    <a:bodyPr/>
-                    <a:lstStyle/>
-                    <a:p>
-                      <a:pPr algn="ctr"/>
-                      <a:r>
-                        <a:rPr lang="fr-FR" sz="1300" b="0" dirty="0" err="1">
-                          <a:solidFill>
-                            <a:schemeClr val="tx1"/>
-                          </a:solidFill>
-                          <a:latin typeface="Calibri" panose="020F0502020204030204" pitchFamily="34" charset="0"/>
-                          <a:cs typeface="Calibri" panose="020F0502020204030204" pitchFamily="34" charset="0"/>
-                        </a:rPr>
-                        <a:t>kwh</a:t>
-                      </a:r>
-                      <a:r>
-                        <a:rPr lang="fr-FR" sz="1300" b="0" dirty="0">
-                          <a:solidFill>
-                            <a:schemeClr val="tx1"/>
-                          </a:solidFill>
-                          <a:latin typeface="Calibri" panose="020F0502020204030204" pitchFamily="34" charset="0"/>
-                          <a:cs typeface="Calibri" panose="020F0502020204030204" pitchFamily="34" charset="0"/>
-                        </a:rPr>
-                        <a:t>/m²</a:t>
-                      </a:r>
-                    </a:p>
-                  </a:txBody>
-                  <a:tcPr>
-                    <a:lnL w="12700" cap="flat" cmpd="sng" algn="ctr">
-                      <a:noFill/>
-                      <a:prstDash val="solid"/>
-                      <a:round/>
-                      <a:headEnd type="none" w="med" len="med"/>
-                      <a:tailEnd type="none" w="med" len="med"/>
-                    </a:lnL>
-                    <a:lnR w="12700" cap="flat" cmpd="sng" algn="ctr">
-                      <a:noFill/>
-                      <a:prstDash val="solid"/>
-                      <a:round/>
-                      <a:headEnd type="none" w="med" len="med"/>
-                      <a:tailEnd type="none" w="med" len="med"/>
-                    </a:lnR>
-                    <a:lnT w="12700" cap="flat" cmpd="sng" algn="ctr">
-                      <a:noFill/>
-                      <a:prstDash val="solid"/>
-                      <a:round/>
-                      <a:headEnd type="none" w="med" len="med"/>
-                      <a:tailEnd type="none" w="med" len="med"/>
-                    </a:lnT>
-                    <a:lnB w="12700" cap="flat" cmpd="sng" algn="ctr">
-                      <a:noFill/>
-                      <a:prstDash val="solid"/>
-                      <a:round/>
-                      <a:headEnd type="none" w="med" len="med"/>
-                      <a:tailEnd type="none" w="med" len="med"/>
-                    </a:lnB>
-                    <a:lnTlToBr w="12700" cmpd="sng">
-                      <a:noFill/>
-                      <a:prstDash val="solid"/>
-                    </a:lnTlToBr>
-                    <a:lnBlToTr w="12700" cmpd="sng">
-                      <a:noFill/>
-                      <a:prstDash val="solid"/>
-                    </a:lnBlToTr>
-                    <a:solidFill>
-                      <a:schemeClr val="bg1"/>
-                    </a:solidFill>
-                  </a:tcPr>
-                </a:tc>
-                <a:extLst>
-                  <a:ext uri="{0D108BD9-81ED-4DB2-BD59-A6C34878D82A}">
-                    <a16:rowId xmlns:a16="http://schemas.microsoft.com/office/drawing/2014/main" val="4131635550"/>
-                  </a:ext>
-                </a:extLst>
-              </a:tr>
-              <a:tr h="324000">
-                <a:tc>
-                  <a:txBody>
-                    <a:bodyPr/>
-                    <a:lstStyle/>
-                    <a:p>
-                      <a:pPr algn="ctr"/>
-                      <a:endParaRPr lang="fr-FR" sz="1300" b="0" dirty="0">
-                        <a:solidFill>
-                          <a:schemeClr val="tx1"/>
-                        </a:solidFill>
-                        <a:latin typeface="Calibri" panose="020F0502020204030204" pitchFamily="34" charset="0"/>
-                        <a:cs typeface="Calibri" panose="020F0502020204030204" pitchFamily="34" charset="0"/>
-                      </a:endParaRPr>
-                    </a:p>
-                  </a:txBody>
-                  <a:tcPr>
-                    <a:lnL w="12700" cap="flat" cmpd="sng" algn="ctr">
-                      <a:noFill/>
-                      <a:prstDash val="solid"/>
-                      <a:round/>
-                      <a:headEnd type="none" w="med" len="med"/>
-                      <a:tailEnd type="none" w="med" len="med"/>
-                    </a:lnL>
-                    <a:lnR w="12700" cap="flat" cmpd="sng" algn="ctr">
-                      <a:noFill/>
-                      <a:prstDash val="solid"/>
-                      <a:round/>
-                      <a:headEnd type="none" w="med" len="med"/>
-                      <a:tailEnd type="none" w="med" len="med"/>
-                    </a:lnR>
-                    <a:lnT w="12700" cap="flat" cmpd="sng" algn="ctr">
-                      <a:noFill/>
-                      <a:prstDash val="solid"/>
-                      <a:round/>
-                      <a:headEnd type="none" w="med" len="med"/>
-                      <a:tailEnd type="none" w="med" len="med"/>
-                    </a:lnT>
-                    <a:lnB w="12700" cap="flat" cmpd="sng" algn="ctr">
-                      <a:noFill/>
-                      <a:prstDash val="solid"/>
-                      <a:round/>
-                      <a:headEnd type="none" w="med" len="med"/>
-                      <a:tailEnd type="none" w="med" len="med"/>
-                    </a:lnB>
-                    <a:lnTlToBr w="12700" cmpd="sng">
-                      <a:noFill/>
-                      <a:prstDash val="solid"/>
-                    </a:lnTlToBr>
-                    <a:lnBlToTr w="12700" cmpd="sng">
-                      <a:noFill/>
-                      <a:prstDash val="solid"/>
-                    </a:lnBlToTr>
-                    <a:solidFill>
-                      <a:schemeClr val="bg1"/>
-                    </a:solidFill>
-                  </a:tcPr>
-                </a:tc>
-                <a:tc>
-                  <a:txBody>
-                    <a:bodyPr/>
-                    <a:lstStyle/>
-                    <a:p>
-                      <a:pPr algn="ctr"/>
-                      <a:r>
-                        <a:rPr lang="fr-FR" sz="1300" b="0" dirty="0" err="1">
-                          <a:solidFill>
-                            <a:schemeClr val="tx1"/>
-                          </a:solidFill>
-                          <a:latin typeface="Calibri" panose="020F0502020204030204" pitchFamily="34" charset="0"/>
-                          <a:cs typeface="Calibri" panose="020F0502020204030204" pitchFamily="34" charset="0"/>
-                        </a:rPr>
-                        <a:t>kwh</a:t>
-                      </a:r>
-                      <a:r>
-                        <a:rPr lang="fr-FR" sz="1300" b="0" dirty="0">
-                          <a:solidFill>
-                            <a:schemeClr val="tx1"/>
-                          </a:solidFill>
-                          <a:latin typeface="Calibri" panose="020F0502020204030204" pitchFamily="34" charset="0"/>
-                          <a:cs typeface="Calibri" panose="020F0502020204030204" pitchFamily="34" charset="0"/>
-                        </a:rPr>
-                        <a:t>/m²</a:t>
-                      </a:r>
-                    </a:p>
-                  </a:txBody>
-                  <a:tcPr>
-                    <a:lnL w="12700" cap="flat" cmpd="sng" algn="ctr">
-                      <a:noFill/>
-                      <a:prstDash val="solid"/>
-                      <a:round/>
-                      <a:headEnd type="none" w="med" len="med"/>
-                      <a:tailEnd type="none" w="med" len="med"/>
-                    </a:lnL>
-                    <a:lnR w="12700" cap="flat" cmpd="sng" algn="ctr">
-                      <a:noFill/>
-                      <a:prstDash val="solid"/>
-                      <a:round/>
-                      <a:headEnd type="none" w="med" len="med"/>
-                      <a:tailEnd type="none" w="med" len="med"/>
-                    </a:lnR>
-                    <a:lnT w="12700" cap="flat" cmpd="sng" algn="ctr">
-                      <a:noFill/>
-                      <a:prstDash val="solid"/>
-                      <a:round/>
-                      <a:headEnd type="none" w="med" len="med"/>
-                      <a:tailEnd type="none" w="med" len="med"/>
-                    </a:lnT>
-                    <a:lnB w="12700" cap="flat" cmpd="sng" algn="ctr">
-                      <a:noFill/>
-                      <a:prstDash val="solid"/>
-                      <a:round/>
-                      <a:headEnd type="none" w="med" len="med"/>
-                      <a:tailEnd type="none" w="med" len="med"/>
-                    </a:lnB>
-                    <a:lnTlToBr w="12700" cmpd="sng">
-                      <a:noFill/>
-                      <a:prstDash val="solid"/>
-                    </a:lnTlToBr>
-                    <a:lnBlToTr w="12700" cmpd="sng">
-                      <a:noFill/>
-                      <a:prstDash val="solid"/>
-                    </a:lnBlToTr>
-                    <a:solidFill>
-                      <a:schemeClr val="bg1"/>
-                    </a:solidFill>
-                  </a:tcPr>
-                </a:tc>
-                <a:extLst>
-                  <a:ext uri="{0D108BD9-81ED-4DB2-BD59-A6C34878D82A}">
-                    <a16:rowId xmlns:a16="http://schemas.microsoft.com/office/drawing/2014/main" val="2710022400"/>
-                  </a:ext>
-                </a:extLst>
-              </a:tr>
-              <a:tr h="324000">
-                <a:tc>
-                  <a:txBody>
-                    <a:bodyPr/>
-                    <a:lstStyle/>
-                    <a:p>
-                      <a:pPr algn="ctr"/>
-                      <a:endParaRPr lang="fr-FR" sz="1300" b="0" dirty="0">
-                        <a:solidFill>
-                          <a:schemeClr val="tx1"/>
-                        </a:solidFill>
-                        <a:latin typeface="Calibri" panose="020F0502020204030204" pitchFamily="34" charset="0"/>
-                        <a:cs typeface="Calibri" panose="020F0502020204030204" pitchFamily="34" charset="0"/>
-                      </a:endParaRPr>
-                    </a:p>
-                  </a:txBody>
-                  <a:tcPr>
-                    <a:lnL w="12700" cap="flat" cmpd="sng" algn="ctr">
-                      <a:noFill/>
-                      <a:prstDash val="solid"/>
-                      <a:round/>
-                      <a:headEnd type="none" w="med" len="med"/>
-                      <a:tailEnd type="none" w="med" len="med"/>
-                    </a:lnL>
-                    <a:lnR w="12700" cap="flat" cmpd="sng" algn="ctr">
-                      <a:noFill/>
-                      <a:prstDash val="solid"/>
-                      <a:round/>
-                      <a:headEnd type="none" w="med" len="med"/>
-                      <a:tailEnd type="none" w="med" len="med"/>
-                    </a:lnR>
-                    <a:lnT w="12700" cap="flat" cmpd="sng" algn="ctr">
-                      <a:noFill/>
-                      <a:prstDash val="solid"/>
-                      <a:round/>
-                      <a:headEnd type="none" w="med" len="med"/>
-                      <a:tailEnd type="none" w="med" len="med"/>
-                    </a:lnT>
-                    <a:lnB w="12700" cap="flat" cmpd="sng" algn="ctr">
-                      <a:noFill/>
-                      <a:prstDash val="solid"/>
-                      <a:round/>
-                      <a:headEnd type="none" w="med" len="med"/>
-                      <a:tailEnd type="none" w="med" len="med"/>
-                    </a:lnB>
-                    <a:lnTlToBr w="12700" cmpd="sng">
-                      <a:noFill/>
-                      <a:prstDash val="solid"/>
-                    </a:lnTlToBr>
-                    <a:lnBlToTr w="12700" cmpd="sng">
-                      <a:noFill/>
-                      <a:prstDash val="solid"/>
-                    </a:lnBlToTr>
-                    <a:solidFill>
-                      <a:schemeClr val="bg1"/>
-                    </a:solidFill>
-                  </a:tcPr>
-                </a:tc>
-                <a:tc>
-                  <a:txBody>
-                    <a:bodyPr/>
-                    <a:lstStyle/>
-                    <a:p>
-                      <a:pPr algn="ctr"/>
-                      <a:r>
-                        <a:rPr lang="fr-FR" sz="1300" b="0" dirty="0" err="1">
-                          <a:solidFill>
-                            <a:schemeClr val="tx1"/>
-                          </a:solidFill>
-                          <a:latin typeface="Calibri" panose="020F0502020204030204" pitchFamily="34" charset="0"/>
-                          <a:cs typeface="Calibri" panose="020F0502020204030204" pitchFamily="34" charset="0"/>
-                        </a:rPr>
-                        <a:t>kwh</a:t>
-                      </a:r>
-                      <a:r>
-                        <a:rPr lang="fr-FR" sz="1300" b="0" dirty="0">
-                          <a:solidFill>
-                            <a:schemeClr val="tx1"/>
-                          </a:solidFill>
-                          <a:latin typeface="Calibri" panose="020F0502020204030204" pitchFamily="34" charset="0"/>
-                          <a:cs typeface="Calibri" panose="020F0502020204030204" pitchFamily="34" charset="0"/>
-                        </a:rPr>
-                        <a:t>/m²</a:t>
-                      </a:r>
-                    </a:p>
-                  </a:txBody>
-                  <a:tcPr>
-                    <a:lnL w="12700" cap="flat" cmpd="sng" algn="ctr">
-                      <a:noFill/>
-                      <a:prstDash val="solid"/>
-                      <a:round/>
-                      <a:headEnd type="none" w="med" len="med"/>
-                      <a:tailEnd type="none" w="med" len="med"/>
-                    </a:lnL>
-                    <a:lnR w="12700" cap="flat" cmpd="sng" algn="ctr">
-                      <a:noFill/>
-                      <a:prstDash val="solid"/>
-                      <a:round/>
-                      <a:headEnd type="none" w="med" len="med"/>
-                      <a:tailEnd type="none" w="med" len="med"/>
-                    </a:lnR>
-                    <a:lnT w="12700" cap="flat" cmpd="sng" algn="ctr">
-                      <a:noFill/>
-                      <a:prstDash val="solid"/>
-                      <a:round/>
-                      <a:headEnd type="none" w="med" len="med"/>
-                      <a:tailEnd type="none" w="med" len="med"/>
-                    </a:lnT>
-                    <a:lnB w="12700" cap="flat" cmpd="sng" algn="ctr">
-                      <a:noFill/>
-                      <a:prstDash val="solid"/>
-                      <a:round/>
-                      <a:headEnd type="none" w="med" len="med"/>
-                      <a:tailEnd type="none" w="med" len="med"/>
-                    </a:lnB>
-                    <a:lnTlToBr w="12700" cmpd="sng">
-                      <a:noFill/>
-                      <a:prstDash val="solid"/>
-                    </a:lnTlToBr>
-                    <a:lnBlToTr w="12700" cmpd="sng">
-                      <a:noFill/>
-                      <a:prstDash val="solid"/>
-                    </a:lnBlToTr>
-                    <a:solidFill>
-                      <a:schemeClr val="bg1"/>
-                    </a:solidFill>
-                  </a:tcPr>
-                </a:tc>
-                <a:extLst>
-                  <a:ext uri="{0D108BD9-81ED-4DB2-BD59-A6C34878D82A}">
-                    <a16:rowId xmlns:a16="http://schemas.microsoft.com/office/drawing/2014/main" val="4250254318"/>
-                  </a:ext>
-                </a:extLst>
-              </a:tr>
-              <a:tr h="324000">
-                <a:tc>
-                  <a:txBody>
-                    <a:bodyPr/>
-                    <a:lstStyle/>
-                    <a:p>
-                      <a:pPr algn="ctr"/>
-                      <a:endParaRPr lang="fr-FR" sz="1300" b="0" dirty="0">
-                        <a:solidFill>
-                          <a:schemeClr val="tx1"/>
-                        </a:solidFill>
-                        <a:latin typeface="Calibri" panose="020F0502020204030204" pitchFamily="34" charset="0"/>
-                        <a:cs typeface="Calibri" panose="020F0502020204030204" pitchFamily="34" charset="0"/>
-                      </a:endParaRPr>
-                    </a:p>
-                  </a:txBody>
-                  <a:tcPr>
-                    <a:lnL w="12700" cap="flat" cmpd="sng" algn="ctr">
-                      <a:noFill/>
-                      <a:prstDash val="solid"/>
-                      <a:round/>
-                      <a:headEnd type="none" w="med" len="med"/>
-                      <a:tailEnd type="none" w="med" len="med"/>
-                    </a:lnL>
-                    <a:lnR w="12700" cap="flat" cmpd="sng" algn="ctr">
-                      <a:noFill/>
-                      <a:prstDash val="solid"/>
-                      <a:round/>
-                      <a:headEnd type="none" w="med" len="med"/>
-                      <a:tailEnd type="none" w="med" len="med"/>
-                    </a:lnR>
-                    <a:lnT w="12700" cap="flat" cmpd="sng" algn="ctr">
-                      <a:noFill/>
-                      <a:prstDash val="solid"/>
-                      <a:round/>
-                      <a:headEnd type="none" w="med" len="med"/>
-                      <a:tailEnd type="none" w="med" len="med"/>
-                    </a:lnT>
-                    <a:lnB w="12700" cap="flat" cmpd="sng" algn="ctr">
-                      <a:noFill/>
-                      <a:prstDash val="solid"/>
-                      <a:round/>
-                      <a:headEnd type="none" w="med" len="med"/>
-                      <a:tailEnd type="none" w="med" len="med"/>
-                    </a:lnB>
-                    <a:lnTlToBr w="12700" cmpd="sng">
-                      <a:noFill/>
-                      <a:prstDash val="solid"/>
-                    </a:lnTlToBr>
-                    <a:lnBlToTr w="12700" cmpd="sng">
-                      <a:noFill/>
-                      <a:prstDash val="solid"/>
-                    </a:lnBlToTr>
-                    <a:solidFill>
-                      <a:schemeClr val="bg1"/>
-                    </a:solidFill>
-                  </a:tcPr>
-                </a:tc>
-                <a:tc>
-                  <a:txBody>
-                    <a:bodyPr/>
-                    <a:lstStyle/>
-                    <a:p>
-                      <a:pPr algn="ctr"/>
-                      <a:r>
-                        <a:rPr lang="fr-FR" sz="1300" b="0" dirty="0" err="1">
-                          <a:solidFill>
-                            <a:schemeClr val="tx1"/>
-                          </a:solidFill>
-                          <a:latin typeface="Calibri" panose="020F0502020204030204" pitchFamily="34" charset="0"/>
-                          <a:cs typeface="Calibri" panose="020F0502020204030204" pitchFamily="34" charset="0"/>
-                        </a:rPr>
-                        <a:t>kwh</a:t>
-                      </a:r>
-                      <a:r>
-                        <a:rPr lang="fr-FR" sz="1300" b="0" dirty="0">
-                          <a:solidFill>
-                            <a:schemeClr val="tx1"/>
-                          </a:solidFill>
-                          <a:latin typeface="Calibri" panose="020F0502020204030204" pitchFamily="34" charset="0"/>
-                          <a:cs typeface="Calibri" panose="020F0502020204030204" pitchFamily="34" charset="0"/>
-                        </a:rPr>
-                        <a:t>/m²</a:t>
-                      </a:r>
-                    </a:p>
-                  </a:txBody>
-                  <a:tcPr>
-                    <a:lnL w="12700" cap="flat" cmpd="sng" algn="ctr">
-                      <a:noFill/>
-                      <a:prstDash val="solid"/>
-                      <a:round/>
-                      <a:headEnd type="none" w="med" len="med"/>
-                      <a:tailEnd type="none" w="med" len="med"/>
-                    </a:lnL>
-                    <a:lnR w="12700" cap="flat" cmpd="sng" algn="ctr">
-                      <a:noFill/>
-                      <a:prstDash val="solid"/>
-                      <a:round/>
-                      <a:headEnd type="none" w="med" len="med"/>
-                      <a:tailEnd type="none" w="med" len="med"/>
-                    </a:lnR>
-                    <a:lnT w="12700" cap="flat" cmpd="sng" algn="ctr">
-                      <a:noFill/>
-                      <a:prstDash val="solid"/>
-                      <a:round/>
-                      <a:headEnd type="none" w="med" len="med"/>
-                      <a:tailEnd type="none" w="med" len="med"/>
-                    </a:lnT>
-                    <a:lnB w="12700" cap="flat" cmpd="sng" algn="ctr">
-                      <a:noFill/>
-                      <a:prstDash val="solid"/>
-                      <a:round/>
-                      <a:headEnd type="none" w="med" len="med"/>
-                      <a:tailEnd type="none" w="med" len="med"/>
-                    </a:lnB>
-                    <a:lnTlToBr w="12700" cmpd="sng">
-                      <a:noFill/>
-                      <a:prstDash val="solid"/>
-                    </a:lnTlToBr>
-                    <a:lnBlToTr w="12700" cmpd="sng">
-                      <a:noFill/>
-                      <a:prstDash val="solid"/>
-                    </a:lnBlToTr>
-                    <a:solidFill>
-                      <a:schemeClr val="bg1"/>
-                    </a:solidFill>
-                  </a:tcPr>
-                </a:tc>
-                <a:extLst>
-                  <a:ext uri="{0D108BD9-81ED-4DB2-BD59-A6C34878D82A}">
-                    <a16:rowId xmlns:a16="http://schemas.microsoft.com/office/drawing/2014/main" val="4133803510"/>
-                  </a:ext>
-                </a:extLst>
-              </a:tr>
-            </a:tbl>
-          </a:graphicData>
-        </a:graphic>
-      </p:graphicFrame>
       <p:sp>
         <p:nvSpPr>
           <p:cNvPr id="14" name="Ellipse 13">
@@ -7839,7 +6985,7 @@
         </p:nvSpPr>
         <p:spPr>
           <a:xfrm>
-            <a:off x="4175242" y="1858172"/>
+            <a:off x="4171658" y="2199420"/>
             <a:ext cx="239060" cy="239060"/>
           </a:xfrm>
           <a:prstGeom prst="ellipse">
@@ -7847,87 +6993,6 @@
           </a:prstGeom>
           <a:solidFill>
             <a:srgbClr val="F2C504"/>
-          </a:solidFill>
-          <a:ln>
-            <a:noFill/>
-          </a:ln>
-        </p:spPr>
-        <p:style>
-          <a:lnRef idx="2">
-            <a:schemeClr val="accent1">
-              <a:shade val="50000"/>
-            </a:schemeClr>
-          </a:lnRef>
-          <a:fillRef idx="1">
-            <a:schemeClr val="accent1"/>
-          </a:fillRef>
-          <a:effectRef idx="0">
-            <a:schemeClr val="accent1"/>
-          </a:effectRef>
-          <a:fontRef idx="minor">
-            <a:schemeClr val="lt1"/>
-          </a:fontRef>
-        </p:style>
-        <p:txBody>
-          <a:bodyPr rtlCol="0" anchor="ctr"/>
-          <a:lstStyle/>
-          <a:p>
-            <a:pPr marL="0" marR="0" lvl="0" indent="0" algn="ctr" defTabSz="914400" rtl="0" eaLnBrk="1" fontAlgn="auto" latinLnBrk="0" hangingPunct="1">
-              <a:lnSpc>
-                <a:spcPct val="100000"/>
-              </a:lnSpc>
-              <a:spcBef>
-                <a:spcPts val="0"/>
-              </a:spcBef>
-              <a:spcAft>
-                <a:spcPts val="0"/>
-              </a:spcAft>
-              <a:buClrTx/>
-              <a:buSzTx/>
-              <a:buFontTx/>
-              <a:buNone/>
-              <a:tabLst/>
-              <a:defRPr/>
-            </a:pPr>
-            <a:endParaRPr kumimoji="0" lang="fr-FR" sz="1800" b="0" i="0" u="none" strike="noStrike" kern="1200" cap="none" spc="0" normalizeH="0" baseline="0" noProof="0">
-              <a:ln>
-                <a:noFill/>
-              </a:ln>
-              <a:solidFill>
-                <a:srgbClr val="FFFFFF"/>
-              </a:solidFill>
-              <a:effectLst/>
-              <a:uLnTx/>
-              <a:uFillTx/>
-              <a:latin typeface="Century Gothic" panose="020F0302020204030204"/>
-              <a:ea typeface="+mn-ea"/>
-              <a:cs typeface="+mn-cs"/>
-            </a:endParaRPr>
-          </a:p>
-        </p:txBody>
-      </p:sp>
-      <p:sp>
-        <p:nvSpPr>
-          <p:cNvPr id="16" name="Ellipse 15">
-            <a:extLst>
-              <a:ext uri="{FF2B5EF4-FFF2-40B4-BE49-F238E27FC236}">
-                <a16:creationId xmlns:a16="http://schemas.microsoft.com/office/drawing/2014/main" id="{F8A2811C-54E3-6F02-FFCA-078B56A04628}"/>
-              </a:ext>
-            </a:extLst>
-          </p:cNvPr>
-          <p:cNvSpPr/>
-          <p:nvPr/>
-        </p:nvSpPr>
-        <p:spPr>
-          <a:xfrm>
-            <a:off x="4175242" y="2172646"/>
-            <a:ext cx="239060" cy="239060"/>
-          </a:xfrm>
-          <a:prstGeom prst="ellipse">
-            <a:avLst/>
-          </a:prstGeom>
-          <a:solidFill>
-            <a:srgbClr val="BF3FFF"/>
           </a:solidFill>
           <a:ln>
             <a:noFill/>
@@ -8001,7 +7066,7 @@
         </p:nvSpPr>
         <p:spPr>
           <a:xfrm>
-            <a:off x="4175242" y="2495284"/>
+            <a:off x="4175242" y="1865574"/>
             <a:ext cx="239060" cy="239060"/>
           </a:xfrm>
           <a:prstGeom prst="ellipse">
@@ -8009,168 +7074,6 @@
           </a:prstGeom>
           <a:solidFill>
             <a:srgbClr val="EB6B0A"/>
-          </a:solidFill>
-          <a:ln>
-            <a:noFill/>
-          </a:ln>
-        </p:spPr>
-        <p:style>
-          <a:lnRef idx="2">
-            <a:schemeClr val="accent1">
-              <a:shade val="50000"/>
-            </a:schemeClr>
-          </a:lnRef>
-          <a:fillRef idx="1">
-            <a:schemeClr val="accent1"/>
-          </a:fillRef>
-          <a:effectRef idx="0">
-            <a:schemeClr val="accent1"/>
-          </a:effectRef>
-          <a:fontRef idx="minor">
-            <a:schemeClr val="lt1"/>
-          </a:fontRef>
-        </p:style>
-        <p:txBody>
-          <a:bodyPr rtlCol="0" anchor="ctr"/>
-          <a:lstStyle/>
-          <a:p>
-            <a:pPr marL="0" marR="0" lvl="0" indent="0" algn="ctr" defTabSz="914400" rtl="0" eaLnBrk="1" fontAlgn="auto" latinLnBrk="0" hangingPunct="1">
-              <a:lnSpc>
-                <a:spcPct val="100000"/>
-              </a:lnSpc>
-              <a:spcBef>
-                <a:spcPts val="0"/>
-              </a:spcBef>
-              <a:spcAft>
-                <a:spcPts val="0"/>
-              </a:spcAft>
-              <a:buClrTx/>
-              <a:buSzTx/>
-              <a:buFontTx/>
-              <a:buNone/>
-              <a:tabLst/>
-              <a:defRPr/>
-            </a:pPr>
-            <a:endParaRPr kumimoji="0" lang="fr-FR" sz="1800" b="0" i="0" u="none" strike="noStrike" kern="1200" cap="none" spc="0" normalizeH="0" baseline="0" noProof="0">
-              <a:ln>
-                <a:noFill/>
-              </a:ln>
-              <a:solidFill>
-                <a:srgbClr val="FFFFFF"/>
-              </a:solidFill>
-              <a:effectLst/>
-              <a:uLnTx/>
-              <a:uFillTx/>
-              <a:latin typeface="Century Gothic" panose="020F0302020204030204"/>
-              <a:ea typeface="+mn-ea"/>
-              <a:cs typeface="+mn-cs"/>
-            </a:endParaRPr>
-          </a:p>
-        </p:txBody>
-      </p:sp>
-      <p:sp>
-        <p:nvSpPr>
-          <p:cNvPr id="18" name="Ellipse 17">
-            <a:extLst>
-              <a:ext uri="{FF2B5EF4-FFF2-40B4-BE49-F238E27FC236}">
-                <a16:creationId xmlns:a16="http://schemas.microsoft.com/office/drawing/2014/main" id="{8A8DBB06-4FDA-42A5-D513-E46921EB4DD0}"/>
-              </a:ext>
-            </a:extLst>
-          </p:cNvPr>
-          <p:cNvSpPr/>
-          <p:nvPr/>
-        </p:nvSpPr>
-        <p:spPr>
-          <a:xfrm>
-            <a:off x="4175242" y="2818816"/>
-            <a:ext cx="239060" cy="239060"/>
-          </a:xfrm>
-          <a:prstGeom prst="ellipse">
-            <a:avLst/>
-          </a:prstGeom>
-          <a:solidFill>
-            <a:srgbClr val="86B918"/>
-          </a:solidFill>
-          <a:ln>
-            <a:noFill/>
-          </a:ln>
-        </p:spPr>
-        <p:style>
-          <a:lnRef idx="2">
-            <a:schemeClr val="accent1">
-              <a:shade val="50000"/>
-            </a:schemeClr>
-          </a:lnRef>
-          <a:fillRef idx="1">
-            <a:schemeClr val="accent1"/>
-          </a:fillRef>
-          <a:effectRef idx="0">
-            <a:schemeClr val="accent1"/>
-          </a:effectRef>
-          <a:fontRef idx="minor">
-            <a:schemeClr val="lt1"/>
-          </a:fontRef>
-        </p:style>
-        <p:txBody>
-          <a:bodyPr rtlCol="0" anchor="ctr"/>
-          <a:lstStyle/>
-          <a:p>
-            <a:pPr marL="0" marR="0" lvl="0" indent="0" algn="ctr" defTabSz="914400" rtl="0" eaLnBrk="1" fontAlgn="auto" latinLnBrk="0" hangingPunct="1">
-              <a:lnSpc>
-                <a:spcPct val="100000"/>
-              </a:lnSpc>
-              <a:spcBef>
-                <a:spcPts val="0"/>
-              </a:spcBef>
-              <a:spcAft>
-                <a:spcPts val="0"/>
-              </a:spcAft>
-              <a:buClrTx/>
-              <a:buSzTx/>
-              <a:buFontTx/>
-              <a:buNone/>
-              <a:tabLst/>
-              <a:defRPr/>
-            </a:pPr>
-            <a:endParaRPr kumimoji="0" lang="fr-FR" sz="1800" b="0" i="0" u="none" strike="noStrike" kern="1200" cap="none" spc="0" normalizeH="0" baseline="0" noProof="0">
-              <a:ln>
-                <a:noFill/>
-              </a:ln>
-              <a:solidFill>
-                <a:srgbClr val="FFFFFF"/>
-              </a:solidFill>
-              <a:effectLst/>
-              <a:uLnTx/>
-              <a:uFillTx/>
-              <a:latin typeface="Century Gothic" panose="020F0302020204030204"/>
-              <a:ea typeface="+mn-ea"/>
-              <a:cs typeface="+mn-cs"/>
-            </a:endParaRPr>
-          </a:p>
-        </p:txBody>
-      </p:sp>
-      <p:sp>
-        <p:nvSpPr>
-          <p:cNvPr id="19" name="Ellipse 18">
-            <a:extLst>
-              <a:ext uri="{FF2B5EF4-FFF2-40B4-BE49-F238E27FC236}">
-                <a16:creationId xmlns:a16="http://schemas.microsoft.com/office/drawing/2014/main" id="{3ACF1B4E-520B-4CF0-BB5C-C11B48D1E9F5}"/>
-              </a:ext>
-            </a:extLst>
-          </p:cNvPr>
-          <p:cNvSpPr/>
-          <p:nvPr/>
-        </p:nvSpPr>
-        <p:spPr>
-          <a:xfrm>
-            <a:off x="4179469" y="3165412"/>
-            <a:ext cx="239060" cy="239060"/>
-          </a:xfrm>
-          <a:prstGeom prst="ellipse">
-            <a:avLst/>
-          </a:prstGeom>
-          <a:solidFill>
-            <a:srgbClr val="008000"/>
           </a:solidFill>
           <a:ln>
             <a:noFill/>
@@ -8291,1286 +7194,6 @@
       </p:sp>
       <p:graphicFrame>
         <p:nvGraphicFramePr>
-          <p:cNvPr id="21" name="Tableau 18">
-            <a:extLst>
-              <a:ext uri="{FF2B5EF4-FFF2-40B4-BE49-F238E27FC236}">
-                <a16:creationId xmlns:a16="http://schemas.microsoft.com/office/drawing/2014/main" id="{EEA90DFE-9583-4FDD-3185-F5583B6FB833}"/>
-              </a:ext>
-            </a:extLst>
-          </p:cNvPr>
-          <p:cNvGraphicFramePr>
-            <a:graphicFrameLocks noGrp="1"/>
-          </p:cNvGraphicFramePr>
-          <p:nvPr>
-            <p:extLst>
-              <p:ext uri="{D42A27DB-BD31-4B8C-83A1-F6EECF244321}">
-                <p14:modId xmlns:p14="http://schemas.microsoft.com/office/powerpoint/2010/main" val="162553813"/>
-              </p:ext>
-            </p:extLst>
-          </p:nvPr>
-        </p:nvGraphicFramePr>
-        <p:xfrm>
-          <a:off x="4486022" y="4348553"/>
-          <a:ext cx="1330999" cy="1944000"/>
-        </p:xfrm>
-        <a:graphic>
-          <a:graphicData uri="http://schemas.openxmlformats.org/drawingml/2006/table">
-            <a:tbl>
-              <a:tblPr firstRow="1" bandRow="1">
-                <a:tableStyleId>{5C22544A-7EE6-4342-B048-85BDC9FD1C3A}</a:tableStyleId>
-              </a:tblPr>
-              <a:tblGrid>
-                <a:gridCol w="571500">
-                  <a:extLst>
-                    <a:ext uri="{9D8B030D-6E8A-4147-A177-3AD203B41FA5}">
-                      <a16:colId xmlns:a16="http://schemas.microsoft.com/office/drawing/2014/main" val="202743026"/>
-                    </a:ext>
-                  </a:extLst>
-                </a:gridCol>
-                <a:gridCol w="759499">
-                  <a:extLst>
-                    <a:ext uri="{9D8B030D-6E8A-4147-A177-3AD203B41FA5}">
-                      <a16:colId xmlns:a16="http://schemas.microsoft.com/office/drawing/2014/main" val="3064061004"/>
-                    </a:ext>
-                  </a:extLst>
-                </a:gridCol>
-              </a:tblGrid>
-              <a:tr h="324000">
-                <a:tc>
-                  <a:txBody>
-                    <a:bodyPr/>
-                    <a:lstStyle/>
-                    <a:p>
-                      <a:pPr algn="ctr"/>
-                      <a:endParaRPr lang="fr-FR" sz="1300" b="0" dirty="0">
-                        <a:solidFill>
-                          <a:schemeClr val="tx1"/>
-                        </a:solidFill>
-                        <a:latin typeface="Calibri" panose="020F0502020204030204" pitchFamily="34" charset="0"/>
-                        <a:cs typeface="Calibri" panose="020F0502020204030204" pitchFamily="34" charset="0"/>
-                      </a:endParaRPr>
-                    </a:p>
-                  </a:txBody>
-                  <a:tcPr>
-                    <a:lnL w="12700" cap="flat" cmpd="sng" algn="ctr">
-                      <a:noFill/>
-                      <a:prstDash val="solid"/>
-                      <a:round/>
-                      <a:headEnd type="none" w="med" len="med"/>
-                      <a:tailEnd type="none" w="med" len="med"/>
-                    </a:lnL>
-                    <a:lnR w="12700" cap="flat" cmpd="sng" algn="ctr">
-                      <a:noFill/>
-                      <a:prstDash val="solid"/>
-                      <a:round/>
-                      <a:headEnd type="none" w="med" len="med"/>
-                      <a:tailEnd type="none" w="med" len="med"/>
-                    </a:lnR>
-                    <a:lnT w="12700" cap="flat" cmpd="sng" algn="ctr">
-                      <a:noFill/>
-                      <a:prstDash val="solid"/>
-                      <a:round/>
-                      <a:headEnd type="none" w="med" len="med"/>
-                      <a:tailEnd type="none" w="med" len="med"/>
-                    </a:lnT>
-                    <a:lnB w="12700" cap="flat" cmpd="sng" algn="ctr">
-                      <a:noFill/>
-                      <a:prstDash val="solid"/>
-                      <a:round/>
-                      <a:headEnd type="none" w="med" len="med"/>
-                      <a:tailEnd type="none" w="med" len="med"/>
-                    </a:lnB>
-                    <a:lnTlToBr w="12700" cmpd="sng">
-                      <a:noFill/>
-                      <a:prstDash val="solid"/>
-                    </a:lnTlToBr>
-                    <a:lnBlToTr w="12700" cmpd="sng">
-                      <a:noFill/>
-                      <a:prstDash val="solid"/>
-                    </a:lnBlToTr>
-                    <a:solidFill>
-                      <a:schemeClr val="bg1"/>
-                    </a:solidFill>
-                  </a:tcPr>
-                </a:tc>
-                <a:tc>
-                  <a:txBody>
-                    <a:bodyPr/>
-                    <a:lstStyle/>
-                    <a:p>
-                      <a:pPr algn="ctr"/>
-                      <a:r>
-                        <a:rPr lang="fr-FR" sz="1300" b="0">
-                          <a:solidFill>
-                            <a:schemeClr val="tx1"/>
-                          </a:solidFill>
-                          <a:latin typeface="Calibri" panose="020F0502020204030204" pitchFamily="34" charset="0"/>
-                          <a:cs typeface="Calibri" panose="020F0502020204030204" pitchFamily="34" charset="0"/>
-                        </a:rPr>
-                        <a:t>€/m²</a:t>
-                      </a:r>
-                    </a:p>
-                  </a:txBody>
-                  <a:tcPr>
-                    <a:lnL w="12700" cap="flat" cmpd="sng" algn="ctr">
-                      <a:noFill/>
-                      <a:prstDash val="solid"/>
-                      <a:round/>
-                      <a:headEnd type="none" w="med" len="med"/>
-                      <a:tailEnd type="none" w="med" len="med"/>
-                    </a:lnL>
-                    <a:lnR w="12700" cap="flat" cmpd="sng" algn="ctr">
-                      <a:noFill/>
-                      <a:prstDash val="solid"/>
-                      <a:round/>
-                      <a:headEnd type="none" w="med" len="med"/>
-                      <a:tailEnd type="none" w="med" len="med"/>
-                    </a:lnR>
-                    <a:lnT w="12700" cap="flat" cmpd="sng" algn="ctr">
-                      <a:noFill/>
-                      <a:prstDash val="solid"/>
-                      <a:round/>
-                      <a:headEnd type="none" w="med" len="med"/>
-                      <a:tailEnd type="none" w="med" len="med"/>
-                    </a:lnT>
-                    <a:lnB w="12700" cap="flat" cmpd="sng" algn="ctr">
-                      <a:noFill/>
-                      <a:prstDash val="solid"/>
-                      <a:round/>
-                      <a:headEnd type="none" w="med" len="med"/>
-                      <a:tailEnd type="none" w="med" len="med"/>
-                    </a:lnB>
-                    <a:lnTlToBr w="12700" cmpd="sng">
-                      <a:noFill/>
-                      <a:prstDash val="solid"/>
-                    </a:lnTlToBr>
-                    <a:lnBlToTr w="12700" cmpd="sng">
-                      <a:noFill/>
-                      <a:prstDash val="solid"/>
-                    </a:lnBlToTr>
-                    <a:solidFill>
-                      <a:schemeClr val="bg1"/>
-                    </a:solidFill>
-                  </a:tcPr>
-                </a:tc>
-                <a:extLst>
-                  <a:ext uri="{0D108BD9-81ED-4DB2-BD59-A6C34878D82A}">
-                    <a16:rowId xmlns:a16="http://schemas.microsoft.com/office/drawing/2014/main" val="3332005047"/>
-                  </a:ext>
-                </a:extLst>
-              </a:tr>
-              <a:tr h="324000">
-                <a:tc>
-                  <a:txBody>
-                    <a:bodyPr/>
-                    <a:lstStyle/>
-                    <a:p>
-                      <a:pPr algn="ctr"/>
-                      <a:endParaRPr lang="fr-FR" sz="1300" b="0" dirty="0">
-                        <a:solidFill>
-                          <a:schemeClr val="tx1"/>
-                        </a:solidFill>
-                        <a:latin typeface="Calibri" panose="020F0502020204030204" pitchFamily="34" charset="0"/>
-                        <a:cs typeface="Calibri" panose="020F0502020204030204" pitchFamily="34" charset="0"/>
-                      </a:endParaRPr>
-                    </a:p>
-                  </a:txBody>
-                  <a:tcPr>
-                    <a:lnL w="12700" cap="flat" cmpd="sng" algn="ctr">
-                      <a:noFill/>
-                      <a:prstDash val="solid"/>
-                      <a:round/>
-                      <a:headEnd type="none" w="med" len="med"/>
-                      <a:tailEnd type="none" w="med" len="med"/>
-                    </a:lnL>
-                    <a:lnR w="12700" cap="flat" cmpd="sng" algn="ctr">
-                      <a:noFill/>
-                      <a:prstDash val="solid"/>
-                      <a:round/>
-                      <a:headEnd type="none" w="med" len="med"/>
-                      <a:tailEnd type="none" w="med" len="med"/>
-                    </a:lnR>
-                    <a:lnT w="12700" cap="flat" cmpd="sng" algn="ctr">
-                      <a:noFill/>
-                      <a:prstDash val="solid"/>
-                      <a:round/>
-                      <a:headEnd type="none" w="med" len="med"/>
-                      <a:tailEnd type="none" w="med" len="med"/>
-                    </a:lnT>
-                    <a:lnB w="12700" cap="flat" cmpd="sng" algn="ctr">
-                      <a:noFill/>
-                      <a:prstDash val="solid"/>
-                      <a:round/>
-                      <a:headEnd type="none" w="med" len="med"/>
-                      <a:tailEnd type="none" w="med" len="med"/>
-                    </a:lnB>
-                    <a:lnTlToBr w="12700" cmpd="sng">
-                      <a:noFill/>
-                      <a:prstDash val="solid"/>
-                    </a:lnTlToBr>
-                    <a:lnBlToTr w="12700" cmpd="sng">
-                      <a:noFill/>
-                      <a:prstDash val="solid"/>
-                    </a:lnBlToTr>
-                    <a:solidFill>
-                      <a:schemeClr val="bg1"/>
-                    </a:solidFill>
-                  </a:tcPr>
-                </a:tc>
-                <a:tc>
-                  <a:txBody>
-                    <a:bodyPr/>
-                    <a:lstStyle/>
-                    <a:p>
-                      <a:pPr algn="ctr"/>
-                      <a:r>
-                        <a:rPr lang="fr-FR" sz="1300" b="0" dirty="0">
-                          <a:solidFill>
-                            <a:schemeClr val="tx1"/>
-                          </a:solidFill>
-                          <a:latin typeface="Calibri" panose="020F0502020204030204" pitchFamily="34" charset="0"/>
-                          <a:cs typeface="Calibri" panose="020F0502020204030204" pitchFamily="34" charset="0"/>
-                        </a:rPr>
-                        <a:t>€/m²</a:t>
-                      </a:r>
-                    </a:p>
-                  </a:txBody>
-                  <a:tcPr>
-                    <a:lnL w="12700" cap="flat" cmpd="sng" algn="ctr">
-                      <a:noFill/>
-                      <a:prstDash val="solid"/>
-                      <a:round/>
-                      <a:headEnd type="none" w="med" len="med"/>
-                      <a:tailEnd type="none" w="med" len="med"/>
-                    </a:lnL>
-                    <a:lnR w="12700" cap="flat" cmpd="sng" algn="ctr">
-                      <a:noFill/>
-                      <a:prstDash val="solid"/>
-                      <a:round/>
-                      <a:headEnd type="none" w="med" len="med"/>
-                      <a:tailEnd type="none" w="med" len="med"/>
-                    </a:lnR>
-                    <a:lnT w="12700" cap="flat" cmpd="sng" algn="ctr">
-                      <a:noFill/>
-                      <a:prstDash val="solid"/>
-                      <a:round/>
-                      <a:headEnd type="none" w="med" len="med"/>
-                      <a:tailEnd type="none" w="med" len="med"/>
-                    </a:lnT>
-                    <a:lnB w="12700" cap="flat" cmpd="sng" algn="ctr">
-                      <a:noFill/>
-                      <a:prstDash val="solid"/>
-                      <a:round/>
-                      <a:headEnd type="none" w="med" len="med"/>
-                      <a:tailEnd type="none" w="med" len="med"/>
-                    </a:lnB>
-                    <a:lnTlToBr w="12700" cmpd="sng">
-                      <a:noFill/>
-                      <a:prstDash val="solid"/>
-                    </a:lnTlToBr>
-                    <a:lnBlToTr w="12700" cmpd="sng">
-                      <a:noFill/>
-                      <a:prstDash val="solid"/>
-                    </a:lnBlToTr>
-                    <a:solidFill>
-                      <a:schemeClr val="bg1"/>
-                    </a:solidFill>
-                  </a:tcPr>
-                </a:tc>
-                <a:extLst>
-                  <a:ext uri="{0D108BD9-81ED-4DB2-BD59-A6C34878D82A}">
-                    <a16:rowId xmlns:a16="http://schemas.microsoft.com/office/drawing/2014/main" val="1367113328"/>
-                  </a:ext>
-                </a:extLst>
-              </a:tr>
-              <a:tr h="324000">
-                <a:tc>
-                  <a:txBody>
-                    <a:bodyPr/>
-                    <a:lstStyle/>
-                    <a:p>
-                      <a:pPr algn="ctr"/>
-                      <a:endParaRPr lang="fr-FR" sz="1300" b="0" dirty="0">
-                        <a:solidFill>
-                          <a:schemeClr val="tx1"/>
-                        </a:solidFill>
-                        <a:latin typeface="Calibri" panose="020F0502020204030204" pitchFamily="34" charset="0"/>
-                        <a:cs typeface="Calibri" panose="020F0502020204030204" pitchFamily="34" charset="0"/>
-                      </a:endParaRPr>
-                    </a:p>
-                  </a:txBody>
-                  <a:tcPr>
-                    <a:lnL w="12700" cap="flat" cmpd="sng" algn="ctr">
-                      <a:noFill/>
-                      <a:prstDash val="solid"/>
-                      <a:round/>
-                      <a:headEnd type="none" w="med" len="med"/>
-                      <a:tailEnd type="none" w="med" len="med"/>
-                    </a:lnL>
-                    <a:lnR w="12700" cap="flat" cmpd="sng" algn="ctr">
-                      <a:noFill/>
-                      <a:prstDash val="solid"/>
-                      <a:round/>
-                      <a:headEnd type="none" w="med" len="med"/>
-                      <a:tailEnd type="none" w="med" len="med"/>
-                    </a:lnR>
-                    <a:lnT w="12700" cap="flat" cmpd="sng" algn="ctr">
-                      <a:noFill/>
-                      <a:prstDash val="solid"/>
-                      <a:round/>
-                      <a:headEnd type="none" w="med" len="med"/>
-                      <a:tailEnd type="none" w="med" len="med"/>
-                    </a:lnT>
-                    <a:lnB w="12700" cap="flat" cmpd="sng" algn="ctr">
-                      <a:noFill/>
-                      <a:prstDash val="solid"/>
-                      <a:round/>
-                      <a:headEnd type="none" w="med" len="med"/>
-                      <a:tailEnd type="none" w="med" len="med"/>
-                    </a:lnB>
-                    <a:lnTlToBr w="12700" cmpd="sng">
-                      <a:noFill/>
-                      <a:prstDash val="solid"/>
-                    </a:lnTlToBr>
-                    <a:lnBlToTr w="12700" cmpd="sng">
-                      <a:noFill/>
-                      <a:prstDash val="solid"/>
-                    </a:lnBlToTr>
-                    <a:solidFill>
-                      <a:schemeClr val="bg1"/>
-                    </a:solidFill>
-                  </a:tcPr>
-                </a:tc>
-                <a:tc>
-                  <a:txBody>
-                    <a:bodyPr/>
-                    <a:lstStyle/>
-                    <a:p>
-                      <a:pPr algn="ctr"/>
-                      <a:r>
-                        <a:rPr lang="fr-FR" sz="1300" b="0">
-                          <a:solidFill>
-                            <a:schemeClr val="tx1"/>
-                          </a:solidFill>
-                          <a:latin typeface="Calibri" panose="020F0502020204030204" pitchFamily="34" charset="0"/>
-                          <a:cs typeface="Calibri" panose="020F0502020204030204" pitchFamily="34" charset="0"/>
-                        </a:rPr>
-                        <a:t>€/m²</a:t>
-                      </a:r>
-                    </a:p>
-                  </a:txBody>
-                  <a:tcPr>
-                    <a:lnL w="12700" cap="flat" cmpd="sng" algn="ctr">
-                      <a:noFill/>
-                      <a:prstDash val="solid"/>
-                      <a:round/>
-                      <a:headEnd type="none" w="med" len="med"/>
-                      <a:tailEnd type="none" w="med" len="med"/>
-                    </a:lnL>
-                    <a:lnR w="12700" cap="flat" cmpd="sng" algn="ctr">
-                      <a:noFill/>
-                      <a:prstDash val="solid"/>
-                      <a:round/>
-                      <a:headEnd type="none" w="med" len="med"/>
-                      <a:tailEnd type="none" w="med" len="med"/>
-                    </a:lnR>
-                    <a:lnT w="12700" cap="flat" cmpd="sng" algn="ctr">
-                      <a:noFill/>
-                      <a:prstDash val="solid"/>
-                      <a:round/>
-                      <a:headEnd type="none" w="med" len="med"/>
-                      <a:tailEnd type="none" w="med" len="med"/>
-                    </a:lnT>
-                    <a:lnB w="12700" cap="flat" cmpd="sng" algn="ctr">
-                      <a:noFill/>
-                      <a:prstDash val="solid"/>
-                      <a:round/>
-                      <a:headEnd type="none" w="med" len="med"/>
-                      <a:tailEnd type="none" w="med" len="med"/>
-                    </a:lnB>
-                    <a:lnTlToBr w="12700" cmpd="sng">
-                      <a:noFill/>
-                      <a:prstDash val="solid"/>
-                    </a:lnTlToBr>
-                    <a:lnBlToTr w="12700" cmpd="sng">
-                      <a:noFill/>
-                      <a:prstDash val="solid"/>
-                    </a:lnBlToTr>
-                    <a:solidFill>
-                      <a:schemeClr val="bg1"/>
-                    </a:solidFill>
-                  </a:tcPr>
-                </a:tc>
-                <a:extLst>
-                  <a:ext uri="{0D108BD9-81ED-4DB2-BD59-A6C34878D82A}">
-                    <a16:rowId xmlns:a16="http://schemas.microsoft.com/office/drawing/2014/main" val="4131635550"/>
-                  </a:ext>
-                </a:extLst>
-              </a:tr>
-              <a:tr h="324000">
-                <a:tc>
-                  <a:txBody>
-                    <a:bodyPr/>
-                    <a:lstStyle/>
-                    <a:p>
-                      <a:pPr algn="ctr"/>
-                      <a:endParaRPr lang="fr-FR" sz="1300" b="0" dirty="0">
-                        <a:solidFill>
-                          <a:schemeClr val="tx1"/>
-                        </a:solidFill>
-                        <a:latin typeface="Calibri" panose="020F0502020204030204" pitchFamily="34" charset="0"/>
-                        <a:cs typeface="Calibri" panose="020F0502020204030204" pitchFamily="34" charset="0"/>
-                      </a:endParaRPr>
-                    </a:p>
-                  </a:txBody>
-                  <a:tcPr>
-                    <a:lnL w="12700" cap="flat" cmpd="sng" algn="ctr">
-                      <a:noFill/>
-                      <a:prstDash val="solid"/>
-                      <a:round/>
-                      <a:headEnd type="none" w="med" len="med"/>
-                      <a:tailEnd type="none" w="med" len="med"/>
-                    </a:lnL>
-                    <a:lnR w="12700" cap="flat" cmpd="sng" algn="ctr">
-                      <a:noFill/>
-                      <a:prstDash val="solid"/>
-                      <a:round/>
-                      <a:headEnd type="none" w="med" len="med"/>
-                      <a:tailEnd type="none" w="med" len="med"/>
-                    </a:lnR>
-                    <a:lnT w="12700" cap="flat" cmpd="sng" algn="ctr">
-                      <a:noFill/>
-                      <a:prstDash val="solid"/>
-                      <a:round/>
-                      <a:headEnd type="none" w="med" len="med"/>
-                      <a:tailEnd type="none" w="med" len="med"/>
-                    </a:lnT>
-                    <a:lnB w="12700" cap="flat" cmpd="sng" algn="ctr">
-                      <a:noFill/>
-                      <a:prstDash val="solid"/>
-                      <a:round/>
-                      <a:headEnd type="none" w="med" len="med"/>
-                      <a:tailEnd type="none" w="med" len="med"/>
-                    </a:lnB>
-                    <a:lnTlToBr w="12700" cmpd="sng">
-                      <a:noFill/>
-                      <a:prstDash val="solid"/>
-                    </a:lnTlToBr>
-                    <a:lnBlToTr w="12700" cmpd="sng">
-                      <a:noFill/>
-                      <a:prstDash val="solid"/>
-                    </a:lnBlToTr>
-                    <a:solidFill>
-                      <a:schemeClr val="bg1"/>
-                    </a:solidFill>
-                  </a:tcPr>
-                </a:tc>
-                <a:tc>
-                  <a:txBody>
-                    <a:bodyPr/>
-                    <a:lstStyle/>
-                    <a:p>
-                      <a:pPr algn="ctr"/>
-                      <a:r>
-                        <a:rPr lang="fr-FR" sz="1300" b="0">
-                          <a:solidFill>
-                            <a:schemeClr val="tx1"/>
-                          </a:solidFill>
-                          <a:latin typeface="Calibri" panose="020F0502020204030204" pitchFamily="34" charset="0"/>
-                          <a:cs typeface="Calibri" panose="020F0502020204030204" pitchFamily="34" charset="0"/>
-                        </a:rPr>
-                        <a:t>€/m²</a:t>
-                      </a:r>
-                    </a:p>
-                  </a:txBody>
-                  <a:tcPr>
-                    <a:lnL w="12700" cap="flat" cmpd="sng" algn="ctr">
-                      <a:noFill/>
-                      <a:prstDash val="solid"/>
-                      <a:round/>
-                      <a:headEnd type="none" w="med" len="med"/>
-                      <a:tailEnd type="none" w="med" len="med"/>
-                    </a:lnL>
-                    <a:lnR w="12700" cap="flat" cmpd="sng" algn="ctr">
-                      <a:noFill/>
-                      <a:prstDash val="solid"/>
-                      <a:round/>
-                      <a:headEnd type="none" w="med" len="med"/>
-                      <a:tailEnd type="none" w="med" len="med"/>
-                    </a:lnR>
-                    <a:lnT w="12700" cap="flat" cmpd="sng" algn="ctr">
-                      <a:noFill/>
-                      <a:prstDash val="solid"/>
-                      <a:round/>
-                      <a:headEnd type="none" w="med" len="med"/>
-                      <a:tailEnd type="none" w="med" len="med"/>
-                    </a:lnT>
-                    <a:lnB w="12700" cap="flat" cmpd="sng" algn="ctr">
-                      <a:noFill/>
-                      <a:prstDash val="solid"/>
-                      <a:round/>
-                      <a:headEnd type="none" w="med" len="med"/>
-                      <a:tailEnd type="none" w="med" len="med"/>
-                    </a:lnB>
-                    <a:lnTlToBr w="12700" cmpd="sng">
-                      <a:noFill/>
-                      <a:prstDash val="solid"/>
-                    </a:lnTlToBr>
-                    <a:lnBlToTr w="12700" cmpd="sng">
-                      <a:noFill/>
-                      <a:prstDash val="solid"/>
-                    </a:lnBlToTr>
-                    <a:solidFill>
-                      <a:schemeClr val="bg1"/>
-                    </a:solidFill>
-                  </a:tcPr>
-                </a:tc>
-                <a:extLst>
-                  <a:ext uri="{0D108BD9-81ED-4DB2-BD59-A6C34878D82A}">
-                    <a16:rowId xmlns:a16="http://schemas.microsoft.com/office/drawing/2014/main" val="2710022400"/>
-                  </a:ext>
-                </a:extLst>
-              </a:tr>
-              <a:tr h="324000">
-                <a:tc>
-                  <a:txBody>
-                    <a:bodyPr/>
-                    <a:lstStyle/>
-                    <a:p>
-                      <a:pPr algn="ctr"/>
-                      <a:endParaRPr lang="fr-FR" sz="1300" b="0" dirty="0">
-                        <a:solidFill>
-                          <a:schemeClr val="tx1"/>
-                        </a:solidFill>
-                        <a:latin typeface="Calibri" panose="020F0502020204030204" pitchFamily="34" charset="0"/>
-                        <a:cs typeface="Calibri" panose="020F0502020204030204" pitchFamily="34" charset="0"/>
-                      </a:endParaRPr>
-                    </a:p>
-                  </a:txBody>
-                  <a:tcPr>
-                    <a:lnL w="12700" cap="flat" cmpd="sng" algn="ctr">
-                      <a:noFill/>
-                      <a:prstDash val="solid"/>
-                      <a:round/>
-                      <a:headEnd type="none" w="med" len="med"/>
-                      <a:tailEnd type="none" w="med" len="med"/>
-                    </a:lnL>
-                    <a:lnR w="12700" cap="flat" cmpd="sng" algn="ctr">
-                      <a:noFill/>
-                      <a:prstDash val="solid"/>
-                      <a:round/>
-                      <a:headEnd type="none" w="med" len="med"/>
-                      <a:tailEnd type="none" w="med" len="med"/>
-                    </a:lnR>
-                    <a:lnT w="12700" cap="flat" cmpd="sng" algn="ctr">
-                      <a:noFill/>
-                      <a:prstDash val="solid"/>
-                      <a:round/>
-                      <a:headEnd type="none" w="med" len="med"/>
-                      <a:tailEnd type="none" w="med" len="med"/>
-                    </a:lnT>
-                    <a:lnB w="12700" cap="flat" cmpd="sng" algn="ctr">
-                      <a:noFill/>
-                      <a:prstDash val="solid"/>
-                      <a:round/>
-                      <a:headEnd type="none" w="med" len="med"/>
-                      <a:tailEnd type="none" w="med" len="med"/>
-                    </a:lnB>
-                    <a:lnTlToBr w="12700" cmpd="sng">
-                      <a:noFill/>
-                      <a:prstDash val="solid"/>
-                    </a:lnTlToBr>
-                    <a:lnBlToTr w="12700" cmpd="sng">
-                      <a:noFill/>
-                      <a:prstDash val="solid"/>
-                    </a:lnBlToTr>
-                    <a:solidFill>
-                      <a:schemeClr val="bg1"/>
-                    </a:solidFill>
-                  </a:tcPr>
-                </a:tc>
-                <a:tc>
-                  <a:txBody>
-                    <a:bodyPr/>
-                    <a:lstStyle/>
-                    <a:p>
-                      <a:pPr algn="ctr"/>
-                      <a:r>
-                        <a:rPr lang="fr-FR" sz="1300" b="0">
-                          <a:solidFill>
-                            <a:schemeClr val="tx1"/>
-                          </a:solidFill>
-                          <a:latin typeface="Calibri" panose="020F0502020204030204" pitchFamily="34" charset="0"/>
-                          <a:cs typeface="Calibri" panose="020F0502020204030204" pitchFamily="34" charset="0"/>
-                        </a:rPr>
-                        <a:t>€/m²</a:t>
-                      </a:r>
-                    </a:p>
-                  </a:txBody>
-                  <a:tcPr>
-                    <a:lnL w="12700" cap="flat" cmpd="sng" algn="ctr">
-                      <a:noFill/>
-                      <a:prstDash val="solid"/>
-                      <a:round/>
-                      <a:headEnd type="none" w="med" len="med"/>
-                      <a:tailEnd type="none" w="med" len="med"/>
-                    </a:lnL>
-                    <a:lnR w="12700" cap="flat" cmpd="sng" algn="ctr">
-                      <a:noFill/>
-                      <a:prstDash val="solid"/>
-                      <a:round/>
-                      <a:headEnd type="none" w="med" len="med"/>
-                      <a:tailEnd type="none" w="med" len="med"/>
-                    </a:lnR>
-                    <a:lnT w="12700" cap="flat" cmpd="sng" algn="ctr">
-                      <a:noFill/>
-                      <a:prstDash val="solid"/>
-                      <a:round/>
-                      <a:headEnd type="none" w="med" len="med"/>
-                      <a:tailEnd type="none" w="med" len="med"/>
-                    </a:lnT>
-                    <a:lnB w="12700" cap="flat" cmpd="sng" algn="ctr">
-                      <a:noFill/>
-                      <a:prstDash val="solid"/>
-                      <a:round/>
-                      <a:headEnd type="none" w="med" len="med"/>
-                      <a:tailEnd type="none" w="med" len="med"/>
-                    </a:lnB>
-                    <a:lnTlToBr w="12700" cmpd="sng">
-                      <a:noFill/>
-                      <a:prstDash val="solid"/>
-                    </a:lnTlToBr>
-                    <a:lnBlToTr w="12700" cmpd="sng">
-                      <a:noFill/>
-                      <a:prstDash val="solid"/>
-                    </a:lnBlToTr>
-                    <a:solidFill>
-                      <a:schemeClr val="bg1"/>
-                    </a:solidFill>
-                  </a:tcPr>
-                </a:tc>
-                <a:extLst>
-                  <a:ext uri="{0D108BD9-81ED-4DB2-BD59-A6C34878D82A}">
-                    <a16:rowId xmlns:a16="http://schemas.microsoft.com/office/drawing/2014/main" val="4250254318"/>
-                  </a:ext>
-                </a:extLst>
-              </a:tr>
-              <a:tr h="324000">
-                <a:tc>
-                  <a:txBody>
-                    <a:bodyPr/>
-                    <a:lstStyle/>
-                    <a:p>
-                      <a:pPr algn="ctr"/>
-                      <a:endParaRPr lang="fr-FR" sz="1300" b="0" dirty="0">
-                        <a:solidFill>
-                          <a:schemeClr val="tx1"/>
-                        </a:solidFill>
-                        <a:latin typeface="Calibri" panose="020F0502020204030204" pitchFamily="34" charset="0"/>
-                        <a:cs typeface="Calibri" panose="020F0502020204030204" pitchFamily="34" charset="0"/>
-                      </a:endParaRPr>
-                    </a:p>
-                  </a:txBody>
-                  <a:tcPr>
-                    <a:lnL w="12700" cap="flat" cmpd="sng" algn="ctr">
-                      <a:noFill/>
-                      <a:prstDash val="solid"/>
-                      <a:round/>
-                      <a:headEnd type="none" w="med" len="med"/>
-                      <a:tailEnd type="none" w="med" len="med"/>
-                    </a:lnL>
-                    <a:lnR w="12700" cap="flat" cmpd="sng" algn="ctr">
-                      <a:noFill/>
-                      <a:prstDash val="solid"/>
-                      <a:round/>
-                      <a:headEnd type="none" w="med" len="med"/>
-                      <a:tailEnd type="none" w="med" len="med"/>
-                    </a:lnR>
-                    <a:lnT w="12700" cap="flat" cmpd="sng" algn="ctr">
-                      <a:noFill/>
-                      <a:prstDash val="solid"/>
-                      <a:round/>
-                      <a:headEnd type="none" w="med" len="med"/>
-                      <a:tailEnd type="none" w="med" len="med"/>
-                    </a:lnT>
-                    <a:lnB w="12700" cap="flat" cmpd="sng" algn="ctr">
-                      <a:noFill/>
-                      <a:prstDash val="solid"/>
-                      <a:round/>
-                      <a:headEnd type="none" w="med" len="med"/>
-                      <a:tailEnd type="none" w="med" len="med"/>
-                    </a:lnB>
-                    <a:lnTlToBr w="12700" cmpd="sng">
-                      <a:noFill/>
-                      <a:prstDash val="solid"/>
-                    </a:lnTlToBr>
-                    <a:lnBlToTr w="12700" cmpd="sng">
-                      <a:noFill/>
-                      <a:prstDash val="solid"/>
-                    </a:lnBlToTr>
-                    <a:solidFill>
-                      <a:schemeClr val="bg1"/>
-                    </a:solidFill>
-                  </a:tcPr>
-                </a:tc>
-                <a:tc>
-                  <a:txBody>
-                    <a:bodyPr/>
-                    <a:lstStyle/>
-                    <a:p>
-                      <a:pPr algn="ctr"/>
-                      <a:r>
-                        <a:rPr lang="fr-FR" sz="1300" b="0" dirty="0">
-                          <a:solidFill>
-                            <a:schemeClr val="tx1"/>
-                          </a:solidFill>
-                          <a:latin typeface="Calibri" panose="020F0502020204030204" pitchFamily="34" charset="0"/>
-                          <a:cs typeface="Calibri" panose="020F0502020204030204" pitchFamily="34" charset="0"/>
-                        </a:rPr>
-                        <a:t>€/m²</a:t>
-                      </a:r>
-                    </a:p>
-                  </a:txBody>
-                  <a:tcPr>
-                    <a:lnL w="12700" cap="flat" cmpd="sng" algn="ctr">
-                      <a:noFill/>
-                      <a:prstDash val="solid"/>
-                      <a:round/>
-                      <a:headEnd type="none" w="med" len="med"/>
-                      <a:tailEnd type="none" w="med" len="med"/>
-                    </a:lnL>
-                    <a:lnR w="12700" cap="flat" cmpd="sng" algn="ctr">
-                      <a:noFill/>
-                      <a:prstDash val="solid"/>
-                      <a:round/>
-                      <a:headEnd type="none" w="med" len="med"/>
-                      <a:tailEnd type="none" w="med" len="med"/>
-                    </a:lnR>
-                    <a:lnT w="12700" cap="flat" cmpd="sng" algn="ctr">
-                      <a:noFill/>
-                      <a:prstDash val="solid"/>
-                      <a:round/>
-                      <a:headEnd type="none" w="med" len="med"/>
-                      <a:tailEnd type="none" w="med" len="med"/>
-                    </a:lnT>
-                    <a:lnB w="12700" cap="flat" cmpd="sng" algn="ctr">
-                      <a:noFill/>
-                      <a:prstDash val="solid"/>
-                      <a:round/>
-                      <a:headEnd type="none" w="med" len="med"/>
-                      <a:tailEnd type="none" w="med" len="med"/>
-                    </a:lnB>
-                    <a:lnTlToBr w="12700" cmpd="sng">
-                      <a:noFill/>
-                      <a:prstDash val="solid"/>
-                    </a:lnTlToBr>
-                    <a:lnBlToTr w="12700" cmpd="sng">
-                      <a:noFill/>
-                      <a:prstDash val="solid"/>
-                    </a:lnBlToTr>
-                    <a:solidFill>
-                      <a:schemeClr val="bg1"/>
-                    </a:solidFill>
-                  </a:tcPr>
-                </a:tc>
-                <a:extLst>
-                  <a:ext uri="{0D108BD9-81ED-4DB2-BD59-A6C34878D82A}">
-                    <a16:rowId xmlns:a16="http://schemas.microsoft.com/office/drawing/2014/main" val="4133803510"/>
-                  </a:ext>
-                </a:extLst>
-              </a:tr>
-            </a:tbl>
-          </a:graphicData>
-        </a:graphic>
-      </p:graphicFrame>
-      <p:sp>
-        <p:nvSpPr>
-          <p:cNvPr id="22" name="Ellipse 21">
-            <a:extLst>
-              <a:ext uri="{FF2B5EF4-FFF2-40B4-BE49-F238E27FC236}">
-                <a16:creationId xmlns:a16="http://schemas.microsoft.com/office/drawing/2014/main" id="{B650E91C-C5C9-80C6-C5A6-979EDE70D83F}"/>
-              </a:ext>
-            </a:extLst>
-          </p:cNvPr>
-          <p:cNvSpPr/>
-          <p:nvPr/>
-        </p:nvSpPr>
-        <p:spPr>
-          <a:xfrm>
-            <a:off x="4184514" y="4394216"/>
-            <a:ext cx="239060" cy="239060"/>
-          </a:xfrm>
-          <a:prstGeom prst="ellipse">
-            <a:avLst/>
-          </a:prstGeom>
-          <a:solidFill>
-            <a:srgbClr val="004579"/>
-          </a:solidFill>
-          <a:ln>
-            <a:noFill/>
-          </a:ln>
-        </p:spPr>
-        <p:style>
-          <a:lnRef idx="2">
-            <a:schemeClr val="accent1">
-              <a:shade val="50000"/>
-            </a:schemeClr>
-          </a:lnRef>
-          <a:fillRef idx="1">
-            <a:schemeClr val="accent1"/>
-          </a:fillRef>
-          <a:effectRef idx="0">
-            <a:schemeClr val="accent1"/>
-          </a:effectRef>
-          <a:fontRef idx="minor">
-            <a:schemeClr val="lt1"/>
-          </a:fontRef>
-        </p:style>
-        <p:txBody>
-          <a:bodyPr rtlCol="0" anchor="ctr"/>
-          <a:lstStyle/>
-          <a:p>
-            <a:pPr marL="0" marR="0" lvl="0" indent="0" algn="ctr" defTabSz="914400" rtl="0" eaLnBrk="1" fontAlgn="auto" latinLnBrk="0" hangingPunct="1">
-              <a:lnSpc>
-                <a:spcPct val="100000"/>
-              </a:lnSpc>
-              <a:spcBef>
-                <a:spcPts val="0"/>
-              </a:spcBef>
-              <a:spcAft>
-                <a:spcPts val="0"/>
-              </a:spcAft>
-              <a:buClrTx/>
-              <a:buSzTx/>
-              <a:buFontTx/>
-              <a:buNone/>
-              <a:tabLst/>
-              <a:defRPr/>
-            </a:pPr>
-            <a:endParaRPr kumimoji="0" lang="fr-FR" sz="1800" b="0" i="0" u="none" strike="noStrike" kern="1200" cap="none" spc="0" normalizeH="0" baseline="0" noProof="0">
-              <a:ln>
-                <a:noFill/>
-              </a:ln>
-              <a:solidFill>
-                <a:srgbClr val="FFFFFF"/>
-              </a:solidFill>
-              <a:effectLst/>
-              <a:uLnTx/>
-              <a:uFillTx/>
-              <a:latin typeface="Century Gothic" panose="020F0302020204030204"/>
-              <a:ea typeface="+mn-ea"/>
-              <a:cs typeface="+mn-cs"/>
-            </a:endParaRPr>
-          </a:p>
-        </p:txBody>
-      </p:sp>
-      <p:sp>
-        <p:nvSpPr>
-          <p:cNvPr id="23" name="Ellipse 22">
-            <a:extLst>
-              <a:ext uri="{FF2B5EF4-FFF2-40B4-BE49-F238E27FC236}">
-                <a16:creationId xmlns:a16="http://schemas.microsoft.com/office/drawing/2014/main" id="{976BC517-50DE-15EB-FA2F-DDF43903459C}"/>
-              </a:ext>
-            </a:extLst>
-          </p:cNvPr>
-          <p:cNvSpPr/>
-          <p:nvPr/>
-        </p:nvSpPr>
-        <p:spPr>
-          <a:xfrm>
-            <a:off x="4184514" y="4714941"/>
-            <a:ext cx="239060" cy="239060"/>
-          </a:xfrm>
-          <a:prstGeom prst="ellipse">
-            <a:avLst/>
-          </a:prstGeom>
-          <a:solidFill>
-            <a:srgbClr val="F2C504"/>
-          </a:solidFill>
-          <a:ln>
-            <a:noFill/>
-          </a:ln>
-        </p:spPr>
-        <p:style>
-          <a:lnRef idx="2">
-            <a:schemeClr val="accent1">
-              <a:shade val="50000"/>
-            </a:schemeClr>
-          </a:lnRef>
-          <a:fillRef idx="1">
-            <a:schemeClr val="accent1"/>
-          </a:fillRef>
-          <a:effectRef idx="0">
-            <a:schemeClr val="accent1"/>
-          </a:effectRef>
-          <a:fontRef idx="minor">
-            <a:schemeClr val="lt1"/>
-          </a:fontRef>
-        </p:style>
-        <p:txBody>
-          <a:bodyPr rtlCol="0" anchor="ctr"/>
-          <a:lstStyle/>
-          <a:p>
-            <a:pPr marL="0" marR="0" lvl="0" indent="0" algn="ctr" defTabSz="914400" rtl="0" eaLnBrk="1" fontAlgn="auto" latinLnBrk="0" hangingPunct="1">
-              <a:lnSpc>
-                <a:spcPct val="100000"/>
-              </a:lnSpc>
-              <a:spcBef>
-                <a:spcPts val="0"/>
-              </a:spcBef>
-              <a:spcAft>
-                <a:spcPts val="0"/>
-              </a:spcAft>
-              <a:buClrTx/>
-              <a:buSzTx/>
-              <a:buFontTx/>
-              <a:buNone/>
-              <a:tabLst/>
-              <a:defRPr/>
-            </a:pPr>
-            <a:endParaRPr kumimoji="0" lang="fr-FR" sz="1800" b="0" i="0" u="none" strike="noStrike" kern="1200" cap="none" spc="0" normalizeH="0" baseline="0" noProof="0">
-              <a:ln>
-                <a:noFill/>
-              </a:ln>
-              <a:solidFill>
-                <a:srgbClr val="FFFFFF"/>
-              </a:solidFill>
-              <a:effectLst/>
-              <a:uLnTx/>
-              <a:uFillTx/>
-              <a:latin typeface="Century Gothic" panose="020F0302020204030204"/>
-              <a:ea typeface="+mn-ea"/>
-              <a:cs typeface="+mn-cs"/>
-            </a:endParaRPr>
-          </a:p>
-        </p:txBody>
-      </p:sp>
-      <p:sp>
-        <p:nvSpPr>
-          <p:cNvPr id="24" name="Ellipse 23">
-            <a:extLst>
-              <a:ext uri="{FF2B5EF4-FFF2-40B4-BE49-F238E27FC236}">
-                <a16:creationId xmlns:a16="http://schemas.microsoft.com/office/drawing/2014/main" id="{770C27DE-B3CE-329D-7E4A-92808A296B17}"/>
-              </a:ext>
-            </a:extLst>
-          </p:cNvPr>
-          <p:cNvSpPr/>
-          <p:nvPr/>
-        </p:nvSpPr>
-        <p:spPr>
-          <a:xfrm>
-            <a:off x="4184514" y="5029415"/>
-            <a:ext cx="239060" cy="239060"/>
-          </a:xfrm>
-          <a:prstGeom prst="ellipse">
-            <a:avLst/>
-          </a:prstGeom>
-          <a:solidFill>
-            <a:srgbClr val="BF3FFF"/>
-          </a:solidFill>
-          <a:ln>
-            <a:noFill/>
-          </a:ln>
-        </p:spPr>
-        <p:style>
-          <a:lnRef idx="2">
-            <a:schemeClr val="accent1">
-              <a:shade val="50000"/>
-            </a:schemeClr>
-          </a:lnRef>
-          <a:fillRef idx="1">
-            <a:schemeClr val="accent1"/>
-          </a:fillRef>
-          <a:effectRef idx="0">
-            <a:schemeClr val="accent1"/>
-          </a:effectRef>
-          <a:fontRef idx="minor">
-            <a:schemeClr val="lt1"/>
-          </a:fontRef>
-        </p:style>
-        <p:txBody>
-          <a:bodyPr rtlCol="0" anchor="ctr"/>
-          <a:lstStyle/>
-          <a:p>
-            <a:pPr marL="0" marR="0" lvl="0" indent="0" algn="ctr" defTabSz="914400" rtl="0" eaLnBrk="1" fontAlgn="auto" latinLnBrk="0" hangingPunct="1">
-              <a:lnSpc>
-                <a:spcPct val="100000"/>
-              </a:lnSpc>
-              <a:spcBef>
-                <a:spcPts val="0"/>
-              </a:spcBef>
-              <a:spcAft>
-                <a:spcPts val="0"/>
-              </a:spcAft>
-              <a:buClrTx/>
-              <a:buSzTx/>
-              <a:buFontTx/>
-              <a:buNone/>
-              <a:tabLst/>
-              <a:defRPr/>
-            </a:pPr>
-            <a:endParaRPr kumimoji="0" lang="fr-FR" sz="1800" b="0" i="0" u="none" strike="noStrike" kern="1200" cap="none" spc="0" normalizeH="0" baseline="0" noProof="0">
-              <a:ln>
-                <a:noFill/>
-              </a:ln>
-              <a:solidFill>
-                <a:srgbClr val="FFFFFF"/>
-              </a:solidFill>
-              <a:effectLst/>
-              <a:uLnTx/>
-              <a:uFillTx/>
-              <a:latin typeface="Century Gothic" panose="020F0302020204030204"/>
-              <a:ea typeface="+mn-ea"/>
-              <a:cs typeface="+mn-cs"/>
-            </a:endParaRPr>
-          </a:p>
-        </p:txBody>
-      </p:sp>
-      <p:sp>
-        <p:nvSpPr>
-          <p:cNvPr id="25" name="Ellipse 24">
-            <a:extLst>
-              <a:ext uri="{FF2B5EF4-FFF2-40B4-BE49-F238E27FC236}">
-                <a16:creationId xmlns:a16="http://schemas.microsoft.com/office/drawing/2014/main" id="{41BCBA61-82F0-D016-F7E3-6F23D287140D}"/>
-              </a:ext>
-            </a:extLst>
-          </p:cNvPr>
-          <p:cNvSpPr/>
-          <p:nvPr/>
-        </p:nvSpPr>
-        <p:spPr>
-          <a:xfrm>
-            <a:off x="4184514" y="5352053"/>
-            <a:ext cx="239060" cy="239060"/>
-          </a:xfrm>
-          <a:prstGeom prst="ellipse">
-            <a:avLst/>
-          </a:prstGeom>
-          <a:solidFill>
-            <a:srgbClr val="EB6B0A"/>
-          </a:solidFill>
-          <a:ln>
-            <a:noFill/>
-          </a:ln>
-        </p:spPr>
-        <p:style>
-          <a:lnRef idx="2">
-            <a:schemeClr val="accent1">
-              <a:shade val="50000"/>
-            </a:schemeClr>
-          </a:lnRef>
-          <a:fillRef idx="1">
-            <a:schemeClr val="accent1"/>
-          </a:fillRef>
-          <a:effectRef idx="0">
-            <a:schemeClr val="accent1"/>
-          </a:effectRef>
-          <a:fontRef idx="minor">
-            <a:schemeClr val="lt1"/>
-          </a:fontRef>
-        </p:style>
-        <p:txBody>
-          <a:bodyPr rtlCol="0" anchor="ctr"/>
-          <a:lstStyle/>
-          <a:p>
-            <a:pPr marL="0" marR="0" lvl="0" indent="0" algn="ctr" defTabSz="914400" rtl="0" eaLnBrk="1" fontAlgn="auto" latinLnBrk="0" hangingPunct="1">
-              <a:lnSpc>
-                <a:spcPct val="100000"/>
-              </a:lnSpc>
-              <a:spcBef>
-                <a:spcPts val="0"/>
-              </a:spcBef>
-              <a:spcAft>
-                <a:spcPts val="0"/>
-              </a:spcAft>
-              <a:buClrTx/>
-              <a:buSzTx/>
-              <a:buFontTx/>
-              <a:buNone/>
-              <a:tabLst/>
-              <a:defRPr/>
-            </a:pPr>
-            <a:endParaRPr kumimoji="0" lang="fr-FR" sz="1800" b="0" i="0" u="none" strike="noStrike" kern="1200" cap="none" spc="0" normalizeH="0" baseline="0" noProof="0">
-              <a:ln>
-                <a:noFill/>
-              </a:ln>
-              <a:solidFill>
-                <a:srgbClr val="FFFFFF"/>
-              </a:solidFill>
-              <a:effectLst/>
-              <a:uLnTx/>
-              <a:uFillTx/>
-              <a:latin typeface="Century Gothic" panose="020F0302020204030204"/>
-              <a:ea typeface="+mn-ea"/>
-              <a:cs typeface="+mn-cs"/>
-            </a:endParaRPr>
-          </a:p>
-        </p:txBody>
-      </p:sp>
-      <p:sp>
-        <p:nvSpPr>
-          <p:cNvPr id="26" name="Ellipse 25">
-            <a:extLst>
-              <a:ext uri="{FF2B5EF4-FFF2-40B4-BE49-F238E27FC236}">
-                <a16:creationId xmlns:a16="http://schemas.microsoft.com/office/drawing/2014/main" id="{DEC984F8-E7B1-2DA3-C69F-3EBFD418546B}"/>
-              </a:ext>
-            </a:extLst>
-          </p:cNvPr>
-          <p:cNvSpPr/>
-          <p:nvPr/>
-        </p:nvSpPr>
-        <p:spPr>
-          <a:xfrm>
-            <a:off x="4184514" y="5675585"/>
-            <a:ext cx="239060" cy="239060"/>
-          </a:xfrm>
-          <a:prstGeom prst="ellipse">
-            <a:avLst/>
-          </a:prstGeom>
-          <a:solidFill>
-            <a:srgbClr val="86B918"/>
-          </a:solidFill>
-          <a:ln>
-            <a:noFill/>
-          </a:ln>
-        </p:spPr>
-        <p:style>
-          <a:lnRef idx="2">
-            <a:schemeClr val="accent1">
-              <a:shade val="50000"/>
-            </a:schemeClr>
-          </a:lnRef>
-          <a:fillRef idx="1">
-            <a:schemeClr val="accent1"/>
-          </a:fillRef>
-          <a:effectRef idx="0">
-            <a:schemeClr val="accent1"/>
-          </a:effectRef>
-          <a:fontRef idx="minor">
-            <a:schemeClr val="lt1"/>
-          </a:fontRef>
-        </p:style>
-        <p:txBody>
-          <a:bodyPr rtlCol="0" anchor="ctr"/>
-          <a:lstStyle/>
-          <a:p>
-            <a:pPr marL="0" marR="0" lvl="0" indent="0" algn="ctr" defTabSz="914400" rtl="0" eaLnBrk="1" fontAlgn="auto" latinLnBrk="0" hangingPunct="1">
-              <a:lnSpc>
-                <a:spcPct val="100000"/>
-              </a:lnSpc>
-              <a:spcBef>
-                <a:spcPts val="0"/>
-              </a:spcBef>
-              <a:spcAft>
-                <a:spcPts val="0"/>
-              </a:spcAft>
-              <a:buClrTx/>
-              <a:buSzTx/>
-              <a:buFontTx/>
-              <a:buNone/>
-              <a:tabLst/>
-              <a:defRPr/>
-            </a:pPr>
-            <a:endParaRPr kumimoji="0" lang="fr-FR" sz="1800" b="0" i="0" u="none" strike="noStrike" kern="1200" cap="none" spc="0" normalizeH="0" baseline="0" noProof="0">
-              <a:ln>
-                <a:noFill/>
-              </a:ln>
-              <a:solidFill>
-                <a:srgbClr val="FFFFFF"/>
-              </a:solidFill>
-              <a:effectLst/>
-              <a:uLnTx/>
-              <a:uFillTx/>
-              <a:latin typeface="Century Gothic" panose="020F0302020204030204"/>
-              <a:ea typeface="+mn-ea"/>
-              <a:cs typeface="+mn-cs"/>
-            </a:endParaRPr>
-          </a:p>
-        </p:txBody>
-      </p:sp>
-      <p:sp>
-        <p:nvSpPr>
-          <p:cNvPr id="27" name="Ellipse 26">
-            <a:extLst>
-              <a:ext uri="{FF2B5EF4-FFF2-40B4-BE49-F238E27FC236}">
-                <a16:creationId xmlns:a16="http://schemas.microsoft.com/office/drawing/2014/main" id="{144BBF8A-E1B8-D2F0-92D5-A86A9B56DC36}"/>
-              </a:ext>
-            </a:extLst>
-          </p:cNvPr>
-          <p:cNvSpPr/>
-          <p:nvPr/>
-        </p:nvSpPr>
-        <p:spPr>
-          <a:xfrm>
-            <a:off x="4188741" y="6022181"/>
-            <a:ext cx="239060" cy="239060"/>
-          </a:xfrm>
-          <a:prstGeom prst="ellipse">
-            <a:avLst/>
-          </a:prstGeom>
-          <a:solidFill>
-            <a:srgbClr val="008000"/>
-          </a:solidFill>
-          <a:ln>
-            <a:noFill/>
-          </a:ln>
-        </p:spPr>
-        <p:style>
-          <a:lnRef idx="2">
-            <a:schemeClr val="accent1">
-              <a:shade val="50000"/>
-            </a:schemeClr>
-          </a:lnRef>
-          <a:fillRef idx="1">
-            <a:schemeClr val="accent1"/>
-          </a:fillRef>
-          <a:effectRef idx="0">
-            <a:schemeClr val="accent1"/>
-          </a:effectRef>
-          <a:fontRef idx="minor">
-            <a:schemeClr val="lt1"/>
-          </a:fontRef>
-        </p:style>
-        <p:txBody>
-          <a:bodyPr rtlCol="0" anchor="ctr"/>
-          <a:lstStyle/>
-          <a:p>
-            <a:pPr marL="0" marR="0" lvl="0" indent="0" algn="ctr" defTabSz="914400" rtl="0" eaLnBrk="1" fontAlgn="auto" latinLnBrk="0" hangingPunct="1">
-              <a:lnSpc>
-                <a:spcPct val="100000"/>
-              </a:lnSpc>
-              <a:spcBef>
-                <a:spcPts val="0"/>
-              </a:spcBef>
-              <a:spcAft>
-                <a:spcPts val="0"/>
-              </a:spcAft>
-              <a:buClrTx/>
-              <a:buSzTx/>
-              <a:buFontTx/>
-              <a:buNone/>
-              <a:tabLst/>
-              <a:defRPr/>
-            </a:pPr>
-            <a:endParaRPr kumimoji="0" lang="fr-FR" sz="1800" b="0" i="0" u="none" strike="noStrike" kern="1200" cap="none" spc="0" normalizeH="0" baseline="0" noProof="0">
-              <a:ln>
-                <a:noFill/>
-              </a:ln>
-              <a:solidFill>
-                <a:srgbClr val="FFFFFF"/>
-              </a:solidFill>
-              <a:effectLst/>
-              <a:uLnTx/>
-              <a:uFillTx/>
-              <a:latin typeface="Century Gothic" panose="020F0302020204030204"/>
-              <a:ea typeface="+mn-ea"/>
-              <a:cs typeface="+mn-cs"/>
-            </a:endParaRPr>
-          </a:p>
-        </p:txBody>
-      </p:sp>
-      <p:graphicFrame>
-        <p:nvGraphicFramePr>
           <p:cNvPr id="6" name="tableauApprovisionnementEnergetique">
             <a:extLst>
               <a:ext uri="{FF2B5EF4-FFF2-40B4-BE49-F238E27FC236}">
@@ -10036,6 +7659,598 @@
           <a:p>
             <a:pPr algn="ctr"/>
             <a:endParaRPr lang="fr-FR" sz="1600"/>
+          </a:p>
+        </p:txBody>
+      </p:sp>
+      <p:sp>
+        <p:nvSpPr>
+          <p:cNvPr id="5" name="graphique1">
+            <a:extLst>
+              <a:ext uri="{FF2B5EF4-FFF2-40B4-BE49-F238E27FC236}">
+                <a16:creationId xmlns:a16="http://schemas.microsoft.com/office/drawing/2014/main" id="{C8CF6A92-7C9B-71A9-56FC-C060D61BA909}"/>
+              </a:ext>
+            </a:extLst>
+          </p:cNvPr>
+          <p:cNvSpPr/>
+          <p:nvPr/>
+        </p:nvSpPr>
+        <p:spPr>
+          <a:xfrm>
+            <a:off x="434109" y="1266887"/>
+            <a:ext cx="3678685" cy="2446131"/>
+          </a:xfrm>
+          <a:prstGeom prst="rect">
+            <a:avLst/>
+          </a:prstGeom>
+          <a:noFill/>
+        </p:spPr>
+        <p:style>
+          <a:lnRef idx="2">
+            <a:schemeClr val="accent1">
+              <a:shade val="15000"/>
+            </a:schemeClr>
+          </a:lnRef>
+          <a:fillRef idx="1">
+            <a:schemeClr val="accent1"/>
+          </a:fillRef>
+          <a:effectRef idx="0">
+            <a:schemeClr val="accent1"/>
+          </a:effectRef>
+          <a:fontRef idx="minor">
+            <a:schemeClr val="lt1"/>
+          </a:fontRef>
+        </p:style>
+        <p:txBody>
+          <a:bodyPr rtlCol="0" anchor="ctr"/>
+          <a:lstStyle/>
+          <a:p>
+            <a:pPr algn="ctr"/>
+            <a:endParaRPr lang="fr-FR">
+              <a:ln>
+                <a:solidFill>
+                  <a:schemeClr val="tx1"/>
+                </a:solidFill>
+              </a:ln>
+            </a:endParaRPr>
+          </a:p>
+        </p:txBody>
+      </p:sp>
+      <p:sp>
+        <p:nvSpPr>
+          <p:cNvPr id="7" name="graphiqueEuro">
+            <a:extLst>
+              <a:ext uri="{FF2B5EF4-FFF2-40B4-BE49-F238E27FC236}">
+                <a16:creationId xmlns:a16="http://schemas.microsoft.com/office/drawing/2014/main" id="{72DD4F56-6478-127C-F89E-1FB09B9EEE36}"/>
+              </a:ext>
+            </a:extLst>
+          </p:cNvPr>
+          <p:cNvSpPr/>
+          <p:nvPr/>
+        </p:nvSpPr>
+        <p:spPr>
+          <a:xfrm>
+            <a:off x="412166" y="4142176"/>
+            <a:ext cx="3678685" cy="2446131"/>
+          </a:xfrm>
+          <a:prstGeom prst="rect">
+            <a:avLst/>
+          </a:prstGeom>
+          <a:noFill/>
+        </p:spPr>
+        <p:style>
+          <a:lnRef idx="2">
+            <a:schemeClr val="accent1">
+              <a:shade val="15000"/>
+            </a:schemeClr>
+          </a:lnRef>
+          <a:fillRef idx="1">
+            <a:schemeClr val="accent1"/>
+          </a:fillRef>
+          <a:effectRef idx="0">
+            <a:schemeClr val="accent1"/>
+          </a:effectRef>
+          <a:fontRef idx="minor">
+            <a:schemeClr val="lt1"/>
+          </a:fontRef>
+        </p:style>
+        <p:txBody>
+          <a:bodyPr rtlCol="0" anchor="ctr"/>
+          <a:lstStyle/>
+          <a:p>
+            <a:pPr algn="ctr"/>
+            <a:endParaRPr lang="fr-FR">
+              <a:ln>
+                <a:solidFill>
+                  <a:schemeClr val="tx1"/>
+                </a:solidFill>
+              </a:ln>
+            </a:endParaRPr>
+          </a:p>
+        </p:txBody>
+      </p:sp>
+      <p:sp>
+        <p:nvSpPr>
+          <p:cNvPr id="8" name="kwhmElec">
+            <a:extLst>
+              <a:ext uri="{FF2B5EF4-FFF2-40B4-BE49-F238E27FC236}">
+                <a16:creationId xmlns:a16="http://schemas.microsoft.com/office/drawing/2014/main" id="{5A366BED-A9D8-E77E-CE2D-C04B8DA18E5C}"/>
+              </a:ext>
+            </a:extLst>
+          </p:cNvPr>
+          <p:cNvSpPr txBox="1"/>
+          <p:nvPr/>
+        </p:nvSpPr>
+        <p:spPr>
+          <a:xfrm>
+            <a:off x="4423574" y="1503088"/>
+            <a:ext cx="1393447" cy="307777"/>
+          </a:xfrm>
+          <a:prstGeom prst="rect">
+            <a:avLst/>
+          </a:prstGeom>
+          <a:noFill/>
+        </p:spPr>
+        <p:txBody>
+          <a:bodyPr wrap="square" rtlCol="0">
+            <a:spAutoFit/>
+          </a:bodyPr>
+          <a:lstStyle/>
+          <a:p>
+            <a:pPr algn="l"/>
+            <a:r>
+              <a:rPr lang="fr-FR" sz="1400" dirty="0" err="1"/>
+              <a:t>kwh</a:t>
+            </a:r>
+            <a:r>
+              <a:rPr lang="fr-FR" sz="1400" dirty="0"/>
+              <a:t>/m²</a:t>
+            </a:r>
+          </a:p>
+        </p:txBody>
+      </p:sp>
+      <p:sp>
+        <p:nvSpPr>
+          <p:cNvPr id="9" name="kwhmGaz">
+            <a:extLst>
+              <a:ext uri="{FF2B5EF4-FFF2-40B4-BE49-F238E27FC236}">
+                <a16:creationId xmlns:a16="http://schemas.microsoft.com/office/drawing/2014/main" id="{91F72314-EC54-524F-4935-9516B720B9B8}"/>
+              </a:ext>
+            </a:extLst>
+          </p:cNvPr>
+          <p:cNvSpPr txBox="1"/>
+          <p:nvPr/>
+        </p:nvSpPr>
+        <p:spPr>
+          <a:xfrm>
+            <a:off x="4423574" y="1837347"/>
+            <a:ext cx="1393447" cy="307777"/>
+          </a:xfrm>
+          <a:prstGeom prst="rect">
+            <a:avLst/>
+          </a:prstGeom>
+          <a:noFill/>
+        </p:spPr>
+        <p:txBody>
+          <a:bodyPr wrap="square" rtlCol="0">
+            <a:spAutoFit/>
+          </a:bodyPr>
+          <a:lstStyle/>
+          <a:p>
+            <a:pPr algn="l"/>
+            <a:r>
+              <a:rPr lang="fr-FR" sz="1400" dirty="0" err="1"/>
+              <a:t>kwh</a:t>
+            </a:r>
+            <a:r>
+              <a:rPr lang="fr-FR" sz="1400" dirty="0"/>
+              <a:t>/m²</a:t>
+            </a:r>
+          </a:p>
+        </p:txBody>
+      </p:sp>
+      <p:sp>
+        <p:nvSpPr>
+          <p:cNvPr id="10" name="kwhmFioul">
+            <a:extLst>
+              <a:ext uri="{FF2B5EF4-FFF2-40B4-BE49-F238E27FC236}">
+                <a16:creationId xmlns:a16="http://schemas.microsoft.com/office/drawing/2014/main" id="{E9112A74-E64A-42F5-EFB0-DCAED3F2C727}"/>
+              </a:ext>
+            </a:extLst>
+          </p:cNvPr>
+          <p:cNvSpPr txBox="1"/>
+          <p:nvPr/>
+        </p:nvSpPr>
+        <p:spPr>
+          <a:xfrm>
+            <a:off x="4429768" y="2171240"/>
+            <a:ext cx="1393447" cy="307777"/>
+          </a:xfrm>
+          <a:prstGeom prst="rect">
+            <a:avLst/>
+          </a:prstGeom>
+          <a:noFill/>
+        </p:spPr>
+        <p:txBody>
+          <a:bodyPr wrap="square" rtlCol="0">
+            <a:spAutoFit/>
+          </a:bodyPr>
+          <a:lstStyle/>
+          <a:p>
+            <a:pPr algn="l"/>
+            <a:r>
+              <a:rPr lang="fr-FR" sz="1400" dirty="0" err="1"/>
+              <a:t>kwh</a:t>
+            </a:r>
+            <a:r>
+              <a:rPr lang="fr-FR" sz="1400" dirty="0"/>
+              <a:t>/m²</a:t>
+            </a:r>
+          </a:p>
+        </p:txBody>
+      </p:sp>
+      <p:sp>
+        <p:nvSpPr>
+          <p:cNvPr id="11" name="Ellipse 10">
+            <a:extLst>
+              <a:ext uri="{FF2B5EF4-FFF2-40B4-BE49-F238E27FC236}">
+                <a16:creationId xmlns:a16="http://schemas.microsoft.com/office/drawing/2014/main" id="{04138778-B2A5-A3BD-7BF8-7DFEF225D9CC}"/>
+              </a:ext>
+            </a:extLst>
+          </p:cNvPr>
+          <p:cNvSpPr/>
+          <p:nvPr/>
+        </p:nvSpPr>
+        <p:spPr>
+          <a:xfrm>
+            <a:off x="4154495" y="4336174"/>
+            <a:ext cx="239060" cy="239060"/>
+          </a:xfrm>
+          <a:prstGeom prst="ellipse">
+            <a:avLst/>
+          </a:prstGeom>
+          <a:solidFill>
+            <a:srgbClr val="004579"/>
+          </a:solidFill>
+          <a:ln>
+            <a:noFill/>
+          </a:ln>
+        </p:spPr>
+        <p:style>
+          <a:lnRef idx="2">
+            <a:schemeClr val="accent1">
+              <a:shade val="50000"/>
+            </a:schemeClr>
+          </a:lnRef>
+          <a:fillRef idx="1">
+            <a:schemeClr val="accent1"/>
+          </a:fillRef>
+          <a:effectRef idx="0">
+            <a:schemeClr val="accent1"/>
+          </a:effectRef>
+          <a:fontRef idx="minor">
+            <a:schemeClr val="lt1"/>
+          </a:fontRef>
+        </p:style>
+        <p:txBody>
+          <a:bodyPr rtlCol="0" anchor="ctr"/>
+          <a:lstStyle/>
+          <a:p>
+            <a:pPr marL="0" marR="0" lvl="0" indent="0" algn="ctr" defTabSz="914400" rtl="0" eaLnBrk="1" fontAlgn="auto" latinLnBrk="0" hangingPunct="1">
+              <a:lnSpc>
+                <a:spcPct val="100000"/>
+              </a:lnSpc>
+              <a:spcBef>
+                <a:spcPts val="0"/>
+              </a:spcBef>
+              <a:spcAft>
+                <a:spcPts val="0"/>
+              </a:spcAft>
+              <a:buClrTx/>
+              <a:buSzTx/>
+              <a:buFontTx/>
+              <a:buNone/>
+              <a:tabLst/>
+              <a:defRPr/>
+            </a:pPr>
+            <a:endParaRPr kumimoji="0" lang="fr-FR" sz="1800" b="0" i="0" u="none" strike="noStrike" kern="1200" cap="none" spc="0" normalizeH="0" baseline="0" noProof="0">
+              <a:ln>
+                <a:noFill/>
+              </a:ln>
+              <a:solidFill>
+                <a:srgbClr val="FFFFFF"/>
+              </a:solidFill>
+              <a:effectLst/>
+              <a:uLnTx/>
+              <a:uFillTx/>
+              <a:latin typeface="Century Gothic" panose="020F0302020204030204"/>
+              <a:ea typeface="+mn-ea"/>
+              <a:cs typeface="+mn-cs"/>
+            </a:endParaRPr>
+          </a:p>
+        </p:txBody>
+      </p:sp>
+      <p:sp>
+        <p:nvSpPr>
+          <p:cNvPr id="12" name="Ellipse 11">
+            <a:extLst>
+              <a:ext uri="{FF2B5EF4-FFF2-40B4-BE49-F238E27FC236}">
+                <a16:creationId xmlns:a16="http://schemas.microsoft.com/office/drawing/2014/main" id="{AF73C3D9-927D-265A-ABDB-B675C7BE29C1}"/>
+              </a:ext>
+            </a:extLst>
+          </p:cNvPr>
+          <p:cNvSpPr/>
+          <p:nvPr/>
+        </p:nvSpPr>
+        <p:spPr>
+          <a:xfrm>
+            <a:off x="4150911" y="4998147"/>
+            <a:ext cx="239060" cy="239060"/>
+          </a:xfrm>
+          <a:prstGeom prst="ellipse">
+            <a:avLst/>
+          </a:prstGeom>
+          <a:solidFill>
+            <a:srgbClr val="F2C504"/>
+          </a:solidFill>
+          <a:ln>
+            <a:noFill/>
+          </a:ln>
+        </p:spPr>
+        <p:style>
+          <a:lnRef idx="2">
+            <a:schemeClr val="accent1">
+              <a:shade val="50000"/>
+            </a:schemeClr>
+          </a:lnRef>
+          <a:fillRef idx="1">
+            <a:schemeClr val="accent1"/>
+          </a:fillRef>
+          <a:effectRef idx="0">
+            <a:schemeClr val="accent1"/>
+          </a:effectRef>
+          <a:fontRef idx="minor">
+            <a:schemeClr val="lt1"/>
+          </a:fontRef>
+        </p:style>
+        <p:txBody>
+          <a:bodyPr rtlCol="0" anchor="ctr"/>
+          <a:lstStyle/>
+          <a:p>
+            <a:pPr marL="0" marR="0" lvl="0" indent="0" algn="ctr" defTabSz="914400" rtl="0" eaLnBrk="1" fontAlgn="auto" latinLnBrk="0" hangingPunct="1">
+              <a:lnSpc>
+                <a:spcPct val="100000"/>
+              </a:lnSpc>
+              <a:spcBef>
+                <a:spcPts val="0"/>
+              </a:spcBef>
+              <a:spcAft>
+                <a:spcPts val="0"/>
+              </a:spcAft>
+              <a:buClrTx/>
+              <a:buSzTx/>
+              <a:buFontTx/>
+              <a:buNone/>
+              <a:tabLst/>
+              <a:defRPr/>
+            </a:pPr>
+            <a:endParaRPr kumimoji="0" lang="fr-FR" sz="1800" b="0" i="0" u="none" strike="noStrike" kern="1200" cap="none" spc="0" normalizeH="0" baseline="0" noProof="0">
+              <a:ln>
+                <a:noFill/>
+              </a:ln>
+              <a:solidFill>
+                <a:srgbClr val="FFFFFF"/>
+              </a:solidFill>
+              <a:effectLst/>
+              <a:uLnTx/>
+              <a:uFillTx/>
+              <a:latin typeface="Century Gothic" panose="020F0302020204030204"/>
+              <a:ea typeface="+mn-ea"/>
+              <a:cs typeface="+mn-cs"/>
+            </a:endParaRPr>
+          </a:p>
+        </p:txBody>
+      </p:sp>
+      <p:sp>
+        <p:nvSpPr>
+          <p:cNvPr id="13" name="Ellipse 12">
+            <a:extLst>
+              <a:ext uri="{FF2B5EF4-FFF2-40B4-BE49-F238E27FC236}">
+                <a16:creationId xmlns:a16="http://schemas.microsoft.com/office/drawing/2014/main" id="{3B2521B2-9E02-71E5-888F-2B3E0EA48FF9}"/>
+              </a:ext>
+            </a:extLst>
+          </p:cNvPr>
+          <p:cNvSpPr/>
+          <p:nvPr/>
+        </p:nvSpPr>
+        <p:spPr>
+          <a:xfrm>
+            <a:off x="4154495" y="4664301"/>
+            <a:ext cx="239060" cy="239060"/>
+          </a:xfrm>
+          <a:prstGeom prst="ellipse">
+            <a:avLst/>
+          </a:prstGeom>
+          <a:solidFill>
+            <a:srgbClr val="EB6B0A"/>
+          </a:solidFill>
+          <a:ln>
+            <a:noFill/>
+          </a:ln>
+        </p:spPr>
+        <p:style>
+          <a:lnRef idx="2">
+            <a:schemeClr val="accent1">
+              <a:shade val="50000"/>
+            </a:schemeClr>
+          </a:lnRef>
+          <a:fillRef idx="1">
+            <a:schemeClr val="accent1"/>
+          </a:fillRef>
+          <a:effectRef idx="0">
+            <a:schemeClr val="accent1"/>
+          </a:effectRef>
+          <a:fontRef idx="minor">
+            <a:schemeClr val="lt1"/>
+          </a:fontRef>
+        </p:style>
+        <p:txBody>
+          <a:bodyPr rtlCol="0" anchor="ctr"/>
+          <a:lstStyle/>
+          <a:p>
+            <a:pPr marL="0" marR="0" lvl="0" indent="0" algn="ctr" defTabSz="914400" rtl="0" eaLnBrk="1" fontAlgn="auto" latinLnBrk="0" hangingPunct="1">
+              <a:lnSpc>
+                <a:spcPct val="100000"/>
+              </a:lnSpc>
+              <a:spcBef>
+                <a:spcPts val="0"/>
+              </a:spcBef>
+              <a:spcAft>
+                <a:spcPts val="0"/>
+              </a:spcAft>
+              <a:buClrTx/>
+              <a:buSzTx/>
+              <a:buFontTx/>
+              <a:buNone/>
+              <a:tabLst/>
+              <a:defRPr/>
+            </a:pPr>
+            <a:endParaRPr kumimoji="0" lang="fr-FR" sz="1800" b="0" i="0" u="none" strike="noStrike" kern="1200" cap="none" spc="0" normalizeH="0" baseline="0" noProof="0">
+              <a:ln>
+                <a:noFill/>
+              </a:ln>
+              <a:solidFill>
+                <a:srgbClr val="FFFFFF"/>
+              </a:solidFill>
+              <a:effectLst/>
+              <a:uLnTx/>
+              <a:uFillTx/>
+              <a:latin typeface="Century Gothic" panose="020F0302020204030204"/>
+              <a:ea typeface="+mn-ea"/>
+              <a:cs typeface="+mn-cs"/>
+            </a:endParaRPr>
+          </a:p>
+        </p:txBody>
+      </p:sp>
+      <p:sp>
+        <p:nvSpPr>
+          <p:cNvPr id="16" name="euromElec">
+            <a:extLst>
+              <a:ext uri="{FF2B5EF4-FFF2-40B4-BE49-F238E27FC236}">
+                <a16:creationId xmlns:a16="http://schemas.microsoft.com/office/drawing/2014/main" id="{18D5B145-E892-1418-DFA9-6E9C59F754F5}"/>
+              </a:ext>
+            </a:extLst>
+          </p:cNvPr>
+          <p:cNvSpPr txBox="1"/>
+          <p:nvPr/>
+        </p:nvSpPr>
+        <p:spPr>
+          <a:xfrm>
+            <a:off x="4402827" y="4301815"/>
+            <a:ext cx="1393447" cy="307777"/>
+          </a:xfrm>
+          <a:prstGeom prst="rect">
+            <a:avLst/>
+          </a:prstGeom>
+          <a:noFill/>
+        </p:spPr>
+        <p:txBody>
+          <a:bodyPr wrap="square" rtlCol="0">
+            <a:spAutoFit/>
+          </a:bodyPr>
+          <a:lstStyle/>
+          <a:p>
+            <a:r>
+              <a:rPr lang="fr-FR" sz="1400" b="0" dirty="0">
+                <a:solidFill>
+                  <a:schemeClr val="tx1"/>
+                </a:solidFill>
+                <a:latin typeface="Calibri" panose="020F0502020204030204" pitchFamily="34" charset="0"/>
+                <a:cs typeface="Calibri" panose="020F0502020204030204" pitchFamily="34" charset="0"/>
+              </a:rPr>
+              <a:t>€/m²</a:t>
+            </a:r>
+          </a:p>
+        </p:txBody>
+      </p:sp>
+      <p:sp>
+        <p:nvSpPr>
+          <p:cNvPr id="18" name="euromGaz">
+            <a:extLst>
+              <a:ext uri="{FF2B5EF4-FFF2-40B4-BE49-F238E27FC236}">
+                <a16:creationId xmlns:a16="http://schemas.microsoft.com/office/drawing/2014/main" id="{DA359D70-918C-8FDD-48B1-1FD44B1C2B3D}"/>
+              </a:ext>
+            </a:extLst>
+          </p:cNvPr>
+          <p:cNvSpPr txBox="1"/>
+          <p:nvPr/>
+        </p:nvSpPr>
+        <p:spPr>
+          <a:xfrm>
+            <a:off x="4402827" y="4636074"/>
+            <a:ext cx="1393447" cy="307777"/>
+          </a:xfrm>
+          <a:prstGeom prst="rect">
+            <a:avLst/>
+          </a:prstGeom>
+          <a:noFill/>
+        </p:spPr>
+        <p:txBody>
+          <a:bodyPr wrap="square" rtlCol="0">
+            <a:spAutoFit/>
+          </a:bodyPr>
+          <a:lstStyle/>
+          <a:p>
+            <a:r>
+              <a:rPr lang="fr-FR" sz="1400" b="0" dirty="0">
+                <a:solidFill>
+                  <a:schemeClr val="tx1"/>
+                </a:solidFill>
+                <a:latin typeface="Calibri" panose="020F0502020204030204" pitchFamily="34" charset="0"/>
+                <a:cs typeface="Calibri" panose="020F0502020204030204" pitchFamily="34" charset="0"/>
+              </a:rPr>
+              <a:t>€/m²</a:t>
+            </a:r>
+          </a:p>
+        </p:txBody>
+      </p:sp>
+      <p:sp>
+        <p:nvSpPr>
+          <p:cNvPr id="19" name="euromFioul">
+            <a:extLst>
+              <a:ext uri="{FF2B5EF4-FFF2-40B4-BE49-F238E27FC236}">
+                <a16:creationId xmlns:a16="http://schemas.microsoft.com/office/drawing/2014/main" id="{666CAA49-91BB-45BD-B93C-81F8711BA305}"/>
+              </a:ext>
+            </a:extLst>
+          </p:cNvPr>
+          <p:cNvSpPr txBox="1"/>
+          <p:nvPr/>
+        </p:nvSpPr>
+        <p:spPr>
+          <a:xfrm>
+            <a:off x="4409021" y="4969967"/>
+            <a:ext cx="1393447" cy="307777"/>
+          </a:xfrm>
+          <a:prstGeom prst="rect">
+            <a:avLst/>
+          </a:prstGeom>
+          <a:noFill/>
+        </p:spPr>
+        <p:txBody>
+          <a:bodyPr wrap="square" rtlCol="0">
+            <a:spAutoFit/>
+          </a:bodyPr>
+          <a:lstStyle/>
+          <a:p>
+            <a:r>
+              <a:rPr lang="fr-FR" sz="1400" b="0" dirty="0">
+                <a:solidFill>
+                  <a:schemeClr val="tx1"/>
+                </a:solidFill>
+                <a:latin typeface="Calibri" panose="020F0502020204030204" pitchFamily="34" charset="0"/>
+                <a:cs typeface="Calibri" panose="020F0502020204030204" pitchFamily="34" charset="0"/>
+              </a:rPr>
+              <a:t>€/m²</a:t>
+            </a:r>
           </a:p>
         </p:txBody>
       </p:sp>

</xml_diff>

<commit_message>
Ajout des Energies manquantes Respect des couleurs Ajout d'une légende #44
</commit_message>
<xml_diff>
--- a/app/src/main/assets/powerpointvierge.pptx
+++ b/app/src/main/assets/powerpointvierge.pptx
@@ -210,7 +210,7 @@
           <a:p>
             <a:fld id="{8EF2C5CC-36BA-4C84-AC43-9F8430F4AE76}" type="datetimeFigureOut">
               <a:rPr lang="fr-FR" smtClean="0"/>
-              <a:t>12/07/2023</a:t>
+              <a:t>13/07/2023</a:t>
             </a:fld>
             <a:endParaRPr lang="fr-FR"/>
           </a:p>
@@ -6892,7 +6892,7 @@
       </p:sp>
       <p:sp>
         <p:nvSpPr>
-          <p:cNvPr id="14" name="Ellipse 13">
+          <p:cNvPr id="14" name="ellipseRatioWatt">
             <a:extLst>
               <a:ext uri="{FF2B5EF4-FFF2-40B4-BE49-F238E27FC236}">
                 <a16:creationId xmlns:a16="http://schemas.microsoft.com/office/drawing/2014/main" id="{0C5CD6F4-6C7A-4DCB-63CA-E3AB8D8B4067}"/>
@@ -6904,176 +6904,17 @@
         </p:nvSpPr>
         <p:spPr>
           <a:xfrm>
-            <a:off x="4175242" y="1537447"/>
-            <a:ext cx="239060" cy="239060"/>
+            <a:off x="4282682" y="1315008"/>
+            <a:ext cx="305072" cy="307777"/>
           </a:xfrm>
           <a:prstGeom prst="ellipse">
             <a:avLst/>
           </a:prstGeom>
           <a:solidFill>
-            <a:srgbClr val="004579"/>
-          </a:solidFill>
-          <a:ln>
-            <a:noFill/>
-          </a:ln>
-        </p:spPr>
-        <p:style>
-          <a:lnRef idx="2">
-            <a:schemeClr val="accent1">
-              <a:shade val="50000"/>
+            <a:schemeClr val="accent5">
+              <a:lumMod val="60000"/>
+              <a:lumOff val="40000"/>
             </a:schemeClr>
-          </a:lnRef>
-          <a:fillRef idx="1">
-            <a:schemeClr val="accent1"/>
-          </a:fillRef>
-          <a:effectRef idx="0">
-            <a:schemeClr val="accent1"/>
-          </a:effectRef>
-          <a:fontRef idx="minor">
-            <a:schemeClr val="lt1"/>
-          </a:fontRef>
-        </p:style>
-        <p:txBody>
-          <a:bodyPr rtlCol="0" anchor="ctr"/>
-          <a:lstStyle/>
-          <a:p>
-            <a:pPr marL="0" marR="0" lvl="0" indent="0" algn="ctr" defTabSz="914400" rtl="0" eaLnBrk="1" fontAlgn="auto" latinLnBrk="0" hangingPunct="1">
-              <a:lnSpc>
-                <a:spcPct val="100000"/>
-              </a:lnSpc>
-              <a:spcBef>
-                <a:spcPts val="0"/>
-              </a:spcBef>
-              <a:spcAft>
-                <a:spcPts val="0"/>
-              </a:spcAft>
-              <a:buClrTx/>
-              <a:buSzTx/>
-              <a:buFontTx/>
-              <a:buNone/>
-              <a:tabLst/>
-              <a:defRPr/>
-            </a:pPr>
-            <a:endParaRPr kumimoji="0" lang="fr-FR" sz="1800" b="0" i="0" u="none" strike="noStrike" kern="1200" cap="none" spc="0" normalizeH="0" baseline="0" noProof="0">
-              <a:ln>
-                <a:noFill/>
-              </a:ln>
-              <a:solidFill>
-                <a:srgbClr val="FFFFFF"/>
-              </a:solidFill>
-              <a:effectLst/>
-              <a:uLnTx/>
-              <a:uFillTx/>
-              <a:latin typeface="Century Gothic" panose="020F0302020204030204"/>
-              <a:ea typeface="+mn-ea"/>
-              <a:cs typeface="+mn-cs"/>
-            </a:endParaRPr>
-          </a:p>
-        </p:txBody>
-      </p:sp>
-      <p:sp>
-        <p:nvSpPr>
-          <p:cNvPr id="15" name="Ellipse 14">
-            <a:extLst>
-              <a:ext uri="{FF2B5EF4-FFF2-40B4-BE49-F238E27FC236}">
-                <a16:creationId xmlns:a16="http://schemas.microsoft.com/office/drawing/2014/main" id="{005A798A-0214-EC24-A28D-22384F38C4BC}"/>
-              </a:ext>
-            </a:extLst>
-          </p:cNvPr>
-          <p:cNvSpPr/>
-          <p:nvPr/>
-        </p:nvSpPr>
-        <p:spPr>
-          <a:xfrm>
-            <a:off x="4171658" y="2199420"/>
-            <a:ext cx="239060" cy="239060"/>
-          </a:xfrm>
-          <a:prstGeom prst="ellipse">
-            <a:avLst/>
-          </a:prstGeom>
-          <a:solidFill>
-            <a:srgbClr val="F2C504"/>
-          </a:solidFill>
-          <a:ln>
-            <a:noFill/>
-          </a:ln>
-        </p:spPr>
-        <p:style>
-          <a:lnRef idx="2">
-            <a:schemeClr val="accent1">
-              <a:shade val="50000"/>
-            </a:schemeClr>
-          </a:lnRef>
-          <a:fillRef idx="1">
-            <a:schemeClr val="accent1"/>
-          </a:fillRef>
-          <a:effectRef idx="0">
-            <a:schemeClr val="accent1"/>
-          </a:effectRef>
-          <a:fontRef idx="minor">
-            <a:schemeClr val="lt1"/>
-          </a:fontRef>
-        </p:style>
-        <p:txBody>
-          <a:bodyPr rtlCol="0" anchor="ctr"/>
-          <a:lstStyle/>
-          <a:p>
-            <a:pPr marL="0" marR="0" lvl="0" indent="0" algn="ctr" defTabSz="914400" rtl="0" eaLnBrk="1" fontAlgn="auto" latinLnBrk="0" hangingPunct="1">
-              <a:lnSpc>
-                <a:spcPct val="100000"/>
-              </a:lnSpc>
-              <a:spcBef>
-                <a:spcPts val="0"/>
-              </a:spcBef>
-              <a:spcAft>
-                <a:spcPts val="0"/>
-              </a:spcAft>
-              <a:buClrTx/>
-              <a:buSzTx/>
-              <a:buFontTx/>
-              <a:buNone/>
-              <a:tabLst/>
-              <a:defRPr/>
-            </a:pPr>
-            <a:endParaRPr kumimoji="0" lang="fr-FR" sz="1800" b="0" i="0" u="none" strike="noStrike" kern="1200" cap="none" spc="0" normalizeH="0" baseline="0" noProof="0">
-              <a:ln>
-                <a:noFill/>
-              </a:ln>
-              <a:solidFill>
-                <a:srgbClr val="FFFFFF"/>
-              </a:solidFill>
-              <a:effectLst/>
-              <a:uLnTx/>
-              <a:uFillTx/>
-              <a:latin typeface="Century Gothic" panose="020F0302020204030204"/>
-              <a:ea typeface="+mn-ea"/>
-              <a:cs typeface="+mn-cs"/>
-            </a:endParaRPr>
-          </a:p>
-        </p:txBody>
-      </p:sp>
-      <p:sp>
-        <p:nvSpPr>
-          <p:cNvPr id="17" name="Ellipse 16">
-            <a:extLst>
-              <a:ext uri="{FF2B5EF4-FFF2-40B4-BE49-F238E27FC236}">
-                <a16:creationId xmlns:a16="http://schemas.microsoft.com/office/drawing/2014/main" id="{04113405-A5D2-DE48-E6E9-A1F9F4092188}"/>
-              </a:ext>
-            </a:extLst>
-          </p:cNvPr>
-          <p:cNvSpPr/>
-          <p:nvPr/>
-        </p:nvSpPr>
-        <p:spPr>
-          <a:xfrm>
-            <a:off x="4175242" y="1865574"/>
-            <a:ext cx="239060" cy="239060"/>
-          </a:xfrm>
-          <a:prstGeom prst="ellipse">
-            <a:avLst/>
-          </a:prstGeom>
-          <a:solidFill>
-            <a:srgbClr val="EB6B0A"/>
           </a:solidFill>
           <a:ln>
             <a:noFill/>
@@ -7677,7 +7518,7 @@
         <p:spPr>
           <a:xfrm>
             <a:off x="434109" y="1266887"/>
-            <a:ext cx="3678685" cy="2446131"/>
+            <a:ext cx="3820677" cy="2446131"/>
           </a:xfrm>
           <a:prstGeom prst="rect">
             <a:avLst/>
@@ -7705,7 +7546,7 @@
           <a:lstStyle/>
           <a:p>
             <a:pPr algn="ctr"/>
-            <a:endParaRPr lang="fr-FR">
+            <a:endParaRPr lang="fr-FR" dirty="0">
               <a:ln>
                 <a:solidFill>
                   <a:schemeClr val="tx1"/>
@@ -7730,7 +7571,7 @@
         <p:spPr>
           <a:xfrm>
             <a:off x="412166" y="4142176"/>
-            <a:ext cx="3678685" cy="2446131"/>
+            <a:ext cx="3842620" cy="2446131"/>
           </a:xfrm>
           <a:prstGeom prst="rect">
             <a:avLst/>
@@ -7782,8 +7623,8 @@
         </p:nvSpPr>
         <p:spPr>
           <a:xfrm>
-            <a:off x="4423574" y="1503088"/>
-            <a:ext cx="1393447" cy="307777"/>
+            <a:off x="4620760" y="1315009"/>
+            <a:ext cx="1302367" cy="307777"/>
           </a:xfrm>
           <a:prstGeom prst="rect">
             <a:avLst/>
@@ -7810,87 +7651,7 @@
       </p:sp>
       <p:sp>
         <p:nvSpPr>
-          <p:cNvPr id="9" name="kwhmGaz">
-            <a:extLst>
-              <a:ext uri="{FF2B5EF4-FFF2-40B4-BE49-F238E27FC236}">
-                <a16:creationId xmlns:a16="http://schemas.microsoft.com/office/drawing/2014/main" id="{91F72314-EC54-524F-4935-9516B720B9B8}"/>
-              </a:ext>
-            </a:extLst>
-          </p:cNvPr>
-          <p:cNvSpPr txBox="1"/>
-          <p:nvPr/>
-        </p:nvSpPr>
-        <p:spPr>
-          <a:xfrm>
-            <a:off x="4423574" y="1837347"/>
-            <a:ext cx="1393447" cy="307777"/>
-          </a:xfrm>
-          <a:prstGeom prst="rect">
-            <a:avLst/>
-          </a:prstGeom>
-          <a:noFill/>
-        </p:spPr>
-        <p:txBody>
-          <a:bodyPr wrap="square" rtlCol="0">
-            <a:spAutoFit/>
-          </a:bodyPr>
-          <a:lstStyle/>
-          <a:p>
-            <a:pPr algn="l"/>
-            <a:r>
-              <a:rPr lang="fr-FR" sz="1400" dirty="0" err="1"/>
-              <a:t>kwh</a:t>
-            </a:r>
-            <a:r>
-              <a:rPr lang="fr-FR" sz="1400" dirty="0"/>
-              <a:t>/m²</a:t>
-            </a:r>
-          </a:p>
-        </p:txBody>
-      </p:sp>
-      <p:sp>
-        <p:nvSpPr>
-          <p:cNvPr id="10" name="kwhmFioul">
-            <a:extLst>
-              <a:ext uri="{FF2B5EF4-FFF2-40B4-BE49-F238E27FC236}">
-                <a16:creationId xmlns:a16="http://schemas.microsoft.com/office/drawing/2014/main" id="{E9112A74-E64A-42F5-EFB0-DCAED3F2C727}"/>
-              </a:ext>
-            </a:extLst>
-          </p:cNvPr>
-          <p:cNvSpPr txBox="1"/>
-          <p:nvPr/>
-        </p:nvSpPr>
-        <p:spPr>
-          <a:xfrm>
-            <a:off x="4429768" y="2171240"/>
-            <a:ext cx="1393447" cy="307777"/>
-          </a:xfrm>
-          <a:prstGeom prst="rect">
-            <a:avLst/>
-          </a:prstGeom>
-          <a:noFill/>
-        </p:spPr>
-        <p:txBody>
-          <a:bodyPr wrap="square" rtlCol="0">
-            <a:spAutoFit/>
-          </a:bodyPr>
-          <a:lstStyle/>
-          <a:p>
-            <a:pPr algn="l"/>
-            <a:r>
-              <a:rPr lang="fr-FR" sz="1400" dirty="0" err="1"/>
-              <a:t>kwh</a:t>
-            </a:r>
-            <a:r>
-              <a:rPr lang="fr-FR" sz="1400" dirty="0"/>
-              <a:t>/m²</a:t>
-            </a:r>
-          </a:p>
-        </p:txBody>
-      </p:sp>
-      <p:sp>
-        <p:nvSpPr>
-          <p:cNvPr id="11" name="Ellipse 10">
+          <p:cNvPr id="11" name="ellipseRatioEuro">
             <a:extLst>
               <a:ext uri="{FF2B5EF4-FFF2-40B4-BE49-F238E27FC236}">
                 <a16:creationId xmlns:a16="http://schemas.microsoft.com/office/drawing/2014/main" id="{04138778-B2A5-A3BD-7BF8-7DFEF225D9CC}"/>
@@ -7902,14 +7663,17 @@
         </p:nvSpPr>
         <p:spPr>
           <a:xfrm>
-            <a:off x="4154495" y="4336174"/>
-            <a:ext cx="239060" cy="239060"/>
+            <a:off x="4281405" y="4275977"/>
+            <a:ext cx="307627" cy="307777"/>
           </a:xfrm>
           <a:prstGeom prst="ellipse">
             <a:avLst/>
           </a:prstGeom>
           <a:solidFill>
-            <a:srgbClr val="004579"/>
+            <a:schemeClr val="accent5">
+              <a:lumMod val="60000"/>
+              <a:lumOff val="40000"/>
+            </a:schemeClr>
           </a:solidFill>
           <a:ln>
             <a:noFill/>
@@ -7952,7 +7716,7 @@
               <a:tabLst/>
               <a:defRPr/>
             </a:pPr>
-            <a:endParaRPr kumimoji="0" lang="fr-FR" sz="1800" b="0" i="0" u="none" strike="noStrike" kern="1200" cap="none" spc="0" normalizeH="0" baseline="0" noProof="0">
+            <a:endParaRPr kumimoji="0" lang="fr-FR" sz="1800" b="0" i="0" u="none" strike="noStrike" kern="1200" cap="none" spc="0" normalizeH="0" baseline="0" noProof="0" dirty="0">
               <a:ln>
                 <a:noFill/>
               </a:ln>
@@ -7967,54 +7731,6 @@
               <a:cs typeface="+mn-cs"/>
             </a:endParaRPr>
           </a:p>
-        </p:txBody>
-      </p:sp>
-      <p:sp>
-        <p:nvSpPr>
-          <p:cNvPr id="12" name="Ellipse 11">
-            <a:extLst>
-              <a:ext uri="{FF2B5EF4-FFF2-40B4-BE49-F238E27FC236}">
-                <a16:creationId xmlns:a16="http://schemas.microsoft.com/office/drawing/2014/main" id="{AF73C3D9-927D-265A-ABDB-B675C7BE29C1}"/>
-              </a:ext>
-            </a:extLst>
-          </p:cNvPr>
-          <p:cNvSpPr/>
-          <p:nvPr/>
-        </p:nvSpPr>
-        <p:spPr>
-          <a:xfrm>
-            <a:off x="4150911" y="4998147"/>
-            <a:ext cx="239060" cy="239060"/>
-          </a:xfrm>
-          <a:prstGeom prst="ellipse">
-            <a:avLst/>
-          </a:prstGeom>
-          <a:solidFill>
-            <a:srgbClr val="F2C504"/>
-          </a:solidFill>
-          <a:ln>
-            <a:noFill/>
-          </a:ln>
-        </p:spPr>
-        <p:style>
-          <a:lnRef idx="2">
-            <a:schemeClr val="accent1">
-              <a:shade val="50000"/>
-            </a:schemeClr>
-          </a:lnRef>
-          <a:fillRef idx="1">
-            <a:schemeClr val="accent1"/>
-          </a:fillRef>
-          <a:effectRef idx="0">
-            <a:schemeClr val="accent1"/>
-          </a:effectRef>
-          <a:fontRef idx="minor">
-            <a:schemeClr val="lt1"/>
-          </a:fontRef>
-        </p:style>
-        <p:txBody>
-          <a:bodyPr rtlCol="0" anchor="ctr"/>
-          <a:lstStyle/>
           <a:p>
             <a:pPr marL="0" marR="0" lvl="0" indent="0" algn="ctr" defTabSz="914400" rtl="0" eaLnBrk="1" fontAlgn="auto" latinLnBrk="0" hangingPunct="1">
               <a:lnSpc>
@@ -8033,69 +7749,13 @@
               <a:tabLst/>
               <a:defRPr/>
             </a:pPr>
-            <a:endParaRPr kumimoji="0" lang="fr-FR" sz="1800" b="0" i="0" u="none" strike="noStrike" kern="1200" cap="none" spc="0" normalizeH="0" baseline="0" noProof="0">
-              <a:ln>
-                <a:noFill/>
-              </a:ln>
+            <a:endParaRPr lang="fr-FR" dirty="0">
               <a:solidFill>
                 <a:srgbClr val="FFFFFF"/>
               </a:solidFill>
-              <a:effectLst/>
-              <a:uLnTx/>
-              <a:uFillTx/>
               <a:latin typeface="Century Gothic" panose="020F0302020204030204"/>
-              <a:ea typeface="+mn-ea"/>
-              <a:cs typeface="+mn-cs"/>
             </a:endParaRPr>
           </a:p>
-        </p:txBody>
-      </p:sp>
-      <p:sp>
-        <p:nvSpPr>
-          <p:cNvPr id="13" name="Ellipse 12">
-            <a:extLst>
-              <a:ext uri="{FF2B5EF4-FFF2-40B4-BE49-F238E27FC236}">
-                <a16:creationId xmlns:a16="http://schemas.microsoft.com/office/drawing/2014/main" id="{3B2521B2-9E02-71E5-888F-2B3E0EA48FF9}"/>
-              </a:ext>
-            </a:extLst>
-          </p:cNvPr>
-          <p:cNvSpPr/>
-          <p:nvPr/>
-        </p:nvSpPr>
-        <p:spPr>
-          <a:xfrm>
-            <a:off x="4154495" y="4664301"/>
-            <a:ext cx="239060" cy="239060"/>
-          </a:xfrm>
-          <a:prstGeom prst="ellipse">
-            <a:avLst/>
-          </a:prstGeom>
-          <a:solidFill>
-            <a:srgbClr val="EB6B0A"/>
-          </a:solidFill>
-          <a:ln>
-            <a:noFill/>
-          </a:ln>
-        </p:spPr>
-        <p:style>
-          <a:lnRef idx="2">
-            <a:schemeClr val="accent1">
-              <a:shade val="50000"/>
-            </a:schemeClr>
-          </a:lnRef>
-          <a:fillRef idx="1">
-            <a:schemeClr val="accent1"/>
-          </a:fillRef>
-          <a:effectRef idx="0">
-            <a:schemeClr val="accent1"/>
-          </a:effectRef>
-          <a:fontRef idx="minor">
-            <a:schemeClr val="lt1"/>
-          </a:fontRef>
-        </p:style>
-        <p:txBody>
-          <a:bodyPr rtlCol="0" anchor="ctr"/>
-          <a:lstStyle/>
           <a:p>
             <a:pPr marL="0" marR="0" lvl="0" indent="0" algn="ctr" defTabSz="914400" rtl="0" eaLnBrk="1" fontAlgn="auto" latinLnBrk="0" hangingPunct="1">
               <a:lnSpc>
@@ -8114,7 +7774,7 @@
               <a:tabLst/>
               <a:defRPr/>
             </a:pPr>
-            <a:endParaRPr kumimoji="0" lang="fr-FR" sz="1800" b="0" i="0" u="none" strike="noStrike" kern="1200" cap="none" spc="0" normalizeH="0" baseline="0" noProof="0">
+            <a:endParaRPr kumimoji="0" lang="fr-FR" sz="1800" b="0" i="0" u="none" strike="noStrike" kern="1200" cap="none" spc="0" normalizeH="0" baseline="0" noProof="0" dirty="0">
               <a:ln>
                 <a:noFill/>
               </a:ln>
@@ -8145,8 +7805,8 @@
         </p:nvSpPr>
         <p:spPr>
           <a:xfrm>
-            <a:off x="4402827" y="4301815"/>
-            <a:ext cx="1393447" cy="307777"/>
+            <a:off x="4620761" y="4275978"/>
+            <a:ext cx="1351962" cy="307777"/>
           </a:xfrm>
           <a:prstGeom prst="rect">
             <a:avLst/>
@@ -8160,94 +7820,13 @@
           <a:lstStyle/>
           <a:p>
             <a:r>
-              <a:rPr lang="fr-FR" sz="1400" b="0" dirty="0">
+              <a:rPr lang="fr-FR" sz="1400" dirty="0">
                 <a:solidFill>
                   <a:schemeClr val="tx1"/>
                 </a:solidFill>
-                <a:latin typeface="Calibri" panose="020F0502020204030204" pitchFamily="34" charset="0"/>
-                <a:cs typeface="Calibri" panose="020F0502020204030204" pitchFamily="34" charset="0"/>
-              </a:rPr>
-              <a:t>€/m²</a:t>
-            </a:r>
-          </a:p>
-        </p:txBody>
-      </p:sp>
-      <p:sp>
-        <p:nvSpPr>
-          <p:cNvPr id="18" name="euromGaz">
-            <a:extLst>
-              <a:ext uri="{FF2B5EF4-FFF2-40B4-BE49-F238E27FC236}">
-                <a16:creationId xmlns:a16="http://schemas.microsoft.com/office/drawing/2014/main" id="{DA359D70-918C-8FDD-48B1-1FD44B1C2B3D}"/>
-              </a:ext>
-            </a:extLst>
-          </p:cNvPr>
-          <p:cNvSpPr txBox="1"/>
-          <p:nvPr/>
-        </p:nvSpPr>
-        <p:spPr>
-          <a:xfrm>
-            <a:off x="4402827" y="4636074"/>
-            <a:ext cx="1393447" cy="307777"/>
-          </a:xfrm>
-          <a:prstGeom prst="rect">
-            <a:avLst/>
-          </a:prstGeom>
-          <a:noFill/>
-        </p:spPr>
-        <p:txBody>
-          <a:bodyPr wrap="square" rtlCol="0">
-            <a:spAutoFit/>
-          </a:bodyPr>
-          <a:lstStyle/>
-          <a:p>
-            <a:r>
-              <a:rPr lang="fr-FR" sz="1400" b="0" dirty="0">
-                <a:solidFill>
-                  <a:schemeClr val="tx1"/>
-                </a:solidFill>
-                <a:latin typeface="Calibri" panose="020F0502020204030204" pitchFamily="34" charset="0"/>
-                <a:cs typeface="Calibri" panose="020F0502020204030204" pitchFamily="34" charset="0"/>
-              </a:rPr>
-              <a:t>€/m²</a:t>
-            </a:r>
-          </a:p>
-        </p:txBody>
-      </p:sp>
-      <p:sp>
-        <p:nvSpPr>
-          <p:cNvPr id="19" name="euromFioul">
-            <a:extLst>
-              <a:ext uri="{FF2B5EF4-FFF2-40B4-BE49-F238E27FC236}">
-                <a16:creationId xmlns:a16="http://schemas.microsoft.com/office/drawing/2014/main" id="{666CAA49-91BB-45BD-B93C-81F8711BA305}"/>
-              </a:ext>
-            </a:extLst>
-          </p:cNvPr>
-          <p:cNvSpPr txBox="1"/>
-          <p:nvPr/>
-        </p:nvSpPr>
-        <p:spPr>
-          <a:xfrm>
-            <a:off x="4409021" y="4969967"/>
-            <a:ext cx="1393447" cy="307777"/>
-          </a:xfrm>
-          <a:prstGeom prst="rect">
-            <a:avLst/>
-          </a:prstGeom>
-          <a:noFill/>
-        </p:spPr>
-        <p:txBody>
-          <a:bodyPr wrap="square" rtlCol="0">
-            <a:spAutoFit/>
-          </a:bodyPr>
-          <a:lstStyle/>
-          <a:p>
-            <a:r>
-              <a:rPr lang="fr-FR" sz="1400" b="0" dirty="0">
-                <a:solidFill>
-                  <a:schemeClr val="tx1"/>
-                </a:solidFill>
-                <a:latin typeface="Calibri" panose="020F0502020204030204" pitchFamily="34" charset="0"/>
-                <a:cs typeface="Calibri" panose="020F0502020204030204" pitchFamily="34" charset="0"/>
+                <a:latin typeface="Calibri Light" panose="020F0302020204030204" pitchFamily="34" charset="0"/>
+                <a:ea typeface="Calibri Light" panose="020F0302020204030204" pitchFamily="34" charset="0"/>
+                <a:cs typeface="Calibri Light" panose="020F0302020204030204" pitchFamily="34" charset="0"/>
               </a:rPr>
               <a:t>€/m²</a:t>
             </a:r>

</xml_diff>

<commit_message>
Theme et Ajout suffix total graphique
</commit_message>
<xml_diff>
--- a/app/src/main/assets/powerpointvierge.pptx
+++ b/app/src/main/assets/powerpointvierge.pptx
@@ -210,7 +210,7 @@
           <a:p>
             <a:fld id="{8EF2C5CC-36BA-4C84-AC43-9F8430F4AE76}" type="datetimeFigureOut">
               <a:rPr lang="fr-FR" smtClean="0"/>
-              <a:t>13/07/2023</a:t>
+              <a:t>17/07/2023</a:t>
             </a:fld>
             <a:endParaRPr lang="fr-FR"/>
           </a:p>
@@ -2099,7 +2099,7 @@
                 </a:solidFill>
                 <a:latin typeface="+mj-lt"/>
               </a:rPr>
-              <a:t>Lorem</a:t>
+              <a:t> </a:t>
             </a:r>
           </a:p>
         </p:txBody>
@@ -2286,7 +2286,7 @@
                 </a:solidFill>
                 <a:latin typeface="+mj-lt"/>
               </a:rPr>
-              <a:t>Lorem</a:t>
+              <a:t> </a:t>
             </a:r>
           </a:p>
         </p:txBody>
@@ -6826,10 +6826,9 @@
                 <a:effectLst/>
                 <a:uLnTx/>
                 <a:uFillTx/>
-                <a:latin typeface="Arial"/>
                 <a:cs typeface="Times New Roman"/>
               </a:rPr>
-              <a:t> Lorem</a:t>
+              <a:t>  </a:t>
             </a:r>
           </a:p>
         </p:txBody>
@@ -7977,7 +7976,7 @@
               <a:rPr lang="fr-FR" sz="1600" dirty="0">
                 <a:cs typeface="Times New Roman"/>
               </a:rPr>
-              <a:t>Lorem</a:t>
+              <a:t>  </a:t>
             </a:r>
           </a:p>
         </p:txBody>
@@ -8037,7 +8036,7 @@
                 <a:uFillTx/>
                 <a:cs typeface="Times New Roman"/>
               </a:rPr>
-              <a:t> Lorem</a:t>
+              <a:t>   </a:t>
             </a:r>
           </a:p>
         </p:txBody>
@@ -8097,7 +8096,7 @@
                 <a:uFillTx/>
                 <a:cs typeface="Times New Roman"/>
               </a:rPr>
-              <a:t> Lorem</a:t>
+              <a:t> 	 </a:t>
             </a:r>
           </a:p>
         </p:txBody>
@@ -9245,10 +9244,9 @@
                 <a:effectLst/>
                 <a:uLnTx/>
                 <a:uFillTx/>
-                <a:latin typeface="Arial"/>
                 <a:cs typeface="Times New Roman"/>
               </a:rPr>
-              <a:t>Ceci est un descriptif</a:t>
+              <a:t> 	</a:t>
             </a:r>
           </a:p>
         </p:txBody>
@@ -11378,10 +11376,9 @@
                 <a:effectLst/>
                 <a:uLnTx/>
                 <a:uFillTx/>
-                <a:latin typeface="Arial"/>
                 <a:cs typeface="Times New Roman"/>
               </a:rPr>
-              <a:t>Ceci est un descriptif</a:t>
+              <a:t> 	</a:t>
             </a:r>
           </a:p>
         </p:txBody>
@@ -12583,21 +12580,7 @@
           </a:bodyPr>
           <a:lstStyle/>
           <a:p>
-            <a:pPr marL="0" marR="0" lvl="0" indent="0" algn="l" defTabSz="914400" rtl="0" eaLnBrk="1" fontAlgn="auto" latinLnBrk="0" hangingPunct="1">
-              <a:lnSpc>
-                <a:spcPct val="100000"/>
-              </a:lnSpc>
-              <a:spcBef>
-                <a:spcPts val="0"/>
-              </a:spcBef>
-              <a:spcAft>
-                <a:spcPts val="0"/>
-              </a:spcAft>
-              <a:buClrTx/>
-              <a:buSzTx/>
-              <a:buFontTx/>
-              <a:buNone/>
-              <a:tabLst/>
+            <a:pPr lvl="1">
               <a:defRPr/>
             </a:pPr>
             <a:r>
@@ -12614,7 +12597,7 @@
                 <a:latin typeface="Arial"/>
                 <a:cs typeface="Times New Roman"/>
               </a:rPr>
-              <a:t>Ceci est un descriptif</a:t>
+              <a:t> </a:t>
             </a:r>
           </a:p>
         </p:txBody>
@@ -13643,7 +13626,7 @@
           <p:nvPr>
             <p:extLst>
               <p:ext uri="{D42A27DB-BD31-4B8C-83A1-F6EECF244321}">
-                <p14:modId xmlns:p14="http://schemas.microsoft.com/office/powerpoint/2010/main" val="1940123446"/>
+                <p14:modId xmlns:p14="http://schemas.microsoft.com/office/powerpoint/2010/main" val="3983583533"/>
               </p:ext>
             </p:extLst>
           </p:nvPr>
@@ -13682,7 +13665,7 @@
                           <a:latin typeface="Calibri" panose="020F0502020204030204" pitchFamily="34" charset="0"/>
                           <a:cs typeface="Calibri" panose="020F0502020204030204" pitchFamily="34" charset="0"/>
                         </a:rPr>
-                        <a:t>Remplacer les tubes fluo par des LEDS</a:t>
+                        <a:t>    </a:t>
                       </a:r>
                     </a:p>
                   </a:txBody>

</xml_diff>

<commit_message>
mise en page powerpoint #46
</commit_message>
<xml_diff>
--- a/app/src/main/assets/powerpointvierge.pptx
+++ b/app/src/main/assets/powerpointvierge.pptx
@@ -210,7 +210,7 @@
           <a:p>
             <a:fld id="{8EF2C5CC-36BA-4C84-AC43-9F8430F4AE76}" type="datetimeFigureOut">
               <a:rPr lang="fr-FR" smtClean="0"/>
-              <a:t>17/07/2023</a:t>
+              <a:t>19/07/2023</a:t>
             </a:fld>
             <a:endParaRPr lang="fr-FR"/>
           </a:p>
@@ -2263,7 +2263,7 @@
         <p:spPr>
           <a:xfrm>
             <a:off x="6914431" y="4603839"/>
-            <a:ext cx="5176187" cy="338554"/>
+            <a:ext cx="5176187" cy="318924"/>
           </a:xfrm>
           <a:prstGeom prst="rect">
             <a:avLst/>
@@ -2273,7 +2273,7 @@
           </a:solidFill>
         </p:spPr>
         <p:txBody>
-          <a:bodyPr wrap="square">
+          <a:bodyPr wrap="square" lIns="36000" tIns="36000" rIns="36000" bIns="36000">
             <a:spAutoFit/>
           </a:bodyPr>
           <a:lstStyle/>
@@ -6783,7 +6783,7 @@
         <p:spPr>
           <a:xfrm>
             <a:off x="6341306" y="5545723"/>
-            <a:ext cx="5656187" cy="338554"/>
+            <a:ext cx="5656187" cy="318924"/>
           </a:xfrm>
           <a:prstGeom prst="rect">
             <a:avLst/>
@@ -6793,7 +6793,7 @@
           </a:solidFill>
         </p:spPr>
         <p:txBody>
-          <a:bodyPr wrap="square" lIns="91440" tIns="45720" rIns="91440" bIns="45720" anchor="t">
+          <a:bodyPr wrap="square" lIns="36000" tIns="36000" rIns="36000" bIns="36000" anchor="t">
             <a:spAutoFit/>
           </a:bodyPr>
           <a:lstStyle/>
@@ -9201,7 +9201,7 @@
         <p:spPr>
           <a:xfrm>
             <a:off x="249724" y="5419393"/>
-            <a:ext cx="5855136" cy="338554"/>
+            <a:ext cx="5855136" cy="318924"/>
           </a:xfrm>
           <a:prstGeom prst="rect">
             <a:avLst/>
@@ -9211,7 +9211,7 @@
           </a:solidFill>
         </p:spPr>
         <p:txBody>
-          <a:bodyPr wrap="square" lIns="91440" tIns="45720" rIns="91440" bIns="45720" anchor="t">
+          <a:bodyPr wrap="square" lIns="36000" tIns="36000" rIns="36000" bIns="36000" anchor="t">
             <a:spAutoFit/>
           </a:bodyPr>
           <a:lstStyle/>
@@ -11333,7 +11333,7 @@
         <p:spPr>
           <a:xfrm>
             <a:off x="6436824" y="5253369"/>
-            <a:ext cx="5505452" cy="338554"/>
+            <a:ext cx="5505452" cy="318924"/>
           </a:xfrm>
           <a:prstGeom prst="rect">
             <a:avLst/>
@@ -11343,7 +11343,7 @@
           </a:solidFill>
         </p:spPr>
         <p:txBody>
-          <a:bodyPr wrap="square" lIns="91440" tIns="45720" rIns="91440" bIns="45720" anchor="t">
+          <a:bodyPr wrap="square" lIns="36000" tIns="36000" rIns="36000" bIns="36000" anchor="t">
             <a:spAutoFit/>
           </a:bodyPr>
           <a:lstStyle/>
@@ -12550,58 +12550,6 @@
           </a:p>
         </p:txBody>
       </p:sp>
-      <p:sp>
-        <p:nvSpPr>
-          <p:cNvPr id="6" name="Descriptif du chauffage">
-            <a:extLst>
-              <a:ext uri="{FF2B5EF4-FFF2-40B4-BE49-F238E27FC236}">
-                <a16:creationId xmlns:a16="http://schemas.microsoft.com/office/drawing/2014/main" id="{8EB9C361-8ED1-9CA4-950A-FE3D3A95E26A}"/>
-              </a:ext>
-            </a:extLst>
-          </p:cNvPr>
-          <p:cNvSpPr txBox="1"/>
-          <p:nvPr/>
-        </p:nvSpPr>
-        <p:spPr>
-          <a:xfrm>
-            <a:off x="6436824" y="5253369"/>
-            <a:ext cx="5505452" cy="338554"/>
-          </a:xfrm>
-          <a:prstGeom prst="rect">
-            <a:avLst/>
-          </a:prstGeom>
-          <a:solidFill>
-            <a:srgbClr val="004C64"/>
-          </a:solidFill>
-        </p:spPr>
-        <p:txBody>
-          <a:bodyPr wrap="square" lIns="91440" tIns="45720" rIns="91440" bIns="45720" anchor="t">
-            <a:spAutoFit/>
-          </a:bodyPr>
-          <a:lstStyle/>
-          <a:p>
-            <a:pPr lvl="1">
-              <a:defRPr/>
-            </a:pPr>
-            <a:r>
-              <a:rPr kumimoji="0" lang="fr-FR" sz="1600" b="0" i="0" u="none" strike="noStrike" kern="1200" cap="none" spc="0" normalizeH="0" baseline="0" noProof="0" dirty="0">
-                <a:ln>
-                  <a:noFill/>
-                </a:ln>
-                <a:solidFill>
-                  <a:srgbClr val="FFFFFF"/>
-                </a:solidFill>
-                <a:effectLst/>
-                <a:uLnTx/>
-                <a:uFillTx/>
-                <a:latin typeface="Arial"/>
-                <a:cs typeface="Times New Roman"/>
-              </a:rPr>
-              <a:t> </a:t>
-            </a:r>
-          </a:p>
-        </p:txBody>
-      </p:sp>
       <p:graphicFrame>
         <p:nvGraphicFramePr>
           <p:cNvPr id="4" name="tableauEmetteurs">
@@ -13501,6 +13449,71 @@
             <a:r>
               <a:rPr lang="fr-FR" sz="1000" i="1" dirty="0"/>
               <a:t>A vérifier</a:t>
+            </a:r>
+          </a:p>
+        </p:txBody>
+      </p:sp>
+      <p:sp>
+        <p:nvSpPr>
+          <p:cNvPr id="5" name="Descriptif du chauffage">
+            <a:extLst>
+              <a:ext uri="{FF2B5EF4-FFF2-40B4-BE49-F238E27FC236}">
+                <a16:creationId xmlns:a16="http://schemas.microsoft.com/office/drawing/2014/main" id="{8B4D225C-85B5-76A1-4103-82AD2BC55381}"/>
+              </a:ext>
+            </a:extLst>
+          </p:cNvPr>
+          <p:cNvSpPr txBox="1"/>
+          <p:nvPr/>
+        </p:nvSpPr>
+        <p:spPr>
+          <a:xfrm>
+            <a:off x="6436823" y="5269622"/>
+            <a:ext cx="5505452" cy="318924"/>
+          </a:xfrm>
+          <a:prstGeom prst="rect">
+            <a:avLst/>
+          </a:prstGeom>
+          <a:solidFill>
+            <a:srgbClr val="004C64"/>
+          </a:solidFill>
+        </p:spPr>
+        <p:txBody>
+          <a:bodyPr wrap="square" lIns="36000" tIns="36000" rIns="36000" bIns="36000" anchor="t">
+            <a:spAutoFit/>
+          </a:bodyPr>
+          <a:lstStyle/>
+          <a:p>
+            <a:pPr marL="0" marR="0" lvl="0" indent="0" algn="l" defTabSz="914400" rtl="0" eaLnBrk="1" fontAlgn="auto" latinLnBrk="0" hangingPunct="1">
+              <a:lnSpc>
+                <a:spcPct val="100000"/>
+              </a:lnSpc>
+              <a:spcBef>
+                <a:spcPts val="0"/>
+              </a:spcBef>
+              <a:spcAft>
+                <a:spcPts val="0"/>
+              </a:spcAft>
+              <a:buClrTx/>
+              <a:buSzTx/>
+              <a:buFontTx/>
+              <a:buNone/>
+              <a:tabLst/>
+              <a:defRPr/>
+            </a:pPr>
+            <a:r>
+              <a:rPr kumimoji="0" lang="fr-FR" sz="1600" b="0" i="0" u="none" strike="noStrike" kern="1200" cap="none" spc="0" normalizeH="0" baseline="0" noProof="0" dirty="0">
+                <a:ln>
+                  <a:noFill/>
+                </a:ln>
+                <a:solidFill>
+                  <a:srgbClr val="FFFFFF"/>
+                </a:solidFill>
+                <a:effectLst/>
+                <a:uLnTx/>
+                <a:uFillTx/>
+                <a:cs typeface="Times New Roman"/>
+              </a:rPr>
+              <a:t> 	</a:t>
             </a:r>
           </a:p>
         </p:txBody>

</xml_diff>

<commit_message>
clean up enused text #47
</commit_message>
<xml_diff>
--- a/app/src/main/assets/powerpointvierge.pptx
+++ b/app/src/main/assets/powerpointvierge.pptx
@@ -210,7 +210,7 @@
           <a:p>
             <a:fld id="{8EF2C5CC-36BA-4C84-AC43-9F8430F4AE76}" type="datetimeFigureOut">
               <a:rPr lang="fr-FR" smtClean="0"/>
-              <a:t>19/07/2023</a:t>
+              <a:t>24/07/2023</a:t>
             </a:fld>
             <a:endParaRPr lang="fr-FR"/>
           </a:p>
@@ -1290,7 +1290,7 @@
       </p:sp>
       <p:sp>
         <p:nvSpPr>
-          <p:cNvPr id="4" name="ZoneTexte 3">
+          <p:cNvPr id="4" name="ZoneTexte Couleurs pour zones">
             <a:extLst>
               <a:ext uri="{FF2B5EF4-FFF2-40B4-BE49-F238E27FC236}">
                 <a16:creationId xmlns:a16="http://schemas.microsoft.com/office/drawing/2014/main" id="{E0FFAC67-6CF3-0BEA-D07B-B92AC3FFF12D}"/>

</xml_diff>

<commit_message>
ajout surface total  #47
</commit_message>
<xml_diff>
--- a/app/src/main/assets/powerpointvierge.pptx
+++ b/app/src/main/assets/powerpointvierge.pptx
@@ -1732,14 +1732,14 @@
           <p:nvPr>
             <p:extLst>
               <p:ext uri="{D42A27DB-BD31-4B8C-83A1-F6EECF244321}">
-                <p14:modId xmlns:p14="http://schemas.microsoft.com/office/powerpoint/2010/main" val="2712078255"/>
+                <p14:modId xmlns:p14="http://schemas.microsoft.com/office/powerpoint/2010/main" val="4232598184"/>
               </p:ext>
             </p:extLst>
           </p:nvPr>
         </p:nvGraphicFramePr>
         <p:xfrm>
-          <a:off x="6957632" y="2011410"/>
-          <a:ext cx="5089784" cy="2035640"/>
+          <a:off x="6957632" y="1734151"/>
+          <a:ext cx="5089784" cy="2539324"/>
         </p:xfrm>
         <a:graphic>
           <a:graphicData uri="http://schemas.openxmlformats.org/drawingml/2006/table">
@@ -1851,6 +1851,79 @@
                 <a:extLst>
                   <a:ext uri="{0D108BD9-81ED-4DB2-BD59-A6C34878D82A}">
                     <a16:rowId xmlns:a16="http://schemas.microsoft.com/office/drawing/2014/main" val="888633293"/>
+                  </a:ext>
+                </a:extLst>
+              </a:tr>
+              <a:tr h="503684">
+                <a:tc>
+                  <a:txBody>
+                    <a:bodyPr/>
+                    <a:lstStyle/>
+                    <a:p>
+                      <a:pPr algn="l" fontAlgn="b"/>
+                      <a:r>
+                        <a:rPr lang="fr-FR" sz="1600" b="1" i="0" u="none" strike="noStrike" dirty="0">
+                          <a:solidFill>
+                            <a:schemeClr val="tx1"/>
+                          </a:solidFill>
+                          <a:effectLst/>
+                          <a:latin typeface="Calibri" panose="020F0502020204030204" pitchFamily="34" charset="0"/>
+                        </a:rPr>
+                        <a:t>Surface totale :</a:t>
+                      </a:r>
+                    </a:p>
+                  </a:txBody>
+                  <a:tcPr marL="0" marR="0" marT="0" marB="0" anchor="b">
+                    <a:lnL>
+                      <a:noFill/>
+                    </a:lnL>
+                    <a:lnR>
+                      <a:noFill/>
+                    </a:lnR>
+                    <a:lnT>
+                      <a:noFill/>
+                    </a:lnT>
+                    <a:lnB>
+                      <a:noFill/>
+                    </a:lnB>
+                  </a:tcPr>
+                </a:tc>
+                <a:tc>
+                  <a:txBody>
+                    <a:bodyPr/>
+                    <a:lstStyle/>
+                    <a:p>
+                      <a:pPr algn="l" fontAlgn="b"/>
+                      <a:r>
+                        <a:rPr lang="fr-FR" sz="1600" b="0" i="0" u="none" strike="noStrike" dirty="0">
+                          <a:solidFill>
+                            <a:schemeClr val="tx1"/>
+                          </a:solidFill>
+                          <a:effectLst/>
+                          <a:latin typeface="Calibri" panose="020F0502020204030204" pitchFamily="34" charset="0"/>
+                        </a:rPr>
+                        <a:t>Surface</a:t>
+                      </a:r>
+                    </a:p>
+                  </a:txBody>
+                  <a:tcPr marL="0" marR="0" marT="0" marB="0" anchor="b">
+                    <a:lnL>
+                      <a:noFill/>
+                    </a:lnL>
+                    <a:lnR>
+                      <a:noFill/>
+                    </a:lnR>
+                    <a:lnT>
+                      <a:noFill/>
+                    </a:lnT>
+                    <a:lnB>
+                      <a:noFill/>
+                    </a:lnB>
+                  </a:tcPr>
+                </a:tc>
+                <a:extLst>
+                  <a:ext uri="{0D108BD9-81ED-4DB2-BD59-A6C34878D82A}">
+                    <a16:rowId xmlns:a16="http://schemas.microsoft.com/office/drawing/2014/main" val="1427163883"/>
                   </a:ext>
                 </a:extLst>
               </a:tr>

</xml_diff>

<commit_message>
légende chauffer occuper #47
</commit_message>
<xml_diff>
--- a/app/src/main/assets/powerpointvierge.pptx
+++ b/app/src/main/assets/powerpointvierge.pptx
@@ -9239,12 +9239,14 @@
         <p:spPr>
           <a:xfrm>
             <a:off x="0" y="6610497"/>
-            <a:ext cx="1009892" cy="276999"/>
+            <a:ext cx="1053173" cy="276999"/>
           </a:xfrm>
           <a:prstGeom prst="rect">
             <a:avLst/>
           </a:prstGeom>
-          <a:noFill/>
+          <a:solidFill>
+            <a:srgbClr val="FF0000"/>
+          </a:solidFill>
         </p:spPr>
         <p:txBody>
           <a:bodyPr wrap="none" rtlCol="0">
@@ -9254,8 +9256,54 @@
           <a:p>
             <a:pPr algn="l"/>
             <a:r>
-              <a:rPr lang="fr-FR" sz="1200" dirty="0"/>
+              <a:rPr lang="fr-FR" sz="1200" dirty="0">
+                <a:solidFill>
+                  <a:schemeClr val="bg1"/>
+                </a:solidFill>
+              </a:rPr>
               <a:t>Chauffé : 🔥  </a:t>
+            </a:r>
+          </a:p>
+        </p:txBody>
+      </p:sp>
+      <p:sp>
+        <p:nvSpPr>
+          <p:cNvPr id="7" name="ZoneTexte 6">
+            <a:extLst>
+              <a:ext uri="{FF2B5EF4-FFF2-40B4-BE49-F238E27FC236}">
+                <a16:creationId xmlns:a16="http://schemas.microsoft.com/office/drawing/2014/main" id="{83B125C5-08D8-66BA-46C9-85712C22892B}"/>
+              </a:ext>
+            </a:extLst>
+          </p:cNvPr>
+          <p:cNvSpPr txBox="1"/>
+          <p:nvPr/>
+        </p:nvSpPr>
+        <p:spPr>
+          <a:xfrm>
+            <a:off x="1053173" y="6610497"/>
+            <a:ext cx="948622" cy="276999"/>
+          </a:xfrm>
+          <a:prstGeom prst="rect">
+            <a:avLst/>
+          </a:prstGeom>
+          <a:solidFill>
+            <a:schemeClr val="tx2"/>
+          </a:solidFill>
+        </p:spPr>
+        <p:txBody>
+          <a:bodyPr wrap="square" rtlCol="0">
+            <a:spAutoFit/>
+          </a:bodyPr>
+          <a:lstStyle/>
+          <a:p>
+            <a:pPr algn="ctr"/>
+            <a:r>
+              <a:rPr lang="fr-FR" sz="1200" dirty="0">
+                <a:solidFill>
+                  <a:schemeClr val="bg1"/>
+                </a:solidFill>
+              </a:rPr>
+              <a:t>Occuper</a:t>
             </a:r>
           </a:p>
         </p:txBody>

</xml_diff>

<commit_message>
Ajout d'une date de visite #51
</commit_message>
<xml_diff>
--- a/app/src/main/assets/powerpointvierge.pptx
+++ b/app/src/main/assets/powerpointvierge.pptx
@@ -210,7 +210,7 @@
           <a:p>
             <a:fld id="{8EF2C5CC-36BA-4C84-AC43-9F8430F4AE76}" type="datetimeFigureOut">
               <a:rPr lang="fr-FR" smtClean="0"/>
-              <a:t>25/07/2023</a:t>
+              <a:t>10/08/2023</a:t>
             </a:fld>
             <a:endParaRPr lang="fr-FR"/>
           </a:p>
@@ -1732,14 +1732,14 @@
           <p:nvPr>
             <p:extLst>
               <p:ext uri="{D42A27DB-BD31-4B8C-83A1-F6EECF244321}">
-                <p14:modId xmlns:p14="http://schemas.microsoft.com/office/powerpoint/2010/main" val="4232598184"/>
+                <p14:modId xmlns:p14="http://schemas.microsoft.com/office/powerpoint/2010/main" val="2635896092"/>
               </p:ext>
             </p:extLst>
           </p:nvPr>
         </p:nvGraphicFramePr>
         <p:xfrm>
           <a:off x="6957632" y="1734151"/>
-          <a:ext cx="5089784" cy="2539324"/>
+          <a:ext cx="5089784" cy="2941106"/>
         </p:xfrm>
         <a:graphic>
           <a:graphicData uri="http://schemas.openxmlformats.org/drawingml/2006/table">
@@ -2143,6 +2143,79 @@
                 <a:extLst>
                   <a:ext uri="{0D108BD9-81ED-4DB2-BD59-A6C34878D82A}">
                     <a16:rowId xmlns:a16="http://schemas.microsoft.com/office/drawing/2014/main" val="26674422"/>
+                  </a:ext>
+                </a:extLst>
+              </a:tr>
+              <a:tr h="401782">
+                <a:tc>
+                  <a:txBody>
+                    <a:bodyPr/>
+                    <a:lstStyle/>
+                    <a:p>
+                      <a:pPr algn="l" fontAlgn="b"/>
+                      <a:r>
+                        <a:rPr lang="fr-FR" sz="1600" b="1" i="0" u="none" strike="noStrike" dirty="0">
+                          <a:solidFill>
+                            <a:schemeClr val="tx1"/>
+                          </a:solidFill>
+                          <a:effectLst/>
+                          <a:latin typeface="Calibri" panose="020F0502020204030204" pitchFamily="34" charset="0"/>
+                        </a:rPr>
+                        <a:t>Date de visite :</a:t>
+                      </a:r>
+                    </a:p>
+                  </a:txBody>
+                  <a:tcPr marL="0" marR="0" marT="0" marB="0" anchor="b">
+                    <a:lnL>
+                      <a:noFill/>
+                    </a:lnL>
+                    <a:lnR>
+                      <a:noFill/>
+                    </a:lnR>
+                    <a:lnT>
+                      <a:noFill/>
+                    </a:lnT>
+                    <a:lnB>
+                      <a:noFill/>
+                    </a:lnB>
+                  </a:tcPr>
+                </a:tc>
+                <a:tc>
+                  <a:txBody>
+                    <a:bodyPr/>
+                    <a:lstStyle/>
+                    <a:p>
+                      <a:pPr algn="l" fontAlgn="b"/>
+                      <a:r>
+                        <a:rPr lang="fr-FR" sz="1600" b="0" i="0" u="none" strike="noStrike" dirty="0">
+                          <a:solidFill>
+                            <a:schemeClr val="tx1"/>
+                          </a:solidFill>
+                          <a:effectLst/>
+                          <a:latin typeface="Calibri" panose="020F0502020204030204" pitchFamily="34" charset="0"/>
+                        </a:rPr>
+                        <a:t>Date de visite</a:t>
+                      </a:r>
+                    </a:p>
+                  </a:txBody>
+                  <a:tcPr marL="0" marR="0" marT="0" marB="0" anchor="b">
+                    <a:lnL>
+                      <a:noFill/>
+                    </a:lnL>
+                    <a:lnR>
+                      <a:noFill/>
+                    </a:lnR>
+                    <a:lnT>
+                      <a:noFill/>
+                    </a:lnT>
+                    <a:lnB>
+                      <a:noFill/>
+                    </a:lnB>
+                  </a:tcPr>
+                </a:tc>
+                <a:extLst>
+                  <a:ext uri="{0D108BD9-81ED-4DB2-BD59-A6C34878D82A}">
+                    <a16:rowId xmlns:a16="http://schemas.microsoft.com/office/drawing/2014/main" val="362996870"/>
                   </a:ext>
                 </a:extLst>
               </a:tr>
@@ -2361,7 +2434,7 @@
         </p:nvSpPr>
         <p:spPr>
           <a:xfrm>
-            <a:off x="6914431" y="4603839"/>
+            <a:off x="6914430" y="4745153"/>
             <a:ext cx="5176187" cy="318924"/>
           </a:xfrm>
           <a:prstGeom prst="rect">

</xml_diff>